<commit_message>
Remove slides from practical 1 & zoom-related
</commit_message>
<xml_diff>
--- a/session_2/SLIDES_introduction_to_R_2.pptx
+++ b/session_2/SLIDES_introduction_to_R_2.pptx
@@ -7,22 +7,14 @@
   </p:sldMasterIdLst>
   <p:sldIdLst>
     <p:sldId id="283" r:id="rId3"/>
-    <p:sldId id="362" r:id="rId4"/>
-    <p:sldId id="384" r:id="rId5"/>
-    <p:sldId id="363" r:id="rId6"/>
-    <p:sldId id="381" r:id="rId7"/>
-    <p:sldId id="380" r:id="rId8"/>
-    <p:sldId id="383" r:id="rId9"/>
-    <p:sldId id="394" r:id="rId10"/>
-    <p:sldId id="385" r:id="rId11"/>
-    <p:sldId id="386" r:id="rId12"/>
-    <p:sldId id="382" r:id="rId13"/>
-    <p:sldId id="395" r:id="rId14"/>
-    <p:sldId id="388" r:id="rId15"/>
-    <p:sldId id="389" r:id="rId16"/>
-    <p:sldId id="390" r:id="rId17"/>
-    <p:sldId id="393" r:id="rId18"/>
-    <p:sldId id="392" r:id="rId19"/>
+    <p:sldId id="383" r:id="rId4"/>
+    <p:sldId id="382" r:id="rId5"/>
+    <p:sldId id="395" r:id="rId6"/>
+    <p:sldId id="388" r:id="rId7"/>
+    <p:sldId id="389" r:id="rId8"/>
+    <p:sldId id="396" r:id="rId9"/>
+    <p:sldId id="393" r:id="rId10"/>
+    <p:sldId id="392" r:id="rId11"/>
   </p:sldIdLst>
   <p:sldSz cx="12192000" cy="6858000"/>
   <p:notesSz cx="6858000" cy="9144000"/>
@@ -278,7 +270,7 @@
           <a:p>
             <a:fld id="{E37723A7-B92E-4635-B4A4-B660A270521F}" type="datetimeFigureOut">
               <a:rPr lang="en-GB" smtClean="0"/>
-              <a:t>15/11/2022</a:t>
+              <a:t>16/11/2022</a:t>
             </a:fld>
             <a:endParaRPr lang="en-GB"/>
           </a:p>
@@ -478,7 +470,7 @@
           <a:p>
             <a:fld id="{E37723A7-B92E-4635-B4A4-B660A270521F}" type="datetimeFigureOut">
               <a:rPr lang="en-GB" smtClean="0"/>
-              <a:t>15/11/2022</a:t>
+              <a:t>16/11/2022</a:t>
             </a:fld>
             <a:endParaRPr lang="en-GB"/>
           </a:p>
@@ -688,7 +680,7 @@
           <a:p>
             <a:fld id="{E37723A7-B92E-4635-B4A4-B660A270521F}" type="datetimeFigureOut">
               <a:rPr lang="en-GB" smtClean="0"/>
-              <a:t>15/11/2022</a:t>
+              <a:t>16/11/2022</a:t>
             </a:fld>
             <a:endParaRPr lang="en-GB"/>
           </a:p>
@@ -2100,7 +2092,7 @@
           <a:p>
             <a:fld id="{E37723A7-B92E-4635-B4A4-B660A270521F}" type="datetimeFigureOut">
               <a:rPr lang="en-GB" smtClean="0"/>
-              <a:t>15/11/2022</a:t>
+              <a:t>16/11/2022</a:t>
             </a:fld>
             <a:endParaRPr lang="en-GB"/>
           </a:p>
@@ -2376,7 +2368,7 @@
           <a:p>
             <a:fld id="{E37723A7-B92E-4635-B4A4-B660A270521F}" type="datetimeFigureOut">
               <a:rPr lang="en-GB" smtClean="0"/>
-              <a:t>15/11/2022</a:t>
+              <a:t>16/11/2022</a:t>
             </a:fld>
             <a:endParaRPr lang="en-GB"/>
           </a:p>
@@ -2644,7 +2636,7 @@
           <a:p>
             <a:fld id="{E37723A7-B92E-4635-B4A4-B660A270521F}" type="datetimeFigureOut">
               <a:rPr lang="en-GB" smtClean="0"/>
-              <a:t>15/11/2022</a:t>
+              <a:t>16/11/2022</a:t>
             </a:fld>
             <a:endParaRPr lang="en-GB"/>
           </a:p>
@@ -3059,7 +3051,7 @@
           <a:p>
             <a:fld id="{E37723A7-B92E-4635-B4A4-B660A270521F}" type="datetimeFigureOut">
               <a:rPr lang="en-GB" smtClean="0"/>
-              <a:t>15/11/2022</a:t>
+              <a:t>16/11/2022</a:t>
             </a:fld>
             <a:endParaRPr lang="en-GB"/>
           </a:p>
@@ -3201,7 +3193,7 @@
           <a:p>
             <a:fld id="{E37723A7-B92E-4635-B4A4-B660A270521F}" type="datetimeFigureOut">
               <a:rPr lang="en-GB" smtClean="0"/>
-              <a:t>15/11/2022</a:t>
+              <a:t>16/11/2022</a:t>
             </a:fld>
             <a:endParaRPr lang="en-GB"/>
           </a:p>
@@ -3314,7 +3306,7 @@
           <a:p>
             <a:fld id="{E37723A7-B92E-4635-B4A4-B660A270521F}" type="datetimeFigureOut">
               <a:rPr lang="en-GB" smtClean="0"/>
-              <a:t>15/11/2022</a:t>
+              <a:t>16/11/2022</a:t>
             </a:fld>
             <a:endParaRPr lang="en-GB"/>
           </a:p>
@@ -3627,7 +3619,7 @@
           <a:p>
             <a:fld id="{E37723A7-B92E-4635-B4A4-B660A270521F}" type="datetimeFigureOut">
               <a:rPr lang="en-GB" smtClean="0"/>
-              <a:t>15/11/2022</a:t>
+              <a:t>16/11/2022</a:t>
             </a:fld>
             <a:endParaRPr lang="en-GB"/>
           </a:p>
@@ -3916,7 +3908,7 @@
           <a:p>
             <a:fld id="{E37723A7-B92E-4635-B4A4-B660A270521F}" type="datetimeFigureOut">
               <a:rPr lang="en-GB" smtClean="0"/>
-              <a:t>15/11/2022</a:t>
+              <a:t>16/11/2022</a:t>
             </a:fld>
             <a:endParaRPr lang="en-GB"/>
           </a:p>
@@ -4159,7 +4151,7 @@
           <a:p>
             <a:fld id="{E37723A7-B92E-4635-B4A4-B660A270521F}" type="datetimeFigureOut">
               <a:rPr lang="en-GB" smtClean="0"/>
-              <a:t>15/11/2022</a:t>
+              <a:t>16/11/2022</a:t>
             </a:fld>
             <a:endParaRPr lang="en-GB"/>
           </a:p>
@@ -5147,7 +5139,7 @@
 </p:sld>
 </file>
 
-<file path=ppt/slides/slide10.xml><?xml version="1.0" encoding="utf-8"?>
+<file path=ppt/slides/slide2.xml><?xml version="1.0" encoding="utf-8"?>
 <p:sld xmlns:a="http://schemas.openxmlformats.org/drawingml/2006/main" xmlns:r="http://schemas.openxmlformats.org/officeDocument/2006/relationships" xmlns:p="http://schemas.openxmlformats.org/presentationml/2006/main">
   <p:cSld>
     <p:spTree>
@@ -5166,333 +5158,91 @@
       </p:grpSpPr>
       <p:sp>
         <p:nvSpPr>
-          <p:cNvPr id="2" name="Title 1">
-            <a:extLst>
-              <a:ext uri="{FF2B5EF4-FFF2-40B4-BE49-F238E27FC236}">
-                <a16:creationId xmlns:a16="http://schemas.microsoft.com/office/drawing/2014/main" id="{B105F02B-CF26-4BB0-A3D9-67EA4975ED02}"/>
-              </a:ext>
-            </a:extLst>
-          </p:cNvPr>
-          <p:cNvSpPr>
-            <a:spLocks noGrp="1"/>
-          </p:cNvSpPr>
-          <p:nvPr>
-            <p:ph type="title"/>
-          </p:nvPr>
-        </p:nvSpPr>
-        <p:spPr/>
-        <p:txBody>
-          <a:bodyPr/>
+          <p:cNvPr id="6" name="TextBox 5"/>
+          <p:cNvSpPr txBox="1"/>
+          <p:nvPr/>
+        </p:nvSpPr>
+        <p:spPr>
+          <a:xfrm>
+            <a:off x="1680117" y="2505670"/>
+            <a:ext cx="8831766" cy="923330"/>
+          </a:xfrm>
+          <a:prstGeom prst="rect">
+            <a:avLst/>
+          </a:prstGeom>
+          <a:noFill/>
+        </p:spPr>
+        <p:txBody>
+          <a:bodyPr wrap="square" rtlCol="0">
+            <a:spAutoFit/>
+          </a:bodyPr>
           <a:lstStyle/>
           <a:p>
-            <a:r>
-              <a:rPr lang="en-US" dirty="0" err="1"/>
-              <a:t>Dataframes</a:t>
-            </a:r>
-            <a:endParaRPr lang="en-GB" dirty="0"/>
-          </a:p>
-        </p:txBody>
-      </p:sp>
-      <p:sp>
-        <p:nvSpPr>
-          <p:cNvPr id="3" name="Content Placeholder 2">
-            <a:extLst>
-              <a:ext uri="{FF2B5EF4-FFF2-40B4-BE49-F238E27FC236}">
-                <a16:creationId xmlns:a16="http://schemas.microsoft.com/office/drawing/2014/main" id="{D5D08F35-34CC-44A6-865B-73A6B3548D01}"/>
-              </a:ext>
-            </a:extLst>
-          </p:cNvPr>
-          <p:cNvSpPr>
-            <a:spLocks noGrp="1"/>
-          </p:cNvSpPr>
-          <p:nvPr>
-            <p:ph idx="1"/>
-          </p:nvPr>
-        </p:nvSpPr>
-        <p:spPr/>
-        <p:txBody>
-          <a:bodyPr/>
-          <a:lstStyle/>
-          <a:p>
-            <a:pPr marL="342900" indent="-342900">
-              <a:buFont typeface="Arial" panose="020B0604020202020204" pitchFamily="34" charset="0"/>
-              <a:buChar char="•"/>
+            <a:pPr marL="0" marR="0" lvl="0" indent="0" algn="ctr" defTabSz="457200" rtl="0" eaLnBrk="1" fontAlgn="auto" latinLnBrk="0" hangingPunct="1">
+              <a:lnSpc>
+                <a:spcPct val="100000"/>
+              </a:lnSpc>
+              <a:spcBef>
+                <a:spcPts val="0"/>
+              </a:spcBef>
+              <a:spcAft>
+                <a:spcPts val="0"/>
+              </a:spcAft>
+              <a:buClrTx/>
+              <a:buSzTx/>
+              <a:buFontTx/>
+              <a:buNone/>
+              <a:tabLst/>
+              <a:defRPr/>
             </a:pPr>
-            <a:endParaRPr lang="en-US" dirty="0"/>
-          </a:p>
-          <a:p>
-            <a:pPr marL="342900" indent="-342900">
-              <a:buFont typeface="Arial" panose="020B0604020202020204" pitchFamily="34" charset="0"/>
-              <a:buChar char="•"/>
-            </a:pPr>
-            <a:endParaRPr lang="en-US" dirty="0"/>
-          </a:p>
-          <a:p>
-            <a:pPr marL="342900" indent="-342900">
-              <a:buFont typeface="Arial" panose="020B0604020202020204" pitchFamily="34" charset="0"/>
-              <a:buChar char="•"/>
-            </a:pPr>
-            <a:r>
-              <a:rPr lang="en-US" dirty="0" err="1"/>
-              <a:t>Dataframes</a:t>
-            </a:r>
-            <a:r>
-              <a:rPr lang="en-US" dirty="0"/>
-              <a:t> are similar to matrix, except that they can contain multiple data types.</a:t>
-            </a:r>
-          </a:p>
-          <a:p>
-            <a:pPr marL="342900" indent="-342900">
-              <a:buFont typeface="Arial" panose="020B0604020202020204" pitchFamily="34" charset="0"/>
-              <a:buChar char="•"/>
-            </a:pPr>
-            <a:endParaRPr lang="en-US" dirty="0"/>
-          </a:p>
-          <a:p>
-            <a:pPr marL="342900" indent="-342900">
-              <a:buFont typeface="Arial" panose="020B0604020202020204" pitchFamily="34" charset="0"/>
-              <a:buChar char="•"/>
-            </a:pPr>
-            <a:r>
-              <a:rPr lang="en-US" dirty="0"/>
-              <a:t>They are created using the command ‘</a:t>
-            </a:r>
-            <a:r>
-              <a:rPr lang="en-US" dirty="0" err="1"/>
-              <a:t>data.frame</a:t>
-            </a:r>
-            <a:r>
-              <a:rPr lang="en-US" dirty="0"/>
-              <a:t>()’</a:t>
-            </a:r>
-          </a:p>
-          <a:p>
-            <a:pPr marL="342900" indent="-342900">
-              <a:buFont typeface="Arial" panose="020B0604020202020204" pitchFamily="34" charset="0"/>
-              <a:buChar char="•"/>
-            </a:pPr>
-            <a:endParaRPr lang="en-US" dirty="0"/>
-          </a:p>
-          <a:p>
-            <a:pPr marL="342900" indent="-342900">
-              <a:buFont typeface="Arial" panose="020B0604020202020204" pitchFamily="34" charset="0"/>
-              <a:buChar char="•"/>
-            </a:pPr>
-            <a:r>
-              <a:rPr lang="en-US" dirty="0"/>
-              <a:t>Their elements can be accessed in the same way as matrices.</a:t>
-            </a:r>
-          </a:p>
-          <a:p>
-            <a:pPr marL="342900" indent="-342900">
-              <a:buFont typeface="Arial" panose="020B0604020202020204" pitchFamily="34" charset="0"/>
-              <a:buChar char="•"/>
-            </a:pPr>
-            <a:endParaRPr lang="en-US" dirty="0"/>
-          </a:p>
-          <a:p>
-            <a:pPr marL="342900" indent="-342900">
-              <a:buFont typeface="Arial" panose="020B0604020202020204" pitchFamily="34" charset="0"/>
-              <a:buChar char="•"/>
-            </a:pPr>
-            <a:endParaRPr lang="en-GB" dirty="0"/>
+            <a:r>
+              <a:rPr kumimoji="0" lang="en-GB" sz="5400" b="0" i="0" u="none" strike="noStrike" kern="1200" cap="none" spc="0" normalizeH="0" baseline="0" noProof="0" dirty="0">
+                <a:ln>
+                  <a:noFill/>
+                </a:ln>
+                <a:solidFill>
+                  <a:srgbClr val="000000"/>
+                </a:solidFill>
+                <a:effectLst/>
+                <a:uLnTx/>
+                <a:uFillTx/>
+                <a:latin typeface="Calibri" panose="020F0502020204030204" pitchFamily="34" charset="0"/>
+                <a:ea typeface="+mn-ea"/>
+                <a:cs typeface="+mn-cs"/>
+              </a:rPr>
+              <a:t>Practical 2</a:t>
+            </a:r>
+            <a:endParaRPr kumimoji="0" lang="en-GB" sz="5400" b="0" i="0" u="none" strike="noStrike" kern="1200" cap="none" spc="0" normalizeH="0" baseline="0" noProof="0" dirty="0">
+              <a:ln>
+                <a:noFill/>
+              </a:ln>
+              <a:solidFill>
+                <a:srgbClr val="000000"/>
+              </a:solidFill>
+              <a:effectLst/>
+              <a:uLnTx/>
+              <a:uFillTx/>
+              <a:latin typeface="Constantia" panose="02030602050306030303" pitchFamily="18" charset="0"/>
+              <a:ea typeface="+mn-ea"/>
+              <a:cs typeface="+mn-cs"/>
+            </a:endParaRPr>
           </a:p>
         </p:txBody>
       </p:sp>
     </p:spTree>
     <p:extLst>
       <p:ext uri="{BB962C8B-B14F-4D97-AF65-F5344CB8AC3E}">
-        <p14:creationId xmlns:p14="http://schemas.microsoft.com/office/powerpoint/2010/main" val="1350202284"/>
+        <p14:creationId xmlns:p14="http://schemas.microsoft.com/office/powerpoint/2010/main" val="1082209432"/>
       </p:ext>
     </p:extLst>
   </p:cSld>
   <p:clrMapOvr>
     <a:masterClrMapping/>
   </p:clrMapOvr>
-  <p:timing>
-    <p:tnLst>
-      <p:par>
-        <p:cTn id="1" dur="indefinite" restart="never" nodeType="tmRoot">
-          <p:childTnLst>
-            <p:seq concurrent="1" nextAc="seek">
-              <p:cTn id="2" dur="indefinite" nodeType="mainSeq">
-                <p:childTnLst>
-                  <p:par>
-                    <p:cTn id="3" fill="hold">
-                      <p:stCondLst>
-                        <p:cond delay="indefinite"/>
-                      </p:stCondLst>
-                      <p:childTnLst>
-                        <p:par>
-                          <p:cTn id="4" fill="hold">
-                            <p:stCondLst>
-                              <p:cond delay="0"/>
-                            </p:stCondLst>
-                            <p:childTnLst>
-                              <p:par>
-                                <p:cTn id="5" presetID="1" presetClass="entr" presetSubtype="0" fill="hold" grpId="0" nodeType="clickEffect">
-                                  <p:stCondLst>
-                                    <p:cond delay="0"/>
-                                  </p:stCondLst>
-                                  <p:childTnLst>
-                                    <p:set>
-                                      <p:cBhvr>
-                                        <p:cTn id="6" dur="1" fill="hold">
-                                          <p:stCondLst>
-                                            <p:cond delay="0"/>
-                                          </p:stCondLst>
-                                        </p:cTn>
-                                        <p:tgtEl>
-                                          <p:spTgt spid="3">
-                                            <p:txEl>
-                                              <p:pRg st="2" end="2"/>
-                                            </p:txEl>
-                                          </p:spTgt>
-                                        </p:tgtEl>
-                                        <p:attrNameLst>
-                                          <p:attrName>style.visibility</p:attrName>
-                                        </p:attrNameLst>
-                                      </p:cBhvr>
-                                      <p:to>
-                                        <p:strVal val="visible"/>
-                                      </p:to>
-                                    </p:set>
-                                  </p:childTnLst>
-                                </p:cTn>
-                              </p:par>
-                            </p:childTnLst>
-                          </p:cTn>
-                        </p:par>
-                      </p:childTnLst>
-                    </p:cTn>
-                  </p:par>
-                  <p:par>
-                    <p:cTn id="7" fill="hold">
-                      <p:stCondLst>
-                        <p:cond delay="indefinite"/>
-                      </p:stCondLst>
-                      <p:childTnLst>
-                        <p:par>
-                          <p:cTn id="8" fill="hold">
-                            <p:stCondLst>
-                              <p:cond delay="0"/>
-                            </p:stCondLst>
-                            <p:childTnLst>
-                              <p:par>
-                                <p:cTn id="9" presetID="1" presetClass="entr" presetSubtype="0" fill="hold" grpId="0" nodeType="clickEffect">
-                                  <p:stCondLst>
-                                    <p:cond delay="0"/>
-                                  </p:stCondLst>
-                                  <p:childTnLst>
-                                    <p:set>
-                                      <p:cBhvr>
-                                        <p:cTn id="10" dur="1" fill="hold">
-                                          <p:stCondLst>
-                                            <p:cond delay="0"/>
-                                          </p:stCondLst>
-                                        </p:cTn>
-                                        <p:tgtEl>
-                                          <p:spTgt spid="3">
-                                            <p:txEl>
-                                              <p:pRg st="4" end="4"/>
-                                            </p:txEl>
-                                          </p:spTgt>
-                                        </p:tgtEl>
-                                        <p:attrNameLst>
-                                          <p:attrName>style.visibility</p:attrName>
-                                        </p:attrNameLst>
-                                      </p:cBhvr>
-                                      <p:to>
-                                        <p:strVal val="visible"/>
-                                      </p:to>
-                                    </p:set>
-                                  </p:childTnLst>
-                                </p:cTn>
-                              </p:par>
-                            </p:childTnLst>
-                          </p:cTn>
-                        </p:par>
-                      </p:childTnLst>
-                    </p:cTn>
-                  </p:par>
-                  <p:par>
-                    <p:cTn id="11" fill="hold">
-                      <p:stCondLst>
-                        <p:cond delay="indefinite"/>
-                      </p:stCondLst>
-                      <p:childTnLst>
-                        <p:par>
-                          <p:cTn id="12" fill="hold">
-                            <p:stCondLst>
-                              <p:cond delay="0"/>
-                            </p:stCondLst>
-                            <p:childTnLst>
-                              <p:par>
-                                <p:cTn id="13" presetID="1" presetClass="entr" presetSubtype="0" fill="hold" grpId="0" nodeType="clickEffect">
-                                  <p:stCondLst>
-                                    <p:cond delay="0"/>
-                                  </p:stCondLst>
-                                  <p:childTnLst>
-                                    <p:set>
-                                      <p:cBhvr>
-                                        <p:cTn id="14" dur="1" fill="hold">
-                                          <p:stCondLst>
-                                            <p:cond delay="0"/>
-                                          </p:stCondLst>
-                                        </p:cTn>
-                                        <p:tgtEl>
-                                          <p:spTgt spid="3">
-                                            <p:txEl>
-                                              <p:pRg st="6" end="6"/>
-                                            </p:txEl>
-                                          </p:spTgt>
-                                        </p:tgtEl>
-                                        <p:attrNameLst>
-                                          <p:attrName>style.visibility</p:attrName>
-                                        </p:attrNameLst>
-                                      </p:cBhvr>
-                                      <p:to>
-                                        <p:strVal val="visible"/>
-                                      </p:to>
-                                    </p:set>
-                                  </p:childTnLst>
-                                </p:cTn>
-                              </p:par>
-                            </p:childTnLst>
-                          </p:cTn>
-                        </p:par>
-                      </p:childTnLst>
-                    </p:cTn>
-                  </p:par>
-                </p:childTnLst>
-              </p:cTn>
-              <p:prevCondLst>
-                <p:cond evt="onPrev" delay="0">
-                  <p:tgtEl>
-                    <p:sldTgt/>
-                  </p:tgtEl>
-                </p:cond>
-              </p:prevCondLst>
-              <p:nextCondLst>
-                <p:cond evt="onNext" delay="0">
-                  <p:tgtEl>
-                    <p:sldTgt/>
-                  </p:tgtEl>
-                </p:cond>
-              </p:nextCondLst>
-            </p:seq>
-          </p:childTnLst>
-        </p:cTn>
-      </p:par>
-    </p:tnLst>
-    <p:bldLst>
-      <p:bldP spid="3" grpId="0" build="p"/>
-    </p:bldLst>
-  </p:timing>
 </p:sld>
 </file>
 
-<file path=ppt/slides/slide11.xml><?xml version="1.0" encoding="utf-8"?>
+<file path=ppt/slides/slide3.xml><?xml version="1.0" encoding="utf-8"?>
 <p:sld xmlns:a="http://schemas.openxmlformats.org/drawingml/2006/main" xmlns:r="http://schemas.openxmlformats.org/officeDocument/2006/relationships" xmlns:p="http://schemas.openxmlformats.org/presentationml/2006/main">
   <p:cSld>
     <p:spTree>
@@ -6096,7 +5846,7 @@
 </p:sld>
 </file>
 
-<file path=ppt/slides/slide12.xml><?xml version="1.0" encoding="utf-8"?>
+<file path=ppt/slides/slide4.xml><?xml version="1.0" encoding="utf-8"?>
 <p:sld xmlns:a="http://schemas.openxmlformats.org/drawingml/2006/main" xmlns:r="http://schemas.openxmlformats.org/officeDocument/2006/relationships" xmlns:p="http://schemas.openxmlformats.org/presentationml/2006/main">
   <p:cSld>
     <p:spTree>
@@ -6949,7 +6699,7 @@
 </p:sld>
 </file>
 
-<file path=ppt/slides/slide13.xml><?xml version="1.0" encoding="utf-8"?>
+<file path=ppt/slides/slide5.xml><?xml version="1.0" encoding="utf-8"?>
 <p:sld xmlns:a="http://schemas.openxmlformats.org/drawingml/2006/main" xmlns:r="http://schemas.openxmlformats.org/officeDocument/2006/relationships" xmlns:p="http://schemas.openxmlformats.org/presentationml/2006/main">
   <p:cSld>
     <p:spTree>
@@ -7444,7 +7194,7 @@
 </p:sld>
 </file>
 
-<file path=ppt/slides/slide14.xml><?xml version="1.0" encoding="utf-8"?>
+<file path=ppt/slides/slide6.xml><?xml version="1.0" encoding="utf-8"?>
 <p:sld xmlns:a="http://schemas.openxmlformats.org/drawingml/2006/main" xmlns:r="http://schemas.openxmlformats.org/officeDocument/2006/relationships" xmlns:p="http://schemas.openxmlformats.org/presentationml/2006/main">
   <p:cSld>
     <p:spTree>
@@ -7909,7 +7659,7 @@
 </p:sld>
 </file>
 
-<file path=ppt/slides/slide15.xml><?xml version="1.0" encoding="utf-8"?>
+<file path=ppt/slides/slide7.xml><?xml version="1.0" encoding="utf-8"?>
 <p:sld xmlns:a="http://schemas.openxmlformats.org/drawingml/2006/main" xmlns:r="http://schemas.openxmlformats.org/officeDocument/2006/relationships" xmlns:p="http://schemas.openxmlformats.org/presentationml/2006/main">
   <p:cSld>
     <p:spTree>
@@ -7931,7 +7681,7 @@
           <p:cNvPr id="2" name="Title 1">
             <a:extLst>
               <a:ext uri="{FF2B5EF4-FFF2-40B4-BE49-F238E27FC236}">
-                <a16:creationId xmlns:a16="http://schemas.microsoft.com/office/drawing/2014/main" id="{AB662826-BDF6-4712-ADA9-10AB70938EFC}"/>
+                <a16:creationId xmlns:a16="http://schemas.microsoft.com/office/drawing/2014/main" id="{0494694A-369B-2B83-68B9-A5CFFBF5E733}"/>
               </a:ext>
             </a:extLst>
           </p:cNvPr>
@@ -7949,7 +7699,11 @@
           <a:p>
             <a:r>
               <a:rPr lang="en-US" dirty="0"/>
-              <a:t>Breakout rooms</a:t>
+              <a:t>Package for data cleaning: </a:t>
+            </a:r>
+            <a:r>
+              <a:rPr lang="en-US" dirty="0" err="1"/>
+              <a:t>dplyr</a:t>
             </a:r>
             <a:endParaRPr lang="en-GB" dirty="0"/>
           </a:p>
@@ -7960,7 +7714,7 @@
           <p:cNvPr id="3" name="Content Placeholder 2">
             <a:extLst>
               <a:ext uri="{FF2B5EF4-FFF2-40B4-BE49-F238E27FC236}">
-                <a16:creationId xmlns:a16="http://schemas.microsoft.com/office/drawing/2014/main" id="{F94EE058-DAB7-49DE-8DBE-C62F6502B3A8}"/>
+                <a16:creationId xmlns:a16="http://schemas.microsoft.com/office/drawing/2014/main" id="{1DE2EACC-629E-3BED-0F35-917C8154711F}"/>
               </a:ext>
             </a:extLst>
           </p:cNvPr>
@@ -7976,14 +7730,14 @@
           <a:bodyPr/>
           <a:lstStyle/>
           <a:p>
-            <a:endParaRPr lang="en-GB" dirty="0"/>
+            <a:endParaRPr lang="en-GB"/>
           </a:p>
         </p:txBody>
       </p:sp>
     </p:spTree>
     <p:extLst>
       <p:ext uri="{BB962C8B-B14F-4D97-AF65-F5344CB8AC3E}">
-        <p14:creationId xmlns:p14="http://schemas.microsoft.com/office/powerpoint/2010/main" val="1198548428"/>
+        <p14:creationId xmlns:p14="http://schemas.microsoft.com/office/powerpoint/2010/main" val="3463844246"/>
       </p:ext>
     </p:extLst>
   </p:cSld>
@@ -7993,7 +7747,7 @@
 </p:sld>
 </file>
 
-<file path=ppt/slides/slide16.xml><?xml version="1.0" encoding="utf-8"?>
+<file path=ppt/slides/slide8.xml><?xml version="1.0" encoding="utf-8"?>
 <p:sld xmlns:a="http://schemas.openxmlformats.org/drawingml/2006/main" xmlns:r="http://schemas.openxmlformats.org/officeDocument/2006/relationships" xmlns:p="http://schemas.openxmlformats.org/presentationml/2006/main">
   <p:cSld>
     <p:spTree>
@@ -8559,3078 +8313,6 @@
 </p:sld>
 </file>
 
-<file path=ppt/slides/slide17.xml><?xml version="1.0" encoding="utf-8"?>
-<p:sld xmlns:a="http://schemas.openxmlformats.org/drawingml/2006/main" xmlns:r="http://schemas.openxmlformats.org/officeDocument/2006/relationships" xmlns:p="http://schemas.openxmlformats.org/presentationml/2006/main">
-  <p:cSld>
-    <p:spTree>
-      <p:nvGrpSpPr>
-        <p:cNvPr id="1" name=""/>
-        <p:cNvGrpSpPr/>
-        <p:nvPr/>
-      </p:nvGrpSpPr>
-      <p:grpSpPr>
-        <a:xfrm>
-          <a:off x="0" y="0"/>
-          <a:ext cx="0" cy="0"/>
-          <a:chOff x="0" y="0"/>
-          <a:chExt cx="0" cy="0"/>
-        </a:xfrm>
-      </p:grpSpPr>
-      <p:sp>
-        <p:nvSpPr>
-          <p:cNvPr id="2" name="Title 1">
-            <a:extLst>
-              <a:ext uri="{FF2B5EF4-FFF2-40B4-BE49-F238E27FC236}">
-                <a16:creationId xmlns:a16="http://schemas.microsoft.com/office/drawing/2014/main" id="{A1FFF348-256A-419B-94A5-1E1296D1F338}"/>
-              </a:ext>
-            </a:extLst>
-          </p:cNvPr>
-          <p:cNvSpPr>
-            <a:spLocks noGrp="1"/>
-          </p:cNvSpPr>
-          <p:nvPr>
-            <p:ph type="title"/>
-          </p:nvPr>
-        </p:nvSpPr>
-        <p:spPr/>
-        <p:txBody>
-          <a:bodyPr/>
-          <a:lstStyle/>
-          <a:p>
-            <a:r>
-              <a:rPr lang="en-US" dirty="0"/>
-              <a:t>Further resources</a:t>
-            </a:r>
-            <a:endParaRPr lang="en-GB" dirty="0"/>
-          </a:p>
-        </p:txBody>
-      </p:sp>
-      <p:sp>
-        <p:nvSpPr>
-          <p:cNvPr id="3" name="Content Placeholder 2">
-            <a:extLst>
-              <a:ext uri="{FF2B5EF4-FFF2-40B4-BE49-F238E27FC236}">
-                <a16:creationId xmlns:a16="http://schemas.microsoft.com/office/drawing/2014/main" id="{D9F956DB-4DF0-4E24-84E4-DA013CE75541}"/>
-              </a:ext>
-            </a:extLst>
-          </p:cNvPr>
-          <p:cNvSpPr>
-            <a:spLocks noGrp="1"/>
-          </p:cNvSpPr>
-          <p:nvPr>
-            <p:ph idx="1"/>
-          </p:nvPr>
-        </p:nvSpPr>
-        <p:spPr>
-          <a:xfrm>
-            <a:off x="438151" y="1477818"/>
-            <a:ext cx="11753850" cy="4821382"/>
-          </a:xfrm>
-        </p:spPr>
-        <p:txBody>
-          <a:bodyPr/>
-          <a:lstStyle/>
-          <a:p>
-            <a:pPr marL="342900" indent="-342900">
-              <a:buFont typeface="Arial" panose="020B0604020202020204" pitchFamily="34" charset="0"/>
-              <a:buChar char="•"/>
-            </a:pPr>
-            <a:r>
-              <a:rPr lang="en-US" dirty="0"/>
-              <a:t>Excellent summary of functions used for data analysis and visualization </a:t>
-            </a:r>
-            <a:r>
-              <a:rPr lang="en-US" dirty="0">
-                <a:hlinkClick r:id="rId2"/>
-              </a:rPr>
-              <a:t>https://r4ds.had.co.nz/index.html</a:t>
-            </a:r>
-            <a:r>
-              <a:rPr lang="en-US" dirty="0"/>
-              <a:t> </a:t>
-            </a:r>
-          </a:p>
-          <a:p>
-            <a:pPr marL="342900" indent="-342900">
-              <a:buFont typeface="Arial" panose="020B0604020202020204" pitchFamily="34" charset="0"/>
-              <a:buChar char="•"/>
-            </a:pPr>
-            <a:endParaRPr lang="en-US" dirty="0"/>
-          </a:p>
-          <a:p>
-            <a:pPr marL="342900" indent="-342900">
-              <a:buFont typeface="Arial" panose="020B0604020202020204" pitchFamily="34" charset="0"/>
-              <a:buChar char="•"/>
-            </a:pPr>
-            <a:r>
-              <a:rPr lang="en-US" dirty="0"/>
-              <a:t>Making graphs in R: </a:t>
-            </a:r>
-            <a:r>
-              <a:rPr lang="en-US" dirty="0">
-                <a:hlinkClick r:id="rId3"/>
-              </a:rPr>
-              <a:t>http://www.cookbook-r.com/Graphs/</a:t>
-            </a:r>
-            <a:r>
-              <a:rPr lang="en-US" dirty="0"/>
-              <a:t> </a:t>
-            </a:r>
-          </a:p>
-          <a:p>
-            <a:pPr marL="342900" indent="-342900">
-              <a:buFont typeface="Arial" panose="020B0604020202020204" pitchFamily="34" charset="0"/>
-              <a:buChar char="•"/>
-            </a:pPr>
-            <a:endParaRPr lang="en-US" dirty="0"/>
-          </a:p>
-          <a:p>
-            <a:pPr marL="342900" indent="-342900">
-              <a:buFont typeface="Arial" panose="020B0604020202020204" pitchFamily="34" charset="0"/>
-              <a:buChar char="•"/>
-            </a:pPr>
-            <a:r>
-              <a:rPr lang="en-US" dirty="0"/>
-              <a:t>For an introduction to packages and development: </a:t>
-            </a:r>
-            <a:r>
-              <a:rPr lang="en-US" dirty="0">
-                <a:hlinkClick r:id="rId4"/>
-              </a:rPr>
-              <a:t>https://r-pkgs.org/intro.html</a:t>
-            </a:r>
-            <a:r>
-              <a:rPr lang="en-US" dirty="0"/>
-              <a:t> </a:t>
-            </a:r>
-          </a:p>
-          <a:p>
-            <a:pPr marL="342900" indent="-342900">
-              <a:buFont typeface="Arial" panose="020B0604020202020204" pitchFamily="34" charset="0"/>
-              <a:buChar char="•"/>
-            </a:pPr>
-            <a:endParaRPr lang="en-US" dirty="0"/>
-          </a:p>
-          <a:p>
-            <a:pPr marL="342900" indent="-342900">
-              <a:buFont typeface="Arial" panose="020B0604020202020204" pitchFamily="34" charset="0"/>
-              <a:buChar char="•"/>
-            </a:pPr>
-            <a:r>
-              <a:rPr lang="en-GB" dirty="0"/>
-              <a:t>The </a:t>
-            </a:r>
-            <a:r>
-              <a:rPr lang="en-GB" dirty="0" err="1"/>
-              <a:t>cheatsheets</a:t>
-            </a:r>
-            <a:r>
-              <a:rPr lang="en-GB" dirty="0"/>
-              <a:t> of various R packages: </a:t>
-            </a:r>
-            <a:r>
-              <a:rPr lang="en-GB" dirty="0">
-                <a:hlinkClick r:id="rId5"/>
-              </a:rPr>
-              <a:t>https://www.rstudio.com/resources/cheatsheets/</a:t>
-            </a:r>
-            <a:r>
-              <a:rPr lang="en-GB" dirty="0"/>
-              <a:t> </a:t>
-            </a:r>
-          </a:p>
-          <a:p>
-            <a:pPr marL="342900" indent="-342900">
-              <a:buFont typeface="Arial" panose="020B0604020202020204" pitchFamily="34" charset="0"/>
-              <a:buChar char="•"/>
-            </a:pPr>
-            <a:endParaRPr lang="en-GB" dirty="0"/>
-          </a:p>
-          <a:p>
-            <a:pPr marL="342900" indent="-342900">
-              <a:buFont typeface="Arial" panose="020B0604020202020204" pitchFamily="34" charset="0"/>
-              <a:buChar char="•"/>
-            </a:pPr>
-            <a:r>
-              <a:rPr lang="en-GB" dirty="0"/>
-              <a:t>For all questions answered by the R community: </a:t>
-            </a:r>
-            <a:r>
-              <a:rPr lang="en-GB" dirty="0">
-                <a:hlinkClick r:id="rId6"/>
-              </a:rPr>
-              <a:t>https://stackoverflow.com/</a:t>
-            </a:r>
-            <a:r>
-              <a:rPr lang="en-GB" dirty="0"/>
-              <a:t> </a:t>
-            </a:r>
-          </a:p>
-        </p:txBody>
-      </p:sp>
-    </p:spTree>
-    <p:extLst>
-      <p:ext uri="{BB962C8B-B14F-4D97-AF65-F5344CB8AC3E}">
-        <p14:creationId xmlns:p14="http://schemas.microsoft.com/office/powerpoint/2010/main" val="764438216"/>
-      </p:ext>
-    </p:extLst>
-  </p:cSld>
-  <p:clrMapOvr>
-    <a:masterClrMapping/>
-  </p:clrMapOvr>
-</p:sld>
-</file>
-
-<file path=ppt/slides/slide2.xml><?xml version="1.0" encoding="utf-8"?>
-<p:sld xmlns:a="http://schemas.openxmlformats.org/drawingml/2006/main" xmlns:r="http://schemas.openxmlformats.org/officeDocument/2006/relationships" xmlns:p="http://schemas.openxmlformats.org/presentationml/2006/main">
-  <p:cSld>
-    <p:spTree>
-      <p:nvGrpSpPr>
-        <p:cNvPr id="1" name=""/>
-        <p:cNvGrpSpPr/>
-        <p:nvPr/>
-      </p:nvGrpSpPr>
-      <p:grpSpPr>
-        <a:xfrm>
-          <a:off x="0" y="0"/>
-          <a:ext cx="0" cy="0"/>
-          <a:chOff x="0" y="0"/>
-          <a:chExt cx="0" cy="0"/>
-        </a:xfrm>
-      </p:grpSpPr>
-      <p:sp>
-        <p:nvSpPr>
-          <p:cNvPr id="2" name="Title 1">
-            <a:extLst>
-              <a:ext uri="{FF2B5EF4-FFF2-40B4-BE49-F238E27FC236}">
-                <a16:creationId xmlns:a16="http://schemas.microsoft.com/office/drawing/2014/main" id="{AF7397BA-7C83-45CF-BA0F-1757836434A8}"/>
-              </a:ext>
-            </a:extLst>
-          </p:cNvPr>
-          <p:cNvSpPr>
-            <a:spLocks noGrp="1"/>
-          </p:cNvSpPr>
-          <p:nvPr>
-            <p:ph type="title"/>
-          </p:nvPr>
-        </p:nvSpPr>
-        <p:spPr/>
-        <p:txBody>
-          <a:bodyPr/>
-          <a:lstStyle/>
-          <a:p>
-            <a:r>
-              <a:rPr lang="en-US" dirty="0"/>
-              <a:t>Reminder of Zoom etiquette</a:t>
-            </a:r>
-            <a:endParaRPr lang="en-GB" dirty="0"/>
-          </a:p>
-        </p:txBody>
-      </p:sp>
-      <p:sp>
-        <p:nvSpPr>
-          <p:cNvPr id="3" name="Content Placeholder 2">
-            <a:extLst>
-              <a:ext uri="{FF2B5EF4-FFF2-40B4-BE49-F238E27FC236}">
-                <a16:creationId xmlns:a16="http://schemas.microsoft.com/office/drawing/2014/main" id="{605C0560-7F10-4F79-83B2-2E4689F5D452}"/>
-              </a:ext>
-            </a:extLst>
-          </p:cNvPr>
-          <p:cNvSpPr>
-            <a:spLocks noGrp="1"/>
-          </p:cNvSpPr>
-          <p:nvPr>
-            <p:ph idx="1"/>
-          </p:nvPr>
-        </p:nvSpPr>
-        <p:spPr/>
-        <p:txBody>
-          <a:bodyPr/>
-          <a:lstStyle/>
-          <a:p>
-            <a:pPr marL="539750" marR="0" lvl="0" indent="-285750" algn="l" defTabSz="342991" rtl="0" eaLnBrk="1" fontAlgn="auto" latinLnBrk="0" hangingPunct="1">
-              <a:lnSpc>
-                <a:spcPct val="100000"/>
-              </a:lnSpc>
-              <a:spcBef>
-                <a:spcPct val="20000"/>
-              </a:spcBef>
-              <a:spcAft>
-                <a:spcPts val="0"/>
-              </a:spcAft>
-              <a:buClrTx/>
-              <a:buSzTx/>
-              <a:buFont typeface="Arial" panose="020B0604020202020204" pitchFamily="34" charset="0"/>
-              <a:buChar char="•"/>
-              <a:tabLst/>
-              <a:defRPr/>
-            </a:pPr>
-            <a:r>
-              <a:rPr kumimoji="0" lang="en-GB" sz="2800" b="0" i="0" u="none" strike="noStrike" kern="1200" cap="none" spc="0" normalizeH="0" baseline="0" noProof="0" dirty="0">
-                <a:ln>
-                  <a:noFill/>
-                </a:ln>
-                <a:solidFill>
-                  <a:srgbClr val="333333"/>
-                </a:solidFill>
-                <a:effectLst/>
-                <a:uLnTx/>
-                <a:uFillTx/>
-                <a:latin typeface="Calibri" panose="020F0502020204030204" pitchFamily="34" charset="0"/>
-                <a:cs typeface="Calibri" panose="020F0502020204030204" pitchFamily="34" charset="0"/>
-              </a:rPr>
-              <a:t>We’ll start with microphones muted</a:t>
-            </a:r>
-          </a:p>
-          <a:p>
-            <a:pPr marL="539750" marR="0" lvl="0" indent="-285750" algn="l" defTabSz="342991" rtl="0" eaLnBrk="1" fontAlgn="auto" latinLnBrk="0" hangingPunct="1">
-              <a:lnSpc>
-                <a:spcPct val="100000"/>
-              </a:lnSpc>
-              <a:spcBef>
-                <a:spcPct val="20000"/>
-              </a:spcBef>
-              <a:spcAft>
-                <a:spcPts val="0"/>
-              </a:spcAft>
-              <a:buClrTx/>
-              <a:buSzTx/>
-              <a:buFont typeface="Arial" panose="020B0604020202020204" pitchFamily="34" charset="0"/>
-              <a:buChar char="•"/>
-              <a:tabLst/>
-              <a:defRPr/>
-            </a:pPr>
-            <a:r>
-              <a:rPr kumimoji="0" lang="en-GB" sz="2800" b="0" i="0" u="none" strike="noStrike" kern="1200" cap="none" spc="0" normalizeH="0" baseline="0" noProof="0" dirty="0">
-                <a:ln>
-                  <a:noFill/>
-                </a:ln>
-                <a:solidFill>
-                  <a:srgbClr val="333333"/>
-                </a:solidFill>
-                <a:effectLst/>
-                <a:uLnTx/>
-                <a:uFillTx/>
-                <a:latin typeface="Calibri" panose="020F0502020204030204" pitchFamily="34" charset="0"/>
-                <a:cs typeface="Calibri" panose="020F0502020204030204" pitchFamily="34" charset="0"/>
-              </a:rPr>
-              <a:t>You are welcome to leave your camera on</a:t>
-            </a:r>
-          </a:p>
-          <a:p>
-            <a:pPr marL="539750" marR="0" lvl="0" indent="-285750" algn="l" defTabSz="342991" rtl="0" eaLnBrk="1" fontAlgn="auto" latinLnBrk="0" hangingPunct="1">
-              <a:lnSpc>
-                <a:spcPct val="100000"/>
-              </a:lnSpc>
-              <a:spcBef>
-                <a:spcPct val="20000"/>
-              </a:spcBef>
-              <a:spcAft>
-                <a:spcPts val="0"/>
-              </a:spcAft>
-              <a:buClrTx/>
-              <a:buSzTx/>
-              <a:buFont typeface="Arial" panose="020B0604020202020204" pitchFamily="34" charset="0"/>
-              <a:buChar char="•"/>
-              <a:tabLst/>
-              <a:defRPr/>
-            </a:pPr>
-            <a:r>
-              <a:rPr kumimoji="0" lang="en-GB" sz="2800" b="0" i="0" u="none" strike="noStrike" kern="1200" cap="none" spc="0" normalizeH="0" baseline="0" noProof="0" dirty="0">
-                <a:ln>
-                  <a:noFill/>
-                </a:ln>
-                <a:solidFill>
-                  <a:srgbClr val="333333"/>
-                </a:solidFill>
-                <a:effectLst/>
-                <a:uLnTx/>
-                <a:uFillTx/>
-                <a:latin typeface="Calibri" panose="020F0502020204030204" pitchFamily="34" charset="0"/>
-                <a:cs typeface="Calibri" panose="020F0502020204030204" pitchFamily="34" charset="0"/>
-              </a:rPr>
-              <a:t>Please type questions in the chat</a:t>
-            </a:r>
-          </a:p>
-          <a:p>
-            <a:pPr marL="539750" marR="0" lvl="0" indent="-285750" algn="l" defTabSz="342991" rtl="0" eaLnBrk="1" fontAlgn="auto" latinLnBrk="0" hangingPunct="1">
-              <a:lnSpc>
-                <a:spcPct val="100000"/>
-              </a:lnSpc>
-              <a:spcBef>
-                <a:spcPct val="20000"/>
-              </a:spcBef>
-              <a:spcAft>
-                <a:spcPts val="0"/>
-              </a:spcAft>
-              <a:buClrTx/>
-              <a:buSzTx/>
-              <a:buFont typeface="Arial" panose="020B0604020202020204" pitchFamily="34" charset="0"/>
-              <a:buChar char="•"/>
-              <a:tabLst/>
-              <a:defRPr/>
-            </a:pPr>
-            <a:r>
-              <a:rPr kumimoji="0" lang="en-GB" sz="2800" b="0" i="0" u="none" strike="noStrike" kern="1200" cap="none" spc="0" normalizeH="0" baseline="0" noProof="0" dirty="0">
-                <a:ln>
-                  <a:noFill/>
-                </a:ln>
-                <a:solidFill>
-                  <a:srgbClr val="333333"/>
-                </a:solidFill>
-                <a:effectLst/>
-                <a:uLnTx/>
-                <a:uFillTx/>
-                <a:latin typeface="Calibri" panose="020F0502020204030204" pitchFamily="34" charset="0"/>
-                <a:cs typeface="Calibri" panose="020F0502020204030204" pitchFamily="34" charset="0"/>
-              </a:rPr>
-              <a:t>In the breakout rooms, you  can turn on your microphone and camera</a:t>
-            </a:r>
-          </a:p>
-          <a:p>
-            <a:pPr marL="539750" marR="0" lvl="0" indent="-285750" algn="l" defTabSz="342991" rtl="0" eaLnBrk="1" fontAlgn="auto" latinLnBrk="0" hangingPunct="1">
-              <a:lnSpc>
-                <a:spcPct val="100000"/>
-              </a:lnSpc>
-              <a:spcBef>
-                <a:spcPct val="20000"/>
-              </a:spcBef>
-              <a:spcAft>
-                <a:spcPts val="0"/>
-              </a:spcAft>
-              <a:buClrTx/>
-              <a:buSzTx/>
-              <a:buFont typeface="Arial" panose="020B0604020202020204" pitchFamily="34" charset="0"/>
-              <a:buChar char="•"/>
-              <a:tabLst/>
-              <a:defRPr/>
-            </a:pPr>
-            <a:r>
-              <a:rPr kumimoji="0" lang="en-GB" sz="2800" b="0" i="0" u="none" strike="noStrike" kern="1200" cap="none" spc="0" normalizeH="0" baseline="0" noProof="0" dirty="0">
-                <a:ln>
-                  <a:noFill/>
-                </a:ln>
-                <a:solidFill>
-                  <a:srgbClr val="333333"/>
-                </a:solidFill>
-                <a:effectLst/>
-                <a:uLnTx/>
-                <a:uFillTx/>
-                <a:latin typeface="Calibri" panose="020F0502020204030204" pitchFamily="34" charset="0"/>
-                <a:cs typeface="Calibri" panose="020F0502020204030204" pitchFamily="34" charset="0"/>
-              </a:rPr>
-              <a:t>Thank you for arriving on time</a:t>
-            </a:r>
-          </a:p>
-          <a:p>
-            <a:pPr marL="254000" marR="0" lvl="0" indent="0" algn="l" defTabSz="342991" rtl="0" eaLnBrk="1" fontAlgn="auto" latinLnBrk="0" hangingPunct="1">
-              <a:lnSpc>
-                <a:spcPct val="100000"/>
-              </a:lnSpc>
-              <a:spcBef>
-                <a:spcPct val="20000"/>
-              </a:spcBef>
-              <a:spcAft>
-                <a:spcPts val="0"/>
-              </a:spcAft>
-              <a:buClrTx/>
-              <a:buSzTx/>
-              <a:buFont typeface="Arial"/>
-              <a:buNone/>
-              <a:tabLst/>
-              <a:defRPr/>
-            </a:pPr>
-            <a:endParaRPr kumimoji="0" lang="en-GB" sz="2800" b="0" i="0" u="none" strike="noStrike" kern="1200" cap="none" spc="0" normalizeH="0" baseline="0" noProof="0" dirty="0">
-              <a:ln>
-                <a:noFill/>
-              </a:ln>
-              <a:solidFill>
-                <a:srgbClr val="333333"/>
-              </a:solidFill>
-              <a:effectLst/>
-              <a:uLnTx/>
-              <a:uFillTx/>
-              <a:latin typeface="Calibri" panose="020F0502020204030204" pitchFamily="34" charset="0"/>
-              <a:cs typeface="Calibri" panose="020F0502020204030204" pitchFamily="34" charset="0"/>
-            </a:endParaRPr>
-          </a:p>
-          <a:p>
-            <a:endParaRPr lang="en-GB" dirty="0">
-              <a:latin typeface="Calibri" panose="020F0502020204030204" pitchFamily="34" charset="0"/>
-              <a:cs typeface="Calibri" panose="020F0502020204030204" pitchFamily="34" charset="0"/>
-            </a:endParaRPr>
-          </a:p>
-        </p:txBody>
-      </p:sp>
-    </p:spTree>
-    <p:extLst>
-      <p:ext uri="{BB962C8B-B14F-4D97-AF65-F5344CB8AC3E}">
-        <p14:creationId xmlns:p14="http://schemas.microsoft.com/office/powerpoint/2010/main" val="724873906"/>
-      </p:ext>
-    </p:extLst>
-  </p:cSld>
-  <p:clrMapOvr>
-    <a:masterClrMapping/>
-  </p:clrMapOvr>
-</p:sld>
-</file>
-
-<file path=ppt/slides/slide3.xml><?xml version="1.0" encoding="utf-8"?>
-<p:sld xmlns:a="http://schemas.openxmlformats.org/drawingml/2006/main" xmlns:r="http://schemas.openxmlformats.org/officeDocument/2006/relationships" xmlns:p="http://schemas.openxmlformats.org/presentationml/2006/main">
-  <p:cSld>
-    <p:spTree>
-      <p:nvGrpSpPr>
-        <p:cNvPr id="1" name=""/>
-        <p:cNvGrpSpPr/>
-        <p:nvPr/>
-      </p:nvGrpSpPr>
-      <p:grpSpPr>
-        <a:xfrm>
-          <a:off x="0" y="0"/>
-          <a:ext cx="0" cy="0"/>
-          <a:chOff x="0" y="0"/>
-          <a:chExt cx="0" cy="0"/>
-        </a:xfrm>
-      </p:grpSpPr>
-      <p:sp>
-        <p:nvSpPr>
-          <p:cNvPr id="2" name="Title 1">
-            <a:extLst>
-              <a:ext uri="{FF2B5EF4-FFF2-40B4-BE49-F238E27FC236}">
-                <a16:creationId xmlns:a16="http://schemas.microsoft.com/office/drawing/2014/main" id="{AF7397BA-7C83-45CF-BA0F-1757836434A8}"/>
-              </a:ext>
-            </a:extLst>
-          </p:cNvPr>
-          <p:cNvSpPr>
-            <a:spLocks noGrp="1"/>
-          </p:cNvSpPr>
-          <p:nvPr>
-            <p:ph type="title"/>
-          </p:nvPr>
-        </p:nvSpPr>
-        <p:spPr/>
-        <p:txBody>
-          <a:bodyPr/>
-          <a:lstStyle/>
-          <a:p>
-            <a:r>
-              <a:rPr lang="en-US" dirty="0"/>
-              <a:t>Structure of the practical</a:t>
-            </a:r>
-            <a:endParaRPr lang="en-GB" dirty="0"/>
-          </a:p>
-        </p:txBody>
-      </p:sp>
-      <p:sp>
-        <p:nvSpPr>
-          <p:cNvPr id="3" name="Content Placeholder 2">
-            <a:extLst>
-              <a:ext uri="{FF2B5EF4-FFF2-40B4-BE49-F238E27FC236}">
-                <a16:creationId xmlns:a16="http://schemas.microsoft.com/office/drawing/2014/main" id="{605C0560-7F10-4F79-83B2-2E4689F5D452}"/>
-              </a:ext>
-            </a:extLst>
-          </p:cNvPr>
-          <p:cNvSpPr>
-            <a:spLocks noGrp="1"/>
-          </p:cNvSpPr>
-          <p:nvPr>
-            <p:ph idx="1"/>
-          </p:nvPr>
-        </p:nvSpPr>
-        <p:spPr/>
-        <p:txBody>
-          <a:bodyPr/>
-          <a:lstStyle/>
-          <a:p>
-            <a:pPr marL="539750" marR="0" lvl="0" indent="-285750" algn="l" defTabSz="342991" rtl="0" eaLnBrk="1" fontAlgn="auto" latinLnBrk="0" hangingPunct="1">
-              <a:lnSpc>
-                <a:spcPct val="100000"/>
-              </a:lnSpc>
-              <a:spcBef>
-                <a:spcPct val="20000"/>
-              </a:spcBef>
-              <a:spcAft>
-                <a:spcPts val="0"/>
-              </a:spcAft>
-              <a:buClrTx/>
-              <a:buSzTx/>
-              <a:buFont typeface="Arial" panose="020B0604020202020204" pitchFamily="34" charset="0"/>
-              <a:buChar char="•"/>
-              <a:tabLst/>
-              <a:defRPr/>
-            </a:pPr>
-            <a:r>
-              <a:rPr kumimoji="0" lang="en-GB" sz="2800" b="0" i="0" u="none" strike="noStrike" kern="1200" cap="none" spc="0" normalizeH="0" baseline="0" noProof="0" dirty="0">
-                <a:ln>
-                  <a:noFill/>
-                </a:ln>
-                <a:solidFill>
-                  <a:srgbClr val="333333"/>
-                </a:solidFill>
-                <a:effectLst/>
-                <a:uLnTx/>
-                <a:uFillTx/>
-                <a:latin typeface="Calibri" panose="020F0502020204030204" pitchFamily="34" charset="0"/>
-                <a:cs typeface="Calibri" panose="020F0502020204030204" pitchFamily="34" charset="0"/>
-              </a:rPr>
-              <a:t>Reminder from last session</a:t>
-            </a:r>
-          </a:p>
-          <a:p>
-            <a:pPr marL="539750" marR="0" lvl="0" indent="-285750" algn="l" defTabSz="342991" rtl="0" eaLnBrk="1" fontAlgn="auto" latinLnBrk="0" hangingPunct="1">
-              <a:lnSpc>
-                <a:spcPct val="100000"/>
-              </a:lnSpc>
-              <a:spcBef>
-                <a:spcPct val="20000"/>
-              </a:spcBef>
-              <a:spcAft>
-                <a:spcPts val="0"/>
-              </a:spcAft>
-              <a:buClrTx/>
-              <a:buSzTx/>
-              <a:buFont typeface="Arial" panose="020B0604020202020204" pitchFamily="34" charset="0"/>
-              <a:buChar char="•"/>
-              <a:tabLst/>
-              <a:defRPr/>
-            </a:pPr>
-            <a:endParaRPr lang="en-GB" sz="2800" dirty="0">
-              <a:solidFill>
-                <a:srgbClr val="333333"/>
-              </a:solidFill>
-              <a:latin typeface="Calibri" panose="020F0502020204030204" pitchFamily="34" charset="0"/>
-              <a:cs typeface="Calibri" panose="020F0502020204030204" pitchFamily="34" charset="0"/>
-            </a:endParaRPr>
-          </a:p>
-          <a:p>
-            <a:pPr marL="539750" marR="0" lvl="0" indent="-285750" algn="l" defTabSz="342991" rtl="0" eaLnBrk="1" fontAlgn="auto" latinLnBrk="0" hangingPunct="1">
-              <a:lnSpc>
-                <a:spcPct val="100000"/>
-              </a:lnSpc>
-              <a:spcBef>
-                <a:spcPct val="20000"/>
-              </a:spcBef>
-              <a:spcAft>
-                <a:spcPts val="0"/>
-              </a:spcAft>
-              <a:buClrTx/>
-              <a:buSzTx/>
-              <a:buFont typeface="Arial" panose="020B0604020202020204" pitchFamily="34" charset="0"/>
-              <a:buChar char="•"/>
-              <a:tabLst/>
-              <a:defRPr/>
-            </a:pPr>
-            <a:r>
-              <a:rPr kumimoji="0" lang="en-GB" sz="2800" b="0" i="0" u="none" strike="noStrike" kern="1200" cap="none" spc="0" normalizeH="0" baseline="0" noProof="0" dirty="0">
-                <a:ln>
-                  <a:noFill/>
-                </a:ln>
-                <a:solidFill>
-                  <a:srgbClr val="333333"/>
-                </a:solidFill>
-                <a:effectLst/>
-                <a:uLnTx/>
-                <a:uFillTx/>
-                <a:latin typeface="Calibri" panose="020F0502020204030204" pitchFamily="34" charset="0"/>
-                <a:cs typeface="Calibri" panose="020F0502020204030204" pitchFamily="34" charset="0"/>
-              </a:rPr>
-              <a:t>Introduction to the concepts covered in Practical 2</a:t>
-            </a:r>
-          </a:p>
-          <a:p>
-            <a:pPr marL="539750" marR="0" lvl="0" indent="-285750" algn="l" defTabSz="342991" rtl="0" eaLnBrk="1" fontAlgn="auto" latinLnBrk="0" hangingPunct="1">
-              <a:lnSpc>
-                <a:spcPct val="100000"/>
-              </a:lnSpc>
-              <a:spcBef>
-                <a:spcPct val="20000"/>
-              </a:spcBef>
-              <a:spcAft>
-                <a:spcPts val="0"/>
-              </a:spcAft>
-              <a:buClrTx/>
-              <a:buSzTx/>
-              <a:buFont typeface="Arial" panose="020B0604020202020204" pitchFamily="34" charset="0"/>
-              <a:buChar char="•"/>
-              <a:tabLst/>
-              <a:defRPr/>
-            </a:pPr>
-            <a:endParaRPr lang="en-GB" sz="2800" dirty="0">
-              <a:solidFill>
-                <a:srgbClr val="333333"/>
-              </a:solidFill>
-              <a:latin typeface="Calibri" panose="020F0502020204030204" pitchFamily="34" charset="0"/>
-              <a:cs typeface="Calibri" panose="020F0502020204030204" pitchFamily="34" charset="0"/>
-            </a:endParaRPr>
-          </a:p>
-          <a:p>
-            <a:pPr marL="539750" marR="0" lvl="0" indent="-285750" algn="l" defTabSz="342991" rtl="0" eaLnBrk="1" fontAlgn="auto" latinLnBrk="0" hangingPunct="1">
-              <a:lnSpc>
-                <a:spcPct val="100000"/>
-              </a:lnSpc>
-              <a:spcBef>
-                <a:spcPct val="20000"/>
-              </a:spcBef>
-              <a:spcAft>
-                <a:spcPts val="0"/>
-              </a:spcAft>
-              <a:buClrTx/>
-              <a:buSzTx/>
-              <a:buFont typeface="Arial" panose="020B0604020202020204" pitchFamily="34" charset="0"/>
-              <a:buChar char="•"/>
-              <a:tabLst/>
-              <a:defRPr/>
-            </a:pPr>
-            <a:r>
-              <a:rPr kumimoji="0" lang="en-GB" sz="2800" b="0" i="0" u="none" strike="noStrike" kern="1200" cap="none" spc="0" normalizeH="0" baseline="0" noProof="0" dirty="0">
-                <a:ln>
-                  <a:noFill/>
-                </a:ln>
-                <a:solidFill>
-                  <a:srgbClr val="333333"/>
-                </a:solidFill>
-                <a:effectLst/>
-                <a:uLnTx/>
-                <a:uFillTx/>
-                <a:latin typeface="Calibri" panose="020F0502020204030204" pitchFamily="34" charset="0"/>
-                <a:cs typeface="Calibri" panose="020F0502020204030204" pitchFamily="34" charset="0"/>
-              </a:rPr>
-              <a:t>Breakout rooms </a:t>
-            </a:r>
-          </a:p>
-          <a:p>
-            <a:pPr marL="539750" marR="0" lvl="0" indent="-285750" algn="l" defTabSz="342991" rtl="0" eaLnBrk="1" fontAlgn="auto" latinLnBrk="0" hangingPunct="1">
-              <a:lnSpc>
-                <a:spcPct val="100000"/>
-              </a:lnSpc>
-              <a:spcBef>
-                <a:spcPct val="20000"/>
-              </a:spcBef>
-              <a:spcAft>
-                <a:spcPts val="0"/>
-              </a:spcAft>
-              <a:buClrTx/>
-              <a:buSzTx/>
-              <a:buFont typeface="Arial" panose="020B0604020202020204" pitchFamily="34" charset="0"/>
-              <a:buChar char="•"/>
-              <a:tabLst/>
-              <a:defRPr/>
-            </a:pPr>
-            <a:endParaRPr lang="en-GB" sz="2800" dirty="0">
-              <a:solidFill>
-                <a:srgbClr val="333333"/>
-              </a:solidFill>
-              <a:latin typeface="Calibri" panose="020F0502020204030204" pitchFamily="34" charset="0"/>
-              <a:cs typeface="Calibri" panose="020F0502020204030204" pitchFamily="34" charset="0"/>
-            </a:endParaRPr>
-          </a:p>
-          <a:p>
-            <a:pPr marL="539750" marR="0" lvl="0" indent="-285750" algn="l" defTabSz="342991" rtl="0" eaLnBrk="1" fontAlgn="auto" latinLnBrk="0" hangingPunct="1">
-              <a:lnSpc>
-                <a:spcPct val="100000"/>
-              </a:lnSpc>
-              <a:spcBef>
-                <a:spcPct val="20000"/>
-              </a:spcBef>
-              <a:spcAft>
-                <a:spcPts val="0"/>
-              </a:spcAft>
-              <a:buClrTx/>
-              <a:buSzTx/>
-              <a:buFont typeface="Arial" panose="020B0604020202020204" pitchFamily="34" charset="0"/>
-              <a:buChar char="•"/>
-              <a:tabLst/>
-              <a:defRPr/>
-            </a:pPr>
-            <a:r>
-              <a:rPr kumimoji="0" lang="en-GB" sz="2800" b="0" i="0" u="none" strike="noStrike" kern="1200" cap="none" spc="0" normalizeH="0" baseline="0" noProof="0" dirty="0">
-                <a:ln>
-                  <a:noFill/>
-                </a:ln>
-                <a:solidFill>
-                  <a:srgbClr val="333333"/>
-                </a:solidFill>
-                <a:effectLst/>
-                <a:uLnTx/>
-                <a:uFillTx/>
-                <a:latin typeface="Calibri" panose="020F0502020204030204" pitchFamily="34" charset="0"/>
-                <a:cs typeface="Calibri" panose="020F0502020204030204" pitchFamily="34" charset="0"/>
-              </a:rPr>
-              <a:t>Wrap up, conclusions and further resources</a:t>
-            </a:r>
-          </a:p>
-          <a:p>
-            <a:pPr marL="254000" marR="0" lvl="0" indent="0" algn="l" defTabSz="342991" rtl="0" eaLnBrk="1" fontAlgn="auto" latinLnBrk="0" hangingPunct="1">
-              <a:lnSpc>
-                <a:spcPct val="100000"/>
-              </a:lnSpc>
-              <a:spcBef>
-                <a:spcPct val="20000"/>
-              </a:spcBef>
-              <a:spcAft>
-                <a:spcPts val="0"/>
-              </a:spcAft>
-              <a:buClrTx/>
-              <a:buSzTx/>
-              <a:buFont typeface="Arial"/>
-              <a:buNone/>
-              <a:tabLst/>
-              <a:defRPr/>
-            </a:pPr>
-            <a:endParaRPr kumimoji="0" lang="en-GB" sz="2800" b="0" i="0" u="none" strike="noStrike" kern="1200" cap="none" spc="0" normalizeH="0" baseline="0" noProof="0" dirty="0">
-              <a:ln>
-                <a:noFill/>
-              </a:ln>
-              <a:solidFill>
-                <a:srgbClr val="333333"/>
-              </a:solidFill>
-              <a:effectLst/>
-              <a:uLnTx/>
-              <a:uFillTx/>
-              <a:latin typeface="Calibri" panose="020F0502020204030204" pitchFamily="34" charset="0"/>
-              <a:cs typeface="Calibri" panose="020F0502020204030204" pitchFamily="34" charset="0"/>
-            </a:endParaRPr>
-          </a:p>
-          <a:p>
-            <a:endParaRPr lang="en-GB" dirty="0">
-              <a:latin typeface="Calibri" panose="020F0502020204030204" pitchFamily="34" charset="0"/>
-              <a:cs typeface="Calibri" panose="020F0502020204030204" pitchFamily="34" charset="0"/>
-            </a:endParaRPr>
-          </a:p>
-        </p:txBody>
-      </p:sp>
-    </p:spTree>
-    <p:extLst>
-      <p:ext uri="{BB962C8B-B14F-4D97-AF65-F5344CB8AC3E}">
-        <p14:creationId xmlns:p14="http://schemas.microsoft.com/office/powerpoint/2010/main" val="3477882452"/>
-      </p:ext>
-    </p:extLst>
-  </p:cSld>
-  <p:clrMapOvr>
-    <a:masterClrMapping/>
-  </p:clrMapOvr>
-</p:sld>
-</file>
-
-<file path=ppt/slides/slide4.xml><?xml version="1.0" encoding="utf-8"?>
-<p:sld xmlns:a="http://schemas.openxmlformats.org/drawingml/2006/main" xmlns:r="http://schemas.openxmlformats.org/officeDocument/2006/relationships" xmlns:p="http://schemas.openxmlformats.org/presentationml/2006/main">
-  <p:cSld>
-    <p:spTree>
-      <p:nvGrpSpPr>
-        <p:cNvPr id="1" name=""/>
-        <p:cNvGrpSpPr/>
-        <p:nvPr/>
-      </p:nvGrpSpPr>
-      <p:grpSpPr>
-        <a:xfrm>
-          <a:off x="0" y="0"/>
-          <a:ext cx="0" cy="0"/>
-          <a:chOff x="0" y="0"/>
-          <a:chExt cx="0" cy="0"/>
-        </a:xfrm>
-      </p:grpSpPr>
-      <p:sp>
-        <p:nvSpPr>
-          <p:cNvPr id="6" name="TextBox 5"/>
-          <p:cNvSpPr txBox="1"/>
-          <p:nvPr/>
-        </p:nvSpPr>
-        <p:spPr>
-          <a:xfrm>
-            <a:off x="1680117" y="2505670"/>
-            <a:ext cx="8831766" cy="923330"/>
-          </a:xfrm>
-          <a:prstGeom prst="rect">
-            <a:avLst/>
-          </a:prstGeom>
-          <a:noFill/>
-        </p:spPr>
-        <p:txBody>
-          <a:bodyPr wrap="square" rtlCol="0">
-            <a:spAutoFit/>
-          </a:bodyPr>
-          <a:lstStyle/>
-          <a:p>
-            <a:pPr marL="0" marR="0" lvl="0" indent="0" algn="ctr" defTabSz="457200" rtl="0" eaLnBrk="1" fontAlgn="auto" latinLnBrk="0" hangingPunct="1">
-              <a:lnSpc>
-                <a:spcPct val="100000"/>
-              </a:lnSpc>
-              <a:spcBef>
-                <a:spcPts val="0"/>
-              </a:spcBef>
-              <a:spcAft>
-                <a:spcPts val="0"/>
-              </a:spcAft>
-              <a:buClrTx/>
-              <a:buSzTx/>
-              <a:buFontTx/>
-              <a:buNone/>
-              <a:tabLst/>
-              <a:defRPr/>
-            </a:pPr>
-            <a:r>
-              <a:rPr kumimoji="0" lang="en-GB" sz="5400" b="0" i="0" u="none" strike="noStrike" kern="1200" cap="none" spc="0" normalizeH="0" baseline="0" noProof="0" dirty="0">
-                <a:ln>
-                  <a:noFill/>
-                </a:ln>
-                <a:solidFill>
-                  <a:srgbClr val="000000"/>
-                </a:solidFill>
-                <a:effectLst/>
-                <a:uLnTx/>
-                <a:uFillTx/>
-                <a:latin typeface="Calibri" panose="020F0502020204030204" pitchFamily="34" charset="0"/>
-                <a:ea typeface="+mn-ea"/>
-                <a:cs typeface="+mn-cs"/>
-              </a:rPr>
-              <a:t>Reminder from Session 1</a:t>
-            </a:r>
-            <a:endParaRPr kumimoji="0" lang="en-GB" sz="5400" b="0" i="0" u="none" strike="noStrike" kern="1200" cap="none" spc="0" normalizeH="0" baseline="0" noProof="0" dirty="0">
-              <a:ln>
-                <a:noFill/>
-              </a:ln>
-              <a:solidFill>
-                <a:srgbClr val="000000"/>
-              </a:solidFill>
-              <a:effectLst/>
-              <a:uLnTx/>
-              <a:uFillTx/>
-              <a:latin typeface="Constantia" panose="02030602050306030303" pitchFamily="18" charset="0"/>
-              <a:ea typeface="+mn-ea"/>
-              <a:cs typeface="+mn-cs"/>
-            </a:endParaRPr>
-          </a:p>
-        </p:txBody>
-      </p:sp>
-    </p:spTree>
-    <p:extLst>
-      <p:ext uri="{BB962C8B-B14F-4D97-AF65-F5344CB8AC3E}">
-        <p14:creationId xmlns:p14="http://schemas.microsoft.com/office/powerpoint/2010/main" val="1106849294"/>
-      </p:ext>
-    </p:extLst>
-  </p:cSld>
-  <p:clrMapOvr>
-    <a:masterClrMapping/>
-  </p:clrMapOvr>
-</p:sld>
-</file>
-
-<file path=ppt/slides/slide5.xml><?xml version="1.0" encoding="utf-8"?>
-<p:sld xmlns:a="http://schemas.openxmlformats.org/drawingml/2006/main" xmlns:r="http://schemas.openxmlformats.org/officeDocument/2006/relationships" xmlns:p="http://schemas.openxmlformats.org/presentationml/2006/main">
-  <p:cSld>
-    <p:spTree>
-      <p:nvGrpSpPr>
-        <p:cNvPr id="1" name=""/>
-        <p:cNvGrpSpPr/>
-        <p:nvPr/>
-      </p:nvGrpSpPr>
-      <p:grpSpPr>
-        <a:xfrm>
-          <a:off x="0" y="0"/>
-          <a:ext cx="0" cy="0"/>
-          <a:chOff x="0" y="0"/>
-          <a:chExt cx="0" cy="0"/>
-        </a:xfrm>
-      </p:grpSpPr>
-      <p:sp>
-        <p:nvSpPr>
-          <p:cNvPr id="2" name="Title 1">
-            <a:extLst>
-              <a:ext uri="{FF2B5EF4-FFF2-40B4-BE49-F238E27FC236}">
-                <a16:creationId xmlns:a16="http://schemas.microsoft.com/office/drawing/2014/main" id="{72F3D2D9-4960-4C21-88B5-48A513B708DD}"/>
-              </a:ext>
-            </a:extLst>
-          </p:cNvPr>
-          <p:cNvSpPr>
-            <a:spLocks noGrp="1"/>
-          </p:cNvSpPr>
-          <p:nvPr>
-            <p:ph type="title"/>
-          </p:nvPr>
-        </p:nvSpPr>
-        <p:spPr/>
-        <p:txBody>
-          <a:bodyPr/>
-          <a:lstStyle/>
-          <a:p>
-            <a:r>
-              <a:rPr lang="en-US" dirty="0"/>
-              <a:t>Walk-through optional Section 1.6</a:t>
-            </a:r>
-            <a:endParaRPr lang="en-GB" dirty="0"/>
-          </a:p>
-        </p:txBody>
-      </p:sp>
-      <p:pic>
-        <p:nvPicPr>
-          <p:cNvPr id="5" name="Content Placeholder 4">
-            <a:extLst>
-              <a:ext uri="{FF2B5EF4-FFF2-40B4-BE49-F238E27FC236}">
-                <a16:creationId xmlns:a16="http://schemas.microsoft.com/office/drawing/2014/main" id="{68FD4AB9-F7D0-4622-8893-E8567012F98B}"/>
-              </a:ext>
-            </a:extLst>
-          </p:cNvPr>
-          <p:cNvPicPr>
-            <a:picLocks noGrp="1" noChangeAspect="1"/>
-          </p:cNvPicPr>
-          <p:nvPr>
-            <p:ph idx="1"/>
-          </p:nvPr>
-        </p:nvPicPr>
-        <p:blipFill rotWithShape="1">
-          <a:blip r:embed="rId2"/>
-          <a:srcRect l="13607" t="84327" r="63941" b="9029"/>
-          <a:stretch/>
-        </p:blipFill>
-        <p:spPr>
-          <a:xfrm>
-            <a:off x="428625" y="2620869"/>
-            <a:ext cx="3743325" cy="623236"/>
-          </a:xfrm>
-        </p:spPr>
-      </p:pic>
-      <p:pic>
-        <p:nvPicPr>
-          <p:cNvPr id="7" name="Picture 6">
-            <a:extLst>
-              <a:ext uri="{FF2B5EF4-FFF2-40B4-BE49-F238E27FC236}">
-                <a16:creationId xmlns:a16="http://schemas.microsoft.com/office/drawing/2014/main" id="{8C9AF310-8B15-440D-883B-A2446F94A7E3}"/>
-              </a:ext>
-            </a:extLst>
-          </p:cNvPr>
-          <p:cNvPicPr>
-            <a:picLocks noChangeAspect="1"/>
-          </p:cNvPicPr>
-          <p:nvPr/>
-        </p:nvPicPr>
-        <p:blipFill rotWithShape="1">
-          <a:blip r:embed="rId3"/>
-          <a:srcRect l="13829" t="86389" r="20781" b="6250"/>
-          <a:stretch/>
-        </p:blipFill>
-        <p:spPr>
-          <a:xfrm>
-            <a:off x="942975" y="3429001"/>
-            <a:ext cx="11249025" cy="712304"/>
-          </a:xfrm>
-          <a:prstGeom prst="rect">
-            <a:avLst/>
-          </a:prstGeom>
-        </p:spPr>
-      </p:pic>
-    </p:spTree>
-    <p:extLst>
-      <p:ext uri="{BB962C8B-B14F-4D97-AF65-F5344CB8AC3E}">
-        <p14:creationId xmlns:p14="http://schemas.microsoft.com/office/powerpoint/2010/main" val="2534984816"/>
-      </p:ext>
-    </p:extLst>
-  </p:cSld>
-  <p:clrMapOvr>
-    <a:masterClrMapping/>
-  </p:clrMapOvr>
-</p:sld>
-</file>
-
-<file path=ppt/slides/slide6.xml><?xml version="1.0" encoding="utf-8"?>
-<p:sld xmlns:a="http://schemas.openxmlformats.org/drawingml/2006/main" xmlns:r="http://schemas.openxmlformats.org/officeDocument/2006/relationships" xmlns:p="http://schemas.openxmlformats.org/presentationml/2006/main">
-  <p:cSld>
-    <p:spTree>
-      <p:nvGrpSpPr>
-        <p:cNvPr id="1" name=""/>
-        <p:cNvGrpSpPr/>
-        <p:nvPr/>
-      </p:nvGrpSpPr>
-      <p:grpSpPr>
-        <a:xfrm>
-          <a:off x="0" y="0"/>
-          <a:ext cx="0" cy="0"/>
-          <a:chOff x="0" y="0"/>
-          <a:chExt cx="0" cy="0"/>
-        </a:xfrm>
-      </p:grpSpPr>
-      <p:sp>
-        <p:nvSpPr>
-          <p:cNvPr id="2" name="Title 1">
-            <a:extLst>
-              <a:ext uri="{FF2B5EF4-FFF2-40B4-BE49-F238E27FC236}">
-                <a16:creationId xmlns:a16="http://schemas.microsoft.com/office/drawing/2014/main" id="{BD73B635-A2D7-4B91-A1EE-8181BEF7CD7C}"/>
-              </a:ext>
-            </a:extLst>
-          </p:cNvPr>
-          <p:cNvSpPr>
-            <a:spLocks noGrp="1"/>
-          </p:cNvSpPr>
-          <p:nvPr>
-            <p:ph type="title"/>
-          </p:nvPr>
-        </p:nvSpPr>
-        <p:spPr/>
-        <p:txBody>
-          <a:bodyPr/>
-          <a:lstStyle/>
-          <a:p>
-            <a:r>
-              <a:rPr lang="en-US" dirty="0"/>
-              <a:t>Solution section 1.6</a:t>
-            </a:r>
-            <a:endParaRPr lang="en-GB" dirty="0"/>
-          </a:p>
-        </p:txBody>
-      </p:sp>
-      <p:graphicFrame>
-        <p:nvGraphicFramePr>
-          <p:cNvPr id="4" name="Table 4">
-            <a:extLst>
-              <a:ext uri="{FF2B5EF4-FFF2-40B4-BE49-F238E27FC236}">
-                <a16:creationId xmlns:a16="http://schemas.microsoft.com/office/drawing/2014/main" id="{F9C5C6D7-84CA-4D5D-840E-490A5C3BD103}"/>
-              </a:ext>
-            </a:extLst>
-          </p:cNvPr>
-          <p:cNvGraphicFramePr>
-            <a:graphicFrameLocks noGrp="1"/>
-          </p:cNvGraphicFramePr>
-          <p:nvPr>
-            <p:ph idx="1"/>
-            <p:extLst>
-              <p:ext uri="{D42A27DB-BD31-4B8C-83A1-F6EECF244321}">
-                <p14:modId xmlns:p14="http://schemas.microsoft.com/office/powerpoint/2010/main" val="1394175758"/>
-              </p:ext>
-            </p:extLst>
-          </p:nvPr>
-        </p:nvGraphicFramePr>
-        <p:xfrm>
-          <a:off x="666750" y="1476375"/>
-          <a:ext cx="10915652" cy="2597735"/>
-        </p:xfrm>
-        <a:graphic>
-          <a:graphicData uri="http://schemas.openxmlformats.org/drawingml/2006/table">
-            <a:tbl>
-              <a:tblPr firstRow="1" bandRow="1">
-                <a:tableStyleId>{5C22544A-7EE6-4342-B048-85BDC9FD1C3A}</a:tableStyleId>
-              </a:tblPr>
-              <a:tblGrid>
-                <a:gridCol w="2728913">
-                  <a:extLst>
-                    <a:ext uri="{9D8B030D-6E8A-4147-A177-3AD203B41FA5}">
-                      <a16:colId xmlns:a16="http://schemas.microsoft.com/office/drawing/2014/main" val="715053803"/>
-                    </a:ext>
-                  </a:extLst>
-                </a:gridCol>
-                <a:gridCol w="2728913">
-                  <a:extLst>
-                    <a:ext uri="{9D8B030D-6E8A-4147-A177-3AD203B41FA5}">
-                      <a16:colId xmlns:a16="http://schemas.microsoft.com/office/drawing/2014/main" val="2746032963"/>
-                    </a:ext>
-                  </a:extLst>
-                </a:gridCol>
-                <a:gridCol w="2728913">
-                  <a:extLst>
-                    <a:ext uri="{9D8B030D-6E8A-4147-A177-3AD203B41FA5}">
-                      <a16:colId xmlns:a16="http://schemas.microsoft.com/office/drawing/2014/main" val="2893383866"/>
-                    </a:ext>
-                  </a:extLst>
-                </a:gridCol>
-                <a:gridCol w="2728913">
-                  <a:extLst>
-                    <a:ext uri="{9D8B030D-6E8A-4147-A177-3AD203B41FA5}">
-                      <a16:colId xmlns:a16="http://schemas.microsoft.com/office/drawing/2014/main" val="3642250614"/>
-                    </a:ext>
-                  </a:extLst>
-                </a:gridCol>
-              </a:tblGrid>
-              <a:tr h="371105">
-                <a:tc>
-                  <a:txBody>
-                    <a:bodyPr/>
-                    <a:lstStyle/>
-                    <a:p>
-                      <a:endParaRPr lang="en-GB" dirty="0"/>
-                    </a:p>
-                  </a:txBody>
-                  <a:tcPr/>
-                </a:tc>
-                <a:tc>
-                  <a:txBody>
-                    <a:bodyPr/>
-                    <a:lstStyle/>
-                    <a:p>
-                      <a:r>
-                        <a:rPr lang="en-US" dirty="0"/>
-                        <a:t>Sepal Width</a:t>
-                      </a:r>
-                      <a:endParaRPr lang="en-GB" dirty="0"/>
-                    </a:p>
-                  </a:txBody>
-                  <a:tcPr/>
-                </a:tc>
-                <a:tc>
-                  <a:txBody>
-                    <a:bodyPr/>
-                    <a:lstStyle/>
-                    <a:p>
-                      <a:r>
-                        <a:rPr lang="en-US" dirty="0"/>
-                        <a:t>Petal Length</a:t>
-                      </a:r>
-                      <a:endParaRPr lang="en-GB" dirty="0"/>
-                    </a:p>
-                  </a:txBody>
-                  <a:tcPr/>
-                </a:tc>
-                <a:tc>
-                  <a:txBody>
-                    <a:bodyPr/>
-                    <a:lstStyle/>
-                    <a:p>
-                      <a:r>
-                        <a:rPr lang="en-US" dirty="0"/>
-                        <a:t>Petal Width</a:t>
-                      </a:r>
-                      <a:endParaRPr lang="en-GB" dirty="0"/>
-                    </a:p>
-                  </a:txBody>
-                  <a:tcPr/>
-                </a:tc>
-                <a:extLst>
-                  <a:ext uri="{0D108BD9-81ED-4DB2-BD59-A6C34878D82A}">
-                    <a16:rowId xmlns:a16="http://schemas.microsoft.com/office/drawing/2014/main" val="2410944377"/>
-                  </a:ext>
-                </a:extLst>
-              </a:tr>
-              <a:tr h="371105">
-                <a:tc>
-                  <a:txBody>
-                    <a:bodyPr/>
-                    <a:lstStyle/>
-                    <a:p>
-                      <a:r>
-                        <a:rPr lang="en-US" dirty="0"/>
-                        <a:t>Mean</a:t>
-                      </a:r>
-                    </a:p>
-                  </a:txBody>
-                  <a:tcPr/>
-                </a:tc>
-                <a:tc>
-                  <a:txBody>
-                    <a:bodyPr/>
-                    <a:lstStyle/>
-                    <a:p>
-                      <a:r>
-                        <a:rPr lang="en-US" dirty="0"/>
-                        <a:t>3.05</a:t>
-                      </a:r>
-                      <a:endParaRPr lang="en-GB" dirty="0"/>
-                    </a:p>
-                  </a:txBody>
-                  <a:tcPr/>
-                </a:tc>
-                <a:tc>
-                  <a:txBody>
-                    <a:bodyPr/>
-                    <a:lstStyle/>
-                    <a:p>
-                      <a:r>
-                        <a:rPr lang="en-US" dirty="0"/>
-                        <a:t>3.76</a:t>
-                      </a:r>
-                      <a:endParaRPr lang="en-GB" dirty="0"/>
-                    </a:p>
-                  </a:txBody>
-                  <a:tcPr/>
-                </a:tc>
-                <a:tc>
-                  <a:txBody>
-                    <a:bodyPr/>
-                    <a:lstStyle/>
-                    <a:p>
-                      <a:r>
-                        <a:rPr lang="en-US" dirty="0"/>
-                        <a:t>1.20</a:t>
-                      </a:r>
-                      <a:endParaRPr lang="en-GB" dirty="0"/>
-                    </a:p>
-                  </a:txBody>
-                  <a:tcPr/>
-                </a:tc>
-                <a:extLst>
-                  <a:ext uri="{0D108BD9-81ED-4DB2-BD59-A6C34878D82A}">
-                    <a16:rowId xmlns:a16="http://schemas.microsoft.com/office/drawing/2014/main" val="1113700670"/>
-                  </a:ext>
-                </a:extLst>
-              </a:tr>
-              <a:tr h="371105">
-                <a:tc>
-                  <a:txBody>
-                    <a:bodyPr/>
-                    <a:lstStyle/>
-                    <a:p>
-                      <a:r>
-                        <a:rPr lang="en-US" dirty="0"/>
-                        <a:t>Median</a:t>
-                      </a:r>
-                      <a:endParaRPr lang="en-GB" dirty="0"/>
-                    </a:p>
-                  </a:txBody>
-                  <a:tcPr/>
-                </a:tc>
-                <a:tc>
-                  <a:txBody>
-                    <a:bodyPr/>
-                    <a:lstStyle/>
-                    <a:p>
-                      <a:r>
-                        <a:rPr lang="en-US" dirty="0"/>
-                        <a:t>3</a:t>
-                      </a:r>
-                      <a:endParaRPr lang="en-GB" dirty="0"/>
-                    </a:p>
-                  </a:txBody>
-                  <a:tcPr/>
-                </a:tc>
-                <a:tc>
-                  <a:txBody>
-                    <a:bodyPr/>
-                    <a:lstStyle/>
-                    <a:p>
-                      <a:r>
-                        <a:rPr lang="en-US" dirty="0"/>
-                        <a:t>4.35</a:t>
-                      </a:r>
-                      <a:endParaRPr lang="en-GB" dirty="0"/>
-                    </a:p>
-                  </a:txBody>
-                  <a:tcPr/>
-                </a:tc>
-                <a:tc>
-                  <a:txBody>
-                    <a:bodyPr/>
-                    <a:lstStyle/>
-                    <a:p>
-                      <a:r>
-                        <a:rPr lang="en-US" dirty="0"/>
-                        <a:t>1.3</a:t>
-                      </a:r>
-                      <a:endParaRPr lang="en-GB" dirty="0"/>
-                    </a:p>
-                  </a:txBody>
-                  <a:tcPr/>
-                </a:tc>
-                <a:extLst>
-                  <a:ext uri="{0D108BD9-81ED-4DB2-BD59-A6C34878D82A}">
-                    <a16:rowId xmlns:a16="http://schemas.microsoft.com/office/drawing/2014/main" val="1207286892"/>
-                  </a:ext>
-                </a:extLst>
-              </a:tr>
-              <a:tr h="371105">
-                <a:tc>
-                  <a:txBody>
-                    <a:bodyPr/>
-                    <a:lstStyle/>
-                    <a:p>
-                      <a:r>
-                        <a:rPr lang="en-US" dirty="0"/>
-                        <a:t>Minimum</a:t>
-                      </a:r>
-                      <a:endParaRPr lang="en-GB" dirty="0"/>
-                    </a:p>
-                  </a:txBody>
-                  <a:tcPr/>
-                </a:tc>
-                <a:tc>
-                  <a:txBody>
-                    <a:bodyPr/>
-                    <a:lstStyle/>
-                    <a:p>
-                      <a:r>
-                        <a:rPr lang="en-US" dirty="0"/>
-                        <a:t>2</a:t>
-                      </a:r>
-                      <a:endParaRPr lang="en-GB" dirty="0"/>
-                    </a:p>
-                  </a:txBody>
-                  <a:tcPr/>
-                </a:tc>
-                <a:tc>
-                  <a:txBody>
-                    <a:bodyPr/>
-                    <a:lstStyle/>
-                    <a:p>
-                      <a:r>
-                        <a:rPr lang="en-US" dirty="0"/>
-                        <a:t>1</a:t>
-                      </a:r>
-                      <a:endParaRPr lang="en-GB" dirty="0"/>
-                    </a:p>
-                  </a:txBody>
-                  <a:tcPr/>
-                </a:tc>
-                <a:tc>
-                  <a:txBody>
-                    <a:bodyPr/>
-                    <a:lstStyle/>
-                    <a:p>
-                      <a:r>
-                        <a:rPr lang="en-US" dirty="0"/>
-                        <a:t>0.1</a:t>
-                      </a:r>
-                    </a:p>
-                  </a:txBody>
-                  <a:tcPr/>
-                </a:tc>
-                <a:extLst>
-                  <a:ext uri="{0D108BD9-81ED-4DB2-BD59-A6C34878D82A}">
-                    <a16:rowId xmlns:a16="http://schemas.microsoft.com/office/drawing/2014/main" val="1879499150"/>
-                  </a:ext>
-                </a:extLst>
-              </a:tr>
-              <a:tr h="371105">
-                <a:tc>
-                  <a:txBody>
-                    <a:bodyPr/>
-                    <a:lstStyle/>
-                    <a:p>
-                      <a:r>
-                        <a:rPr lang="en-US" dirty="0"/>
-                        <a:t>Maximum</a:t>
-                      </a:r>
-                      <a:endParaRPr lang="en-GB" dirty="0"/>
-                    </a:p>
-                  </a:txBody>
-                  <a:tcPr/>
-                </a:tc>
-                <a:tc>
-                  <a:txBody>
-                    <a:bodyPr/>
-                    <a:lstStyle/>
-                    <a:p>
-                      <a:r>
-                        <a:rPr lang="en-US" dirty="0"/>
-                        <a:t>4.4</a:t>
-                      </a:r>
-                      <a:endParaRPr lang="en-GB" dirty="0"/>
-                    </a:p>
-                  </a:txBody>
-                  <a:tcPr/>
-                </a:tc>
-                <a:tc>
-                  <a:txBody>
-                    <a:bodyPr/>
-                    <a:lstStyle/>
-                    <a:p>
-                      <a:r>
-                        <a:rPr lang="en-US" dirty="0"/>
-                        <a:t>6.9</a:t>
-                      </a:r>
-                      <a:endParaRPr lang="en-GB" dirty="0"/>
-                    </a:p>
-                  </a:txBody>
-                  <a:tcPr/>
-                </a:tc>
-                <a:tc>
-                  <a:txBody>
-                    <a:bodyPr/>
-                    <a:lstStyle/>
-                    <a:p>
-                      <a:r>
-                        <a:rPr lang="en-US" dirty="0"/>
-                        <a:t>2.5</a:t>
-                      </a:r>
-                    </a:p>
-                  </a:txBody>
-                  <a:tcPr/>
-                </a:tc>
-                <a:extLst>
-                  <a:ext uri="{0D108BD9-81ED-4DB2-BD59-A6C34878D82A}">
-                    <a16:rowId xmlns:a16="http://schemas.microsoft.com/office/drawing/2014/main" val="1341949112"/>
-                  </a:ext>
-                </a:extLst>
-              </a:tr>
-              <a:tr h="371105">
-                <a:tc>
-                  <a:txBody>
-                    <a:bodyPr/>
-                    <a:lstStyle/>
-                    <a:p>
-                      <a:r>
-                        <a:rPr lang="en-US" dirty="0"/>
-                        <a:t>Range</a:t>
-                      </a:r>
-                      <a:endParaRPr lang="en-GB" dirty="0"/>
-                    </a:p>
-                  </a:txBody>
-                  <a:tcPr/>
-                </a:tc>
-                <a:tc>
-                  <a:txBody>
-                    <a:bodyPr/>
-                    <a:lstStyle/>
-                    <a:p>
-                      <a:r>
-                        <a:rPr lang="en-US" dirty="0"/>
-                        <a:t>2.0 - 4.4</a:t>
-                      </a:r>
-                      <a:endParaRPr lang="en-GB" dirty="0"/>
-                    </a:p>
-                  </a:txBody>
-                  <a:tcPr/>
-                </a:tc>
-                <a:tc>
-                  <a:txBody>
-                    <a:bodyPr/>
-                    <a:lstStyle/>
-                    <a:p>
-                      <a:r>
-                        <a:rPr lang="en-US" dirty="0"/>
-                        <a:t>1 - 6.9</a:t>
-                      </a:r>
-                      <a:endParaRPr lang="en-GB" dirty="0"/>
-                    </a:p>
-                  </a:txBody>
-                  <a:tcPr/>
-                </a:tc>
-                <a:tc>
-                  <a:txBody>
-                    <a:bodyPr/>
-                    <a:lstStyle/>
-                    <a:p>
-                      <a:r>
-                        <a:rPr lang="en-US" dirty="0"/>
-                        <a:t>0.1 - 2.5</a:t>
-                      </a:r>
-                    </a:p>
-                  </a:txBody>
-                  <a:tcPr/>
-                </a:tc>
-                <a:extLst>
-                  <a:ext uri="{0D108BD9-81ED-4DB2-BD59-A6C34878D82A}">
-                    <a16:rowId xmlns:a16="http://schemas.microsoft.com/office/drawing/2014/main" val="2353976258"/>
-                  </a:ext>
-                </a:extLst>
-              </a:tr>
-              <a:tr h="371105">
-                <a:tc>
-                  <a:txBody>
-                    <a:bodyPr/>
-                    <a:lstStyle/>
-                    <a:p>
-                      <a:r>
-                        <a:rPr lang="en-US" dirty="0"/>
-                        <a:t>Sum</a:t>
-                      </a:r>
-                      <a:endParaRPr lang="en-GB" dirty="0"/>
-                    </a:p>
-                  </a:txBody>
-                  <a:tcPr/>
-                </a:tc>
-                <a:tc>
-                  <a:txBody>
-                    <a:bodyPr/>
-                    <a:lstStyle/>
-                    <a:p>
-                      <a:r>
-                        <a:rPr lang="en-US" dirty="0"/>
-                        <a:t>458.6</a:t>
-                      </a:r>
-                      <a:endParaRPr lang="en-GB" dirty="0"/>
-                    </a:p>
-                  </a:txBody>
-                  <a:tcPr/>
-                </a:tc>
-                <a:tc>
-                  <a:txBody>
-                    <a:bodyPr/>
-                    <a:lstStyle/>
-                    <a:p>
-                      <a:r>
-                        <a:rPr lang="en-US" dirty="0"/>
-                        <a:t>563.7</a:t>
-                      </a:r>
-                      <a:endParaRPr lang="en-GB" dirty="0"/>
-                    </a:p>
-                  </a:txBody>
-                  <a:tcPr/>
-                </a:tc>
-                <a:tc>
-                  <a:txBody>
-                    <a:bodyPr/>
-                    <a:lstStyle/>
-                    <a:p>
-                      <a:r>
-                        <a:rPr lang="en-US" dirty="0"/>
-                        <a:t>179.9</a:t>
-                      </a:r>
-                      <a:endParaRPr lang="en-GB" dirty="0"/>
-                    </a:p>
-                  </a:txBody>
-                  <a:tcPr/>
-                </a:tc>
-                <a:extLst>
-                  <a:ext uri="{0D108BD9-81ED-4DB2-BD59-A6C34878D82A}">
-                    <a16:rowId xmlns:a16="http://schemas.microsoft.com/office/drawing/2014/main" val="4197471103"/>
-                  </a:ext>
-                </a:extLst>
-              </a:tr>
-            </a:tbl>
-          </a:graphicData>
-        </a:graphic>
-      </p:graphicFrame>
-      <p:pic>
-        <p:nvPicPr>
-          <p:cNvPr id="6" name="Picture 5">
-            <a:extLst>
-              <a:ext uri="{FF2B5EF4-FFF2-40B4-BE49-F238E27FC236}">
-                <a16:creationId xmlns:a16="http://schemas.microsoft.com/office/drawing/2014/main" id="{6BE010F4-FE84-43E6-B518-678748BA9CB5}"/>
-              </a:ext>
-            </a:extLst>
-          </p:cNvPr>
-          <p:cNvPicPr>
-            <a:picLocks noChangeAspect="1"/>
-          </p:cNvPicPr>
-          <p:nvPr/>
-        </p:nvPicPr>
-        <p:blipFill rotWithShape="1">
-          <a:blip r:embed="rId2"/>
-          <a:srcRect l="52422" t="53194" b="7777"/>
-          <a:stretch/>
-        </p:blipFill>
-        <p:spPr>
-          <a:xfrm>
-            <a:off x="3009899" y="4181474"/>
-            <a:ext cx="5800725" cy="2676526"/>
-          </a:xfrm>
-          <a:prstGeom prst="rect">
-            <a:avLst/>
-          </a:prstGeom>
-        </p:spPr>
-      </p:pic>
-    </p:spTree>
-    <p:extLst>
-      <p:ext uri="{BB962C8B-B14F-4D97-AF65-F5344CB8AC3E}">
-        <p14:creationId xmlns:p14="http://schemas.microsoft.com/office/powerpoint/2010/main" val="2247412923"/>
-      </p:ext>
-    </p:extLst>
-  </p:cSld>
-  <p:clrMapOvr>
-    <a:masterClrMapping/>
-  </p:clrMapOvr>
-</p:sld>
-</file>
-
-<file path=ppt/slides/slide7.xml><?xml version="1.0" encoding="utf-8"?>
-<p:sld xmlns:a="http://schemas.openxmlformats.org/drawingml/2006/main" xmlns:r="http://schemas.openxmlformats.org/officeDocument/2006/relationships" xmlns:p="http://schemas.openxmlformats.org/presentationml/2006/main">
-  <p:cSld>
-    <p:spTree>
-      <p:nvGrpSpPr>
-        <p:cNvPr id="1" name=""/>
-        <p:cNvGrpSpPr/>
-        <p:nvPr/>
-      </p:nvGrpSpPr>
-      <p:grpSpPr>
-        <a:xfrm>
-          <a:off x="0" y="0"/>
-          <a:ext cx="0" cy="0"/>
-          <a:chOff x="0" y="0"/>
-          <a:chExt cx="0" cy="0"/>
-        </a:xfrm>
-      </p:grpSpPr>
-      <p:sp>
-        <p:nvSpPr>
-          <p:cNvPr id="6" name="TextBox 5"/>
-          <p:cNvSpPr txBox="1"/>
-          <p:nvPr/>
-        </p:nvSpPr>
-        <p:spPr>
-          <a:xfrm>
-            <a:off x="1680117" y="2505670"/>
-            <a:ext cx="8831766" cy="923330"/>
-          </a:xfrm>
-          <a:prstGeom prst="rect">
-            <a:avLst/>
-          </a:prstGeom>
-          <a:noFill/>
-        </p:spPr>
-        <p:txBody>
-          <a:bodyPr wrap="square" rtlCol="0">
-            <a:spAutoFit/>
-          </a:bodyPr>
-          <a:lstStyle/>
-          <a:p>
-            <a:pPr marL="0" marR="0" lvl="0" indent="0" algn="ctr" defTabSz="457200" rtl="0" eaLnBrk="1" fontAlgn="auto" latinLnBrk="0" hangingPunct="1">
-              <a:lnSpc>
-                <a:spcPct val="100000"/>
-              </a:lnSpc>
-              <a:spcBef>
-                <a:spcPts val="0"/>
-              </a:spcBef>
-              <a:spcAft>
-                <a:spcPts val="0"/>
-              </a:spcAft>
-              <a:buClrTx/>
-              <a:buSzTx/>
-              <a:buFontTx/>
-              <a:buNone/>
-              <a:tabLst/>
-              <a:defRPr/>
-            </a:pPr>
-            <a:r>
-              <a:rPr kumimoji="0" lang="en-GB" sz="5400" b="0" i="0" u="none" strike="noStrike" kern="1200" cap="none" spc="0" normalizeH="0" baseline="0" noProof="0" dirty="0">
-                <a:ln>
-                  <a:noFill/>
-                </a:ln>
-                <a:solidFill>
-                  <a:srgbClr val="000000"/>
-                </a:solidFill>
-                <a:effectLst/>
-                <a:uLnTx/>
-                <a:uFillTx/>
-                <a:latin typeface="Calibri" panose="020F0502020204030204" pitchFamily="34" charset="0"/>
-                <a:ea typeface="+mn-ea"/>
-                <a:cs typeface="+mn-cs"/>
-              </a:rPr>
-              <a:t>Practical 2</a:t>
-            </a:r>
-            <a:endParaRPr kumimoji="0" lang="en-GB" sz="5400" b="0" i="0" u="none" strike="noStrike" kern="1200" cap="none" spc="0" normalizeH="0" baseline="0" noProof="0" dirty="0">
-              <a:ln>
-                <a:noFill/>
-              </a:ln>
-              <a:solidFill>
-                <a:srgbClr val="000000"/>
-              </a:solidFill>
-              <a:effectLst/>
-              <a:uLnTx/>
-              <a:uFillTx/>
-              <a:latin typeface="Constantia" panose="02030602050306030303" pitchFamily="18" charset="0"/>
-              <a:ea typeface="+mn-ea"/>
-              <a:cs typeface="+mn-cs"/>
-            </a:endParaRPr>
-          </a:p>
-        </p:txBody>
-      </p:sp>
-    </p:spTree>
-    <p:extLst>
-      <p:ext uri="{BB962C8B-B14F-4D97-AF65-F5344CB8AC3E}">
-        <p14:creationId xmlns:p14="http://schemas.microsoft.com/office/powerpoint/2010/main" val="1082209432"/>
-      </p:ext>
-    </p:extLst>
-  </p:cSld>
-  <p:clrMapOvr>
-    <a:masterClrMapping/>
-  </p:clrMapOvr>
-</p:sld>
-</file>
-
-<file path=ppt/slides/slide8.xml><?xml version="1.0" encoding="utf-8"?>
-<p:sld xmlns:a="http://schemas.openxmlformats.org/drawingml/2006/main" xmlns:r="http://schemas.openxmlformats.org/officeDocument/2006/relationships" xmlns:p="http://schemas.openxmlformats.org/presentationml/2006/main">
-  <p:cSld>
-    <p:spTree>
-      <p:nvGrpSpPr>
-        <p:cNvPr id="1" name=""/>
-        <p:cNvGrpSpPr/>
-        <p:nvPr/>
-      </p:nvGrpSpPr>
-      <p:grpSpPr>
-        <a:xfrm>
-          <a:off x="0" y="0"/>
-          <a:ext cx="0" cy="0"/>
-          <a:chOff x="0" y="0"/>
-          <a:chExt cx="0" cy="0"/>
-        </a:xfrm>
-      </p:grpSpPr>
-      <p:sp>
-        <p:nvSpPr>
-          <p:cNvPr id="2" name="Title 1">
-            <a:extLst>
-              <a:ext uri="{FF2B5EF4-FFF2-40B4-BE49-F238E27FC236}">
-                <a16:creationId xmlns:a16="http://schemas.microsoft.com/office/drawing/2014/main" id="{186A7389-B6D6-4346-95A8-5D2A3ABFCCB2}"/>
-              </a:ext>
-            </a:extLst>
-          </p:cNvPr>
-          <p:cNvSpPr>
-            <a:spLocks noGrp="1"/>
-          </p:cNvSpPr>
-          <p:nvPr>
-            <p:ph type="title"/>
-          </p:nvPr>
-        </p:nvSpPr>
-        <p:spPr/>
-        <p:txBody>
-          <a:bodyPr/>
-          <a:lstStyle/>
-          <a:p>
-            <a:r>
-              <a:rPr lang="en-US" dirty="0"/>
-              <a:t>Vectors</a:t>
-            </a:r>
-            <a:endParaRPr lang="en-GB" dirty="0"/>
-          </a:p>
-        </p:txBody>
-      </p:sp>
-      <p:sp>
-        <p:nvSpPr>
-          <p:cNvPr id="3" name="Content Placeholder 2">
-            <a:extLst>
-              <a:ext uri="{FF2B5EF4-FFF2-40B4-BE49-F238E27FC236}">
-                <a16:creationId xmlns:a16="http://schemas.microsoft.com/office/drawing/2014/main" id="{5C98BE32-F9A8-44A2-8F19-D968DC79334F}"/>
-              </a:ext>
-            </a:extLst>
-          </p:cNvPr>
-          <p:cNvSpPr>
-            <a:spLocks noGrp="1"/>
-          </p:cNvSpPr>
-          <p:nvPr>
-            <p:ph idx="1"/>
-          </p:nvPr>
-        </p:nvSpPr>
-        <p:spPr>
-          <a:xfrm>
-            <a:off x="609599" y="1477817"/>
-            <a:ext cx="10972801" cy="5523057"/>
-          </a:xfrm>
-        </p:spPr>
-        <p:txBody>
-          <a:bodyPr/>
-          <a:lstStyle/>
-          <a:p>
-            <a:pPr marL="342900" indent="-342900">
-              <a:buFont typeface="Arial" panose="020B0604020202020204" pitchFamily="34" charset="0"/>
-              <a:buChar char="•"/>
-            </a:pPr>
-            <a:r>
-              <a:rPr lang="en-US" dirty="0"/>
-              <a:t>Vectors contain a number of elements, usually of the same class.</a:t>
-            </a:r>
-          </a:p>
-          <a:p>
-            <a:pPr marL="342900" indent="-342900">
-              <a:buFont typeface="Arial" panose="020B0604020202020204" pitchFamily="34" charset="0"/>
-              <a:buChar char="•"/>
-            </a:pPr>
-            <a:endParaRPr lang="en-US" dirty="0"/>
-          </a:p>
-          <a:p>
-            <a:pPr marL="342900" indent="-342900">
-              <a:buFont typeface="Arial" panose="020B0604020202020204" pitchFamily="34" charset="0"/>
-              <a:buChar char="•"/>
-            </a:pPr>
-            <a:r>
-              <a:rPr lang="en-US" dirty="0"/>
-              <a:t>A vector is constructed using the function ‘c()’</a:t>
-            </a:r>
-          </a:p>
-          <a:p>
-            <a:pPr marL="1085850" lvl="1" indent="-342900">
-              <a:buFont typeface="Arial" panose="020B0604020202020204" pitchFamily="34" charset="0"/>
-              <a:buChar char="•"/>
-            </a:pPr>
-            <a:r>
-              <a:rPr lang="en-US" sz="2200" dirty="0"/>
-              <a:t>‘</a:t>
-            </a:r>
-            <a:r>
-              <a:rPr lang="en-US" sz="2200" dirty="0" err="1"/>
-              <a:t>vec</a:t>
-            </a:r>
-            <a:r>
-              <a:rPr lang="en-US" sz="2200" dirty="0"/>
-              <a:t> &lt;- c(1,2,3)’ </a:t>
-            </a:r>
-            <a:r>
-              <a:rPr lang="en-US" sz="2200" dirty="0" err="1"/>
-              <a:t>initialises</a:t>
-            </a:r>
-            <a:r>
-              <a:rPr lang="en-US" sz="2200" dirty="0"/>
-              <a:t> a numeric vector, called </a:t>
-            </a:r>
-            <a:r>
-              <a:rPr lang="en-US" sz="2200" dirty="0" err="1"/>
-              <a:t>vec</a:t>
-            </a:r>
-            <a:r>
-              <a:rPr lang="en-US" sz="2200" dirty="0"/>
-              <a:t>, that contains three elements.</a:t>
-            </a:r>
-          </a:p>
-          <a:p>
-            <a:pPr marL="1085850" lvl="1" indent="-342900">
-              <a:buFont typeface="Arial" panose="020B0604020202020204" pitchFamily="34" charset="0"/>
-              <a:buChar char="•"/>
-            </a:pPr>
-            <a:endParaRPr lang="en-US" sz="2200" dirty="0"/>
-          </a:p>
-          <a:p>
-            <a:pPr marL="1085850" lvl="1" indent="-342900">
-              <a:buFont typeface="Arial" panose="020B0604020202020204" pitchFamily="34" charset="0"/>
-              <a:buChar char="•"/>
-            </a:pPr>
-            <a:endParaRPr lang="en-US" sz="2200" dirty="0"/>
-          </a:p>
-          <a:p>
-            <a:pPr marL="1085850" lvl="1" indent="-342900">
-              <a:buFont typeface="Arial" panose="020B0604020202020204" pitchFamily="34" charset="0"/>
-              <a:buChar char="•"/>
-            </a:pPr>
-            <a:r>
-              <a:rPr lang="en-US" sz="2200" dirty="0"/>
-              <a:t>‘</a:t>
-            </a:r>
-            <a:r>
-              <a:rPr lang="en-US" sz="2200" dirty="0" err="1"/>
-              <a:t>vec</a:t>
-            </a:r>
-            <a:r>
-              <a:rPr lang="en-US" sz="2200" dirty="0"/>
-              <a:t> &lt;- c(“</a:t>
-            </a:r>
-            <a:r>
-              <a:rPr lang="en-US" sz="2200" dirty="0" err="1"/>
-              <a:t>a”,”b”,”c</a:t>
-            </a:r>
-            <a:r>
-              <a:rPr lang="en-US" sz="2200" dirty="0"/>
-              <a:t>”)’ </a:t>
-            </a:r>
-            <a:r>
-              <a:rPr lang="en-US" sz="2200" dirty="0" err="1"/>
-              <a:t>initialises</a:t>
-            </a:r>
-            <a:r>
-              <a:rPr lang="en-US" sz="2200" dirty="0"/>
-              <a:t> a vector of characters, called </a:t>
-            </a:r>
-            <a:r>
-              <a:rPr lang="en-US" sz="2200" dirty="0" err="1"/>
-              <a:t>vec</a:t>
-            </a:r>
-            <a:r>
-              <a:rPr lang="en-US" sz="2200" dirty="0"/>
-              <a:t>, that contains three elements.</a:t>
-            </a:r>
-          </a:p>
-          <a:p>
-            <a:endParaRPr lang="en-US" dirty="0"/>
-          </a:p>
-          <a:p>
-            <a:pPr marL="342900" indent="-342900">
-              <a:buFont typeface="Arial" panose="020B0604020202020204" pitchFamily="34" charset="0"/>
-              <a:buChar char="•"/>
-            </a:pPr>
-            <a:r>
-              <a:rPr lang="en-US" dirty="0"/>
-              <a:t>Values of a vector are accessed using brackets ‘[ ]’:</a:t>
-            </a:r>
-          </a:p>
-          <a:p>
-            <a:pPr marL="1085850" lvl="1" indent="-342900">
-              <a:buFont typeface="Arial" panose="020B0604020202020204" pitchFamily="34" charset="0"/>
-              <a:buChar char="•"/>
-            </a:pPr>
-            <a:r>
-              <a:rPr lang="en-US" sz="2200" dirty="0"/>
-              <a:t>‘</a:t>
-            </a:r>
-            <a:r>
-              <a:rPr lang="en-US" sz="2200" dirty="0" err="1"/>
-              <a:t>vec</a:t>
-            </a:r>
-            <a:r>
-              <a:rPr lang="en-US" sz="2200" dirty="0"/>
-              <a:t>[3]’ designates the third element of the vector ‘</a:t>
-            </a:r>
-            <a:r>
-              <a:rPr lang="en-US" sz="2200" dirty="0" err="1"/>
-              <a:t>vec</a:t>
-            </a:r>
-            <a:r>
-              <a:rPr lang="en-US" sz="2200" dirty="0"/>
-              <a:t>’.</a:t>
-            </a:r>
-          </a:p>
-          <a:p>
-            <a:pPr marL="1085850" lvl="1" indent="-342900">
-              <a:buFont typeface="Arial" panose="020B0604020202020204" pitchFamily="34" charset="0"/>
-              <a:buChar char="•"/>
-            </a:pPr>
-            <a:r>
-              <a:rPr lang="en-US" sz="2200" dirty="0"/>
-              <a:t>‘</a:t>
-            </a:r>
-            <a:r>
-              <a:rPr lang="en-US" sz="2200" dirty="0" err="1"/>
-              <a:t>vec</a:t>
-            </a:r>
-            <a:r>
-              <a:rPr lang="en-US" sz="2200" dirty="0"/>
-              <a:t>[-3]’ returns  the vector ‘</a:t>
-            </a:r>
-            <a:r>
-              <a:rPr lang="en-US" sz="2200" dirty="0" err="1"/>
-              <a:t>vec</a:t>
-            </a:r>
-            <a:r>
-              <a:rPr lang="en-US" sz="2200" dirty="0"/>
-              <a:t>’ minus the third element.</a:t>
-            </a:r>
-          </a:p>
-          <a:p>
-            <a:pPr marL="1085850" lvl="1" indent="-342900">
-              <a:buFont typeface="Arial" panose="020B0604020202020204" pitchFamily="34" charset="0"/>
-              <a:buChar char="•"/>
-            </a:pPr>
-            <a:r>
-              <a:rPr lang="en-US" sz="2200" dirty="0"/>
-              <a:t>‘</a:t>
-            </a:r>
-            <a:r>
-              <a:rPr lang="en-US" sz="2200" dirty="0" err="1"/>
-              <a:t>vec</a:t>
-            </a:r>
-            <a:r>
-              <a:rPr lang="en-US" sz="2200" dirty="0"/>
-              <a:t>[length(</a:t>
-            </a:r>
-            <a:r>
-              <a:rPr lang="en-US" sz="2200" dirty="0" err="1"/>
-              <a:t>vec</a:t>
-            </a:r>
-            <a:r>
-              <a:rPr lang="en-US" sz="2200" dirty="0"/>
-              <a:t>)]’ designates the last element of the vector ‘</a:t>
-            </a:r>
-            <a:r>
-              <a:rPr lang="en-US" sz="2200" dirty="0" err="1"/>
-              <a:t>vec</a:t>
-            </a:r>
-            <a:r>
-              <a:rPr lang="en-US" sz="2200" dirty="0"/>
-              <a:t>’.</a:t>
-            </a:r>
-          </a:p>
-        </p:txBody>
-      </p:sp>
-      <p:graphicFrame>
-        <p:nvGraphicFramePr>
-          <p:cNvPr id="4" name="Table 4">
-            <a:extLst>
-              <a:ext uri="{FF2B5EF4-FFF2-40B4-BE49-F238E27FC236}">
-                <a16:creationId xmlns:a16="http://schemas.microsoft.com/office/drawing/2014/main" id="{0DE4DD00-4E61-4C1C-80F1-6092E6FA4418}"/>
-              </a:ext>
-            </a:extLst>
-          </p:cNvPr>
-          <p:cNvGraphicFramePr>
-            <a:graphicFrameLocks noGrp="1"/>
-          </p:cNvGraphicFramePr>
-          <p:nvPr>
-            <p:extLst>
-              <p:ext uri="{D42A27DB-BD31-4B8C-83A1-F6EECF244321}">
-                <p14:modId xmlns:p14="http://schemas.microsoft.com/office/powerpoint/2010/main" val="228704173"/>
-              </p:ext>
-            </p:extLst>
-          </p:nvPr>
-        </p:nvGraphicFramePr>
-        <p:xfrm>
-          <a:off x="4019550" y="3376930"/>
-          <a:ext cx="3815952" cy="370840"/>
-        </p:xfrm>
-        <a:graphic>
-          <a:graphicData uri="http://schemas.openxmlformats.org/drawingml/2006/table">
-            <a:tbl>
-              <a:tblPr firstRow="1" bandRow="1">
-                <a:tableStyleId>{5C22544A-7EE6-4342-B048-85BDC9FD1C3A}</a:tableStyleId>
-              </a:tblPr>
-              <a:tblGrid>
-                <a:gridCol w="1271984">
-                  <a:extLst>
-                    <a:ext uri="{9D8B030D-6E8A-4147-A177-3AD203B41FA5}">
-                      <a16:colId xmlns:a16="http://schemas.microsoft.com/office/drawing/2014/main" val="588169052"/>
-                    </a:ext>
-                  </a:extLst>
-                </a:gridCol>
-                <a:gridCol w="1271984">
-                  <a:extLst>
-                    <a:ext uri="{9D8B030D-6E8A-4147-A177-3AD203B41FA5}">
-                      <a16:colId xmlns:a16="http://schemas.microsoft.com/office/drawing/2014/main" val="747211374"/>
-                    </a:ext>
-                  </a:extLst>
-                </a:gridCol>
-                <a:gridCol w="1271984">
-                  <a:extLst>
-                    <a:ext uri="{9D8B030D-6E8A-4147-A177-3AD203B41FA5}">
-                      <a16:colId xmlns:a16="http://schemas.microsoft.com/office/drawing/2014/main" val="2290586244"/>
-                    </a:ext>
-                  </a:extLst>
-                </a:gridCol>
-              </a:tblGrid>
-              <a:tr h="370840">
-                <a:tc>
-                  <a:txBody>
-                    <a:bodyPr/>
-                    <a:lstStyle/>
-                    <a:p>
-                      <a:pPr algn="ctr"/>
-                      <a:r>
-                        <a:rPr lang="en-US" dirty="0">
-                          <a:solidFill>
-                            <a:schemeClr val="tx1"/>
-                          </a:solidFill>
-                        </a:rPr>
-                        <a:t>1</a:t>
-                      </a:r>
-                      <a:endParaRPr lang="en-GB" dirty="0">
-                        <a:solidFill>
-                          <a:schemeClr val="tx1"/>
-                        </a:solidFill>
-                      </a:endParaRPr>
-                    </a:p>
-                  </a:txBody>
-                  <a:tcPr>
-                    <a:lnL w="12700" cap="flat" cmpd="sng" algn="ctr">
-                      <a:solidFill>
-                        <a:schemeClr val="tx1"/>
-                      </a:solidFill>
-                      <a:prstDash val="solid"/>
-                      <a:round/>
-                      <a:headEnd type="none" w="med" len="med"/>
-                      <a:tailEnd type="none" w="med" len="med"/>
-                    </a:lnL>
-                    <a:lnR w="12700" cap="flat" cmpd="sng" algn="ctr">
-                      <a:solidFill>
-                        <a:schemeClr val="tx1"/>
-                      </a:solidFill>
-                      <a:prstDash val="solid"/>
-                      <a:round/>
-                      <a:headEnd type="none" w="med" len="med"/>
-                      <a:tailEnd type="none" w="med" len="med"/>
-                    </a:lnR>
-                    <a:lnT w="12700" cap="flat" cmpd="sng" algn="ctr">
-                      <a:solidFill>
-                        <a:schemeClr val="tx1"/>
-                      </a:solidFill>
-                      <a:prstDash val="solid"/>
-                      <a:round/>
-                      <a:headEnd type="none" w="med" len="med"/>
-                      <a:tailEnd type="none" w="med" len="med"/>
-                    </a:lnT>
-                    <a:lnB w="12700" cap="flat" cmpd="sng" algn="ctr">
-                      <a:solidFill>
-                        <a:schemeClr val="tx1"/>
-                      </a:solidFill>
-                      <a:prstDash val="solid"/>
-                      <a:round/>
-                      <a:headEnd type="none" w="med" len="med"/>
-                      <a:tailEnd type="none" w="med" len="med"/>
-                    </a:lnB>
-                    <a:noFill/>
-                  </a:tcPr>
-                </a:tc>
-                <a:tc>
-                  <a:txBody>
-                    <a:bodyPr/>
-                    <a:lstStyle/>
-                    <a:p>
-                      <a:pPr algn="ctr"/>
-                      <a:r>
-                        <a:rPr lang="en-US" dirty="0">
-                          <a:solidFill>
-                            <a:schemeClr val="tx1"/>
-                          </a:solidFill>
-                        </a:rPr>
-                        <a:t>2</a:t>
-                      </a:r>
-                      <a:endParaRPr lang="en-GB" dirty="0">
-                        <a:solidFill>
-                          <a:schemeClr val="tx1"/>
-                        </a:solidFill>
-                      </a:endParaRPr>
-                    </a:p>
-                  </a:txBody>
-                  <a:tcPr>
-                    <a:lnL w="12700" cap="flat" cmpd="sng" algn="ctr">
-                      <a:solidFill>
-                        <a:schemeClr val="tx1"/>
-                      </a:solidFill>
-                      <a:prstDash val="solid"/>
-                      <a:round/>
-                      <a:headEnd type="none" w="med" len="med"/>
-                      <a:tailEnd type="none" w="med" len="med"/>
-                    </a:lnL>
-                    <a:lnR w="12700" cap="flat" cmpd="sng" algn="ctr">
-                      <a:solidFill>
-                        <a:schemeClr val="tx1"/>
-                      </a:solidFill>
-                      <a:prstDash val="solid"/>
-                      <a:round/>
-                      <a:headEnd type="none" w="med" len="med"/>
-                      <a:tailEnd type="none" w="med" len="med"/>
-                    </a:lnR>
-                    <a:lnT w="12700" cap="flat" cmpd="sng" algn="ctr">
-                      <a:solidFill>
-                        <a:schemeClr val="tx1"/>
-                      </a:solidFill>
-                      <a:prstDash val="solid"/>
-                      <a:round/>
-                      <a:headEnd type="none" w="med" len="med"/>
-                      <a:tailEnd type="none" w="med" len="med"/>
-                    </a:lnT>
-                    <a:lnB w="12700" cap="flat" cmpd="sng" algn="ctr">
-                      <a:solidFill>
-                        <a:schemeClr val="tx1"/>
-                      </a:solidFill>
-                      <a:prstDash val="solid"/>
-                      <a:round/>
-                      <a:headEnd type="none" w="med" len="med"/>
-                      <a:tailEnd type="none" w="med" len="med"/>
-                    </a:lnB>
-                    <a:noFill/>
-                  </a:tcPr>
-                </a:tc>
-                <a:tc>
-                  <a:txBody>
-                    <a:bodyPr/>
-                    <a:lstStyle/>
-                    <a:p>
-                      <a:pPr algn="ctr"/>
-                      <a:r>
-                        <a:rPr lang="en-US" dirty="0">
-                          <a:solidFill>
-                            <a:schemeClr val="tx1"/>
-                          </a:solidFill>
-                        </a:rPr>
-                        <a:t>3</a:t>
-                      </a:r>
-                      <a:endParaRPr lang="en-GB" dirty="0">
-                        <a:solidFill>
-                          <a:schemeClr val="tx1"/>
-                        </a:solidFill>
-                      </a:endParaRPr>
-                    </a:p>
-                  </a:txBody>
-                  <a:tcPr>
-                    <a:lnL w="12700" cap="flat" cmpd="sng" algn="ctr">
-                      <a:solidFill>
-                        <a:schemeClr val="tx1"/>
-                      </a:solidFill>
-                      <a:prstDash val="solid"/>
-                      <a:round/>
-                      <a:headEnd type="none" w="med" len="med"/>
-                      <a:tailEnd type="none" w="med" len="med"/>
-                    </a:lnL>
-                    <a:lnR w="12700" cap="flat" cmpd="sng" algn="ctr">
-                      <a:solidFill>
-                        <a:schemeClr val="tx1"/>
-                      </a:solidFill>
-                      <a:prstDash val="solid"/>
-                      <a:round/>
-                      <a:headEnd type="none" w="med" len="med"/>
-                      <a:tailEnd type="none" w="med" len="med"/>
-                    </a:lnR>
-                    <a:lnT w="12700" cap="flat" cmpd="sng" algn="ctr">
-                      <a:solidFill>
-                        <a:schemeClr val="tx1"/>
-                      </a:solidFill>
-                      <a:prstDash val="solid"/>
-                      <a:round/>
-                      <a:headEnd type="none" w="med" len="med"/>
-                      <a:tailEnd type="none" w="med" len="med"/>
-                    </a:lnT>
-                    <a:lnB w="12700" cap="flat" cmpd="sng" algn="ctr">
-                      <a:solidFill>
-                        <a:schemeClr val="tx1"/>
-                      </a:solidFill>
-                      <a:prstDash val="solid"/>
-                      <a:round/>
-                      <a:headEnd type="none" w="med" len="med"/>
-                      <a:tailEnd type="none" w="med" len="med"/>
-                    </a:lnB>
-                    <a:noFill/>
-                  </a:tcPr>
-                </a:tc>
-                <a:extLst>
-                  <a:ext uri="{0D108BD9-81ED-4DB2-BD59-A6C34878D82A}">
-                    <a16:rowId xmlns:a16="http://schemas.microsoft.com/office/drawing/2014/main" val="3224497902"/>
-                  </a:ext>
-                </a:extLst>
-              </a:tr>
-            </a:tbl>
-          </a:graphicData>
-        </a:graphic>
-      </p:graphicFrame>
-      <p:graphicFrame>
-        <p:nvGraphicFramePr>
-          <p:cNvPr id="5" name="Table 4">
-            <a:extLst>
-              <a:ext uri="{FF2B5EF4-FFF2-40B4-BE49-F238E27FC236}">
-                <a16:creationId xmlns:a16="http://schemas.microsoft.com/office/drawing/2014/main" id="{09D65B1B-DC99-4018-9DD7-FFD5D5043304}"/>
-              </a:ext>
-            </a:extLst>
-          </p:cNvPr>
-          <p:cNvGraphicFramePr>
-            <a:graphicFrameLocks noGrp="1"/>
-          </p:cNvGraphicFramePr>
-          <p:nvPr>
-            <p:extLst>
-              <p:ext uri="{D42A27DB-BD31-4B8C-83A1-F6EECF244321}">
-                <p14:modId xmlns:p14="http://schemas.microsoft.com/office/powerpoint/2010/main" val="3516093836"/>
-              </p:ext>
-            </p:extLst>
-          </p:nvPr>
-        </p:nvGraphicFramePr>
-        <p:xfrm>
-          <a:off x="4019550" y="4725804"/>
-          <a:ext cx="3815952" cy="370840"/>
-        </p:xfrm>
-        <a:graphic>
-          <a:graphicData uri="http://schemas.openxmlformats.org/drawingml/2006/table">
-            <a:tbl>
-              <a:tblPr firstRow="1" bandRow="1">
-                <a:tableStyleId>{5C22544A-7EE6-4342-B048-85BDC9FD1C3A}</a:tableStyleId>
-              </a:tblPr>
-              <a:tblGrid>
-                <a:gridCol w="1271984">
-                  <a:extLst>
-                    <a:ext uri="{9D8B030D-6E8A-4147-A177-3AD203B41FA5}">
-                      <a16:colId xmlns:a16="http://schemas.microsoft.com/office/drawing/2014/main" val="588169052"/>
-                    </a:ext>
-                  </a:extLst>
-                </a:gridCol>
-                <a:gridCol w="1271984">
-                  <a:extLst>
-                    <a:ext uri="{9D8B030D-6E8A-4147-A177-3AD203B41FA5}">
-                      <a16:colId xmlns:a16="http://schemas.microsoft.com/office/drawing/2014/main" val="747211374"/>
-                    </a:ext>
-                  </a:extLst>
-                </a:gridCol>
-                <a:gridCol w="1271984">
-                  <a:extLst>
-                    <a:ext uri="{9D8B030D-6E8A-4147-A177-3AD203B41FA5}">
-                      <a16:colId xmlns:a16="http://schemas.microsoft.com/office/drawing/2014/main" val="2290586244"/>
-                    </a:ext>
-                  </a:extLst>
-                </a:gridCol>
-              </a:tblGrid>
-              <a:tr h="370840">
-                <a:tc>
-                  <a:txBody>
-                    <a:bodyPr/>
-                    <a:lstStyle/>
-                    <a:p>
-                      <a:pPr algn="ctr"/>
-                      <a:r>
-                        <a:rPr lang="en-US" dirty="0">
-                          <a:solidFill>
-                            <a:schemeClr val="tx1"/>
-                          </a:solidFill>
-                        </a:rPr>
-                        <a:t>“a”</a:t>
-                      </a:r>
-                      <a:endParaRPr lang="en-GB" dirty="0">
-                        <a:solidFill>
-                          <a:schemeClr val="tx1"/>
-                        </a:solidFill>
-                      </a:endParaRPr>
-                    </a:p>
-                  </a:txBody>
-                  <a:tcPr>
-                    <a:lnL w="12700" cap="flat" cmpd="sng" algn="ctr">
-                      <a:solidFill>
-                        <a:schemeClr val="tx1"/>
-                      </a:solidFill>
-                      <a:prstDash val="solid"/>
-                      <a:round/>
-                      <a:headEnd type="none" w="med" len="med"/>
-                      <a:tailEnd type="none" w="med" len="med"/>
-                    </a:lnL>
-                    <a:lnR w="12700" cap="flat" cmpd="sng" algn="ctr">
-                      <a:solidFill>
-                        <a:schemeClr val="tx1"/>
-                      </a:solidFill>
-                      <a:prstDash val="solid"/>
-                      <a:round/>
-                      <a:headEnd type="none" w="med" len="med"/>
-                      <a:tailEnd type="none" w="med" len="med"/>
-                    </a:lnR>
-                    <a:lnT w="12700" cap="flat" cmpd="sng" algn="ctr">
-                      <a:solidFill>
-                        <a:schemeClr val="tx1"/>
-                      </a:solidFill>
-                      <a:prstDash val="solid"/>
-                      <a:round/>
-                      <a:headEnd type="none" w="med" len="med"/>
-                      <a:tailEnd type="none" w="med" len="med"/>
-                    </a:lnT>
-                    <a:lnB w="12700" cap="flat" cmpd="sng" algn="ctr">
-                      <a:solidFill>
-                        <a:schemeClr val="tx1"/>
-                      </a:solidFill>
-                      <a:prstDash val="solid"/>
-                      <a:round/>
-                      <a:headEnd type="none" w="med" len="med"/>
-                      <a:tailEnd type="none" w="med" len="med"/>
-                    </a:lnB>
-                    <a:noFill/>
-                  </a:tcPr>
-                </a:tc>
-                <a:tc>
-                  <a:txBody>
-                    <a:bodyPr/>
-                    <a:lstStyle/>
-                    <a:p>
-                      <a:pPr algn="ctr"/>
-                      <a:r>
-                        <a:rPr lang="en-US" dirty="0">
-                          <a:solidFill>
-                            <a:schemeClr val="tx1"/>
-                          </a:solidFill>
-                        </a:rPr>
-                        <a:t>“b”</a:t>
-                      </a:r>
-                      <a:endParaRPr lang="en-GB" dirty="0">
-                        <a:solidFill>
-                          <a:schemeClr val="tx1"/>
-                        </a:solidFill>
-                      </a:endParaRPr>
-                    </a:p>
-                  </a:txBody>
-                  <a:tcPr>
-                    <a:lnL w="12700" cap="flat" cmpd="sng" algn="ctr">
-                      <a:solidFill>
-                        <a:schemeClr val="tx1"/>
-                      </a:solidFill>
-                      <a:prstDash val="solid"/>
-                      <a:round/>
-                      <a:headEnd type="none" w="med" len="med"/>
-                      <a:tailEnd type="none" w="med" len="med"/>
-                    </a:lnL>
-                    <a:lnR w="12700" cap="flat" cmpd="sng" algn="ctr">
-                      <a:solidFill>
-                        <a:schemeClr val="tx1"/>
-                      </a:solidFill>
-                      <a:prstDash val="solid"/>
-                      <a:round/>
-                      <a:headEnd type="none" w="med" len="med"/>
-                      <a:tailEnd type="none" w="med" len="med"/>
-                    </a:lnR>
-                    <a:lnT w="12700" cap="flat" cmpd="sng" algn="ctr">
-                      <a:solidFill>
-                        <a:schemeClr val="tx1"/>
-                      </a:solidFill>
-                      <a:prstDash val="solid"/>
-                      <a:round/>
-                      <a:headEnd type="none" w="med" len="med"/>
-                      <a:tailEnd type="none" w="med" len="med"/>
-                    </a:lnT>
-                    <a:lnB w="12700" cap="flat" cmpd="sng" algn="ctr">
-                      <a:solidFill>
-                        <a:schemeClr val="tx1"/>
-                      </a:solidFill>
-                      <a:prstDash val="solid"/>
-                      <a:round/>
-                      <a:headEnd type="none" w="med" len="med"/>
-                      <a:tailEnd type="none" w="med" len="med"/>
-                    </a:lnB>
-                    <a:noFill/>
-                  </a:tcPr>
-                </a:tc>
-                <a:tc>
-                  <a:txBody>
-                    <a:bodyPr/>
-                    <a:lstStyle/>
-                    <a:p>
-                      <a:pPr algn="ctr"/>
-                      <a:r>
-                        <a:rPr lang="en-US" dirty="0">
-                          <a:solidFill>
-                            <a:schemeClr val="tx1"/>
-                          </a:solidFill>
-                        </a:rPr>
-                        <a:t>“c”</a:t>
-                      </a:r>
-                      <a:endParaRPr lang="en-GB" dirty="0">
-                        <a:solidFill>
-                          <a:schemeClr val="tx1"/>
-                        </a:solidFill>
-                      </a:endParaRPr>
-                    </a:p>
-                  </a:txBody>
-                  <a:tcPr>
-                    <a:lnL w="12700" cap="flat" cmpd="sng" algn="ctr">
-                      <a:solidFill>
-                        <a:schemeClr val="tx1"/>
-                      </a:solidFill>
-                      <a:prstDash val="solid"/>
-                      <a:round/>
-                      <a:headEnd type="none" w="med" len="med"/>
-                      <a:tailEnd type="none" w="med" len="med"/>
-                    </a:lnL>
-                    <a:lnR w="12700" cap="flat" cmpd="sng" algn="ctr">
-                      <a:solidFill>
-                        <a:schemeClr val="tx1"/>
-                      </a:solidFill>
-                      <a:prstDash val="solid"/>
-                      <a:round/>
-                      <a:headEnd type="none" w="med" len="med"/>
-                      <a:tailEnd type="none" w="med" len="med"/>
-                    </a:lnR>
-                    <a:lnT w="12700" cap="flat" cmpd="sng" algn="ctr">
-                      <a:solidFill>
-                        <a:schemeClr val="tx1"/>
-                      </a:solidFill>
-                      <a:prstDash val="solid"/>
-                      <a:round/>
-                      <a:headEnd type="none" w="med" len="med"/>
-                      <a:tailEnd type="none" w="med" len="med"/>
-                    </a:lnT>
-                    <a:lnB w="12700" cap="flat" cmpd="sng" algn="ctr">
-                      <a:solidFill>
-                        <a:schemeClr val="tx1"/>
-                      </a:solidFill>
-                      <a:prstDash val="solid"/>
-                      <a:round/>
-                      <a:headEnd type="none" w="med" len="med"/>
-                      <a:tailEnd type="none" w="med" len="med"/>
-                    </a:lnB>
-                    <a:noFill/>
-                  </a:tcPr>
-                </a:tc>
-                <a:extLst>
-                  <a:ext uri="{0D108BD9-81ED-4DB2-BD59-A6C34878D82A}">
-                    <a16:rowId xmlns:a16="http://schemas.microsoft.com/office/drawing/2014/main" val="3224497902"/>
-                  </a:ext>
-                </a:extLst>
-              </a:tr>
-            </a:tbl>
-          </a:graphicData>
-        </a:graphic>
-      </p:graphicFrame>
-    </p:spTree>
-    <p:extLst>
-      <p:ext uri="{BB962C8B-B14F-4D97-AF65-F5344CB8AC3E}">
-        <p14:creationId xmlns:p14="http://schemas.microsoft.com/office/powerpoint/2010/main" val="3252781561"/>
-      </p:ext>
-    </p:extLst>
-  </p:cSld>
-  <p:clrMapOvr>
-    <a:masterClrMapping/>
-  </p:clrMapOvr>
-  <p:timing>
-    <p:tnLst>
-      <p:par>
-        <p:cTn id="1" dur="indefinite" restart="never" nodeType="tmRoot">
-          <p:childTnLst>
-            <p:seq concurrent="1" nextAc="seek">
-              <p:cTn id="2" dur="indefinite" nodeType="mainSeq">
-                <p:childTnLst>
-                  <p:par>
-                    <p:cTn id="3" fill="hold">
-                      <p:stCondLst>
-                        <p:cond delay="indefinite"/>
-                      </p:stCondLst>
-                      <p:childTnLst>
-                        <p:par>
-                          <p:cTn id="4" fill="hold">
-                            <p:stCondLst>
-                              <p:cond delay="0"/>
-                            </p:stCondLst>
-                            <p:childTnLst>
-                              <p:par>
-                                <p:cTn id="5" presetID="1" presetClass="entr" presetSubtype="0" fill="hold" grpId="0" nodeType="clickEffect">
-                                  <p:stCondLst>
-                                    <p:cond delay="0"/>
-                                  </p:stCondLst>
-                                  <p:childTnLst>
-                                    <p:set>
-                                      <p:cBhvr>
-                                        <p:cTn id="6" dur="1" fill="hold">
-                                          <p:stCondLst>
-                                            <p:cond delay="0"/>
-                                          </p:stCondLst>
-                                        </p:cTn>
-                                        <p:tgtEl>
-                                          <p:spTgt spid="3">
-                                            <p:txEl>
-                                              <p:pRg st="0" end="0"/>
-                                            </p:txEl>
-                                          </p:spTgt>
-                                        </p:tgtEl>
-                                        <p:attrNameLst>
-                                          <p:attrName>style.visibility</p:attrName>
-                                        </p:attrNameLst>
-                                      </p:cBhvr>
-                                      <p:to>
-                                        <p:strVal val="visible"/>
-                                      </p:to>
-                                    </p:set>
-                                  </p:childTnLst>
-                                </p:cTn>
-                              </p:par>
-                            </p:childTnLst>
-                          </p:cTn>
-                        </p:par>
-                      </p:childTnLst>
-                    </p:cTn>
-                  </p:par>
-                  <p:par>
-                    <p:cTn id="7" fill="hold">
-                      <p:stCondLst>
-                        <p:cond delay="indefinite"/>
-                      </p:stCondLst>
-                      <p:childTnLst>
-                        <p:par>
-                          <p:cTn id="8" fill="hold">
-                            <p:stCondLst>
-                              <p:cond delay="0"/>
-                            </p:stCondLst>
-                            <p:childTnLst>
-                              <p:par>
-                                <p:cTn id="9" presetID="1" presetClass="entr" presetSubtype="0" fill="hold" grpId="0" nodeType="clickEffect">
-                                  <p:stCondLst>
-                                    <p:cond delay="0"/>
-                                  </p:stCondLst>
-                                  <p:childTnLst>
-                                    <p:set>
-                                      <p:cBhvr>
-                                        <p:cTn id="10" dur="1" fill="hold">
-                                          <p:stCondLst>
-                                            <p:cond delay="0"/>
-                                          </p:stCondLst>
-                                        </p:cTn>
-                                        <p:tgtEl>
-                                          <p:spTgt spid="3">
-                                            <p:txEl>
-                                              <p:pRg st="2" end="2"/>
-                                            </p:txEl>
-                                          </p:spTgt>
-                                        </p:tgtEl>
-                                        <p:attrNameLst>
-                                          <p:attrName>style.visibility</p:attrName>
-                                        </p:attrNameLst>
-                                      </p:cBhvr>
-                                      <p:to>
-                                        <p:strVal val="visible"/>
-                                      </p:to>
-                                    </p:set>
-                                  </p:childTnLst>
-                                </p:cTn>
-                              </p:par>
-                            </p:childTnLst>
-                          </p:cTn>
-                        </p:par>
-                      </p:childTnLst>
-                    </p:cTn>
-                  </p:par>
-                  <p:par>
-                    <p:cTn id="11" fill="hold">
-                      <p:stCondLst>
-                        <p:cond delay="indefinite"/>
-                      </p:stCondLst>
-                      <p:childTnLst>
-                        <p:par>
-                          <p:cTn id="12" fill="hold">
-                            <p:stCondLst>
-                              <p:cond delay="0"/>
-                            </p:stCondLst>
-                            <p:childTnLst>
-                              <p:par>
-                                <p:cTn id="13" presetID="1" presetClass="entr" presetSubtype="0" fill="hold" grpId="0" nodeType="clickEffect">
-                                  <p:stCondLst>
-                                    <p:cond delay="0"/>
-                                  </p:stCondLst>
-                                  <p:childTnLst>
-                                    <p:set>
-                                      <p:cBhvr>
-                                        <p:cTn id="14" dur="1" fill="hold">
-                                          <p:stCondLst>
-                                            <p:cond delay="0"/>
-                                          </p:stCondLst>
-                                        </p:cTn>
-                                        <p:tgtEl>
-                                          <p:spTgt spid="3">
-                                            <p:txEl>
-                                              <p:pRg st="3" end="3"/>
-                                            </p:txEl>
-                                          </p:spTgt>
-                                        </p:tgtEl>
-                                        <p:attrNameLst>
-                                          <p:attrName>style.visibility</p:attrName>
-                                        </p:attrNameLst>
-                                      </p:cBhvr>
-                                      <p:to>
-                                        <p:strVal val="visible"/>
-                                      </p:to>
-                                    </p:set>
-                                  </p:childTnLst>
-                                </p:cTn>
-                              </p:par>
-                            </p:childTnLst>
-                          </p:cTn>
-                        </p:par>
-                      </p:childTnLst>
-                    </p:cTn>
-                  </p:par>
-                  <p:par>
-                    <p:cTn id="15" fill="hold">
-                      <p:stCondLst>
-                        <p:cond delay="indefinite"/>
-                      </p:stCondLst>
-                      <p:childTnLst>
-                        <p:par>
-                          <p:cTn id="16" fill="hold">
-                            <p:stCondLst>
-                              <p:cond delay="0"/>
-                            </p:stCondLst>
-                            <p:childTnLst>
-                              <p:par>
-                                <p:cTn id="17" presetID="1" presetClass="entr" presetSubtype="0" fill="hold" nodeType="clickEffect">
-                                  <p:stCondLst>
-                                    <p:cond delay="0"/>
-                                  </p:stCondLst>
-                                  <p:childTnLst>
-                                    <p:set>
-                                      <p:cBhvr>
-                                        <p:cTn id="18" dur="1" fill="hold">
-                                          <p:stCondLst>
-                                            <p:cond delay="0"/>
-                                          </p:stCondLst>
-                                        </p:cTn>
-                                        <p:tgtEl>
-                                          <p:spTgt spid="4"/>
-                                        </p:tgtEl>
-                                        <p:attrNameLst>
-                                          <p:attrName>style.visibility</p:attrName>
-                                        </p:attrNameLst>
-                                      </p:cBhvr>
-                                      <p:to>
-                                        <p:strVal val="visible"/>
-                                      </p:to>
-                                    </p:set>
-                                  </p:childTnLst>
-                                </p:cTn>
-                              </p:par>
-                            </p:childTnLst>
-                          </p:cTn>
-                        </p:par>
-                      </p:childTnLst>
-                    </p:cTn>
-                  </p:par>
-                  <p:par>
-                    <p:cTn id="19" fill="hold">
-                      <p:stCondLst>
-                        <p:cond delay="indefinite"/>
-                      </p:stCondLst>
-                      <p:childTnLst>
-                        <p:par>
-                          <p:cTn id="20" fill="hold">
-                            <p:stCondLst>
-                              <p:cond delay="0"/>
-                            </p:stCondLst>
-                            <p:childTnLst>
-                              <p:par>
-                                <p:cTn id="21" presetID="1" presetClass="entr" presetSubtype="0" fill="hold" grpId="0" nodeType="clickEffect">
-                                  <p:stCondLst>
-                                    <p:cond delay="0"/>
-                                  </p:stCondLst>
-                                  <p:childTnLst>
-                                    <p:set>
-                                      <p:cBhvr>
-                                        <p:cTn id="22" dur="1" fill="hold">
-                                          <p:stCondLst>
-                                            <p:cond delay="0"/>
-                                          </p:stCondLst>
-                                        </p:cTn>
-                                        <p:tgtEl>
-                                          <p:spTgt spid="3">
-                                            <p:txEl>
-                                              <p:pRg st="6" end="6"/>
-                                            </p:txEl>
-                                          </p:spTgt>
-                                        </p:tgtEl>
-                                        <p:attrNameLst>
-                                          <p:attrName>style.visibility</p:attrName>
-                                        </p:attrNameLst>
-                                      </p:cBhvr>
-                                      <p:to>
-                                        <p:strVal val="visible"/>
-                                      </p:to>
-                                    </p:set>
-                                  </p:childTnLst>
-                                </p:cTn>
-                              </p:par>
-                            </p:childTnLst>
-                          </p:cTn>
-                        </p:par>
-                      </p:childTnLst>
-                    </p:cTn>
-                  </p:par>
-                  <p:par>
-                    <p:cTn id="23" fill="hold">
-                      <p:stCondLst>
-                        <p:cond delay="indefinite"/>
-                      </p:stCondLst>
-                      <p:childTnLst>
-                        <p:par>
-                          <p:cTn id="24" fill="hold">
-                            <p:stCondLst>
-                              <p:cond delay="0"/>
-                            </p:stCondLst>
-                            <p:childTnLst>
-                              <p:par>
-                                <p:cTn id="25" presetID="1" presetClass="entr" presetSubtype="0" fill="hold" nodeType="clickEffect">
-                                  <p:stCondLst>
-                                    <p:cond delay="0"/>
-                                  </p:stCondLst>
-                                  <p:childTnLst>
-                                    <p:set>
-                                      <p:cBhvr>
-                                        <p:cTn id="26" dur="1" fill="hold">
-                                          <p:stCondLst>
-                                            <p:cond delay="0"/>
-                                          </p:stCondLst>
-                                        </p:cTn>
-                                        <p:tgtEl>
-                                          <p:spTgt spid="5"/>
-                                        </p:tgtEl>
-                                        <p:attrNameLst>
-                                          <p:attrName>style.visibility</p:attrName>
-                                        </p:attrNameLst>
-                                      </p:cBhvr>
-                                      <p:to>
-                                        <p:strVal val="visible"/>
-                                      </p:to>
-                                    </p:set>
-                                  </p:childTnLst>
-                                </p:cTn>
-                              </p:par>
-                            </p:childTnLst>
-                          </p:cTn>
-                        </p:par>
-                      </p:childTnLst>
-                    </p:cTn>
-                  </p:par>
-                  <p:par>
-                    <p:cTn id="27" fill="hold">
-                      <p:stCondLst>
-                        <p:cond delay="indefinite"/>
-                      </p:stCondLst>
-                      <p:childTnLst>
-                        <p:par>
-                          <p:cTn id="28" fill="hold">
-                            <p:stCondLst>
-                              <p:cond delay="0"/>
-                            </p:stCondLst>
-                            <p:childTnLst>
-                              <p:par>
-                                <p:cTn id="29" presetID="1" presetClass="entr" presetSubtype="0" fill="hold" grpId="0" nodeType="clickEffect">
-                                  <p:stCondLst>
-                                    <p:cond delay="0"/>
-                                  </p:stCondLst>
-                                  <p:childTnLst>
-                                    <p:set>
-                                      <p:cBhvr>
-                                        <p:cTn id="30" dur="1" fill="hold">
-                                          <p:stCondLst>
-                                            <p:cond delay="0"/>
-                                          </p:stCondLst>
-                                        </p:cTn>
-                                        <p:tgtEl>
-                                          <p:spTgt spid="3">
-                                            <p:txEl>
-                                              <p:pRg st="8" end="8"/>
-                                            </p:txEl>
-                                          </p:spTgt>
-                                        </p:tgtEl>
-                                        <p:attrNameLst>
-                                          <p:attrName>style.visibility</p:attrName>
-                                        </p:attrNameLst>
-                                      </p:cBhvr>
-                                      <p:to>
-                                        <p:strVal val="visible"/>
-                                      </p:to>
-                                    </p:set>
-                                  </p:childTnLst>
-                                </p:cTn>
-                              </p:par>
-                            </p:childTnLst>
-                          </p:cTn>
-                        </p:par>
-                      </p:childTnLst>
-                    </p:cTn>
-                  </p:par>
-                  <p:par>
-                    <p:cTn id="31" fill="hold">
-                      <p:stCondLst>
-                        <p:cond delay="indefinite"/>
-                      </p:stCondLst>
-                      <p:childTnLst>
-                        <p:par>
-                          <p:cTn id="32" fill="hold">
-                            <p:stCondLst>
-                              <p:cond delay="0"/>
-                            </p:stCondLst>
-                            <p:childTnLst>
-                              <p:par>
-                                <p:cTn id="33" presetID="1" presetClass="entr" presetSubtype="0" fill="hold" grpId="0" nodeType="clickEffect">
-                                  <p:stCondLst>
-                                    <p:cond delay="0"/>
-                                  </p:stCondLst>
-                                  <p:childTnLst>
-                                    <p:set>
-                                      <p:cBhvr>
-                                        <p:cTn id="34" dur="1" fill="hold">
-                                          <p:stCondLst>
-                                            <p:cond delay="0"/>
-                                          </p:stCondLst>
-                                        </p:cTn>
-                                        <p:tgtEl>
-                                          <p:spTgt spid="3">
-                                            <p:txEl>
-                                              <p:pRg st="9" end="9"/>
-                                            </p:txEl>
-                                          </p:spTgt>
-                                        </p:tgtEl>
-                                        <p:attrNameLst>
-                                          <p:attrName>style.visibility</p:attrName>
-                                        </p:attrNameLst>
-                                      </p:cBhvr>
-                                      <p:to>
-                                        <p:strVal val="visible"/>
-                                      </p:to>
-                                    </p:set>
-                                  </p:childTnLst>
-                                </p:cTn>
-                              </p:par>
-                            </p:childTnLst>
-                          </p:cTn>
-                        </p:par>
-                      </p:childTnLst>
-                    </p:cTn>
-                  </p:par>
-                  <p:par>
-                    <p:cTn id="35" fill="hold">
-                      <p:stCondLst>
-                        <p:cond delay="indefinite"/>
-                      </p:stCondLst>
-                      <p:childTnLst>
-                        <p:par>
-                          <p:cTn id="36" fill="hold">
-                            <p:stCondLst>
-                              <p:cond delay="0"/>
-                            </p:stCondLst>
-                            <p:childTnLst>
-                              <p:par>
-                                <p:cTn id="37" presetID="1" presetClass="entr" presetSubtype="0" fill="hold" grpId="0" nodeType="clickEffect">
-                                  <p:stCondLst>
-                                    <p:cond delay="0"/>
-                                  </p:stCondLst>
-                                  <p:childTnLst>
-                                    <p:set>
-                                      <p:cBhvr>
-                                        <p:cTn id="38" dur="1" fill="hold">
-                                          <p:stCondLst>
-                                            <p:cond delay="0"/>
-                                          </p:stCondLst>
-                                        </p:cTn>
-                                        <p:tgtEl>
-                                          <p:spTgt spid="3">
-                                            <p:txEl>
-                                              <p:pRg st="10" end="10"/>
-                                            </p:txEl>
-                                          </p:spTgt>
-                                        </p:tgtEl>
-                                        <p:attrNameLst>
-                                          <p:attrName>style.visibility</p:attrName>
-                                        </p:attrNameLst>
-                                      </p:cBhvr>
-                                      <p:to>
-                                        <p:strVal val="visible"/>
-                                      </p:to>
-                                    </p:set>
-                                  </p:childTnLst>
-                                </p:cTn>
-                              </p:par>
-                            </p:childTnLst>
-                          </p:cTn>
-                        </p:par>
-                      </p:childTnLst>
-                    </p:cTn>
-                  </p:par>
-                  <p:par>
-                    <p:cTn id="39" fill="hold">
-                      <p:stCondLst>
-                        <p:cond delay="indefinite"/>
-                      </p:stCondLst>
-                      <p:childTnLst>
-                        <p:par>
-                          <p:cTn id="40" fill="hold">
-                            <p:stCondLst>
-                              <p:cond delay="0"/>
-                            </p:stCondLst>
-                            <p:childTnLst>
-                              <p:par>
-                                <p:cTn id="41" presetID="1" presetClass="entr" presetSubtype="0" fill="hold" grpId="0" nodeType="clickEffect">
-                                  <p:stCondLst>
-                                    <p:cond delay="0"/>
-                                  </p:stCondLst>
-                                  <p:childTnLst>
-                                    <p:set>
-                                      <p:cBhvr>
-                                        <p:cTn id="42" dur="1" fill="hold">
-                                          <p:stCondLst>
-                                            <p:cond delay="0"/>
-                                          </p:stCondLst>
-                                        </p:cTn>
-                                        <p:tgtEl>
-                                          <p:spTgt spid="3">
-                                            <p:txEl>
-                                              <p:pRg st="11" end="11"/>
-                                            </p:txEl>
-                                          </p:spTgt>
-                                        </p:tgtEl>
-                                        <p:attrNameLst>
-                                          <p:attrName>style.visibility</p:attrName>
-                                        </p:attrNameLst>
-                                      </p:cBhvr>
-                                      <p:to>
-                                        <p:strVal val="visible"/>
-                                      </p:to>
-                                    </p:set>
-                                  </p:childTnLst>
-                                </p:cTn>
-                              </p:par>
-                            </p:childTnLst>
-                          </p:cTn>
-                        </p:par>
-                      </p:childTnLst>
-                    </p:cTn>
-                  </p:par>
-                </p:childTnLst>
-              </p:cTn>
-              <p:prevCondLst>
-                <p:cond evt="onPrev" delay="0">
-                  <p:tgtEl>
-                    <p:sldTgt/>
-                  </p:tgtEl>
-                </p:cond>
-              </p:prevCondLst>
-              <p:nextCondLst>
-                <p:cond evt="onNext" delay="0">
-                  <p:tgtEl>
-                    <p:sldTgt/>
-                  </p:tgtEl>
-                </p:cond>
-              </p:nextCondLst>
-            </p:seq>
-          </p:childTnLst>
-        </p:cTn>
-      </p:par>
-    </p:tnLst>
-    <p:bldLst>
-      <p:bldP spid="3" grpId="0" uiExpand="1" build="p"/>
-    </p:bldLst>
-  </p:timing>
-</p:sld>
-</file>
-
 <file path=ppt/slides/slide9.xml><?xml version="1.0" encoding="utf-8"?>
 <p:sld xmlns:a="http://schemas.openxmlformats.org/drawingml/2006/main" xmlns:r="http://schemas.openxmlformats.org/officeDocument/2006/relationships" xmlns:p="http://schemas.openxmlformats.org/presentationml/2006/main">
   <p:cSld>
@@ -11653,7 +8335,7 @@
           <p:cNvPr id="2" name="Title 1">
             <a:extLst>
               <a:ext uri="{FF2B5EF4-FFF2-40B4-BE49-F238E27FC236}">
-                <a16:creationId xmlns:a16="http://schemas.microsoft.com/office/drawing/2014/main" id="{17881CAC-12CD-49C4-BA78-AAA9D92318D2}"/>
+                <a16:creationId xmlns:a16="http://schemas.microsoft.com/office/drawing/2014/main" id="{A1FFF348-256A-419B-94A5-1E1296D1F338}"/>
               </a:ext>
             </a:extLst>
           </p:cNvPr>
@@ -11671,7 +8353,7 @@
           <a:p>
             <a:r>
               <a:rPr lang="en-US" dirty="0"/>
-              <a:t>Matrices</a:t>
+              <a:t>Further resources</a:t>
             </a:r>
             <a:endParaRPr lang="en-GB" dirty="0"/>
           </a:p>
@@ -11682,7 +8364,7 @@
           <p:cNvPr id="3" name="Content Placeholder 2">
             <a:extLst>
               <a:ext uri="{FF2B5EF4-FFF2-40B4-BE49-F238E27FC236}">
-                <a16:creationId xmlns:a16="http://schemas.microsoft.com/office/drawing/2014/main" id="{2D88C833-E67F-4D42-838C-A808B375E8F5}"/>
+                <a16:creationId xmlns:a16="http://schemas.microsoft.com/office/drawing/2014/main" id="{D9F956DB-4DF0-4E24-84E4-DA013CE75541}"/>
               </a:ext>
             </a:extLst>
           </p:cNvPr>
@@ -11695,8 +8377,8 @@
         </p:nvSpPr>
         <p:spPr>
           <a:xfrm>
-            <a:off x="609598" y="1477817"/>
-            <a:ext cx="11391901" cy="5294457"/>
+            <a:off x="438151" y="1477818"/>
+            <a:ext cx="11753850" cy="4821382"/>
           </a:xfrm>
         </p:spPr>
         <p:txBody>
@@ -11709,7 +8391,17 @@
             </a:pPr>
             <a:r>
               <a:rPr lang="en-US" dirty="0"/>
-              <a:t>A matrix is a two-dimensional group of vectors, containing elements of the same class.</a:t>
+              <a:t>Excellent summary of functions used for data analysis and visualization </a:t>
+            </a:r>
+            <a:r>
+              <a:rPr lang="en-US" dirty="0">
+                <a:hlinkClick r:id="rId2"/>
+              </a:rPr>
+              <a:t>https://r4ds.had.co.nz/index.html</a:t>
+            </a:r>
+            <a:r>
+              <a:rPr lang="en-US" dirty="0"/>
+              <a:t> </a:t>
             </a:r>
           </a:p>
           <a:p>
@@ -11726,94 +8418,17 @@
             </a:pPr>
             <a:r>
               <a:rPr lang="en-US" dirty="0"/>
-              <a:t>A matrix is constructed using the function ‘matrix()’, which needs 3 arguments:</a:t>
-            </a:r>
-          </a:p>
-          <a:p>
-            <a:pPr marL="1085850" lvl="1" indent="-342900">
-              <a:buFont typeface="Arial" panose="020B0604020202020204" pitchFamily="34" charset="0"/>
-              <a:buChar char="•"/>
-            </a:pPr>
-            <a:r>
-              <a:rPr lang="en-US" sz="2200" dirty="0"/>
-              <a:t>‘data’: the values of the elements (by default set to NA).</a:t>
-            </a:r>
-          </a:p>
-          <a:p>
-            <a:pPr marL="1085850" lvl="1" indent="-342900">
-              <a:buFont typeface="Arial" panose="020B0604020202020204" pitchFamily="34" charset="0"/>
-              <a:buChar char="•"/>
-            </a:pPr>
-            <a:r>
-              <a:rPr lang="en-US" sz="2200" dirty="0"/>
-              <a:t>‘</a:t>
-            </a:r>
-            <a:r>
-              <a:rPr lang="en-US" sz="2200" dirty="0" err="1"/>
-              <a:t>nrow</a:t>
-            </a:r>
-            <a:r>
-              <a:rPr lang="en-US" sz="2200" dirty="0"/>
-              <a:t>’: the number of rows (default to 1).</a:t>
-            </a:r>
-          </a:p>
-          <a:p>
-            <a:pPr marL="1085850" lvl="1" indent="-342900">
-              <a:buFont typeface="Arial" panose="020B0604020202020204" pitchFamily="34" charset="0"/>
-              <a:buChar char="•"/>
-            </a:pPr>
-            <a:r>
-              <a:rPr lang="en-US" sz="2200" dirty="0"/>
-              <a:t>‘</a:t>
-            </a:r>
-            <a:r>
-              <a:rPr lang="en-US" sz="2200" dirty="0" err="1"/>
-              <a:t>ncol</a:t>
-            </a:r>
-            <a:r>
-              <a:rPr lang="en-US" sz="2200" dirty="0"/>
-              <a:t>’: the number of columns (default to 1).</a:t>
-            </a:r>
-          </a:p>
-          <a:p>
-            <a:pPr marL="1085850" lvl="1" indent="-342900">
-              <a:buFont typeface="Arial" panose="020B0604020202020204" pitchFamily="34" charset="0"/>
-              <a:buChar char="•"/>
-            </a:pPr>
-            <a:endParaRPr lang="en-US" sz="2200" dirty="0"/>
-          </a:p>
-          <a:p>
-            <a:pPr marL="342900" indent="-342900">
-              <a:buFont typeface="Arial" panose="020B0604020202020204" pitchFamily="34" charset="0"/>
-              <a:buChar char="•"/>
-            </a:pPr>
+              <a:t>Making graphs in R: </a:t>
+            </a:r>
+            <a:r>
+              <a:rPr lang="en-US" dirty="0">
+                <a:hlinkClick r:id="rId3"/>
+              </a:rPr>
+              <a:t>http://www.cookbook-r.com/Graphs/</a:t>
+            </a:r>
             <a:r>
               <a:rPr lang="en-US" dirty="0"/>
-              <a:t>‘mat &lt;- matrix(c(1,2,3,4), </a:t>
-            </a:r>
-            <a:r>
-              <a:rPr lang="en-US" dirty="0" err="1"/>
-              <a:t>nrow</a:t>
-            </a:r>
-            <a:r>
-              <a:rPr lang="en-US" dirty="0"/>
-              <a:t> = 2, </a:t>
-            </a:r>
-            <a:r>
-              <a:rPr lang="en-US" dirty="0" err="1"/>
-              <a:t>ncol</a:t>
-            </a:r>
-            <a:r>
-              <a:rPr lang="en-US" dirty="0"/>
-              <a:t> = 2)’ </a:t>
-            </a:r>
-            <a:r>
-              <a:rPr lang="en-US" dirty="0" err="1"/>
-              <a:t>initialises</a:t>
-            </a:r>
-            <a:r>
-              <a:rPr lang="en-US" dirty="0"/>
-              <a:t> a matrix, called ‘mat’, with 2 rows and 2 columns:</a:t>
+              <a:t> </a:t>
             </a:r>
           </a:p>
           <a:p>
@@ -11828,16 +8443,54 @@
               <a:buFont typeface="Arial" panose="020B0604020202020204" pitchFamily="34" charset="0"/>
               <a:buChar char="•"/>
             </a:pPr>
-            <a:endParaRPr lang="en-US" dirty="0"/>
+            <a:r>
+              <a:rPr lang="en-US" dirty="0"/>
+              <a:t>For an introduction to packages and development: </a:t>
+            </a:r>
+            <a:r>
+              <a:rPr lang="en-US" dirty="0">
+                <a:hlinkClick r:id="rId4"/>
+              </a:rPr>
+              <a:t>https://r-pkgs.org/intro.html</a:t>
+            </a:r>
+            <a:r>
+              <a:rPr lang="en-US" dirty="0"/>
+              <a:t> </a:t>
+            </a:r>
           </a:p>
           <a:p>
             <a:pPr marL="342900" indent="-342900">
               <a:buFont typeface="Arial" panose="020B0604020202020204" pitchFamily="34" charset="0"/>
               <a:buChar char="•"/>
             </a:pPr>
-            <a:r>
-              <a:rPr lang="en-US" dirty="0"/>
-              <a:t>‘mat[1,2]’ will return the element on the first row, and second column.</a:t>
+            <a:endParaRPr lang="en-US" dirty="0"/>
+          </a:p>
+          <a:p>
+            <a:pPr marL="342900" indent="-342900">
+              <a:buFont typeface="Arial" panose="020B0604020202020204" pitchFamily="34" charset="0"/>
+              <a:buChar char="•"/>
+            </a:pPr>
+            <a:r>
+              <a:rPr lang="en-GB" dirty="0"/>
+              <a:t>The </a:t>
+            </a:r>
+            <a:r>
+              <a:rPr lang="en-GB" dirty="0" err="1"/>
+              <a:t>cheatsheets</a:t>
+            </a:r>
+            <a:r>
+              <a:rPr lang="en-GB" dirty="0"/>
+              <a:t> of various R packages: </a:t>
+            </a:r>
+            <a:r>
+              <a:rPr lang="en-GB" dirty="0">
+                <a:hlinkClick r:id="rId5"/>
+              </a:rPr>
+              <a:t>https://www.rstudio.com/resources/cheatsheets/</a:t>
+            </a:r>
+            <a:r>
+              <a:rPr lang="en-GB" dirty="0"/>
+              <a:t> </a:t>
             </a:r>
           </a:p>
           <a:p>
@@ -11847,747 +8500,38 @@
             </a:pPr>
             <a:endParaRPr lang="en-GB" dirty="0"/>
           </a:p>
-        </p:txBody>
-      </p:sp>
-      <p:graphicFrame>
-        <p:nvGraphicFramePr>
-          <p:cNvPr id="4" name="Table 4">
-            <a:extLst>
-              <a:ext uri="{FF2B5EF4-FFF2-40B4-BE49-F238E27FC236}">
-                <a16:creationId xmlns:a16="http://schemas.microsoft.com/office/drawing/2014/main" id="{E9C91549-75E9-4A0F-9C5F-74C547F5B641}"/>
-              </a:ext>
-            </a:extLst>
-          </p:cNvPr>
-          <p:cNvGraphicFramePr>
-            <a:graphicFrameLocks noGrp="1"/>
-          </p:cNvGraphicFramePr>
-          <p:nvPr>
-            <p:extLst>
-              <p:ext uri="{D42A27DB-BD31-4B8C-83A1-F6EECF244321}">
-                <p14:modId xmlns:p14="http://schemas.microsoft.com/office/powerpoint/2010/main" val="4092427275"/>
-              </p:ext>
-            </p:extLst>
-          </p:nvPr>
-        </p:nvGraphicFramePr>
-        <p:xfrm>
-          <a:off x="4346575" y="5248275"/>
-          <a:ext cx="3968750" cy="741680"/>
-        </p:xfrm>
-        <a:graphic>
-          <a:graphicData uri="http://schemas.openxmlformats.org/drawingml/2006/table">
-            <a:tbl>
-              <a:tblPr firstRow="1" bandRow="1">
-                <a:tableStyleId>{5C22544A-7EE6-4342-B048-85BDC9FD1C3A}</a:tableStyleId>
-              </a:tblPr>
-              <a:tblGrid>
-                <a:gridCol w="1984375">
-                  <a:extLst>
-                    <a:ext uri="{9D8B030D-6E8A-4147-A177-3AD203B41FA5}">
-                      <a16:colId xmlns:a16="http://schemas.microsoft.com/office/drawing/2014/main" val="2466429905"/>
-                    </a:ext>
-                  </a:extLst>
-                </a:gridCol>
-                <a:gridCol w="1984375">
-                  <a:extLst>
-                    <a:ext uri="{9D8B030D-6E8A-4147-A177-3AD203B41FA5}">
-                      <a16:colId xmlns:a16="http://schemas.microsoft.com/office/drawing/2014/main" val="1897081289"/>
-                    </a:ext>
-                  </a:extLst>
-                </a:gridCol>
-              </a:tblGrid>
-              <a:tr h="370840">
-                <a:tc>
-                  <a:txBody>
-                    <a:bodyPr/>
-                    <a:lstStyle/>
-                    <a:p>
-                      <a:pPr algn="ctr"/>
-                      <a:r>
-                        <a:rPr lang="en-US" dirty="0">
-                          <a:solidFill>
-                            <a:schemeClr val="tx1"/>
-                          </a:solidFill>
-                        </a:rPr>
-                        <a:t>1</a:t>
-                      </a:r>
-                      <a:endParaRPr lang="en-GB" dirty="0">
-                        <a:solidFill>
-                          <a:schemeClr val="tx1"/>
-                        </a:solidFill>
-                      </a:endParaRPr>
-                    </a:p>
-                  </a:txBody>
-                  <a:tcPr>
-                    <a:lnL w="12700" cap="flat" cmpd="sng" algn="ctr">
-                      <a:solidFill>
-                        <a:schemeClr val="tx1"/>
-                      </a:solidFill>
-                      <a:prstDash val="solid"/>
-                      <a:round/>
-                      <a:headEnd type="none" w="med" len="med"/>
-                      <a:tailEnd type="none" w="med" len="med"/>
-                    </a:lnL>
-                    <a:lnR w="12700" cap="flat" cmpd="sng" algn="ctr">
-                      <a:solidFill>
-                        <a:schemeClr val="tx1"/>
-                      </a:solidFill>
-                      <a:prstDash val="solid"/>
-                      <a:round/>
-                      <a:headEnd type="none" w="med" len="med"/>
-                      <a:tailEnd type="none" w="med" len="med"/>
-                    </a:lnR>
-                    <a:lnT w="12700" cap="flat" cmpd="sng" algn="ctr">
-                      <a:solidFill>
-                        <a:schemeClr val="tx1"/>
-                      </a:solidFill>
-                      <a:prstDash val="solid"/>
-                      <a:round/>
-                      <a:headEnd type="none" w="med" len="med"/>
-                      <a:tailEnd type="none" w="med" len="med"/>
-                    </a:lnT>
-                    <a:lnB w="12700" cap="flat" cmpd="sng" algn="ctr">
-                      <a:solidFill>
-                        <a:schemeClr val="tx1"/>
-                      </a:solidFill>
-                      <a:prstDash val="solid"/>
-                      <a:round/>
-                      <a:headEnd type="none" w="med" len="med"/>
-                      <a:tailEnd type="none" w="med" len="med"/>
-                    </a:lnB>
-                    <a:noFill/>
-                  </a:tcPr>
-                </a:tc>
-                <a:tc>
-                  <a:txBody>
-                    <a:bodyPr/>
-                    <a:lstStyle/>
-                    <a:p>
-                      <a:pPr algn="ctr"/>
-                      <a:r>
-                        <a:rPr lang="en-US" dirty="0">
-                          <a:solidFill>
-                            <a:schemeClr val="tx1"/>
-                          </a:solidFill>
-                        </a:rPr>
-                        <a:t>3</a:t>
-                      </a:r>
-                      <a:endParaRPr lang="en-GB" dirty="0">
-                        <a:solidFill>
-                          <a:schemeClr val="tx1"/>
-                        </a:solidFill>
-                      </a:endParaRPr>
-                    </a:p>
-                  </a:txBody>
-                  <a:tcPr>
-                    <a:lnL w="12700" cap="flat" cmpd="sng" algn="ctr">
-                      <a:solidFill>
-                        <a:schemeClr val="tx1"/>
-                      </a:solidFill>
-                      <a:prstDash val="solid"/>
-                      <a:round/>
-                      <a:headEnd type="none" w="med" len="med"/>
-                      <a:tailEnd type="none" w="med" len="med"/>
-                    </a:lnL>
-                    <a:lnR w="12700" cap="flat" cmpd="sng" algn="ctr">
-                      <a:solidFill>
-                        <a:schemeClr val="tx1"/>
-                      </a:solidFill>
-                      <a:prstDash val="solid"/>
-                      <a:round/>
-                      <a:headEnd type="none" w="med" len="med"/>
-                      <a:tailEnd type="none" w="med" len="med"/>
-                    </a:lnR>
-                    <a:lnT w="12700" cap="flat" cmpd="sng" algn="ctr">
-                      <a:solidFill>
-                        <a:schemeClr val="tx1"/>
-                      </a:solidFill>
-                      <a:prstDash val="solid"/>
-                      <a:round/>
-                      <a:headEnd type="none" w="med" len="med"/>
-                      <a:tailEnd type="none" w="med" len="med"/>
-                    </a:lnT>
-                    <a:lnB w="12700" cap="flat" cmpd="sng" algn="ctr">
-                      <a:solidFill>
-                        <a:schemeClr val="tx1"/>
-                      </a:solidFill>
-                      <a:prstDash val="solid"/>
-                      <a:round/>
-                      <a:headEnd type="none" w="med" len="med"/>
-                      <a:tailEnd type="none" w="med" len="med"/>
-                    </a:lnB>
-                    <a:noFill/>
-                  </a:tcPr>
-                </a:tc>
-                <a:extLst>
-                  <a:ext uri="{0D108BD9-81ED-4DB2-BD59-A6C34878D82A}">
-                    <a16:rowId xmlns:a16="http://schemas.microsoft.com/office/drawing/2014/main" val="2590180859"/>
-                  </a:ext>
-                </a:extLst>
-              </a:tr>
-              <a:tr h="370840">
-                <a:tc>
-                  <a:txBody>
-                    <a:bodyPr/>
-                    <a:lstStyle/>
-                    <a:p>
-                      <a:pPr algn="ctr"/>
-                      <a:r>
-                        <a:rPr lang="en-US" dirty="0">
-                          <a:solidFill>
-                            <a:schemeClr val="tx1"/>
-                          </a:solidFill>
-                        </a:rPr>
-                        <a:t>2</a:t>
-                      </a:r>
-                      <a:endParaRPr lang="en-GB" dirty="0">
-                        <a:solidFill>
-                          <a:schemeClr val="tx1"/>
-                        </a:solidFill>
-                      </a:endParaRPr>
-                    </a:p>
-                  </a:txBody>
-                  <a:tcPr>
-                    <a:lnL w="12700" cap="flat" cmpd="sng" algn="ctr">
-                      <a:solidFill>
-                        <a:schemeClr val="tx1"/>
-                      </a:solidFill>
-                      <a:prstDash val="solid"/>
-                      <a:round/>
-                      <a:headEnd type="none" w="med" len="med"/>
-                      <a:tailEnd type="none" w="med" len="med"/>
-                    </a:lnL>
-                    <a:lnR w="12700" cap="flat" cmpd="sng" algn="ctr">
-                      <a:solidFill>
-                        <a:schemeClr val="tx1"/>
-                      </a:solidFill>
-                      <a:prstDash val="solid"/>
-                      <a:round/>
-                      <a:headEnd type="none" w="med" len="med"/>
-                      <a:tailEnd type="none" w="med" len="med"/>
-                    </a:lnR>
-                    <a:lnT w="12700" cap="flat" cmpd="sng" algn="ctr">
-                      <a:solidFill>
-                        <a:schemeClr val="tx1"/>
-                      </a:solidFill>
-                      <a:prstDash val="solid"/>
-                      <a:round/>
-                      <a:headEnd type="none" w="med" len="med"/>
-                      <a:tailEnd type="none" w="med" len="med"/>
-                    </a:lnT>
-                    <a:lnB w="12700" cap="flat" cmpd="sng" algn="ctr">
-                      <a:solidFill>
-                        <a:schemeClr val="tx1"/>
-                      </a:solidFill>
-                      <a:prstDash val="solid"/>
-                      <a:round/>
-                      <a:headEnd type="none" w="med" len="med"/>
-                      <a:tailEnd type="none" w="med" len="med"/>
-                    </a:lnB>
-                    <a:noFill/>
-                  </a:tcPr>
-                </a:tc>
-                <a:tc>
-                  <a:txBody>
-                    <a:bodyPr/>
-                    <a:lstStyle/>
-                    <a:p>
-                      <a:pPr algn="ctr"/>
-                      <a:r>
-                        <a:rPr lang="en-US" dirty="0">
-                          <a:solidFill>
-                            <a:schemeClr val="tx1"/>
-                          </a:solidFill>
-                        </a:rPr>
-                        <a:t>4</a:t>
-                      </a:r>
-                      <a:endParaRPr lang="en-GB" dirty="0">
-                        <a:solidFill>
-                          <a:schemeClr val="tx1"/>
-                        </a:solidFill>
-                      </a:endParaRPr>
-                    </a:p>
-                  </a:txBody>
-                  <a:tcPr>
-                    <a:lnL w="12700" cap="flat" cmpd="sng" algn="ctr">
-                      <a:solidFill>
-                        <a:schemeClr val="tx1"/>
-                      </a:solidFill>
-                      <a:prstDash val="solid"/>
-                      <a:round/>
-                      <a:headEnd type="none" w="med" len="med"/>
-                      <a:tailEnd type="none" w="med" len="med"/>
-                    </a:lnL>
-                    <a:lnR w="12700" cap="flat" cmpd="sng" algn="ctr">
-                      <a:solidFill>
-                        <a:schemeClr val="tx1"/>
-                      </a:solidFill>
-                      <a:prstDash val="solid"/>
-                      <a:round/>
-                      <a:headEnd type="none" w="med" len="med"/>
-                      <a:tailEnd type="none" w="med" len="med"/>
-                    </a:lnR>
-                    <a:lnT w="12700" cap="flat" cmpd="sng" algn="ctr">
-                      <a:solidFill>
-                        <a:schemeClr val="tx1"/>
-                      </a:solidFill>
-                      <a:prstDash val="solid"/>
-                      <a:round/>
-                      <a:headEnd type="none" w="med" len="med"/>
-                      <a:tailEnd type="none" w="med" len="med"/>
-                    </a:lnT>
-                    <a:lnB w="12700" cap="flat" cmpd="sng" algn="ctr">
-                      <a:solidFill>
-                        <a:schemeClr val="tx1"/>
-                      </a:solidFill>
-                      <a:prstDash val="solid"/>
-                      <a:round/>
-                      <a:headEnd type="none" w="med" len="med"/>
-                      <a:tailEnd type="none" w="med" len="med"/>
-                    </a:lnB>
-                    <a:noFill/>
-                  </a:tcPr>
-                </a:tc>
-                <a:extLst>
-                  <a:ext uri="{0D108BD9-81ED-4DB2-BD59-A6C34878D82A}">
-                    <a16:rowId xmlns:a16="http://schemas.microsoft.com/office/drawing/2014/main" val="594246234"/>
-                  </a:ext>
-                </a:extLst>
-              </a:tr>
-            </a:tbl>
-          </a:graphicData>
-        </a:graphic>
-      </p:graphicFrame>
+          <a:p>
+            <a:pPr marL="342900" indent="-342900">
+              <a:buFont typeface="Arial" panose="020B0604020202020204" pitchFamily="34" charset="0"/>
+              <a:buChar char="•"/>
+            </a:pPr>
+            <a:r>
+              <a:rPr lang="en-GB" dirty="0"/>
+              <a:t>For all questions answered by the R community: </a:t>
+            </a:r>
+            <a:r>
+              <a:rPr lang="en-GB" dirty="0">
+                <a:hlinkClick r:id="rId6"/>
+              </a:rPr>
+              <a:t>https://stackoverflow.com/</a:t>
+            </a:r>
+            <a:r>
+              <a:rPr lang="en-GB" dirty="0"/>
+              <a:t> </a:t>
+            </a:r>
+          </a:p>
+        </p:txBody>
+      </p:sp>
     </p:spTree>
     <p:extLst>
       <p:ext uri="{BB962C8B-B14F-4D97-AF65-F5344CB8AC3E}">
-        <p14:creationId xmlns:p14="http://schemas.microsoft.com/office/powerpoint/2010/main" val="1393015215"/>
+        <p14:creationId xmlns:p14="http://schemas.microsoft.com/office/powerpoint/2010/main" val="764438216"/>
       </p:ext>
     </p:extLst>
   </p:cSld>
   <p:clrMapOvr>
     <a:masterClrMapping/>
   </p:clrMapOvr>
-  <p:timing>
-    <p:tnLst>
-      <p:par>
-        <p:cTn id="1" dur="indefinite" restart="never" nodeType="tmRoot">
-          <p:childTnLst>
-            <p:seq concurrent="1" nextAc="seek">
-              <p:cTn id="2" dur="indefinite" nodeType="mainSeq">
-                <p:childTnLst>
-                  <p:par>
-                    <p:cTn id="3" fill="hold">
-                      <p:stCondLst>
-                        <p:cond delay="indefinite"/>
-                      </p:stCondLst>
-                      <p:childTnLst>
-                        <p:par>
-                          <p:cTn id="4" fill="hold">
-                            <p:stCondLst>
-                              <p:cond delay="0"/>
-                            </p:stCondLst>
-                            <p:childTnLst>
-                              <p:par>
-                                <p:cTn id="5" presetID="1" presetClass="entr" presetSubtype="0" fill="hold" grpId="0" nodeType="clickEffect">
-                                  <p:stCondLst>
-                                    <p:cond delay="0"/>
-                                  </p:stCondLst>
-                                  <p:childTnLst>
-                                    <p:set>
-                                      <p:cBhvr>
-                                        <p:cTn id="6" dur="1" fill="hold">
-                                          <p:stCondLst>
-                                            <p:cond delay="0"/>
-                                          </p:stCondLst>
-                                        </p:cTn>
-                                        <p:tgtEl>
-                                          <p:spTgt spid="3">
-                                            <p:txEl>
-                                              <p:pRg st="0" end="0"/>
-                                            </p:txEl>
-                                          </p:spTgt>
-                                        </p:tgtEl>
-                                        <p:attrNameLst>
-                                          <p:attrName>style.visibility</p:attrName>
-                                        </p:attrNameLst>
-                                      </p:cBhvr>
-                                      <p:to>
-                                        <p:strVal val="visible"/>
-                                      </p:to>
-                                    </p:set>
-                                  </p:childTnLst>
-                                </p:cTn>
-                              </p:par>
-                            </p:childTnLst>
-                          </p:cTn>
-                        </p:par>
-                      </p:childTnLst>
-                    </p:cTn>
-                  </p:par>
-                  <p:par>
-                    <p:cTn id="7" fill="hold">
-                      <p:stCondLst>
-                        <p:cond delay="indefinite"/>
-                      </p:stCondLst>
-                      <p:childTnLst>
-                        <p:par>
-                          <p:cTn id="8" fill="hold">
-                            <p:stCondLst>
-                              <p:cond delay="0"/>
-                            </p:stCondLst>
-                            <p:childTnLst>
-                              <p:par>
-                                <p:cTn id="9" presetID="1" presetClass="entr" presetSubtype="0" fill="hold" grpId="0" nodeType="clickEffect">
-                                  <p:stCondLst>
-                                    <p:cond delay="0"/>
-                                  </p:stCondLst>
-                                  <p:childTnLst>
-                                    <p:set>
-                                      <p:cBhvr>
-                                        <p:cTn id="10" dur="1" fill="hold">
-                                          <p:stCondLst>
-                                            <p:cond delay="0"/>
-                                          </p:stCondLst>
-                                        </p:cTn>
-                                        <p:tgtEl>
-                                          <p:spTgt spid="3">
-                                            <p:txEl>
-                                              <p:pRg st="2" end="2"/>
-                                            </p:txEl>
-                                          </p:spTgt>
-                                        </p:tgtEl>
-                                        <p:attrNameLst>
-                                          <p:attrName>style.visibility</p:attrName>
-                                        </p:attrNameLst>
-                                      </p:cBhvr>
-                                      <p:to>
-                                        <p:strVal val="visible"/>
-                                      </p:to>
-                                    </p:set>
-                                  </p:childTnLst>
-                                </p:cTn>
-                              </p:par>
-                            </p:childTnLst>
-                          </p:cTn>
-                        </p:par>
-                      </p:childTnLst>
-                    </p:cTn>
-                  </p:par>
-                  <p:par>
-                    <p:cTn id="11" fill="hold">
-                      <p:stCondLst>
-                        <p:cond delay="indefinite"/>
-                      </p:stCondLst>
-                      <p:childTnLst>
-                        <p:par>
-                          <p:cTn id="12" fill="hold">
-                            <p:stCondLst>
-                              <p:cond delay="0"/>
-                            </p:stCondLst>
-                            <p:childTnLst>
-                              <p:par>
-                                <p:cTn id="13" presetID="1" presetClass="entr" presetSubtype="0" fill="hold" grpId="0" nodeType="clickEffect">
-                                  <p:stCondLst>
-                                    <p:cond delay="0"/>
-                                  </p:stCondLst>
-                                  <p:childTnLst>
-                                    <p:set>
-                                      <p:cBhvr>
-                                        <p:cTn id="14" dur="1" fill="hold">
-                                          <p:stCondLst>
-                                            <p:cond delay="0"/>
-                                          </p:stCondLst>
-                                        </p:cTn>
-                                        <p:tgtEl>
-                                          <p:spTgt spid="3">
-                                            <p:txEl>
-                                              <p:pRg st="3" end="3"/>
-                                            </p:txEl>
-                                          </p:spTgt>
-                                        </p:tgtEl>
-                                        <p:attrNameLst>
-                                          <p:attrName>style.visibility</p:attrName>
-                                        </p:attrNameLst>
-                                      </p:cBhvr>
-                                      <p:to>
-                                        <p:strVal val="visible"/>
-                                      </p:to>
-                                    </p:set>
-                                  </p:childTnLst>
-                                </p:cTn>
-                              </p:par>
-                            </p:childTnLst>
-                          </p:cTn>
-                        </p:par>
-                      </p:childTnLst>
-                    </p:cTn>
-                  </p:par>
-                  <p:par>
-                    <p:cTn id="15" fill="hold">
-                      <p:stCondLst>
-                        <p:cond delay="indefinite"/>
-                      </p:stCondLst>
-                      <p:childTnLst>
-                        <p:par>
-                          <p:cTn id="16" fill="hold">
-                            <p:stCondLst>
-                              <p:cond delay="0"/>
-                            </p:stCondLst>
-                            <p:childTnLst>
-                              <p:par>
-                                <p:cTn id="17" presetID="1" presetClass="entr" presetSubtype="0" fill="hold" grpId="0" nodeType="clickEffect">
-                                  <p:stCondLst>
-                                    <p:cond delay="0"/>
-                                  </p:stCondLst>
-                                  <p:childTnLst>
-                                    <p:set>
-                                      <p:cBhvr>
-                                        <p:cTn id="18" dur="1" fill="hold">
-                                          <p:stCondLst>
-                                            <p:cond delay="0"/>
-                                          </p:stCondLst>
-                                        </p:cTn>
-                                        <p:tgtEl>
-                                          <p:spTgt spid="3">
-                                            <p:txEl>
-                                              <p:pRg st="4" end="4"/>
-                                            </p:txEl>
-                                          </p:spTgt>
-                                        </p:tgtEl>
-                                        <p:attrNameLst>
-                                          <p:attrName>style.visibility</p:attrName>
-                                        </p:attrNameLst>
-                                      </p:cBhvr>
-                                      <p:to>
-                                        <p:strVal val="visible"/>
-                                      </p:to>
-                                    </p:set>
-                                  </p:childTnLst>
-                                </p:cTn>
-                              </p:par>
-                            </p:childTnLst>
-                          </p:cTn>
-                        </p:par>
-                      </p:childTnLst>
-                    </p:cTn>
-                  </p:par>
-                  <p:par>
-                    <p:cTn id="19" fill="hold">
-                      <p:stCondLst>
-                        <p:cond delay="indefinite"/>
-                      </p:stCondLst>
-                      <p:childTnLst>
-                        <p:par>
-                          <p:cTn id="20" fill="hold">
-                            <p:stCondLst>
-                              <p:cond delay="0"/>
-                            </p:stCondLst>
-                            <p:childTnLst>
-                              <p:par>
-                                <p:cTn id="21" presetID="1" presetClass="entr" presetSubtype="0" fill="hold" grpId="0" nodeType="clickEffect">
-                                  <p:stCondLst>
-                                    <p:cond delay="0"/>
-                                  </p:stCondLst>
-                                  <p:childTnLst>
-                                    <p:set>
-                                      <p:cBhvr>
-                                        <p:cTn id="22" dur="1" fill="hold">
-                                          <p:stCondLst>
-                                            <p:cond delay="0"/>
-                                          </p:stCondLst>
-                                        </p:cTn>
-                                        <p:tgtEl>
-                                          <p:spTgt spid="3">
-                                            <p:txEl>
-                                              <p:pRg st="5" end="5"/>
-                                            </p:txEl>
-                                          </p:spTgt>
-                                        </p:tgtEl>
-                                        <p:attrNameLst>
-                                          <p:attrName>style.visibility</p:attrName>
-                                        </p:attrNameLst>
-                                      </p:cBhvr>
-                                      <p:to>
-                                        <p:strVal val="visible"/>
-                                      </p:to>
-                                    </p:set>
-                                  </p:childTnLst>
-                                </p:cTn>
-                              </p:par>
-                            </p:childTnLst>
-                          </p:cTn>
-                        </p:par>
-                      </p:childTnLst>
-                    </p:cTn>
-                  </p:par>
-                  <p:par>
-                    <p:cTn id="23" fill="hold">
-                      <p:stCondLst>
-                        <p:cond delay="indefinite"/>
-                      </p:stCondLst>
-                      <p:childTnLst>
-                        <p:par>
-                          <p:cTn id="24" fill="hold">
-                            <p:stCondLst>
-                              <p:cond delay="0"/>
-                            </p:stCondLst>
-                            <p:childTnLst>
-                              <p:par>
-                                <p:cTn id="25" presetID="1" presetClass="entr" presetSubtype="0" fill="hold" grpId="0" nodeType="clickEffect">
-                                  <p:stCondLst>
-                                    <p:cond delay="0"/>
-                                  </p:stCondLst>
-                                  <p:childTnLst>
-                                    <p:set>
-                                      <p:cBhvr>
-                                        <p:cTn id="26" dur="1" fill="hold">
-                                          <p:stCondLst>
-                                            <p:cond delay="0"/>
-                                          </p:stCondLst>
-                                        </p:cTn>
-                                        <p:tgtEl>
-                                          <p:spTgt spid="3">
-                                            <p:txEl>
-                                              <p:pRg st="7" end="7"/>
-                                            </p:txEl>
-                                          </p:spTgt>
-                                        </p:tgtEl>
-                                        <p:attrNameLst>
-                                          <p:attrName>style.visibility</p:attrName>
-                                        </p:attrNameLst>
-                                      </p:cBhvr>
-                                      <p:to>
-                                        <p:strVal val="visible"/>
-                                      </p:to>
-                                    </p:set>
-                                  </p:childTnLst>
-                                </p:cTn>
-                              </p:par>
-                            </p:childTnLst>
-                          </p:cTn>
-                        </p:par>
-                      </p:childTnLst>
-                    </p:cTn>
-                  </p:par>
-                  <p:par>
-                    <p:cTn id="27" fill="hold">
-                      <p:stCondLst>
-                        <p:cond delay="indefinite"/>
-                      </p:stCondLst>
-                      <p:childTnLst>
-                        <p:par>
-                          <p:cTn id="28" fill="hold">
-                            <p:stCondLst>
-                              <p:cond delay="0"/>
-                            </p:stCondLst>
-                            <p:childTnLst>
-                              <p:par>
-                                <p:cTn id="29" presetID="1" presetClass="entr" presetSubtype="0" fill="hold" nodeType="clickEffect">
-                                  <p:stCondLst>
-                                    <p:cond delay="0"/>
-                                  </p:stCondLst>
-                                  <p:childTnLst>
-                                    <p:set>
-                                      <p:cBhvr>
-                                        <p:cTn id="30" dur="1" fill="hold">
-                                          <p:stCondLst>
-                                            <p:cond delay="0"/>
-                                          </p:stCondLst>
-                                        </p:cTn>
-                                        <p:tgtEl>
-                                          <p:spTgt spid="4"/>
-                                        </p:tgtEl>
-                                        <p:attrNameLst>
-                                          <p:attrName>style.visibility</p:attrName>
-                                        </p:attrNameLst>
-                                      </p:cBhvr>
-                                      <p:to>
-                                        <p:strVal val="visible"/>
-                                      </p:to>
-                                    </p:set>
-                                  </p:childTnLst>
-                                </p:cTn>
-                              </p:par>
-                            </p:childTnLst>
-                          </p:cTn>
-                        </p:par>
-                      </p:childTnLst>
-                    </p:cTn>
-                  </p:par>
-                  <p:par>
-                    <p:cTn id="31" fill="hold">
-                      <p:stCondLst>
-                        <p:cond delay="indefinite"/>
-                      </p:stCondLst>
-                      <p:childTnLst>
-                        <p:par>
-                          <p:cTn id="32" fill="hold">
-                            <p:stCondLst>
-                              <p:cond delay="0"/>
-                            </p:stCondLst>
-                            <p:childTnLst>
-                              <p:par>
-                                <p:cTn id="33" presetID="1" presetClass="entr" presetSubtype="0" fill="hold" grpId="0" nodeType="clickEffect">
-                                  <p:stCondLst>
-                                    <p:cond delay="0"/>
-                                  </p:stCondLst>
-                                  <p:childTnLst>
-                                    <p:set>
-                                      <p:cBhvr>
-                                        <p:cTn id="34" dur="1" fill="hold">
-                                          <p:stCondLst>
-                                            <p:cond delay="0"/>
-                                          </p:stCondLst>
-                                        </p:cTn>
-                                        <p:tgtEl>
-                                          <p:spTgt spid="3">
-                                            <p:txEl>
-                                              <p:pRg st="10" end="10"/>
-                                            </p:txEl>
-                                          </p:spTgt>
-                                        </p:tgtEl>
-                                        <p:attrNameLst>
-                                          <p:attrName>style.visibility</p:attrName>
-                                        </p:attrNameLst>
-                                      </p:cBhvr>
-                                      <p:to>
-                                        <p:strVal val="visible"/>
-                                      </p:to>
-                                    </p:set>
-                                  </p:childTnLst>
-                                </p:cTn>
-                              </p:par>
-                            </p:childTnLst>
-                          </p:cTn>
-                        </p:par>
-                      </p:childTnLst>
-                    </p:cTn>
-                  </p:par>
-                </p:childTnLst>
-              </p:cTn>
-              <p:prevCondLst>
-                <p:cond evt="onPrev" delay="0">
-                  <p:tgtEl>
-                    <p:sldTgt/>
-                  </p:tgtEl>
-                </p:cond>
-              </p:prevCondLst>
-              <p:nextCondLst>
-                <p:cond evt="onNext" delay="0">
-                  <p:tgtEl>
-                    <p:sldTgt/>
-                  </p:tgtEl>
-                </p:cond>
-              </p:nextCondLst>
-            </p:seq>
-          </p:childTnLst>
-        </p:cTn>
-      </p:par>
-    </p:tnLst>
-    <p:bldLst>
-      <p:bldP spid="3" grpId="0" uiExpand="1" build="p"/>
-    </p:bldLst>
-  </p:timing>
 </p:sld>
 </file>
 

</xml_diff>

<commit_message>
Add slides on R functions and dplyr commands
</commit_message>
<xml_diff>
--- a/session_2/SLIDES_introduction_to_R_2.pptx
+++ b/session_2/SLIDES_introduction_to_R_2.pptx
@@ -10,11 +10,12 @@
     <p:sldId id="383" r:id="rId4"/>
     <p:sldId id="382" r:id="rId5"/>
     <p:sldId id="395" r:id="rId6"/>
-    <p:sldId id="388" r:id="rId7"/>
-    <p:sldId id="389" r:id="rId8"/>
-    <p:sldId id="396" r:id="rId9"/>
-    <p:sldId id="393" r:id="rId10"/>
-    <p:sldId id="392" r:id="rId11"/>
+    <p:sldId id="397" r:id="rId7"/>
+    <p:sldId id="388" r:id="rId8"/>
+    <p:sldId id="389" r:id="rId9"/>
+    <p:sldId id="396" r:id="rId10"/>
+    <p:sldId id="393" r:id="rId11"/>
+    <p:sldId id="392" r:id="rId12"/>
   </p:sldIdLst>
   <p:sldSz cx="12192000" cy="6858000"/>
   <p:notesSz cx="6858000" cy="9144000"/>
@@ -270,7 +271,7 @@
           <a:p>
             <a:fld id="{E37723A7-B92E-4635-B4A4-B660A270521F}" type="datetimeFigureOut">
               <a:rPr lang="en-GB" smtClean="0"/>
-              <a:t>16/11/2022</a:t>
+              <a:t>17/11/2022</a:t>
             </a:fld>
             <a:endParaRPr lang="en-GB"/>
           </a:p>
@@ -470,7 +471,7 @@
           <a:p>
             <a:fld id="{E37723A7-B92E-4635-B4A4-B660A270521F}" type="datetimeFigureOut">
               <a:rPr lang="en-GB" smtClean="0"/>
-              <a:t>16/11/2022</a:t>
+              <a:t>17/11/2022</a:t>
             </a:fld>
             <a:endParaRPr lang="en-GB"/>
           </a:p>
@@ -680,7 +681,7 @@
           <a:p>
             <a:fld id="{E37723A7-B92E-4635-B4A4-B660A270521F}" type="datetimeFigureOut">
               <a:rPr lang="en-GB" smtClean="0"/>
-              <a:t>16/11/2022</a:t>
+              <a:t>17/11/2022</a:t>
             </a:fld>
             <a:endParaRPr lang="en-GB"/>
           </a:p>
@@ -2092,7 +2093,7 @@
           <a:p>
             <a:fld id="{E37723A7-B92E-4635-B4A4-B660A270521F}" type="datetimeFigureOut">
               <a:rPr lang="en-GB" smtClean="0"/>
-              <a:t>16/11/2022</a:t>
+              <a:t>17/11/2022</a:t>
             </a:fld>
             <a:endParaRPr lang="en-GB"/>
           </a:p>
@@ -2368,7 +2369,7 @@
           <a:p>
             <a:fld id="{E37723A7-B92E-4635-B4A4-B660A270521F}" type="datetimeFigureOut">
               <a:rPr lang="en-GB" smtClean="0"/>
-              <a:t>16/11/2022</a:t>
+              <a:t>17/11/2022</a:t>
             </a:fld>
             <a:endParaRPr lang="en-GB"/>
           </a:p>
@@ -2636,7 +2637,7 @@
           <a:p>
             <a:fld id="{E37723A7-B92E-4635-B4A4-B660A270521F}" type="datetimeFigureOut">
               <a:rPr lang="en-GB" smtClean="0"/>
-              <a:t>16/11/2022</a:t>
+              <a:t>17/11/2022</a:t>
             </a:fld>
             <a:endParaRPr lang="en-GB"/>
           </a:p>
@@ -3051,7 +3052,7 @@
           <a:p>
             <a:fld id="{E37723A7-B92E-4635-B4A4-B660A270521F}" type="datetimeFigureOut">
               <a:rPr lang="en-GB" smtClean="0"/>
-              <a:t>16/11/2022</a:t>
+              <a:t>17/11/2022</a:t>
             </a:fld>
             <a:endParaRPr lang="en-GB"/>
           </a:p>
@@ -3193,7 +3194,7 @@
           <a:p>
             <a:fld id="{E37723A7-B92E-4635-B4A4-B660A270521F}" type="datetimeFigureOut">
               <a:rPr lang="en-GB" smtClean="0"/>
-              <a:t>16/11/2022</a:t>
+              <a:t>17/11/2022</a:t>
             </a:fld>
             <a:endParaRPr lang="en-GB"/>
           </a:p>
@@ -3306,7 +3307,7 @@
           <a:p>
             <a:fld id="{E37723A7-B92E-4635-B4A4-B660A270521F}" type="datetimeFigureOut">
               <a:rPr lang="en-GB" smtClean="0"/>
-              <a:t>16/11/2022</a:t>
+              <a:t>17/11/2022</a:t>
             </a:fld>
             <a:endParaRPr lang="en-GB"/>
           </a:p>
@@ -3619,7 +3620,7 @@
           <a:p>
             <a:fld id="{E37723A7-B92E-4635-B4A4-B660A270521F}" type="datetimeFigureOut">
               <a:rPr lang="en-GB" smtClean="0"/>
-              <a:t>16/11/2022</a:t>
+              <a:t>17/11/2022</a:t>
             </a:fld>
             <a:endParaRPr lang="en-GB"/>
           </a:p>
@@ -3908,7 +3909,7 @@
           <a:p>
             <a:fld id="{E37723A7-B92E-4635-B4A4-B660A270521F}" type="datetimeFigureOut">
               <a:rPr lang="en-GB" smtClean="0"/>
-              <a:t>16/11/2022</a:t>
+              <a:t>17/11/2022</a:t>
             </a:fld>
             <a:endParaRPr lang="en-GB"/>
           </a:p>
@@ -4151,7 +4152,7 @@
           <a:p>
             <a:fld id="{E37723A7-B92E-4635-B4A4-B660A270521F}" type="datetimeFigureOut">
               <a:rPr lang="en-GB" smtClean="0"/>
-              <a:t>16/11/2022</a:t>
+              <a:t>17/11/2022</a:t>
             </a:fld>
             <a:endParaRPr lang="en-GB"/>
           </a:p>
@@ -4972,8 +4973,107 @@
                 <a:ea typeface="+mn-ea"/>
                 <a:cs typeface="+mn-cs"/>
               </a:rPr>
-              <a:t>Alexis Robert, Sophie Meakin</a:t>
-            </a:r>
+              <a:t>Alexis Robert, Sophie </a:t>
+            </a:r>
+            <a:r>
+              <a:rPr kumimoji="0" lang="en-GB" sz="2800" b="0" i="0" u="none" strike="noStrike" kern="1200" cap="none" spc="0" normalizeH="0" baseline="0" noProof="0" dirty="0" err="1">
+                <a:ln>
+                  <a:noFill/>
+                </a:ln>
+                <a:solidFill>
+                  <a:prstClr val="white"/>
+                </a:solidFill>
+                <a:effectLst/>
+                <a:uLnTx/>
+                <a:uFillTx/>
+                <a:latin typeface="Corbel" panose="020B0503020204020204" pitchFamily="34" charset="0"/>
+                <a:ea typeface="+mn-ea"/>
+                <a:cs typeface="+mn-cs"/>
+              </a:rPr>
+              <a:t>Meakin</a:t>
+            </a:r>
+            <a:r>
+              <a:rPr kumimoji="0" lang="en-GB" sz="2800" b="0" i="0" u="none" strike="noStrike" kern="1200" cap="none" spc="0" normalizeH="0" baseline="0" noProof="0" dirty="0">
+                <a:ln>
+                  <a:noFill/>
+                </a:ln>
+                <a:solidFill>
+                  <a:prstClr val="white"/>
+                </a:solidFill>
+                <a:effectLst/>
+                <a:uLnTx/>
+                <a:uFillTx/>
+                <a:latin typeface="Corbel" panose="020B0503020204020204" pitchFamily="34" charset="0"/>
+                <a:ea typeface="+mn-ea"/>
+                <a:cs typeface="+mn-cs"/>
+              </a:rPr>
+              <a:t>, Billy </a:t>
+            </a:r>
+            <a:r>
+              <a:rPr kumimoji="0" lang="en-GB" sz="2800" b="0" i="0" u="none" strike="noStrike" kern="1200" cap="none" spc="0" normalizeH="0" baseline="0" noProof="0" dirty="0" err="1">
+                <a:ln>
+                  <a:noFill/>
+                </a:ln>
+                <a:solidFill>
+                  <a:prstClr val="white"/>
+                </a:solidFill>
+                <a:effectLst/>
+                <a:uLnTx/>
+                <a:uFillTx/>
+                <a:latin typeface="Corbel" panose="020B0503020204020204" pitchFamily="34" charset="0"/>
+                <a:ea typeface="+mn-ea"/>
+                <a:cs typeface="+mn-cs"/>
+              </a:rPr>
+              <a:t>Quilty</a:t>
+            </a:r>
+            <a:r>
+              <a:rPr kumimoji="0" lang="en-GB" sz="2800" b="0" i="0" u="none" strike="noStrike" kern="1200" cap="none" spc="0" normalizeH="0" baseline="0" noProof="0" dirty="0">
+                <a:ln>
+                  <a:noFill/>
+                </a:ln>
+                <a:solidFill>
+                  <a:prstClr val="white"/>
+                </a:solidFill>
+                <a:effectLst/>
+                <a:uLnTx/>
+                <a:uFillTx/>
+                <a:latin typeface="Corbel" panose="020B0503020204020204" pitchFamily="34" charset="0"/>
+                <a:ea typeface="+mn-ea"/>
+                <a:cs typeface="+mn-cs"/>
+              </a:rPr>
+              <a:t>, Naomi </a:t>
+            </a:r>
+            <a:r>
+              <a:rPr kumimoji="0" lang="en-GB" sz="2800" b="0" i="0" u="none" strike="noStrike" kern="1200" cap="none" spc="0" normalizeH="0" baseline="0" noProof="0" dirty="0" err="1">
+                <a:ln>
+                  <a:noFill/>
+                </a:ln>
+                <a:solidFill>
+                  <a:prstClr val="white"/>
+                </a:solidFill>
+                <a:effectLst/>
+                <a:uLnTx/>
+                <a:uFillTx/>
+                <a:latin typeface="Corbel" panose="020B0503020204020204" pitchFamily="34" charset="0"/>
+                <a:ea typeface="+mn-ea"/>
+                <a:cs typeface="+mn-cs"/>
+              </a:rPr>
+              <a:t>Waterlow</a:t>
+            </a:r>
+            <a:endParaRPr kumimoji="0" lang="en-GB" sz="2800" b="0" i="0" u="none" strike="noStrike" kern="1200" cap="none" spc="0" normalizeH="0" baseline="0" noProof="0" dirty="0">
+              <a:ln>
+                <a:noFill/>
+              </a:ln>
+              <a:solidFill>
+                <a:prstClr val="white"/>
+              </a:solidFill>
+              <a:effectLst/>
+              <a:uLnTx/>
+              <a:uFillTx/>
+              <a:latin typeface="Corbel" panose="020B0503020204020204" pitchFamily="34" charset="0"/>
+              <a:ea typeface="+mn-ea"/>
+              <a:cs typeface="+mn-cs"/>
+            </a:endParaRPr>
           </a:p>
           <a:p>
             <a:pPr marL="0" marR="0" lvl="0" indent="0" algn="ctr" defTabSz="914400" rtl="0" eaLnBrk="1" fontAlgn="auto" latinLnBrk="0" hangingPunct="1">
@@ -5130,6 +5230,228 @@
     <p:extLst>
       <p:ext uri="{BB962C8B-B14F-4D97-AF65-F5344CB8AC3E}">
         <p14:creationId xmlns:p14="http://schemas.microsoft.com/office/powerpoint/2010/main" val="3870651766"/>
+      </p:ext>
+    </p:extLst>
+  </p:cSld>
+  <p:clrMapOvr>
+    <a:masterClrMapping/>
+  </p:clrMapOvr>
+</p:sld>
+</file>
+
+<file path=ppt/slides/slide10.xml><?xml version="1.0" encoding="utf-8"?>
+<p:sld xmlns:a="http://schemas.openxmlformats.org/drawingml/2006/main" xmlns:r="http://schemas.openxmlformats.org/officeDocument/2006/relationships" xmlns:p="http://schemas.openxmlformats.org/presentationml/2006/main">
+  <p:cSld>
+    <p:spTree>
+      <p:nvGrpSpPr>
+        <p:cNvPr id="1" name=""/>
+        <p:cNvGrpSpPr/>
+        <p:nvPr/>
+      </p:nvGrpSpPr>
+      <p:grpSpPr>
+        <a:xfrm>
+          <a:off x="0" y="0"/>
+          <a:ext cx="0" cy="0"/>
+          <a:chOff x="0" y="0"/>
+          <a:chExt cx="0" cy="0"/>
+        </a:xfrm>
+      </p:grpSpPr>
+      <p:sp>
+        <p:nvSpPr>
+          <p:cNvPr id="2" name="Title 1">
+            <a:extLst>
+              <a:ext uri="{FF2B5EF4-FFF2-40B4-BE49-F238E27FC236}">
+                <a16:creationId xmlns:a16="http://schemas.microsoft.com/office/drawing/2014/main" id="{A1FFF348-256A-419B-94A5-1E1296D1F338}"/>
+              </a:ext>
+            </a:extLst>
+          </p:cNvPr>
+          <p:cNvSpPr>
+            <a:spLocks noGrp="1"/>
+          </p:cNvSpPr>
+          <p:nvPr>
+            <p:ph type="title"/>
+          </p:nvPr>
+        </p:nvSpPr>
+        <p:spPr/>
+        <p:txBody>
+          <a:bodyPr/>
+          <a:lstStyle/>
+          <a:p>
+            <a:r>
+              <a:rPr lang="en-US" dirty="0"/>
+              <a:t>Further resources</a:t>
+            </a:r>
+            <a:endParaRPr lang="en-GB" dirty="0"/>
+          </a:p>
+        </p:txBody>
+      </p:sp>
+      <p:sp>
+        <p:nvSpPr>
+          <p:cNvPr id="3" name="Content Placeholder 2">
+            <a:extLst>
+              <a:ext uri="{FF2B5EF4-FFF2-40B4-BE49-F238E27FC236}">
+                <a16:creationId xmlns:a16="http://schemas.microsoft.com/office/drawing/2014/main" id="{D9F956DB-4DF0-4E24-84E4-DA013CE75541}"/>
+              </a:ext>
+            </a:extLst>
+          </p:cNvPr>
+          <p:cNvSpPr>
+            <a:spLocks noGrp="1"/>
+          </p:cNvSpPr>
+          <p:nvPr>
+            <p:ph idx="1"/>
+          </p:nvPr>
+        </p:nvSpPr>
+        <p:spPr>
+          <a:xfrm>
+            <a:off x="438151" y="1477818"/>
+            <a:ext cx="11753850" cy="4821382"/>
+          </a:xfrm>
+        </p:spPr>
+        <p:txBody>
+          <a:bodyPr/>
+          <a:lstStyle/>
+          <a:p>
+            <a:pPr marL="342900" indent="-342900">
+              <a:buFont typeface="Arial" panose="020B0604020202020204" pitchFamily="34" charset="0"/>
+              <a:buChar char="•"/>
+            </a:pPr>
+            <a:r>
+              <a:rPr lang="en-US" dirty="0"/>
+              <a:t>Excellent summary of functions used for data analysis and visualization </a:t>
+            </a:r>
+            <a:r>
+              <a:rPr lang="en-US" dirty="0">
+                <a:hlinkClick r:id="rId2"/>
+              </a:rPr>
+              <a:t>https://r4ds.had.co.nz/index.html</a:t>
+            </a:r>
+            <a:r>
+              <a:rPr lang="en-US" dirty="0"/>
+              <a:t> </a:t>
+            </a:r>
+          </a:p>
+          <a:p>
+            <a:pPr marL="342900" indent="-342900">
+              <a:buFont typeface="Arial" panose="020B0604020202020204" pitchFamily="34" charset="0"/>
+              <a:buChar char="•"/>
+            </a:pPr>
+            <a:endParaRPr lang="en-US" dirty="0"/>
+          </a:p>
+          <a:p>
+            <a:pPr marL="342900" indent="-342900">
+              <a:buFont typeface="Arial" panose="020B0604020202020204" pitchFamily="34" charset="0"/>
+              <a:buChar char="•"/>
+            </a:pPr>
+            <a:r>
+              <a:rPr lang="en-US" dirty="0"/>
+              <a:t>Making graphs in R: </a:t>
+            </a:r>
+            <a:r>
+              <a:rPr lang="en-US" dirty="0">
+                <a:hlinkClick r:id="rId3"/>
+              </a:rPr>
+              <a:t>http://www.cookbook-r.com/Graphs/</a:t>
+            </a:r>
+            <a:r>
+              <a:rPr lang="en-US" dirty="0"/>
+              <a:t> </a:t>
+            </a:r>
+          </a:p>
+          <a:p>
+            <a:pPr marL="342900" indent="-342900">
+              <a:buFont typeface="Arial" panose="020B0604020202020204" pitchFamily="34" charset="0"/>
+              <a:buChar char="•"/>
+            </a:pPr>
+            <a:endParaRPr lang="en-US" dirty="0"/>
+          </a:p>
+          <a:p>
+            <a:pPr marL="342900" indent="-342900">
+              <a:buFont typeface="Arial" panose="020B0604020202020204" pitchFamily="34" charset="0"/>
+              <a:buChar char="•"/>
+            </a:pPr>
+            <a:r>
+              <a:rPr lang="en-US" dirty="0"/>
+              <a:t>For an introduction to packages and development: </a:t>
+            </a:r>
+            <a:r>
+              <a:rPr lang="en-US" dirty="0">
+                <a:hlinkClick r:id="rId4"/>
+              </a:rPr>
+              <a:t>https://r-pkgs.org/intro.html</a:t>
+            </a:r>
+            <a:r>
+              <a:rPr lang="en-US" dirty="0"/>
+              <a:t> </a:t>
+            </a:r>
+          </a:p>
+          <a:p>
+            <a:pPr marL="342900" indent="-342900">
+              <a:buFont typeface="Arial" panose="020B0604020202020204" pitchFamily="34" charset="0"/>
+              <a:buChar char="•"/>
+            </a:pPr>
+            <a:endParaRPr lang="en-US" dirty="0"/>
+          </a:p>
+          <a:p>
+            <a:pPr marL="342900" indent="-342900">
+              <a:buFont typeface="Arial" panose="020B0604020202020204" pitchFamily="34" charset="0"/>
+              <a:buChar char="•"/>
+            </a:pPr>
+            <a:r>
+              <a:rPr lang="en-GB" dirty="0"/>
+              <a:t>The </a:t>
+            </a:r>
+            <a:r>
+              <a:rPr lang="en-GB" dirty="0" err="1"/>
+              <a:t>cheatsheets</a:t>
+            </a:r>
+            <a:r>
+              <a:rPr lang="en-GB" dirty="0"/>
+              <a:t> of various R packages: </a:t>
+            </a:r>
+            <a:r>
+              <a:rPr lang="en-GB" dirty="0">
+                <a:hlinkClick r:id="rId5"/>
+              </a:rPr>
+              <a:t>https://www.rstudio.com/resources/cheatsheets/</a:t>
+            </a:r>
+            <a:r>
+              <a:rPr lang="en-GB" dirty="0"/>
+              <a:t> </a:t>
+            </a:r>
+          </a:p>
+          <a:p>
+            <a:pPr marL="342900" indent="-342900">
+              <a:buFont typeface="Arial" panose="020B0604020202020204" pitchFamily="34" charset="0"/>
+              <a:buChar char="•"/>
+            </a:pPr>
+            <a:endParaRPr lang="en-GB" dirty="0"/>
+          </a:p>
+          <a:p>
+            <a:pPr marL="342900" indent="-342900">
+              <a:buFont typeface="Arial" panose="020B0604020202020204" pitchFamily="34" charset="0"/>
+              <a:buChar char="•"/>
+            </a:pPr>
+            <a:r>
+              <a:rPr lang="en-GB" dirty="0"/>
+              <a:t>For all questions answered by the R community: </a:t>
+            </a:r>
+            <a:r>
+              <a:rPr lang="en-GB" dirty="0">
+                <a:hlinkClick r:id="rId6"/>
+              </a:rPr>
+              <a:t>https://stackoverflow.com/</a:t>
+            </a:r>
+            <a:r>
+              <a:rPr lang="en-GB" dirty="0"/>
+              <a:t> </a:t>
+            </a:r>
+          </a:p>
+        </p:txBody>
+      </p:sp>
+    </p:spTree>
+    <p:extLst>
+      <p:ext uri="{BB962C8B-B14F-4D97-AF65-F5344CB8AC3E}">
+        <p14:creationId xmlns:p14="http://schemas.microsoft.com/office/powerpoint/2010/main" val="764438216"/>
       </p:ext>
     </p:extLst>
   </p:cSld>
@@ -5892,12 +6214,78 @@
           </a:p>
         </p:txBody>
       </p:sp>
+      <p:sp>
+        <p:nvSpPr>
+          <p:cNvPr id="3" name="TextBox 2">
+            <a:extLst>
+              <a:ext uri="{FF2B5EF4-FFF2-40B4-BE49-F238E27FC236}">
+                <a16:creationId xmlns:a16="http://schemas.microsoft.com/office/drawing/2014/main" id="{B2693A34-CE9A-2A24-611B-61947CF0A0CA}"/>
+              </a:ext>
+            </a:extLst>
+          </p:cNvPr>
+          <p:cNvSpPr txBox="1"/>
+          <p:nvPr/>
+        </p:nvSpPr>
+        <p:spPr>
+          <a:xfrm>
+            <a:off x="609600" y="3317358"/>
+            <a:ext cx="10097386" cy="830997"/>
+          </a:xfrm>
+          <a:prstGeom prst="rect">
+            <a:avLst/>
+          </a:prstGeom>
+          <a:noFill/>
+        </p:spPr>
+        <p:txBody>
+          <a:bodyPr wrap="square" rtlCol="0">
+            <a:spAutoFit/>
+          </a:bodyPr>
+          <a:lstStyle/>
+          <a:p>
+            <a:r>
+              <a:rPr lang="en-US" sz="2400" b="1" dirty="0"/>
+              <a:t>Create a function that takes two numbers and compute the summed of their square values</a:t>
+            </a:r>
+            <a:endParaRPr lang="en-GB" sz="2400" b="1" dirty="0"/>
+          </a:p>
+        </p:txBody>
+      </p:sp>
+    </p:spTree>
+    <p:extLst>
+      <p:ext uri="{BB962C8B-B14F-4D97-AF65-F5344CB8AC3E}">
+        <p14:creationId xmlns:p14="http://schemas.microsoft.com/office/powerpoint/2010/main" val="2069951249"/>
+      </p:ext>
+    </p:extLst>
+  </p:cSld>
+  <p:clrMapOvr>
+    <a:masterClrMapping/>
+  </p:clrMapOvr>
+</p:sld>
+</file>
+
+<file path=ppt/slides/slide5.xml><?xml version="1.0" encoding="utf-8"?>
+<p:sld xmlns:a="http://schemas.openxmlformats.org/drawingml/2006/main" xmlns:r="http://schemas.openxmlformats.org/officeDocument/2006/relationships" xmlns:p="http://schemas.openxmlformats.org/presentationml/2006/main">
+  <p:cSld>
+    <p:spTree>
+      <p:nvGrpSpPr>
+        <p:cNvPr id="1" name=""/>
+        <p:cNvGrpSpPr/>
+        <p:nvPr/>
+      </p:nvGrpSpPr>
+      <p:grpSpPr>
+        <a:xfrm>
+          <a:off x="0" y="0"/>
+          <a:ext cx="0" cy="0"/>
+          <a:chOff x="0" y="0"/>
+          <a:chExt cx="0" cy="0"/>
+        </a:xfrm>
+      </p:grpSpPr>
       <p:pic>
         <p:nvPicPr>
-          <p:cNvPr id="9" name="Picture 8">
+          <p:cNvPr id="4" name="Picture 3">
             <a:extLst>
               <a:ext uri="{FF2B5EF4-FFF2-40B4-BE49-F238E27FC236}">
-                <a16:creationId xmlns:a16="http://schemas.microsoft.com/office/drawing/2014/main" id="{B294B2F5-3108-4CAD-8EE0-C6212034869D}"/>
+                <a16:creationId xmlns:a16="http://schemas.microsoft.com/office/drawing/2014/main" id="{C023F0D8-570B-A814-DAB5-97C07AA2EC65}"/>
               </a:ext>
             </a:extLst>
           </p:cNvPr>
@@ -5914,14 +6302,43 @@
         </p:blipFill>
         <p:spPr>
           <a:xfrm>
-            <a:off x="609600" y="1548129"/>
-            <a:ext cx="6507163" cy="3557873"/>
+            <a:off x="581024" y="1575680"/>
+            <a:ext cx="9327907" cy="3608724"/>
           </a:xfrm>
           <a:prstGeom prst="rect">
             <a:avLst/>
           </a:prstGeom>
         </p:spPr>
       </p:pic>
+      <p:sp>
+        <p:nvSpPr>
+          <p:cNvPr id="2" name="Title 1">
+            <a:extLst>
+              <a:ext uri="{FF2B5EF4-FFF2-40B4-BE49-F238E27FC236}">
+                <a16:creationId xmlns:a16="http://schemas.microsoft.com/office/drawing/2014/main" id="{D7859BBF-8E2F-4A6C-B74D-0EEDFA99D0A8}"/>
+              </a:ext>
+            </a:extLst>
+          </p:cNvPr>
+          <p:cNvSpPr>
+            <a:spLocks noGrp="1"/>
+          </p:cNvSpPr>
+          <p:nvPr>
+            <p:ph type="title"/>
+          </p:nvPr>
+        </p:nvSpPr>
+        <p:spPr/>
+        <p:txBody>
+          <a:bodyPr/>
+          <a:lstStyle/>
+          <a:p>
+            <a:r>
+              <a:rPr lang="en-US" dirty="0"/>
+              <a:t>Functions (example)</a:t>
+            </a:r>
+            <a:endParaRPr lang="en-GB" dirty="0"/>
+          </a:p>
+        </p:txBody>
+      </p:sp>
       <p:sp>
         <p:nvSpPr>
           <p:cNvPr id="10" name="Oval 9">
@@ -6086,7 +6503,7 @@
         </p:nvSpPr>
         <p:spPr>
           <a:xfrm>
-            <a:off x="7383463" y="1962150"/>
+            <a:off x="9680099" y="1962150"/>
             <a:ext cx="388937" cy="2419350"/>
           </a:xfrm>
           <a:prstGeom prst="rightBrace">
@@ -6254,7 +6671,7 @@
         </p:nvSpPr>
         <p:spPr>
           <a:xfrm>
-            <a:off x="8039100" y="2934650"/>
+            <a:off x="10335736" y="2934650"/>
             <a:ext cx="2366964" cy="461665"/>
           </a:xfrm>
           <a:prstGeom prst="rect">
@@ -6315,7 +6732,7 @@
     </p:spTree>
     <p:extLst>
       <p:ext uri="{BB962C8B-B14F-4D97-AF65-F5344CB8AC3E}">
-        <p14:creationId xmlns:p14="http://schemas.microsoft.com/office/powerpoint/2010/main" val="2069951249"/>
+        <p14:creationId xmlns:p14="http://schemas.microsoft.com/office/powerpoint/2010/main" val="3309089069"/>
       </p:ext>
     </p:extLst>
   </p:cSld>
@@ -6699,501 +7116,6 @@
 </p:sld>
 </file>
 
-<file path=ppt/slides/slide5.xml><?xml version="1.0" encoding="utf-8"?>
-<p:sld xmlns:a="http://schemas.openxmlformats.org/drawingml/2006/main" xmlns:r="http://schemas.openxmlformats.org/officeDocument/2006/relationships" xmlns:p="http://schemas.openxmlformats.org/presentationml/2006/main">
-  <p:cSld>
-    <p:spTree>
-      <p:nvGrpSpPr>
-        <p:cNvPr id="1" name=""/>
-        <p:cNvGrpSpPr/>
-        <p:nvPr/>
-      </p:nvGrpSpPr>
-      <p:grpSpPr>
-        <a:xfrm>
-          <a:off x="0" y="0"/>
-          <a:ext cx="0" cy="0"/>
-          <a:chOff x="0" y="0"/>
-          <a:chExt cx="0" cy="0"/>
-        </a:xfrm>
-      </p:grpSpPr>
-      <p:sp>
-        <p:nvSpPr>
-          <p:cNvPr id="2" name="Title 1">
-            <a:extLst>
-              <a:ext uri="{FF2B5EF4-FFF2-40B4-BE49-F238E27FC236}">
-                <a16:creationId xmlns:a16="http://schemas.microsoft.com/office/drawing/2014/main" id="{34AD570E-32DE-42BA-8BA3-FF7A5AC00A15}"/>
-              </a:ext>
-            </a:extLst>
-          </p:cNvPr>
-          <p:cNvSpPr>
-            <a:spLocks noGrp="1"/>
-          </p:cNvSpPr>
-          <p:nvPr>
-            <p:ph type="title"/>
-          </p:nvPr>
-        </p:nvSpPr>
-        <p:spPr/>
-        <p:txBody>
-          <a:bodyPr/>
-          <a:lstStyle/>
-          <a:p>
-            <a:r>
-              <a:rPr lang="en-US" dirty="0"/>
-              <a:t>Packages</a:t>
-            </a:r>
-            <a:endParaRPr lang="en-GB" dirty="0"/>
-          </a:p>
-        </p:txBody>
-      </p:sp>
-      <p:sp>
-        <p:nvSpPr>
-          <p:cNvPr id="3" name="Content Placeholder 2">
-            <a:extLst>
-              <a:ext uri="{FF2B5EF4-FFF2-40B4-BE49-F238E27FC236}">
-                <a16:creationId xmlns:a16="http://schemas.microsoft.com/office/drawing/2014/main" id="{E5238F85-F42E-44B2-AD97-F329F6AB511C}"/>
-              </a:ext>
-            </a:extLst>
-          </p:cNvPr>
-          <p:cNvSpPr>
-            <a:spLocks noGrp="1"/>
-          </p:cNvSpPr>
-          <p:nvPr>
-            <p:ph idx="1"/>
-          </p:nvPr>
-        </p:nvSpPr>
-        <p:spPr>
-          <a:xfrm>
-            <a:off x="609599" y="1477818"/>
-            <a:ext cx="11325226" cy="4821382"/>
-          </a:xfrm>
-        </p:spPr>
-        <p:txBody>
-          <a:bodyPr/>
-          <a:lstStyle/>
-          <a:p>
-            <a:pPr marL="342900" indent="-342900">
-              <a:buFont typeface="Arial" panose="020B0604020202020204" pitchFamily="34" charset="0"/>
-              <a:buChar char="•"/>
-            </a:pPr>
-            <a:r>
-              <a:rPr lang="en-US" dirty="0"/>
-              <a:t>The functions used in the practical so far are included in base R.</a:t>
-            </a:r>
-          </a:p>
-          <a:p>
-            <a:pPr marL="342900" indent="-342900">
-              <a:buFont typeface="Arial" panose="020B0604020202020204" pitchFamily="34" charset="0"/>
-              <a:buChar char="•"/>
-            </a:pPr>
-            <a:endParaRPr lang="en-US" dirty="0"/>
-          </a:p>
-          <a:p>
-            <a:pPr marL="342900" indent="-342900">
-              <a:buFont typeface="Arial" panose="020B0604020202020204" pitchFamily="34" charset="0"/>
-              <a:buChar char="•"/>
-            </a:pPr>
-            <a:r>
-              <a:rPr lang="en-GB" dirty="0"/>
-              <a:t>Packages are units of shareable code, and can include </a:t>
-            </a:r>
-            <a:r>
-              <a:rPr lang="en-GB" b="1" dirty="0"/>
-              <a:t>functions</a:t>
-            </a:r>
-            <a:r>
-              <a:rPr lang="en-GB" dirty="0"/>
-              <a:t>, </a:t>
-            </a:r>
-            <a:r>
-              <a:rPr lang="en-GB" b="1" dirty="0"/>
-              <a:t>data</a:t>
-            </a:r>
-            <a:r>
-              <a:rPr lang="en-GB" dirty="0"/>
-              <a:t>, </a:t>
-            </a:r>
-            <a:r>
-              <a:rPr lang="en-GB" b="1" dirty="0"/>
-              <a:t>documentation</a:t>
-            </a:r>
-            <a:r>
-              <a:rPr lang="en-GB" dirty="0"/>
-              <a:t>, and </a:t>
-            </a:r>
-            <a:r>
-              <a:rPr lang="en-GB" b="1" dirty="0"/>
-              <a:t>tests.</a:t>
-            </a:r>
-          </a:p>
-          <a:p>
-            <a:pPr marL="342900" indent="-342900">
-              <a:buFont typeface="Arial" panose="020B0604020202020204" pitchFamily="34" charset="0"/>
-              <a:buChar char="•"/>
-            </a:pPr>
-            <a:endParaRPr lang="en-GB" dirty="0"/>
-          </a:p>
-          <a:p>
-            <a:pPr marL="342900" indent="-342900">
-              <a:buFont typeface="Arial" panose="020B0604020202020204" pitchFamily="34" charset="0"/>
-              <a:buChar char="•"/>
-            </a:pPr>
-            <a:r>
-              <a:rPr lang="en-GB" dirty="0"/>
-              <a:t>Packages are stored on CRAN (</a:t>
-            </a:r>
-            <a:r>
-              <a:rPr lang="en-GB" dirty="0">
-                <a:hlinkClick r:id="rId2"/>
-              </a:rPr>
-              <a:t>https://cran.r-project.org/web/packages/</a:t>
-            </a:r>
-            <a:r>
-              <a:rPr lang="en-GB" dirty="0"/>
-              <a:t>), over 18,000 packages are currently available.</a:t>
-            </a:r>
-          </a:p>
-          <a:p>
-            <a:pPr marL="342900" indent="-342900">
-              <a:buFont typeface="Arial" panose="020B0604020202020204" pitchFamily="34" charset="0"/>
-              <a:buChar char="•"/>
-            </a:pPr>
-            <a:endParaRPr lang="en-GB" dirty="0"/>
-          </a:p>
-          <a:p>
-            <a:pPr marL="342900" indent="-342900">
-              <a:buFont typeface="Arial" panose="020B0604020202020204" pitchFamily="34" charset="0"/>
-              <a:buChar char="•"/>
-            </a:pPr>
-            <a:r>
-              <a:rPr lang="en-GB" dirty="0"/>
-              <a:t>Packages should be installed using the function ‘</a:t>
-            </a:r>
-            <a:r>
-              <a:rPr lang="en-GB" dirty="0" err="1"/>
-              <a:t>install.packages</a:t>
-            </a:r>
-            <a:r>
-              <a:rPr lang="en-GB" dirty="0"/>
-              <a:t>()’ (only needed once)</a:t>
-            </a:r>
-          </a:p>
-          <a:p>
-            <a:pPr marL="342900" indent="-342900">
-              <a:buFont typeface="Arial" panose="020B0604020202020204" pitchFamily="34" charset="0"/>
-              <a:buChar char="•"/>
-            </a:pPr>
-            <a:endParaRPr lang="en-GB" dirty="0"/>
-          </a:p>
-          <a:p>
-            <a:pPr marL="342900" indent="-342900">
-              <a:buFont typeface="Arial" panose="020B0604020202020204" pitchFamily="34" charset="0"/>
-              <a:buChar char="•"/>
-            </a:pPr>
-            <a:r>
-              <a:rPr lang="en-GB" dirty="0"/>
-              <a:t>Once installed, packages are loaded using the function ‘library()’ (needed every time a new session is opened).</a:t>
-            </a:r>
-          </a:p>
-          <a:p>
-            <a:pPr marL="342900" indent="-342900">
-              <a:buFont typeface="Arial" panose="020B0604020202020204" pitchFamily="34" charset="0"/>
-              <a:buChar char="•"/>
-            </a:pPr>
-            <a:endParaRPr lang="en-GB" dirty="0"/>
-          </a:p>
-        </p:txBody>
-      </p:sp>
-    </p:spTree>
-    <p:extLst>
-      <p:ext uri="{BB962C8B-B14F-4D97-AF65-F5344CB8AC3E}">
-        <p14:creationId xmlns:p14="http://schemas.microsoft.com/office/powerpoint/2010/main" val="1758710244"/>
-      </p:ext>
-    </p:extLst>
-  </p:cSld>
-  <p:clrMapOvr>
-    <a:masterClrMapping/>
-  </p:clrMapOvr>
-  <p:timing>
-    <p:tnLst>
-      <p:par>
-        <p:cTn id="1" dur="indefinite" restart="never" nodeType="tmRoot">
-          <p:childTnLst>
-            <p:seq concurrent="1" nextAc="seek">
-              <p:cTn id="2" dur="indefinite" nodeType="mainSeq">
-                <p:childTnLst>
-                  <p:par>
-                    <p:cTn id="3" fill="hold">
-                      <p:stCondLst>
-                        <p:cond delay="indefinite"/>
-                      </p:stCondLst>
-                      <p:childTnLst>
-                        <p:par>
-                          <p:cTn id="4" fill="hold">
-                            <p:stCondLst>
-                              <p:cond delay="0"/>
-                            </p:stCondLst>
-                            <p:childTnLst>
-                              <p:par>
-                                <p:cTn id="5" presetID="1" presetClass="entr" presetSubtype="0" fill="hold" grpId="0" nodeType="clickEffect">
-                                  <p:stCondLst>
-                                    <p:cond delay="0"/>
-                                  </p:stCondLst>
-                                  <p:childTnLst>
-                                    <p:set>
-                                      <p:cBhvr>
-                                        <p:cTn id="6" dur="1" fill="hold">
-                                          <p:stCondLst>
-                                            <p:cond delay="0"/>
-                                          </p:stCondLst>
-                                        </p:cTn>
-                                        <p:tgtEl>
-                                          <p:spTgt spid="3">
-                                            <p:txEl>
-                                              <p:pRg st="0" end="0"/>
-                                            </p:txEl>
-                                          </p:spTgt>
-                                        </p:tgtEl>
-                                        <p:attrNameLst>
-                                          <p:attrName>style.visibility</p:attrName>
-                                        </p:attrNameLst>
-                                      </p:cBhvr>
-                                      <p:to>
-                                        <p:strVal val="visible"/>
-                                      </p:to>
-                                    </p:set>
-                                  </p:childTnLst>
-                                </p:cTn>
-                              </p:par>
-                            </p:childTnLst>
-                          </p:cTn>
-                        </p:par>
-                      </p:childTnLst>
-                    </p:cTn>
-                  </p:par>
-                  <p:par>
-                    <p:cTn id="7" fill="hold">
-                      <p:stCondLst>
-                        <p:cond delay="indefinite"/>
-                      </p:stCondLst>
-                      <p:childTnLst>
-                        <p:par>
-                          <p:cTn id="8" fill="hold">
-                            <p:stCondLst>
-                              <p:cond delay="0"/>
-                            </p:stCondLst>
-                            <p:childTnLst>
-                              <p:par>
-                                <p:cTn id="9" presetID="1" presetClass="entr" presetSubtype="0" fill="hold" grpId="0" nodeType="clickEffect">
-                                  <p:stCondLst>
-                                    <p:cond delay="0"/>
-                                  </p:stCondLst>
-                                  <p:childTnLst>
-                                    <p:set>
-                                      <p:cBhvr>
-                                        <p:cTn id="10" dur="1" fill="hold">
-                                          <p:stCondLst>
-                                            <p:cond delay="0"/>
-                                          </p:stCondLst>
-                                        </p:cTn>
-                                        <p:tgtEl>
-                                          <p:spTgt spid="3">
-                                            <p:txEl>
-                                              <p:pRg st="2" end="2"/>
-                                            </p:txEl>
-                                          </p:spTgt>
-                                        </p:tgtEl>
-                                        <p:attrNameLst>
-                                          <p:attrName>style.visibility</p:attrName>
-                                        </p:attrNameLst>
-                                      </p:cBhvr>
-                                      <p:to>
-                                        <p:strVal val="visible"/>
-                                      </p:to>
-                                    </p:set>
-                                  </p:childTnLst>
-                                </p:cTn>
-                              </p:par>
-                            </p:childTnLst>
-                          </p:cTn>
-                        </p:par>
-                      </p:childTnLst>
-                    </p:cTn>
-                  </p:par>
-                  <p:par>
-                    <p:cTn id="11" fill="hold">
-                      <p:stCondLst>
-                        <p:cond delay="indefinite"/>
-                      </p:stCondLst>
-                      <p:childTnLst>
-                        <p:par>
-                          <p:cTn id="12" fill="hold">
-                            <p:stCondLst>
-                              <p:cond delay="0"/>
-                            </p:stCondLst>
-                            <p:childTnLst>
-                              <p:par>
-                                <p:cTn id="13" presetID="1" presetClass="entr" presetSubtype="0" fill="hold" grpId="0" nodeType="clickEffect">
-                                  <p:stCondLst>
-                                    <p:cond delay="0"/>
-                                  </p:stCondLst>
-                                  <p:childTnLst>
-                                    <p:set>
-                                      <p:cBhvr>
-                                        <p:cTn id="14" dur="1" fill="hold">
-                                          <p:stCondLst>
-                                            <p:cond delay="0"/>
-                                          </p:stCondLst>
-                                        </p:cTn>
-                                        <p:tgtEl>
-                                          <p:spTgt spid="3">
-                                            <p:txEl>
-                                              <p:pRg st="4" end="4"/>
-                                            </p:txEl>
-                                          </p:spTgt>
-                                        </p:tgtEl>
-                                        <p:attrNameLst>
-                                          <p:attrName>style.visibility</p:attrName>
-                                        </p:attrNameLst>
-                                      </p:cBhvr>
-                                      <p:to>
-                                        <p:strVal val="visible"/>
-                                      </p:to>
-                                    </p:set>
-                                  </p:childTnLst>
-                                </p:cTn>
-                              </p:par>
-                            </p:childTnLst>
-                          </p:cTn>
-                        </p:par>
-                      </p:childTnLst>
-                    </p:cTn>
-                  </p:par>
-                  <p:par>
-                    <p:cTn id="15" fill="hold">
-                      <p:stCondLst>
-                        <p:cond delay="indefinite"/>
-                      </p:stCondLst>
-                      <p:childTnLst>
-                        <p:par>
-                          <p:cTn id="16" fill="hold">
-                            <p:stCondLst>
-                              <p:cond delay="0"/>
-                            </p:stCondLst>
-                            <p:childTnLst>
-                              <p:par>
-                                <p:cTn id="17" presetID="1" presetClass="entr" presetSubtype="0" fill="hold" grpId="0" nodeType="clickEffect">
-                                  <p:stCondLst>
-                                    <p:cond delay="0"/>
-                                  </p:stCondLst>
-                                  <p:childTnLst>
-                                    <p:set>
-                                      <p:cBhvr>
-                                        <p:cTn id="18" dur="1" fill="hold">
-                                          <p:stCondLst>
-                                            <p:cond delay="0"/>
-                                          </p:stCondLst>
-                                        </p:cTn>
-                                        <p:tgtEl>
-                                          <p:spTgt spid="3">
-                                            <p:txEl>
-                                              <p:pRg st="6" end="6"/>
-                                            </p:txEl>
-                                          </p:spTgt>
-                                        </p:tgtEl>
-                                        <p:attrNameLst>
-                                          <p:attrName>style.visibility</p:attrName>
-                                        </p:attrNameLst>
-                                      </p:cBhvr>
-                                      <p:to>
-                                        <p:strVal val="visible"/>
-                                      </p:to>
-                                    </p:set>
-                                  </p:childTnLst>
-                                </p:cTn>
-                              </p:par>
-                            </p:childTnLst>
-                          </p:cTn>
-                        </p:par>
-                      </p:childTnLst>
-                    </p:cTn>
-                  </p:par>
-                  <p:par>
-                    <p:cTn id="19" fill="hold">
-                      <p:stCondLst>
-                        <p:cond delay="indefinite"/>
-                      </p:stCondLst>
-                      <p:childTnLst>
-                        <p:par>
-                          <p:cTn id="20" fill="hold">
-                            <p:stCondLst>
-                              <p:cond delay="0"/>
-                            </p:stCondLst>
-                            <p:childTnLst>
-                              <p:par>
-                                <p:cTn id="21" presetID="1" presetClass="entr" presetSubtype="0" fill="hold" grpId="0" nodeType="clickEffect">
-                                  <p:stCondLst>
-                                    <p:cond delay="0"/>
-                                  </p:stCondLst>
-                                  <p:childTnLst>
-                                    <p:set>
-                                      <p:cBhvr>
-                                        <p:cTn id="22" dur="1" fill="hold">
-                                          <p:stCondLst>
-                                            <p:cond delay="0"/>
-                                          </p:stCondLst>
-                                        </p:cTn>
-                                        <p:tgtEl>
-                                          <p:spTgt spid="3">
-                                            <p:txEl>
-                                              <p:pRg st="8" end="8"/>
-                                            </p:txEl>
-                                          </p:spTgt>
-                                        </p:tgtEl>
-                                        <p:attrNameLst>
-                                          <p:attrName>style.visibility</p:attrName>
-                                        </p:attrNameLst>
-                                      </p:cBhvr>
-                                      <p:to>
-                                        <p:strVal val="visible"/>
-                                      </p:to>
-                                    </p:set>
-                                  </p:childTnLst>
-                                </p:cTn>
-                              </p:par>
-                            </p:childTnLst>
-                          </p:cTn>
-                        </p:par>
-                      </p:childTnLst>
-                    </p:cTn>
-                  </p:par>
-                </p:childTnLst>
-              </p:cTn>
-              <p:prevCondLst>
-                <p:cond evt="onPrev" delay="0">
-                  <p:tgtEl>
-                    <p:sldTgt/>
-                  </p:tgtEl>
-                </p:cond>
-              </p:prevCondLst>
-              <p:nextCondLst>
-                <p:cond evt="onNext" delay="0">
-                  <p:tgtEl>
-                    <p:sldTgt/>
-                  </p:tgtEl>
-                </p:cond>
-              </p:nextCondLst>
-            </p:seq>
-          </p:childTnLst>
-        </p:cTn>
-      </p:par>
-    </p:tnLst>
-    <p:bldLst>
-      <p:bldP spid="3" grpId="0" build="p"/>
-    </p:bldLst>
-  </p:timing>
-</p:sld>
-</file>
-
 <file path=ppt/slides/slide6.xml><?xml version="1.0" encoding="utf-8"?>
 <p:sld xmlns:a="http://schemas.openxmlformats.org/drawingml/2006/main" xmlns:r="http://schemas.openxmlformats.org/officeDocument/2006/relationships" xmlns:p="http://schemas.openxmlformats.org/presentationml/2006/main">
   <p:cSld>
@@ -7216,7 +7138,7 @@
           <p:cNvPr id="2" name="Title 1">
             <a:extLst>
               <a:ext uri="{FF2B5EF4-FFF2-40B4-BE49-F238E27FC236}">
-                <a16:creationId xmlns:a16="http://schemas.microsoft.com/office/drawing/2014/main" id="{00355A65-FD6C-401C-8B74-0E20D0FB85C1}"/>
+                <a16:creationId xmlns:a16="http://schemas.microsoft.com/office/drawing/2014/main" id="{34AD570E-32DE-42BA-8BA3-FF7A5AC00A15}"/>
               </a:ext>
             </a:extLst>
           </p:cNvPr>
@@ -7229,14 +7151,12 @@
         </p:nvSpPr>
         <p:spPr/>
         <p:txBody>
-          <a:bodyPr>
-            <a:normAutofit/>
-          </a:bodyPr>
+          <a:bodyPr/>
           <a:lstStyle/>
           <a:p>
             <a:r>
               <a:rPr lang="en-US" dirty="0"/>
-              <a:t>Example of importing and using a package: ggplot2</a:t>
+              <a:t>Packages</a:t>
             </a:r>
             <a:endParaRPr lang="en-GB" dirty="0"/>
           </a:p>
@@ -7247,7 +7167,7 @@
           <p:cNvPr id="3" name="Content Placeholder 2">
             <a:extLst>
               <a:ext uri="{FF2B5EF4-FFF2-40B4-BE49-F238E27FC236}">
-                <a16:creationId xmlns:a16="http://schemas.microsoft.com/office/drawing/2014/main" id="{AD57517A-35EC-4F66-83D4-8D16A7DEB483}"/>
+                <a16:creationId xmlns:a16="http://schemas.microsoft.com/office/drawing/2014/main" id="{E5238F85-F42E-44B2-AD97-F329F6AB511C}"/>
               </a:ext>
             </a:extLst>
           </p:cNvPr>
@@ -7258,7 +7178,12 @@
             <p:ph idx="1"/>
           </p:nvPr>
         </p:nvSpPr>
-        <p:spPr/>
+        <p:spPr>
+          <a:xfrm>
+            <a:off x="609599" y="1477818"/>
+            <a:ext cx="11325226" cy="4821382"/>
+          </a:xfrm>
+        </p:spPr>
         <p:txBody>
           <a:bodyPr/>
           <a:lstStyle/>
@@ -7269,7 +7194,7 @@
             </a:pPr>
             <a:r>
               <a:rPr lang="en-US" dirty="0"/>
-              <a:t>ggplot2 is one of the most popular packages for data visualization.</a:t>
+              <a:t>The functions used in the practical so far are included in base R.</a:t>
             </a:r>
           </a:p>
           <a:p>
@@ -7285,33 +7210,36 @@
               <a:buChar char="•"/>
             </a:pPr>
             <a:r>
-              <a:rPr lang="en-US" dirty="0"/>
-              <a:t>It can be more flexible than base R plots.</a:t>
-            </a:r>
-          </a:p>
-          <a:p>
-            <a:pPr marL="342900" indent="-342900">
-              <a:buFont typeface="Arial" panose="020B0604020202020204" pitchFamily="34" charset="0"/>
-              <a:buChar char="•"/>
-            </a:pPr>
-            <a:endParaRPr lang="en-US" dirty="0"/>
-          </a:p>
-          <a:p>
-            <a:pPr marL="342900" indent="-342900">
-              <a:buFont typeface="Arial" panose="020B0604020202020204" pitchFamily="34" charset="0"/>
-              <a:buChar char="•"/>
-            </a:pPr>
-            <a:r>
               <a:rPr lang="en-GB" dirty="0"/>
-              <a:t>The basic function is ‘</a:t>
-            </a:r>
-            <a:r>
-              <a:rPr lang="en-GB" dirty="0" err="1"/>
-              <a:t>ggplot</a:t>
+              <a:t>Packages are units of shareable code, and can include </a:t>
+            </a:r>
+            <a:r>
+              <a:rPr lang="en-GB" b="1" dirty="0"/>
+              <a:t>functions</a:t>
             </a:r>
             <a:r>
               <a:rPr lang="en-GB" dirty="0"/>
-              <a:t>()’, which returns an empty blank plot.</a:t>
+              <a:t>, </a:t>
+            </a:r>
+            <a:r>
+              <a:rPr lang="en-GB" b="1" dirty="0"/>
+              <a:t>data</a:t>
+            </a:r>
+            <a:r>
+              <a:rPr lang="en-GB" dirty="0"/>
+              <a:t>, </a:t>
+            </a:r>
+            <a:r>
+              <a:rPr lang="en-GB" b="1" dirty="0"/>
+              <a:t>documentation</a:t>
+            </a:r>
+            <a:r>
+              <a:rPr lang="en-GB" dirty="0"/>
+              <a:t>, and </a:t>
+            </a:r>
+            <a:r>
+              <a:rPr lang="en-GB" b="1" dirty="0"/>
+              <a:t>tests.</a:t>
             </a:r>
           </a:p>
           <a:p>
@@ -7328,7 +7256,17 @@
             </a:pPr>
             <a:r>
               <a:rPr lang="en-GB" dirty="0"/>
-              <a:t>Layers of information are then added to the plot, using various functions.</a:t>
+              <a:t>Packages are stored on CRAN (</a:t>
+            </a:r>
+            <a:r>
+              <a:rPr lang="en-GB" dirty="0">
+                <a:hlinkClick r:id="rId2"/>
+              </a:rPr>
+              <a:t>https://cran.r-project.org/web/packages/</a:t>
+            </a:r>
+            <a:r>
+              <a:rPr lang="en-GB" dirty="0"/>
+              <a:t>), over 18,000 packages are currently available.</a:t>
             </a:r>
           </a:p>
           <a:p>
@@ -7345,33 +7283,47 @@
             </a:pPr>
             <a:r>
               <a:rPr lang="en-GB" dirty="0"/>
-              <a:t>More information on ggplot2 can be found on the </a:t>
+              <a:t>Packages should be installed using the function ‘</a:t>
             </a:r>
             <a:r>
               <a:rPr lang="en-GB" dirty="0" err="1"/>
-              <a:t>cheatsheet</a:t>
+              <a:t>install.packages</a:t>
             </a:r>
             <a:r>
               <a:rPr lang="en-GB" dirty="0"/>
-              <a:t> and website (</a:t>
-            </a:r>
-            <a:r>
-              <a:rPr lang="en-GB" dirty="0">
-                <a:hlinkClick r:id="rId2"/>
-              </a:rPr>
-              <a:t>https://ggplot2.tidyverse.org/</a:t>
-            </a:r>
+              <a:t>()’ (only needed once)</a:t>
+            </a:r>
+          </a:p>
+          <a:p>
+            <a:pPr marL="342900" indent="-342900">
+              <a:buFont typeface="Arial" panose="020B0604020202020204" pitchFamily="34" charset="0"/>
+              <a:buChar char="•"/>
+            </a:pPr>
+            <a:endParaRPr lang="en-GB" dirty="0"/>
+          </a:p>
+          <a:p>
+            <a:pPr marL="342900" indent="-342900">
+              <a:buFont typeface="Arial" panose="020B0604020202020204" pitchFamily="34" charset="0"/>
+              <a:buChar char="•"/>
+            </a:pPr>
             <a:r>
               <a:rPr lang="en-GB" dirty="0"/>
-              <a:t>). </a:t>
-            </a:r>
+              <a:t>Once installed, packages are loaded using the function ‘library()’ (needed every time a new session is opened).</a:t>
+            </a:r>
+          </a:p>
+          <a:p>
+            <a:pPr marL="342900" indent="-342900">
+              <a:buFont typeface="Arial" panose="020B0604020202020204" pitchFamily="34" charset="0"/>
+              <a:buChar char="•"/>
+            </a:pPr>
+            <a:endParaRPr lang="en-GB" dirty="0"/>
           </a:p>
         </p:txBody>
       </p:sp>
     </p:spTree>
     <p:extLst>
       <p:ext uri="{BB962C8B-B14F-4D97-AF65-F5344CB8AC3E}">
-        <p14:creationId xmlns:p14="http://schemas.microsoft.com/office/powerpoint/2010/main" val="1328776277"/>
+        <p14:creationId xmlns:p14="http://schemas.microsoft.com/office/powerpoint/2010/main" val="1758710244"/>
       </p:ext>
     </p:extLst>
   </p:cSld>
@@ -7681,6 +7633,471 @@
           <p:cNvPr id="2" name="Title 1">
             <a:extLst>
               <a:ext uri="{FF2B5EF4-FFF2-40B4-BE49-F238E27FC236}">
+                <a16:creationId xmlns:a16="http://schemas.microsoft.com/office/drawing/2014/main" id="{00355A65-FD6C-401C-8B74-0E20D0FB85C1}"/>
+              </a:ext>
+            </a:extLst>
+          </p:cNvPr>
+          <p:cNvSpPr>
+            <a:spLocks noGrp="1"/>
+          </p:cNvSpPr>
+          <p:nvPr>
+            <p:ph type="title"/>
+          </p:nvPr>
+        </p:nvSpPr>
+        <p:spPr/>
+        <p:txBody>
+          <a:bodyPr>
+            <a:normAutofit/>
+          </a:bodyPr>
+          <a:lstStyle/>
+          <a:p>
+            <a:r>
+              <a:rPr lang="en-US" dirty="0"/>
+              <a:t>Example of importing and using a package: ggplot2</a:t>
+            </a:r>
+            <a:endParaRPr lang="en-GB" dirty="0"/>
+          </a:p>
+        </p:txBody>
+      </p:sp>
+      <p:sp>
+        <p:nvSpPr>
+          <p:cNvPr id="3" name="Content Placeholder 2">
+            <a:extLst>
+              <a:ext uri="{FF2B5EF4-FFF2-40B4-BE49-F238E27FC236}">
+                <a16:creationId xmlns:a16="http://schemas.microsoft.com/office/drawing/2014/main" id="{AD57517A-35EC-4F66-83D4-8D16A7DEB483}"/>
+              </a:ext>
+            </a:extLst>
+          </p:cNvPr>
+          <p:cNvSpPr>
+            <a:spLocks noGrp="1"/>
+          </p:cNvSpPr>
+          <p:nvPr>
+            <p:ph idx="1"/>
+          </p:nvPr>
+        </p:nvSpPr>
+        <p:spPr/>
+        <p:txBody>
+          <a:bodyPr/>
+          <a:lstStyle/>
+          <a:p>
+            <a:pPr marL="342900" indent="-342900">
+              <a:buFont typeface="Arial" panose="020B0604020202020204" pitchFamily="34" charset="0"/>
+              <a:buChar char="•"/>
+            </a:pPr>
+            <a:r>
+              <a:rPr lang="en-US" dirty="0"/>
+              <a:t>ggplot2 is one of the most popular packages for data visualization.</a:t>
+            </a:r>
+          </a:p>
+          <a:p>
+            <a:pPr marL="342900" indent="-342900">
+              <a:buFont typeface="Arial" panose="020B0604020202020204" pitchFamily="34" charset="0"/>
+              <a:buChar char="•"/>
+            </a:pPr>
+            <a:endParaRPr lang="en-US" dirty="0"/>
+          </a:p>
+          <a:p>
+            <a:pPr marL="342900" indent="-342900">
+              <a:buFont typeface="Arial" panose="020B0604020202020204" pitchFamily="34" charset="0"/>
+              <a:buChar char="•"/>
+            </a:pPr>
+            <a:r>
+              <a:rPr lang="en-US" dirty="0"/>
+              <a:t>It can be more flexible than base R plots.</a:t>
+            </a:r>
+          </a:p>
+          <a:p>
+            <a:pPr marL="342900" indent="-342900">
+              <a:buFont typeface="Arial" panose="020B0604020202020204" pitchFamily="34" charset="0"/>
+              <a:buChar char="•"/>
+            </a:pPr>
+            <a:endParaRPr lang="en-US" dirty="0"/>
+          </a:p>
+          <a:p>
+            <a:pPr marL="342900" indent="-342900">
+              <a:buFont typeface="Arial" panose="020B0604020202020204" pitchFamily="34" charset="0"/>
+              <a:buChar char="•"/>
+            </a:pPr>
+            <a:r>
+              <a:rPr lang="en-GB" dirty="0"/>
+              <a:t>The basic function is ‘</a:t>
+            </a:r>
+            <a:r>
+              <a:rPr lang="en-GB" dirty="0" err="1"/>
+              <a:t>ggplot</a:t>
+            </a:r>
+            <a:r>
+              <a:rPr lang="en-GB" dirty="0"/>
+              <a:t>()’, which returns an empty blank plot.</a:t>
+            </a:r>
+          </a:p>
+          <a:p>
+            <a:pPr marL="342900" indent="-342900">
+              <a:buFont typeface="Arial" panose="020B0604020202020204" pitchFamily="34" charset="0"/>
+              <a:buChar char="•"/>
+            </a:pPr>
+            <a:endParaRPr lang="en-GB" dirty="0"/>
+          </a:p>
+          <a:p>
+            <a:pPr marL="342900" indent="-342900">
+              <a:buFont typeface="Arial" panose="020B0604020202020204" pitchFamily="34" charset="0"/>
+              <a:buChar char="•"/>
+            </a:pPr>
+            <a:r>
+              <a:rPr lang="en-GB" dirty="0"/>
+              <a:t>Layers of information are then added to the plot, using various functions.</a:t>
+            </a:r>
+          </a:p>
+          <a:p>
+            <a:pPr marL="342900" indent="-342900">
+              <a:buFont typeface="Arial" panose="020B0604020202020204" pitchFamily="34" charset="0"/>
+              <a:buChar char="•"/>
+            </a:pPr>
+            <a:endParaRPr lang="en-GB" dirty="0"/>
+          </a:p>
+          <a:p>
+            <a:pPr marL="342900" indent="-342900">
+              <a:buFont typeface="Arial" panose="020B0604020202020204" pitchFamily="34" charset="0"/>
+              <a:buChar char="•"/>
+            </a:pPr>
+            <a:r>
+              <a:rPr lang="en-GB" dirty="0"/>
+              <a:t>More information on ggplot2 can be found on the </a:t>
+            </a:r>
+            <a:r>
+              <a:rPr lang="en-GB" dirty="0" err="1"/>
+              <a:t>cheatsheet</a:t>
+            </a:r>
+            <a:r>
+              <a:rPr lang="en-GB" dirty="0"/>
+              <a:t> and website (</a:t>
+            </a:r>
+            <a:r>
+              <a:rPr lang="en-GB" dirty="0">
+                <a:hlinkClick r:id="rId2"/>
+              </a:rPr>
+              <a:t>https://ggplot2.tidyverse.org/</a:t>
+            </a:r>
+            <a:r>
+              <a:rPr lang="en-GB" dirty="0"/>
+              <a:t>). </a:t>
+            </a:r>
+          </a:p>
+        </p:txBody>
+      </p:sp>
+    </p:spTree>
+    <p:extLst>
+      <p:ext uri="{BB962C8B-B14F-4D97-AF65-F5344CB8AC3E}">
+        <p14:creationId xmlns:p14="http://schemas.microsoft.com/office/powerpoint/2010/main" val="1328776277"/>
+      </p:ext>
+    </p:extLst>
+  </p:cSld>
+  <p:clrMapOvr>
+    <a:masterClrMapping/>
+  </p:clrMapOvr>
+  <p:timing>
+    <p:tnLst>
+      <p:par>
+        <p:cTn id="1" dur="indefinite" restart="never" nodeType="tmRoot">
+          <p:childTnLst>
+            <p:seq concurrent="1" nextAc="seek">
+              <p:cTn id="2" dur="indefinite" nodeType="mainSeq">
+                <p:childTnLst>
+                  <p:par>
+                    <p:cTn id="3" fill="hold">
+                      <p:stCondLst>
+                        <p:cond delay="indefinite"/>
+                      </p:stCondLst>
+                      <p:childTnLst>
+                        <p:par>
+                          <p:cTn id="4" fill="hold">
+                            <p:stCondLst>
+                              <p:cond delay="0"/>
+                            </p:stCondLst>
+                            <p:childTnLst>
+                              <p:par>
+                                <p:cTn id="5" presetID="1" presetClass="entr" presetSubtype="0" fill="hold" grpId="0" nodeType="clickEffect">
+                                  <p:stCondLst>
+                                    <p:cond delay="0"/>
+                                  </p:stCondLst>
+                                  <p:childTnLst>
+                                    <p:set>
+                                      <p:cBhvr>
+                                        <p:cTn id="6" dur="1" fill="hold">
+                                          <p:stCondLst>
+                                            <p:cond delay="0"/>
+                                          </p:stCondLst>
+                                        </p:cTn>
+                                        <p:tgtEl>
+                                          <p:spTgt spid="3">
+                                            <p:txEl>
+                                              <p:pRg st="0" end="0"/>
+                                            </p:txEl>
+                                          </p:spTgt>
+                                        </p:tgtEl>
+                                        <p:attrNameLst>
+                                          <p:attrName>style.visibility</p:attrName>
+                                        </p:attrNameLst>
+                                      </p:cBhvr>
+                                      <p:to>
+                                        <p:strVal val="visible"/>
+                                      </p:to>
+                                    </p:set>
+                                  </p:childTnLst>
+                                </p:cTn>
+                              </p:par>
+                            </p:childTnLst>
+                          </p:cTn>
+                        </p:par>
+                      </p:childTnLst>
+                    </p:cTn>
+                  </p:par>
+                  <p:par>
+                    <p:cTn id="7" fill="hold">
+                      <p:stCondLst>
+                        <p:cond delay="indefinite"/>
+                      </p:stCondLst>
+                      <p:childTnLst>
+                        <p:par>
+                          <p:cTn id="8" fill="hold">
+                            <p:stCondLst>
+                              <p:cond delay="0"/>
+                            </p:stCondLst>
+                            <p:childTnLst>
+                              <p:par>
+                                <p:cTn id="9" presetID="1" presetClass="entr" presetSubtype="0" fill="hold" grpId="0" nodeType="clickEffect">
+                                  <p:stCondLst>
+                                    <p:cond delay="0"/>
+                                  </p:stCondLst>
+                                  <p:childTnLst>
+                                    <p:set>
+                                      <p:cBhvr>
+                                        <p:cTn id="10" dur="1" fill="hold">
+                                          <p:stCondLst>
+                                            <p:cond delay="0"/>
+                                          </p:stCondLst>
+                                        </p:cTn>
+                                        <p:tgtEl>
+                                          <p:spTgt spid="3">
+                                            <p:txEl>
+                                              <p:pRg st="2" end="2"/>
+                                            </p:txEl>
+                                          </p:spTgt>
+                                        </p:tgtEl>
+                                        <p:attrNameLst>
+                                          <p:attrName>style.visibility</p:attrName>
+                                        </p:attrNameLst>
+                                      </p:cBhvr>
+                                      <p:to>
+                                        <p:strVal val="visible"/>
+                                      </p:to>
+                                    </p:set>
+                                  </p:childTnLst>
+                                </p:cTn>
+                              </p:par>
+                            </p:childTnLst>
+                          </p:cTn>
+                        </p:par>
+                      </p:childTnLst>
+                    </p:cTn>
+                  </p:par>
+                  <p:par>
+                    <p:cTn id="11" fill="hold">
+                      <p:stCondLst>
+                        <p:cond delay="indefinite"/>
+                      </p:stCondLst>
+                      <p:childTnLst>
+                        <p:par>
+                          <p:cTn id="12" fill="hold">
+                            <p:stCondLst>
+                              <p:cond delay="0"/>
+                            </p:stCondLst>
+                            <p:childTnLst>
+                              <p:par>
+                                <p:cTn id="13" presetID="1" presetClass="entr" presetSubtype="0" fill="hold" grpId="0" nodeType="clickEffect">
+                                  <p:stCondLst>
+                                    <p:cond delay="0"/>
+                                  </p:stCondLst>
+                                  <p:childTnLst>
+                                    <p:set>
+                                      <p:cBhvr>
+                                        <p:cTn id="14" dur="1" fill="hold">
+                                          <p:stCondLst>
+                                            <p:cond delay="0"/>
+                                          </p:stCondLst>
+                                        </p:cTn>
+                                        <p:tgtEl>
+                                          <p:spTgt spid="3">
+                                            <p:txEl>
+                                              <p:pRg st="4" end="4"/>
+                                            </p:txEl>
+                                          </p:spTgt>
+                                        </p:tgtEl>
+                                        <p:attrNameLst>
+                                          <p:attrName>style.visibility</p:attrName>
+                                        </p:attrNameLst>
+                                      </p:cBhvr>
+                                      <p:to>
+                                        <p:strVal val="visible"/>
+                                      </p:to>
+                                    </p:set>
+                                  </p:childTnLst>
+                                </p:cTn>
+                              </p:par>
+                            </p:childTnLst>
+                          </p:cTn>
+                        </p:par>
+                      </p:childTnLst>
+                    </p:cTn>
+                  </p:par>
+                  <p:par>
+                    <p:cTn id="15" fill="hold">
+                      <p:stCondLst>
+                        <p:cond delay="indefinite"/>
+                      </p:stCondLst>
+                      <p:childTnLst>
+                        <p:par>
+                          <p:cTn id="16" fill="hold">
+                            <p:stCondLst>
+                              <p:cond delay="0"/>
+                            </p:stCondLst>
+                            <p:childTnLst>
+                              <p:par>
+                                <p:cTn id="17" presetID="1" presetClass="entr" presetSubtype="0" fill="hold" grpId="0" nodeType="clickEffect">
+                                  <p:stCondLst>
+                                    <p:cond delay="0"/>
+                                  </p:stCondLst>
+                                  <p:childTnLst>
+                                    <p:set>
+                                      <p:cBhvr>
+                                        <p:cTn id="18" dur="1" fill="hold">
+                                          <p:stCondLst>
+                                            <p:cond delay="0"/>
+                                          </p:stCondLst>
+                                        </p:cTn>
+                                        <p:tgtEl>
+                                          <p:spTgt spid="3">
+                                            <p:txEl>
+                                              <p:pRg st="6" end="6"/>
+                                            </p:txEl>
+                                          </p:spTgt>
+                                        </p:tgtEl>
+                                        <p:attrNameLst>
+                                          <p:attrName>style.visibility</p:attrName>
+                                        </p:attrNameLst>
+                                      </p:cBhvr>
+                                      <p:to>
+                                        <p:strVal val="visible"/>
+                                      </p:to>
+                                    </p:set>
+                                  </p:childTnLst>
+                                </p:cTn>
+                              </p:par>
+                            </p:childTnLst>
+                          </p:cTn>
+                        </p:par>
+                      </p:childTnLst>
+                    </p:cTn>
+                  </p:par>
+                  <p:par>
+                    <p:cTn id="19" fill="hold">
+                      <p:stCondLst>
+                        <p:cond delay="indefinite"/>
+                      </p:stCondLst>
+                      <p:childTnLst>
+                        <p:par>
+                          <p:cTn id="20" fill="hold">
+                            <p:stCondLst>
+                              <p:cond delay="0"/>
+                            </p:stCondLst>
+                            <p:childTnLst>
+                              <p:par>
+                                <p:cTn id="21" presetID="1" presetClass="entr" presetSubtype="0" fill="hold" grpId="0" nodeType="clickEffect">
+                                  <p:stCondLst>
+                                    <p:cond delay="0"/>
+                                  </p:stCondLst>
+                                  <p:childTnLst>
+                                    <p:set>
+                                      <p:cBhvr>
+                                        <p:cTn id="22" dur="1" fill="hold">
+                                          <p:stCondLst>
+                                            <p:cond delay="0"/>
+                                          </p:stCondLst>
+                                        </p:cTn>
+                                        <p:tgtEl>
+                                          <p:spTgt spid="3">
+                                            <p:txEl>
+                                              <p:pRg st="8" end="8"/>
+                                            </p:txEl>
+                                          </p:spTgt>
+                                        </p:tgtEl>
+                                        <p:attrNameLst>
+                                          <p:attrName>style.visibility</p:attrName>
+                                        </p:attrNameLst>
+                                      </p:cBhvr>
+                                      <p:to>
+                                        <p:strVal val="visible"/>
+                                      </p:to>
+                                    </p:set>
+                                  </p:childTnLst>
+                                </p:cTn>
+                              </p:par>
+                            </p:childTnLst>
+                          </p:cTn>
+                        </p:par>
+                      </p:childTnLst>
+                    </p:cTn>
+                  </p:par>
+                </p:childTnLst>
+              </p:cTn>
+              <p:prevCondLst>
+                <p:cond evt="onPrev" delay="0">
+                  <p:tgtEl>
+                    <p:sldTgt/>
+                  </p:tgtEl>
+                </p:cond>
+              </p:prevCondLst>
+              <p:nextCondLst>
+                <p:cond evt="onNext" delay="0">
+                  <p:tgtEl>
+                    <p:sldTgt/>
+                  </p:tgtEl>
+                </p:cond>
+              </p:nextCondLst>
+            </p:seq>
+          </p:childTnLst>
+        </p:cTn>
+      </p:par>
+    </p:tnLst>
+    <p:bldLst>
+      <p:bldP spid="3" grpId="0" build="p"/>
+    </p:bldLst>
+  </p:timing>
+</p:sld>
+</file>
+
+<file path=ppt/slides/slide8.xml><?xml version="1.0" encoding="utf-8"?>
+<p:sld xmlns:a="http://schemas.openxmlformats.org/drawingml/2006/main" xmlns:r="http://schemas.openxmlformats.org/officeDocument/2006/relationships" xmlns:p="http://schemas.openxmlformats.org/presentationml/2006/main">
+  <p:cSld>
+    <p:spTree>
+      <p:nvGrpSpPr>
+        <p:cNvPr id="1" name=""/>
+        <p:cNvGrpSpPr/>
+        <p:nvPr/>
+      </p:nvGrpSpPr>
+      <p:grpSpPr>
+        <a:xfrm>
+          <a:off x="0" y="0"/>
+          <a:ext cx="0" cy="0"/>
+          <a:chOff x="0" y="0"/>
+          <a:chExt cx="0" cy="0"/>
+        </a:xfrm>
+      </p:grpSpPr>
+      <p:sp>
+        <p:nvSpPr>
+          <p:cNvPr id="2" name="Title 1">
+            <a:extLst>
+              <a:ext uri="{FF2B5EF4-FFF2-40B4-BE49-F238E27FC236}">
                 <a16:creationId xmlns:a16="http://schemas.microsoft.com/office/drawing/2014/main" id="{0494694A-369B-2B83-68B9-A5CFFBF5E733}"/>
               </a:ext>
             </a:extLst>
@@ -7730,7 +8147,111 @@
           <a:bodyPr/>
           <a:lstStyle/>
           <a:p>
-            <a:endParaRPr lang="en-GB"/>
+            <a:pPr marL="342900" indent="-342900">
+              <a:buFont typeface="Arial" panose="020B0604020202020204" pitchFamily="34" charset="0"/>
+              <a:buChar char="•"/>
+            </a:pPr>
+            <a:r>
+              <a:rPr lang="en-GB" dirty="0" err="1"/>
+              <a:t>dplyr</a:t>
+            </a:r>
+            <a:r>
+              <a:rPr lang="en-GB" dirty="0"/>
+              <a:t> is a package developed for handling and cleaning data</a:t>
+            </a:r>
+          </a:p>
+          <a:p>
+            <a:pPr marL="342900" indent="-342900">
+              <a:buFont typeface="Arial" panose="020B0604020202020204" pitchFamily="34" charset="0"/>
+              <a:buChar char="•"/>
+            </a:pPr>
+            <a:endParaRPr lang="en-GB" dirty="0"/>
+          </a:p>
+          <a:p>
+            <a:pPr marL="342900" indent="-342900">
+              <a:buFont typeface="Arial" panose="020B0604020202020204" pitchFamily="34" charset="0"/>
+              <a:buChar char="•"/>
+            </a:pPr>
+            <a:r>
+              <a:rPr lang="en-GB" dirty="0" err="1"/>
+              <a:t>dplyr</a:t>
+            </a:r>
+            <a:r>
+              <a:rPr lang="en-GB" dirty="0"/>
+              <a:t> contains a few commands to manipulate data:</a:t>
+            </a:r>
+          </a:p>
+          <a:p>
+            <a:pPr marL="1085850" lvl="1" indent="-342900">
+              <a:buFont typeface="Arial" panose="020B0604020202020204" pitchFamily="34" charset="0"/>
+              <a:buChar char="•"/>
+            </a:pPr>
+            <a:r>
+              <a:rPr lang="en-GB" dirty="0"/>
+              <a:t>filter(): select rows (depending on their value)</a:t>
+            </a:r>
+          </a:p>
+          <a:p>
+            <a:pPr marL="1085850" lvl="1" indent="-342900">
+              <a:buFont typeface="Arial" panose="020B0604020202020204" pitchFamily="34" charset="0"/>
+              <a:buChar char="•"/>
+            </a:pPr>
+            <a:r>
+              <a:rPr lang="en-GB" dirty="0"/>
+              <a:t>select(): select </a:t>
+            </a:r>
+            <a:r>
+              <a:rPr lang="en-GB" dirty="0" err="1"/>
+              <a:t>colums</a:t>
+            </a:r>
+            <a:r>
+              <a:rPr lang="en-GB" dirty="0"/>
+              <a:t> (depending on their value)</a:t>
+            </a:r>
+          </a:p>
+          <a:p>
+            <a:pPr marL="1085850" lvl="1" indent="-342900">
+              <a:buFont typeface="Arial" panose="020B0604020202020204" pitchFamily="34" charset="0"/>
+              <a:buChar char="•"/>
+            </a:pPr>
+            <a:r>
+              <a:rPr lang="en-GB" dirty="0"/>
+              <a:t>mutate(): add new variables</a:t>
+            </a:r>
+          </a:p>
+          <a:p>
+            <a:pPr marL="1085850" lvl="1" indent="-342900">
+              <a:buFont typeface="Arial" panose="020B0604020202020204" pitchFamily="34" charset="0"/>
+              <a:buChar char="•"/>
+            </a:pPr>
+            <a:r>
+              <a:rPr lang="en-GB" dirty="0"/>
+              <a:t>arrange(): change the order of the rows</a:t>
+            </a:r>
+          </a:p>
+          <a:p>
+            <a:pPr marL="1085850" lvl="1" indent="-342900">
+              <a:buFont typeface="Arial" panose="020B0604020202020204" pitchFamily="34" charset="0"/>
+              <a:buChar char="•"/>
+            </a:pPr>
+            <a:r>
+              <a:rPr lang="en-GB" dirty="0"/>
+              <a:t>summarise(): compute summary statistics</a:t>
+            </a:r>
+          </a:p>
+          <a:p>
+            <a:pPr marL="1085850" lvl="1" indent="-342900">
+              <a:buFont typeface="Arial" panose="020B0604020202020204" pitchFamily="34" charset="0"/>
+              <a:buChar char="•"/>
+            </a:pPr>
+            <a:r>
+              <a:rPr lang="en-GB" dirty="0" err="1"/>
+              <a:t>group_by</a:t>
+            </a:r>
+            <a:r>
+              <a:rPr lang="en-GB" dirty="0"/>
+              <a:t>(): group rows together</a:t>
+            </a:r>
           </a:p>
         </p:txBody>
       </p:sp>
@@ -7747,7 +8268,7 @@
 </p:sld>
 </file>
 
-<file path=ppt/slides/slide8.xml><?xml version="1.0" encoding="utf-8"?>
+<file path=ppt/slides/slide9.xml><?xml version="1.0" encoding="utf-8"?>
 <p:sld xmlns:a="http://schemas.openxmlformats.org/drawingml/2006/main" xmlns:r="http://schemas.openxmlformats.org/officeDocument/2006/relationships" xmlns:p="http://schemas.openxmlformats.org/presentationml/2006/main">
   <p:cSld>
     <p:spTree>
@@ -8310,228 +8831,6 @@
       <p:bldP spid="3" grpId="0" uiExpand="1" build="p"/>
     </p:bldLst>
   </p:timing>
-</p:sld>
-</file>
-
-<file path=ppt/slides/slide9.xml><?xml version="1.0" encoding="utf-8"?>
-<p:sld xmlns:a="http://schemas.openxmlformats.org/drawingml/2006/main" xmlns:r="http://schemas.openxmlformats.org/officeDocument/2006/relationships" xmlns:p="http://schemas.openxmlformats.org/presentationml/2006/main">
-  <p:cSld>
-    <p:spTree>
-      <p:nvGrpSpPr>
-        <p:cNvPr id="1" name=""/>
-        <p:cNvGrpSpPr/>
-        <p:nvPr/>
-      </p:nvGrpSpPr>
-      <p:grpSpPr>
-        <a:xfrm>
-          <a:off x="0" y="0"/>
-          <a:ext cx="0" cy="0"/>
-          <a:chOff x="0" y="0"/>
-          <a:chExt cx="0" cy="0"/>
-        </a:xfrm>
-      </p:grpSpPr>
-      <p:sp>
-        <p:nvSpPr>
-          <p:cNvPr id="2" name="Title 1">
-            <a:extLst>
-              <a:ext uri="{FF2B5EF4-FFF2-40B4-BE49-F238E27FC236}">
-                <a16:creationId xmlns:a16="http://schemas.microsoft.com/office/drawing/2014/main" id="{A1FFF348-256A-419B-94A5-1E1296D1F338}"/>
-              </a:ext>
-            </a:extLst>
-          </p:cNvPr>
-          <p:cNvSpPr>
-            <a:spLocks noGrp="1"/>
-          </p:cNvSpPr>
-          <p:nvPr>
-            <p:ph type="title"/>
-          </p:nvPr>
-        </p:nvSpPr>
-        <p:spPr/>
-        <p:txBody>
-          <a:bodyPr/>
-          <a:lstStyle/>
-          <a:p>
-            <a:r>
-              <a:rPr lang="en-US" dirty="0"/>
-              <a:t>Further resources</a:t>
-            </a:r>
-            <a:endParaRPr lang="en-GB" dirty="0"/>
-          </a:p>
-        </p:txBody>
-      </p:sp>
-      <p:sp>
-        <p:nvSpPr>
-          <p:cNvPr id="3" name="Content Placeholder 2">
-            <a:extLst>
-              <a:ext uri="{FF2B5EF4-FFF2-40B4-BE49-F238E27FC236}">
-                <a16:creationId xmlns:a16="http://schemas.microsoft.com/office/drawing/2014/main" id="{D9F956DB-4DF0-4E24-84E4-DA013CE75541}"/>
-              </a:ext>
-            </a:extLst>
-          </p:cNvPr>
-          <p:cNvSpPr>
-            <a:spLocks noGrp="1"/>
-          </p:cNvSpPr>
-          <p:nvPr>
-            <p:ph idx="1"/>
-          </p:nvPr>
-        </p:nvSpPr>
-        <p:spPr>
-          <a:xfrm>
-            <a:off x="438151" y="1477818"/>
-            <a:ext cx="11753850" cy="4821382"/>
-          </a:xfrm>
-        </p:spPr>
-        <p:txBody>
-          <a:bodyPr/>
-          <a:lstStyle/>
-          <a:p>
-            <a:pPr marL="342900" indent="-342900">
-              <a:buFont typeface="Arial" panose="020B0604020202020204" pitchFamily="34" charset="0"/>
-              <a:buChar char="•"/>
-            </a:pPr>
-            <a:r>
-              <a:rPr lang="en-US" dirty="0"/>
-              <a:t>Excellent summary of functions used for data analysis and visualization </a:t>
-            </a:r>
-            <a:r>
-              <a:rPr lang="en-US" dirty="0">
-                <a:hlinkClick r:id="rId2"/>
-              </a:rPr>
-              <a:t>https://r4ds.had.co.nz/index.html</a:t>
-            </a:r>
-            <a:r>
-              <a:rPr lang="en-US" dirty="0"/>
-              <a:t> </a:t>
-            </a:r>
-          </a:p>
-          <a:p>
-            <a:pPr marL="342900" indent="-342900">
-              <a:buFont typeface="Arial" panose="020B0604020202020204" pitchFamily="34" charset="0"/>
-              <a:buChar char="•"/>
-            </a:pPr>
-            <a:endParaRPr lang="en-US" dirty="0"/>
-          </a:p>
-          <a:p>
-            <a:pPr marL="342900" indent="-342900">
-              <a:buFont typeface="Arial" panose="020B0604020202020204" pitchFamily="34" charset="0"/>
-              <a:buChar char="•"/>
-            </a:pPr>
-            <a:r>
-              <a:rPr lang="en-US" dirty="0"/>
-              <a:t>Making graphs in R: </a:t>
-            </a:r>
-            <a:r>
-              <a:rPr lang="en-US" dirty="0">
-                <a:hlinkClick r:id="rId3"/>
-              </a:rPr>
-              <a:t>http://www.cookbook-r.com/Graphs/</a:t>
-            </a:r>
-            <a:r>
-              <a:rPr lang="en-US" dirty="0"/>
-              <a:t> </a:t>
-            </a:r>
-          </a:p>
-          <a:p>
-            <a:pPr marL="342900" indent="-342900">
-              <a:buFont typeface="Arial" panose="020B0604020202020204" pitchFamily="34" charset="0"/>
-              <a:buChar char="•"/>
-            </a:pPr>
-            <a:endParaRPr lang="en-US" dirty="0"/>
-          </a:p>
-          <a:p>
-            <a:pPr marL="342900" indent="-342900">
-              <a:buFont typeface="Arial" panose="020B0604020202020204" pitchFamily="34" charset="0"/>
-              <a:buChar char="•"/>
-            </a:pPr>
-            <a:r>
-              <a:rPr lang="en-US" dirty="0"/>
-              <a:t>For an introduction to packages and development: </a:t>
-            </a:r>
-            <a:r>
-              <a:rPr lang="en-US" dirty="0">
-                <a:hlinkClick r:id="rId4"/>
-              </a:rPr>
-              <a:t>https://r-pkgs.org/intro.html</a:t>
-            </a:r>
-            <a:r>
-              <a:rPr lang="en-US" dirty="0"/>
-              <a:t> </a:t>
-            </a:r>
-          </a:p>
-          <a:p>
-            <a:pPr marL="342900" indent="-342900">
-              <a:buFont typeface="Arial" panose="020B0604020202020204" pitchFamily="34" charset="0"/>
-              <a:buChar char="•"/>
-            </a:pPr>
-            <a:endParaRPr lang="en-US" dirty="0"/>
-          </a:p>
-          <a:p>
-            <a:pPr marL="342900" indent="-342900">
-              <a:buFont typeface="Arial" panose="020B0604020202020204" pitchFamily="34" charset="0"/>
-              <a:buChar char="•"/>
-            </a:pPr>
-            <a:r>
-              <a:rPr lang="en-GB" dirty="0"/>
-              <a:t>The </a:t>
-            </a:r>
-            <a:r>
-              <a:rPr lang="en-GB" dirty="0" err="1"/>
-              <a:t>cheatsheets</a:t>
-            </a:r>
-            <a:r>
-              <a:rPr lang="en-GB" dirty="0"/>
-              <a:t> of various R packages: </a:t>
-            </a:r>
-            <a:r>
-              <a:rPr lang="en-GB" dirty="0">
-                <a:hlinkClick r:id="rId5"/>
-              </a:rPr>
-              <a:t>https://www.rstudio.com/resources/cheatsheets/</a:t>
-            </a:r>
-            <a:r>
-              <a:rPr lang="en-GB" dirty="0"/>
-              <a:t> </a:t>
-            </a:r>
-          </a:p>
-          <a:p>
-            <a:pPr marL="342900" indent="-342900">
-              <a:buFont typeface="Arial" panose="020B0604020202020204" pitchFamily="34" charset="0"/>
-              <a:buChar char="•"/>
-            </a:pPr>
-            <a:endParaRPr lang="en-GB" dirty="0"/>
-          </a:p>
-          <a:p>
-            <a:pPr marL="342900" indent="-342900">
-              <a:buFont typeface="Arial" panose="020B0604020202020204" pitchFamily="34" charset="0"/>
-              <a:buChar char="•"/>
-            </a:pPr>
-            <a:r>
-              <a:rPr lang="en-GB" dirty="0"/>
-              <a:t>For all questions answered by the R community: </a:t>
-            </a:r>
-            <a:r>
-              <a:rPr lang="en-GB" dirty="0">
-                <a:hlinkClick r:id="rId6"/>
-              </a:rPr>
-              <a:t>https://stackoverflow.com/</a:t>
-            </a:r>
-            <a:r>
-              <a:rPr lang="en-GB" dirty="0"/>
-              <a:t> </a:t>
-            </a:r>
-          </a:p>
-        </p:txBody>
-      </p:sp>
-    </p:spTree>
-    <p:extLst>
-      <p:ext uri="{BB962C8B-B14F-4D97-AF65-F5344CB8AC3E}">
-        <p14:creationId xmlns:p14="http://schemas.microsoft.com/office/powerpoint/2010/main" val="764438216"/>
-      </p:ext>
-    </p:extLst>
-  </p:cSld>
-  <p:clrMapOvr>
-    <a:masterClrMapping/>
-  </p:clrMapOvr>
 </p:sld>
 </file>
 

</xml_diff>

<commit_message>
Add slides on ggplot2
</commit_message>
<xml_diff>
--- a/session_2/SLIDES_introduction_to_R_2.pptx
+++ b/session_2/SLIDES_introduction_to_R_2.pptx
@@ -12,10 +12,17 @@
     <p:sldId id="395" r:id="rId6"/>
     <p:sldId id="397" r:id="rId7"/>
     <p:sldId id="388" r:id="rId8"/>
-    <p:sldId id="389" r:id="rId9"/>
-    <p:sldId id="396" r:id="rId10"/>
-    <p:sldId id="393" r:id="rId11"/>
-    <p:sldId id="392" r:id="rId12"/>
+    <p:sldId id="398" r:id="rId9"/>
+    <p:sldId id="399" r:id="rId10"/>
+    <p:sldId id="400" r:id="rId11"/>
+    <p:sldId id="404" r:id="rId12"/>
+    <p:sldId id="401" r:id="rId13"/>
+    <p:sldId id="403" r:id="rId14"/>
+    <p:sldId id="405" r:id="rId15"/>
+    <p:sldId id="406" r:id="rId16"/>
+    <p:sldId id="396" r:id="rId17"/>
+    <p:sldId id="393" r:id="rId18"/>
+    <p:sldId id="392" r:id="rId19"/>
   </p:sldIdLst>
   <p:sldSz cx="12192000" cy="6858000"/>
   <p:notesSz cx="6858000" cy="9144000"/>
@@ -271,7 +278,7 @@
           <a:p>
             <a:fld id="{E37723A7-B92E-4635-B4A4-B660A270521F}" type="datetimeFigureOut">
               <a:rPr lang="en-GB" smtClean="0"/>
-              <a:t>17/11/2022</a:t>
+              <a:t>18/11/2022</a:t>
             </a:fld>
             <a:endParaRPr lang="en-GB"/>
           </a:p>
@@ -471,7 +478,7 @@
           <a:p>
             <a:fld id="{E37723A7-B92E-4635-B4A4-B660A270521F}" type="datetimeFigureOut">
               <a:rPr lang="en-GB" smtClean="0"/>
-              <a:t>17/11/2022</a:t>
+              <a:t>18/11/2022</a:t>
             </a:fld>
             <a:endParaRPr lang="en-GB"/>
           </a:p>
@@ -681,7 +688,7 @@
           <a:p>
             <a:fld id="{E37723A7-B92E-4635-B4A4-B660A270521F}" type="datetimeFigureOut">
               <a:rPr lang="en-GB" smtClean="0"/>
-              <a:t>17/11/2022</a:t>
+              <a:t>18/11/2022</a:t>
             </a:fld>
             <a:endParaRPr lang="en-GB"/>
           </a:p>
@@ -2093,7 +2100,7 @@
           <a:p>
             <a:fld id="{E37723A7-B92E-4635-B4A4-B660A270521F}" type="datetimeFigureOut">
               <a:rPr lang="en-GB" smtClean="0"/>
-              <a:t>17/11/2022</a:t>
+              <a:t>18/11/2022</a:t>
             </a:fld>
             <a:endParaRPr lang="en-GB"/>
           </a:p>
@@ -2369,7 +2376,7 @@
           <a:p>
             <a:fld id="{E37723A7-B92E-4635-B4A4-B660A270521F}" type="datetimeFigureOut">
               <a:rPr lang="en-GB" smtClean="0"/>
-              <a:t>17/11/2022</a:t>
+              <a:t>18/11/2022</a:t>
             </a:fld>
             <a:endParaRPr lang="en-GB"/>
           </a:p>
@@ -2637,7 +2644,7 @@
           <a:p>
             <a:fld id="{E37723A7-B92E-4635-B4A4-B660A270521F}" type="datetimeFigureOut">
               <a:rPr lang="en-GB" smtClean="0"/>
-              <a:t>17/11/2022</a:t>
+              <a:t>18/11/2022</a:t>
             </a:fld>
             <a:endParaRPr lang="en-GB"/>
           </a:p>
@@ -3052,7 +3059,7 @@
           <a:p>
             <a:fld id="{E37723A7-B92E-4635-B4A4-B660A270521F}" type="datetimeFigureOut">
               <a:rPr lang="en-GB" smtClean="0"/>
-              <a:t>17/11/2022</a:t>
+              <a:t>18/11/2022</a:t>
             </a:fld>
             <a:endParaRPr lang="en-GB"/>
           </a:p>
@@ -3194,7 +3201,7 @@
           <a:p>
             <a:fld id="{E37723A7-B92E-4635-B4A4-B660A270521F}" type="datetimeFigureOut">
               <a:rPr lang="en-GB" smtClean="0"/>
-              <a:t>17/11/2022</a:t>
+              <a:t>18/11/2022</a:t>
             </a:fld>
             <a:endParaRPr lang="en-GB"/>
           </a:p>
@@ -3307,7 +3314,7 @@
           <a:p>
             <a:fld id="{E37723A7-B92E-4635-B4A4-B660A270521F}" type="datetimeFigureOut">
               <a:rPr lang="en-GB" smtClean="0"/>
-              <a:t>17/11/2022</a:t>
+              <a:t>18/11/2022</a:t>
             </a:fld>
             <a:endParaRPr lang="en-GB"/>
           </a:p>
@@ -3620,7 +3627,7 @@
           <a:p>
             <a:fld id="{E37723A7-B92E-4635-B4A4-B660A270521F}" type="datetimeFigureOut">
               <a:rPr lang="en-GB" smtClean="0"/>
-              <a:t>17/11/2022</a:t>
+              <a:t>18/11/2022</a:t>
             </a:fld>
             <a:endParaRPr lang="en-GB"/>
           </a:p>
@@ -3909,7 +3916,7 @@
           <a:p>
             <a:fld id="{E37723A7-B92E-4635-B4A4-B660A270521F}" type="datetimeFigureOut">
               <a:rPr lang="en-GB" smtClean="0"/>
-              <a:t>17/11/2022</a:t>
+              <a:t>18/11/2022</a:t>
             </a:fld>
             <a:endParaRPr lang="en-GB"/>
           </a:p>
@@ -4152,7 +4159,7 @@
           <a:p>
             <a:fld id="{E37723A7-B92E-4635-B4A4-B660A270521F}" type="datetimeFigureOut">
               <a:rPr lang="en-GB" smtClean="0"/>
-              <a:t>17/11/2022</a:t>
+              <a:t>18/11/2022</a:t>
             </a:fld>
             <a:endParaRPr lang="en-GB"/>
           </a:p>
@@ -5261,6 +5268,2106 @@
           <p:cNvPr id="2" name="Title 1">
             <a:extLst>
               <a:ext uri="{FF2B5EF4-FFF2-40B4-BE49-F238E27FC236}">
+                <a16:creationId xmlns:a16="http://schemas.microsoft.com/office/drawing/2014/main" id="{0494694A-369B-2B83-68B9-A5CFFBF5E733}"/>
+              </a:ext>
+            </a:extLst>
+          </p:cNvPr>
+          <p:cNvSpPr>
+            <a:spLocks noGrp="1"/>
+          </p:cNvSpPr>
+          <p:nvPr>
+            <p:ph type="title"/>
+          </p:nvPr>
+        </p:nvSpPr>
+        <p:spPr/>
+        <p:txBody>
+          <a:bodyPr/>
+          <a:lstStyle/>
+          <a:p>
+            <a:r>
+              <a:rPr lang="en-US" dirty="0"/>
+              <a:t>ggplot2, step 2</a:t>
+            </a:r>
+            <a:endParaRPr lang="en-GB" dirty="0"/>
+          </a:p>
+        </p:txBody>
+      </p:sp>
+      <p:sp>
+        <p:nvSpPr>
+          <p:cNvPr id="9" name="TextBox 8">
+            <a:extLst>
+              <a:ext uri="{FF2B5EF4-FFF2-40B4-BE49-F238E27FC236}">
+                <a16:creationId xmlns:a16="http://schemas.microsoft.com/office/drawing/2014/main" id="{A22918F9-0F46-56B6-3FDE-0CBFC98923E4}"/>
+              </a:ext>
+            </a:extLst>
+          </p:cNvPr>
+          <p:cNvSpPr txBox="1"/>
+          <p:nvPr/>
+        </p:nvSpPr>
+        <p:spPr>
+          <a:xfrm>
+            <a:off x="8931545" y="1794284"/>
+            <a:ext cx="907621" cy="369332"/>
+          </a:xfrm>
+          <a:prstGeom prst="rect">
+            <a:avLst/>
+          </a:prstGeom>
+          <a:noFill/>
+        </p:spPr>
+        <p:txBody>
+          <a:bodyPr wrap="none" rtlCol="0">
+            <a:spAutoFit/>
+          </a:bodyPr>
+          <a:lstStyle/>
+          <a:p>
+            <a:r>
+              <a:rPr lang="en-US" b="1" dirty="0"/>
+              <a:t>Output</a:t>
+            </a:r>
+          </a:p>
+        </p:txBody>
+      </p:sp>
+      <p:pic>
+        <p:nvPicPr>
+          <p:cNvPr id="7" name="Picture 6">
+            <a:extLst>
+              <a:ext uri="{FF2B5EF4-FFF2-40B4-BE49-F238E27FC236}">
+                <a16:creationId xmlns:a16="http://schemas.microsoft.com/office/drawing/2014/main" id="{35A91161-F3ED-08E9-28EB-CF824E9E7E55}"/>
+              </a:ext>
+            </a:extLst>
+          </p:cNvPr>
+          <p:cNvPicPr>
+            <a:picLocks noChangeAspect="1"/>
+          </p:cNvPicPr>
+          <p:nvPr/>
+        </p:nvPicPr>
+        <p:blipFill>
+          <a:blip r:embed="rId2"/>
+          <a:stretch>
+            <a:fillRect/>
+          </a:stretch>
+        </p:blipFill>
+        <p:spPr>
+          <a:xfrm>
+            <a:off x="7652658" y="2163616"/>
+            <a:ext cx="3222171" cy="3222171"/>
+          </a:xfrm>
+          <a:prstGeom prst="rect">
+            <a:avLst/>
+          </a:prstGeom>
+        </p:spPr>
+      </p:pic>
+      <p:pic>
+        <p:nvPicPr>
+          <p:cNvPr id="8" name="Picture 7">
+            <a:extLst>
+              <a:ext uri="{FF2B5EF4-FFF2-40B4-BE49-F238E27FC236}">
+                <a16:creationId xmlns:a16="http://schemas.microsoft.com/office/drawing/2014/main" id="{B2575200-DA97-3C9C-78C2-29D15517D2D2}"/>
+              </a:ext>
+            </a:extLst>
+          </p:cNvPr>
+          <p:cNvPicPr>
+            <a:picLocks noChangeAspect="1"/>
+          </p:cNvPicPr>
+          <p:nvPr/>
+        </p:nvPicPr>
+        <p:blipFill rotWithShape="1">
+          <a:blip r:embed="rId3"/>
+          <a:srcRect l="1821" t="9834" r="55322" b="57395"/>
+          <a:stretch/>
+        </p:blipFill>
+        <p:spPr>
+          <a:xfrm>
+            <a:off x="1023257" y="2481943"/>
+            <a:ext cx="5314733" cy="2539999"/>
+          </a:xfrm>
+          <a:prstGeom prst="rect">
+            <a:avLst/>
+          </a:prstGeom>
+        </p:spPr>
+      </p:pic>
+      <p:sp>
+        <p:nvSpPr>
+          <p:cNvPr id="6" name="Rectangle 5">
+            <a:extLst>
+              <a:ext uri="{FF2B5EF4-FFF2-40B4-BE49-F238E27FC236}">
+                <a16:creationId xmlns:a16="http://schemas.microsoft.com/office/drawing/2014/main" id="{AF391E97-F268-7634-FC4B-73E136FC7199}"/>
+              </a:ext>
+            </a:extLst>
+          </p:cNvPr>
+          <p:cNvSpPr/>
+          <p:nvPr/>
+        </p:nvSpPr>
+        <p:spPr>
+          <a:xfrm>
+            <a:off x="1156370" y="4152737"/>
+            <a:ext cx="4253830" cy="781132"/>
+          </a:xfrm>
+          <a:prstGeom prst="rect">
+            <a:avLst/>
+          </a:prstGeom>
+          <a:noFill/>
+          <a:ln w="38100">
+            <a:solidFill>
+              <a:schemeClr val="accent5"/>
+            </a:solidFill>
+          </a:ln>
+          <a:effectLst/>
+        </p:spPr>
+        <p:style>
+          <a:lnRef idx="1">
+            <a:schemeClr val="accent1"/>
+          </a:lnRef>
+          <a:fillRef idx="3">
+            <a:schemeClr val="accent1"/>
+          </a:fillRef>
+          <a:effectRef idx="2">
+            <a:schemeClr val="accent1"/>
+          </a:effectRef>
+          <a:fontRef idx="minor">
+            <a:schemeClr val="lt1"/>
+          </a:fontRef>
+        </p:style>
+        <p:txBody>
+          <a:bodyPr rtlCol="0" anchor="ctr"/>
+          <a:lstStyle/>
+          <a:p>
+            <a:pPr algn="ctr"/>
+            <a:endParaRPr lang="en-US"/>
+          </a:p>
+        </p:txBody>
+      </p:sp>
+    </p:spTree>
+    <p:extLst>
+      <p:ext uri="{BB962C8B-B14F-4D97-AF65-F5344CB8AC3E}">
+        <p14:creationId xmlns:p14="http://schemas.microsoft.com/office/powerpoint/2010/main" val="3911228862"/>
+      </p:ext>
+    </p:extLst>
+  </p:cSld>
+  <p:clrMapOvr>
+    <a:masterClrMapping/>
+  </p:clrMapOvr>
+</p:sld>
+</file>
+
+<file path=ppt/slides/slide11.xml><?xml version="1.0" encoding="utf-8"?>
+<p:sld xmlns:a="http://schemas.openxmlformats.org/drawingml/2006/main" xmlns:r="http://schemas.openxmlformats.org/officeDocument/2006/relationships" xmlns:p="http://schemas.openxmlformats.org/presentationml/2006/main">
+  <p:cSld>
+    <p:spTree>
+      <p:nvGrpSpPr>
+        <p:cNvPr id="1" name=""/>
+        <p:cNvGrpSpPr/>
+        <p:nvPr/>
+      </p:nvGrpSpPr>
+      <p:grpSpPr>
+        <a:xfrm>
+          <a:off x="0" y="0"/>
+          <a:ext cx="0" cy="0"/>
+          <a:chOff x="0" y="0"/>
+          <a:chExt cx="0" cy="0"/>
+        </a:xfrm>
+      </p:grpSpPr>
+      <p:sp>
+        <p:nvSpPr>
+          <p:cNvPr id="2" name="Title 1">
+            <a:extLst>
+              <a:ext uri="{FF2B5EF4-FFF2-40B4-BE49-F238E27FC236}">
+                <a16:creationId xmlns:a16="http://schemas.microsoft.com/office/drawing/2014/main" id="{0494694A-369B-2B83-68B9-A5CFFBF5E733}"/>
+              </a:ext>
+            </a:extLst>
+          </p:cNvPr>
+          <p:cNvSpPr>
+            <a:spLocks noGrp="1"/>
+          </p:cNvSpPr>
+          <p:nvPr>
+            <p:ph type="title"/>
+          </p:nvPr>
+        </p:nvSpPr>
+        <p:spPr/>
+        <p:txBody>
+          <a:bodyPr/>
+          <a:lstStyle/>
+          <a:p>
+            <a:r>
+              <a:rPr lang="en-US" dirty="0"/>
+              <a:t>ggplot2, step 3</a:t>
+            </a:r>
+            <a:endParaRPr lang="en-GB" dirty="0"/>
+          </a:p>
+        </p:txBody>
+      </p:sp>
+      <p:sp>
+        <p:nvSpPr>
+          <p:cNvPr id="3" name="Content Placeholder 2">
+            <a:extLst>
+              <a:ext uri="{FF2B5EF4-FFF2-40B4-BE49-F238E27FC236}">
+                <a16:creationId xmlns:a16="http://schemas.microsoft.com/office/drawing/2014/main" id="{1DE2EACC-629E-3BED-0F35-917C8154711F}"/>
+              </a:ext>
+            </a:extLst>
+          </p:cNvPr>
+          <p:cNvSpPr>
+            <a:spLocks noGrp="1"/>
+          </p:cNvSpPr>
+          <p:nvPr>
+            <p:ph idx="1"/>
+          </p:nvPr>
+        </p:nvSpPr>
+        <p:spPr/>
+        <p:txBody>
+          <a:bodyPr/>
+          <a:lstStyle/>
+          <a:p>
+            <a:pPr>
+              <a:spcBef>
+                <a:spcPts val="0"/>
+              </a:spcBef>
+              <a:spcAft>
+                <a:spcPts val="1200"/>
+              </a:spcAft>
+            </a:pPr>
+            <a:r>
+              <a:rPr lang="en-US" sz="2400" b="1" dirty="0"/>
+              <a:t>Step 3: Tell R how you want to plot these data </a:t>
+            </a:r>
+          </a:p>
+          <a:p>
+            <a:pPr marL="342900" indent="-342900">
+              <a:spcBef>
+                <a:spcPts val="0"/>
+              </a:spcBef>
+              <a:spcAft>
+                <a:spcPts val="1200"/>
+              </a:spcAft>
+              <a:buFont typeface="Arial" panose="020B0604020202020204" pitchFamily="34" charset="0"/>
+              <a:buChar char="•"/>
+            </a:pPr>
+            <a:r>
+              <a:rPr lang="en-US" sz="2400" dirty="0"/>
+              <a:t>We define the plot type with a “</a:t>
+            </a:r>
+            <a:r>
+              <a:rPr lang="en-US" sz="2400" dirty="0" err="1"/>
+              <a:t>geom</a:t>
+            </a:r>
+            <a:r>
+              <a:rPr lang="en-US" sz="2400" dirty="0"/>
+              <a:t>_” function, e.g. ”</a:t>
+            </a:r>
+            <a:r>
+              <a:rPr lang="en-US" sz="2400" dirty="0" err="1"/>
+              <a:t>geom_point</a:t>
+            </a:r>
+            <a:r>
+              <a:rPr lang="en-US" sz="2400" dirty="0"/>
+              <a:t>()” for adding points.</a:t>
+            </a:r>
+          </a:p>
+          <a:p>
+            <a:pPr marL="342900" indent="-342900">
+              <a:spcBef>
+                <a:spcPts val="0"/>
+              </a:spcBef>
+              <a:spcAft>
+                <a:spcPts val="1200"/>
+              </a:spcAft>
+              <a:buFont typeface="Arial" panose="020B0604020202020204" pitchFamily="34" charset="0"/>
+              <a:buChar char="•"/>
+            </a:pPr>
+            <a:r>
+              <a:rPr lang="en-US" dirty="0"/>
+              <a:t>We </a:t>
+            </a:r>
+            <a:r>
+              <a:rPr lang="en-US" u="sng" dirty="0"/>
+              <a:t>literally</a:t>
+            </a:r>
+            <a:r>
+              <a:rPr lang="en-US" dirty="0"/>
+              <a:t> add the points to the empty canvas by using a plus symbol (+) at the end of the ”</a:t>
+            </a:r>
+            <a:r>
+              <a:rPr lang="en-US" dirty="0" err="1"/>
+              <a:t>ggplot</a:t>
+            </a:r>
+            <a:r>
+              <a:rPr lang="en-US" dirty="0"/>
+              <a:t>()” function and before the ”</a:t>
+            </a:r>
+            <a:r>
+              <a:rPr lang="en-US" dirty="0" err="1"/>
+              <a:t>geom_point</a:t>
+            </a:r>
+            <a:r>
+              <a:rPr lang="en-US" dirty="0"/>
+              <a:t>()” function</a:t>
+            </a:r>
+            <a:endParaRPr lang="en-US" sz="2400" dirty="0"/>
+          </a:p>
+        </p:txBody>
+      </p:sp>
+    </p:spTree>
+    <p:extLst>
+      <p:ext uri="{BB962C8B-B14F-4D97-AF65-F5344CB8AC3E}">
+        <p14:creationId xmlns:p14="http://schemas.microsoft.com/office/powerpoint/2010/main" val="3763015328"/>
+      </p:ext>
+    </p:extLst>
+  </p:cSld>
+  <p:clrMapOvr>
+    <a:masterClrMapping/>
+  </p:clrMapOvr>
+</p:sld>
+</file>
+
+<file path=ppt/slides/slide12.xml><?xml version="1.0" encoding="utf-8"?>
+<p:sld xmlns:a="http://schemas.openxmlformats.org/drawingml/2006/main" xmlns:r="http://schemas.openxmlformats.org/officeDocument/2006/relationships" xmlns:p="http://schemas.openxmlformats.org/presentationml/2006/main">
+  <p:cSld>
+    <p:spTree>
+      <p:nvGrpSpPr>
+        <p:cNvPr id="1" name=""/>
+        <p:cNvGrpSpPr/>
+        <p:nvPr/>
+      </p:nvGrpSpPr>
+      <p:grpSpPr>
+        <a:xfrm>
+          <a:off x="0" y="0"/>
+          <a:ext cx="0" cy="0"/>
+          <a:chOff x="0" y="0"/>
+          <a:chExt cx="0" cy="0"/>
+        </a:xfrm>
+      </p:grpSpPr>
+      <p:pic>
+        <p:nvPicPr>
+          <p:cNvPr id="4" name="Picture 3">
+            <a:extLst>
+              <a:ext uri="{FF2B5EF4-FFF2-40B4-BE49-F238E27FC236}">
+                <a16:creationId xmlns:a16="http://schemas.microsoft.com/office/drawing/2014/main" id="{5B10B56D-4751-A4EE-2BD1-440F1E01E434}"/>
+              </a:ext>
+            </a:extLst>
+          </p:cNvPr>
+          <p:cNvPicPr>
+            <a:picLocks noChangeAspect="1"/>
+          </p:cNvPicPr>
+          <p:nvPr/>
+        </p:nvPicPr>
+        <p:blipFill rotWithShape="1">
+          <a:blip r:embed="rId2"/>
+          <a:srcRect l="1820" t="9141" r="53362" b="54258"/>
+          <a:stretch/>
+        </p:blipFill>
+        <p:spPr>
+          <a:xfrm>
+            <a:off x="1235022" y="2468416"/>
+            <a:ext cx="5317562" cy="2714169"/>
+          </a:xfrm>
+          <a:prstGeom prst="rect">
+            <a:avLst/>
+          </a:prstGeom>
+        </p:spPr>
+      </p:pic>
+      <p:sp>
+        <p:nvSpPr>
+          <p:cNvPr id="2" name="Title 1">
+            <a:extLst>
+              <a:ext uri="{FF2B5EF4-FFF2-40B4-BE49-F238E27FC236}">
+                <a16:creationId xmlns:a16="http://schemas.microsoft.com/office/drawing/2014/main" id="{0494694A-369B-2B83-68B9-A5CFFBF5E733}"/>
+              </a:ext>
+            </a:extLst>
+          </p:cNvPr>
+          <p:cNvSpPr>
+            <a:spLocks noGrp="1"/>
+          </p:cNvSpPr>
+          <p:nvPr>
+            <p:ph type="title"/>
+          </p:nvPr>
+        </p:nvSpPr>
+        <p:spPr/>
+        <p:txBody>
+          <a:bodyPr/>
+          <a:lstStyle/>
+          <a:p>
+            <a:r>
+              <a:rPr lang="en-US" dirty="0"/>
+              <a:t>ggplot2, step 3</a:t>
+            </a:r>
+            <a:endParaRPr lang="en-GB" dirty="0"/>
+          </a:p>
+        </p:txBody>
+      </p:sp>
+      <p:sp>
+        <p:nvSpPr>
+          <p:cNvPr id="9" name="TextBox 8">
+            <a:extLst>
+              <a:ext uri="{FF2B5EF4-FFF2-40B4-BE49-F238E27FC236}">
+                <a16:creationId xmlns:a16="http://schemas.microsoft.com/office/drawing/2014/main" id="{A22918F9-0F46-56B6-3FDE-0CBFC98923E4}"/>
+              </a:ext>
+            </a:extLst>
+          </p:cNvPr>
+          <p:cNvSpPr txBox="1"/>
+          <p:nvPr/>
+        </p:nvSpPr>
+        <p:spPr>
+          <a:xfrm>
+            <a:off x="9171031" y="2099084"/>
+            <a:ext cx="907621" cy="369332"/>
+          </a:xfrm>
+          <a:prstGeom prst="rect">
+            <a:avLst/>
+          </a:prstGeom>
+          <a:noFill/>
+        </p:spPr>
+        <p:txBody>
+          <a:bodyPr wrap="none" rtlCol="0">
+            <a:spAutoFit/>
+          </a:bodyPr>
+          <a:lstStyle/>
+          <a:p>
+            <a:r>
+              <a:rPr lang="en-US" b="1" dirty="0"/>
+              <a:t>Output</a:t>
+            </a:r>
+          </a:p>
+        </p:txBody>
+      </p:sp>
+      <p:sp>
+        <p:nvSpPr>
+          <p:cNvPr id="5" name="Rectangle 4">
+            <a:extLst>
+              <a:ext uri="{FF2B5EF4-FFF2-40B4-BE49-F238E27FC236}">
+                <a16:creationId xmlns:a16="http://schemas.microsoft.com/office/drawing/2014/main" id="{F844C8C1-32D8-4140-18C9-2893D47C30F9}"/>
+              </a:ext>
+            </a:extLst>
+          </p:cNvPr>
+          <p:cNvSpPr/>
+          <p:nvPr/>
+        </p:nvSpPr>
+        <p:spPr>
+          <a:xfrm>
+            <a:off x="1349829" y="4114801"/>
+            <a:ext cx="5202755" cy="914400"/>
+          </a:xfrm>
+          <a:prstGeom prst="rect">
+            <a:avLst/>
+          </a:prstGeom>
+          <a:noFill/>
+          <a:ln w="38100">
+            <a:solidFill>
+              <a:schemeClr val="accent5"/>
+            </a:solidFill>
+          </a:ln>
+          <a:effectLst/>
+        </p:spPr>
+        <p:style>
+          <a:lnRef idx="1">
+            <a:schemeClr val="accent1"/>
+          </a:lnRef>
+          <a:fillRef idx="3">
+            <a:schemeClr val="accent1"/>
+          </a:fillRef>
+          <a:effectRef idx="2">
+            <a:schemeClr val="accent1"/>
+          </a:effectRef>
+          <a:fontRef idx="minor">
+            <a:schemeClr val="lt1"/>
+          </a:fontRef>
+        </p:style>
+        <p:txBody>
+          <a:bodyPr rtlCol="0" anchor="ctr"/>
+          <a:lstStyle/>
+          <a:p>
+            <a:pPr algn="ctr"/>
+            <a:endParaRPr lang="en-US"/>
+          </a:p>
+        </p:txBody>
+      </p:sp>
+      <p:pic>
+        <p:nvPicPr>
+          <p:cNvPr id="6" name="Picture 5">
+            <a:extLst>
+              <a:ext uri="{FF2B5EF4-FFF2-40B4-BE49-F238E27FC236}">
+                <a16:creationId xmlns:a16="http://schemas.microsoft.com/office/drawing/2014/main" id="{462E08A6-0F64-F9AF-8D93-B526184B182B}"/>
+              </a:ext>
+            </a:extLst>
+          </p:cNvPr>
+          <p:cNvPicPr>
+            <a:picLocks noChangeAspect="1"/>
+          </p:cNvPicPr>
+          <p:nvPr/>
+        </p:nvPicPr>
+        <p:blipFill>
+          <a:blip r:embed="rId3"/>
+          <a:stretch>
+            <a:fillRect/>
+          </a:stretch>
+        </p:blipFill>
+        <p:spPr>
+          <a:xfrm>
+            <a:off x="7878615" y="2444830"/>
+            <a:ext cx="3235700" cy="3235700"/>
+          </a:xfrm>
+          <a:prstGeom prst="rect">
+            <a:avLst/>
+          </a:prstGeom>
+        </p:spPr>
+      </p:pic>
+    </p:spTree>
+    <p:extLst>
+      <p:ext uri="{BB962C8B-B14F-4D97-AF65-F5344CB8AC3E}">
+        <p14:creationId xmlns:p14="http://schemas.microsoft.com/office/powerpoint/2010/main" val="3015337331"/>
+      </p:ext>
+    </p:extLst>
+  </p:cSld>
+  <p:clrMapOvr>
+    <a:masterClrMapping/>
+  </p:clrMapOvr>
+</p:sld>
+</file>
+
+<file path=ppt/slides/slide13.xml><?xml version="1.0" encoding="utf-8"?>
+<p:sld xmlns:a="http://schemas.openxmlformats.org/drawingml/2006/main" xmlns:r="http://schemas.openxmlformats.org/officeDocument/2006/relationships" xmlns:p="http://schemas.openxmlformats.org/presentationml/2006/main">
+  <p:cSld>
+    <p:spTree>
+      <p:nvGrpSpPr>
+        <p:cNvPr id="1" name=""/>
+        <p:cNvGrpSpPr/>
+        <p:nvPr/>
+      </p:nvGrpSpPr>
+      <p:grpSpPr>
+        <a:xfrm>
+          <a:off x="0" y="0"/>
+          <a:ext cx="0" cy="0"/>
+          <a:chOff x="0" y="0"/>
+          <a:chExt cx="0" cy="0"/>
+        </a:xfrm>
+      </p:grpSpPr>
+      <p:sp>
+        <p:nvSpPr>
+          <p:cNvPr id="2" name="Title 1">
+            <a:extLst>
+              <a:ext uri="{FF2B5EF4-FFF2-40B4-BE49-F238E27FC236}">
+                <a16:creationId xmlns:a16="http://schemas.microsoft.com/office/drawing/2014/main" id="{0494694A-369B-2B83-68B9-A5CFFBF5E733}"/>
+              </a:ext>
+            </a:extLst>
+          </p:cNvPr>
+          <p:cNvSpPr>
+            <a:spLocks noGrp="1"/>
+          </p:cNvSpPr>
+          <p:nvPr>
+            <p:ph type="title"/>
+          </p:nvPr>
+        </p:nvSpPr>
+        <p:spPr/>
+        <p:txBody>
+          <a:bodyPr/>
+          <a:lstStyle/>
+          <a:p>
+            <a:r>
+              <a:rPr lang="en-US" dirty="0"/>
+              <a:t>ggplot2, extras</a:t>
+            </a:r>
+            <a:endParaRPr lang="en-GB" dirty="0"/>
+          </a:p>
+        </p:txBody>
+      </p:sp>
+      <p:sp>
+        <p:nvSpPr>
+          <p:cNvPr id="3" name="Content Placeholder 2">
+            <a:extLst>
+              <a:ext uri="{FF2B5EF4-FFF2-40B4-BE49-F238E27FC236}">
+                <a16:creationId xmlns:a16="http://schemas.microsoft.com/office/drawing/2014/main" id="{1DE2EACC-629E-3BED-0F35-917C8154711F}"/>
+              </a:ext>
+            </a:extLst>
+          </p:cNvPr>
+          <p:cNvSpPr>
+            <a:spLocks noGrp="1"/>
+          </p:cNvSpPr>
+          <p:nvPr>
+            <p:ph idx="1"/>
+          </p:nvPr>
+        </p:nvSpPr>
+        <p:spPr/>
+        <p:txBody>
+          <a:bodyPr/>
+          <a:lstStyle/>
+          <a:p>
+            <a:pPr marL="342900" indent="-342900">
+              <a:spcBef>
+                <a:spcPts val="0"/>
+              </a:spcBef>
+              <a:spcAft>
+                <a:spcPts val="1200"/>
+              </a:spcAft>
+              <a:buFont typeface="Arial" panose="020B0604020202020204" pitchFamily="34" charset="0"/>
+              <a:buChar char="•"/>
+            </a:pPr>
+            <a:r>
+              <a:rPr lang="en-US" sz="2400" dirty="0"/>
+              <a:t>After making the basic plot, you can change the appearance of different parts to make it nicer, or easier to understand.</a:t>
+            </a:r>
+          </a:p>
+          <a:p>
+            <a:pPr marL="342900" indent="-342900">
+              <a:spcBef>
+                <a:spcPts val="0"/>
+              </a:spcBef>
+              <a:spcAft>
+                <a:spcPts val="1200"/>
+              </a:spcAft>
+              <a:buFont typeface="Arial" panose="020B0604020202020204" pitchFamily="34" charset="0"/>
+              <a:buChar char="•"/>
+            </a:pPr>
+            <a:r>
+              <a:rPr lang="en-US" dirty="0"/>
+              <a:t>What are some examples of things you might want to change about this plot?</a:t>
+            </a:r>
+          </a:p>
+          <a:p>
+            <a:pPr marL="1085850" lvl="1" indent="-342900">
+              <a:spcBef>
+                <a:spcPts val="0"/>
+              </a:spcBef>
+              <a:spcAft>
+                <a:spcPts val="1200"/>
+              </a:spcAft>
+              <a:buFont typeface="Arial" panose="020B0604020202020204" pitchFamily="34" charset="0"/>
+              <a:buChar char="•"/>
+            </a:pPr>
+            <a:r>
+              <a:rPr lang="en-US" sz="2000" dirty="0"/>
+              <a:t>Limits (range) of axes</a:t>
+            </a:r>
+          </a:p>
+          <a:p>
+            <a:pPr marL="1085850" lvl="1" indent="-342900">
+              <a:spcBef>
+                <a:spcPts val="0"/>
+              </a:spcBef>
+              <a:spcAft>
+                <a:spcPts val="1200"/>
+              </a:spcAft>
+              <a:buFont typeface="Arial" panose="020B0604020202020204" pitchFamily="34" charset="0"/>
+              <a:buChar char="•"/>
+            </a:pPr>
+            <a:r>
+              <a:rPr lang="en-US" sz="2000" dirty="0"/>
+              <a:t>Axis labels</a:t>
+            </a:r>
+          </a:p>
+          <a:p>
+            <a:pPr marL="1085850" lvl="1" indent="-342900">
+              <a:spcBef>
+                <a:spcPts val="0"/>
+              </a:spcBef>
+              <a:spcAft>
+                <a:spcPts val="1200"/>
+              </a:spcAft>
+              <a:buFont typeface="Arial" panose="020B0604020202020204" pitchFamily="34" charset="0"/>
+              <a:buChar char="•"/>
+            </a:pPr>
+            <a:r>
+              <a:rPr lang="en-US" sz="2000" dirty="0"/>
+              <a:t>Plot title</a:t>
+            </a:r>
+          </a:p>
+          <a:p>
+            <a:pPr marL="1085850" lvl="1" indent="-342900">
+              <a:spcBef>
+                <a:spcPts val="0"/>
+              </a:spcBef>
+              <a:spcAft>
+                <a:spcPts val="1200"/>
+              </a:spcAft>
+              <a:buFont typeface="Arial" panose="020B0604020202020204" pitchFamily="34" charset="0"/>
+              <a:buChar char="•"/>
+            </a:pPr>
+            <a:r>
+              <a:rPr lang="en-US" sz="2000" dirty="0"/>
+              <a:t>Background </a:t>
+            </a:r>
+            <a:r>
+              <a:rPr lang="en-US" sz="2000" dirty="0" err="1"/>
+              <a:t>colour</a:t>
+            </a:r>
+            <a:endParaRPr lang="en-US" sz="2000" dirty="0"/>
+          </a:p>
+          <a:p>
+            <a:pPr marL="1085850" lvl="1" indent="-342900">
+              <a:spcBef>
+                <a:spcPts val="0"/>
+              </a:spcBef>
+              <a:spcAft>
+                <a:spcPts val="1200"/>
+              </a:spcAft>
+              <a:buFont typeface="Arial" panose="020B0604020202020204" pitchFamily="34" charset="0"/>
+              <a:buChar char="•"/>
+            </a:pPr>
+            <a:r>
+              <a:rPr lang="en-US" sz="2000" dirty="0"/>
+              <a:t>…</a:t>
+            </a:r>
+            <a:endParaRPr lang="en-US" dirty="0"/>
+          </a:p>
+          <a:p>
+            <a:pPr marL="342900" indent="-342900">
+              <a:spcBef>
+                <a:spcPts val="0"/>
+              </a:spcBef>
+              <a:spcAft>
+                <a:spcPts val="1200"/>
+              </a:spcAft>
+              <a:buFont typeface="Arial" panose="020B0604020202020204" pitchFamily="34" charset="0"/>
+              <a:buChar char="•"/>
+            </a:pPr>
+            <a:r>
+              <a:rPr lang="en-US" dirty="0"/>
+              <a:t>You can change each of these with a function</a:t>
+            </a:r>
+          </a:p>
+          <a:p>
+            <a:pPr lvl="1" indent="0">
+              <a:spcBef>
+                <a:spcPts val="0"/>
+              </a:spcBef>
+              <a:spcAft>
+                <a:spcPts val="1200"/>
+              </a:spcAft>
+              <a:buNone/>
+            </a:pPr>
+            <a:endParaRPr lang="en-US" sz="2000" dirty="0"/>
+          </a:p>
+          <a:p>
+            <a:pPr marL="1085850" lvl="1" indent="-342900">
+              <a:spcBef>
+                <a:spcPts val="0"/>
+              </a:spcBef>
+              <a:spcAft>
+                <a:spcPts val="1200"/>
+              </a:spcAft>
+              <a:buFont typeface="Arial" panose="020B0604020202020204" pitchFamily="34" charset="0"/>
+              <a:buChar char="•"/>
+            </a:pPr>
+            <a:endParaRPr lang="en-US" sz="2400" dirty="0"/>
+          </a:p>
+        </p:txBody>
+      </p:sp>
+      <p:pic>
+        <p:nvPicPr>
+          <p:cNvPr id="4" name="Picture 3">
+            <a:extLst>
+              <a:ext uri="{FF2B5EF4-FFF2-40B4-BE49-F238E27FC236}">
+                <a16:creationId xmlns:a16="http://schemas.microsoft.com/office/drawing/2014/main" id="{869DF04B-488F-0612-A179-07A48F99ED20}"/>
+              </a:ext>
+            </a:extLst>
+          </p:cNvPr>
+          <p:cNvPicPr>
+            <a:picLocks noChangeAspect="1"/>
+          </p:cNvPicPr>
+          <p:nvPr/>
+        </p:nvPicPr>
+        <p:blipFill>
+          <a:blip r:embed="rId2"/>
+          <a:stretch>
+            <a:fillRect/>
+          </a:stretch>
+        </p:blipFill>
+        <p:spPr>
+          <a:xfrm>
+            <a:off x="8934556" y="2789489"/>
+            <a:ext cx="3235700" cy="3235700"/>
+          </a:xfrm>
+          <a:prstGeom prst="rect">
+            <a:avLst/>
+          </a:prstGeom>
+        </p:spPr>
+      </p:pic>
+    </p:spTree>
+    <p:extLst>
+      <p:ext uri="{BB962C8B-B14F-4D97-AF65-F5344CB8AC3E}">
+        <p14:creationId xmlns:p14="http://schemas.microsoft.com/office/powerpoint/2010/main" val="1105789145"/>
+      </p:ext>
+    </p:extLst>
+  </p:cSld>
+  <p:clrMapOvr>
+    <a:masterClrMapping/>
+  </p:clrMapOvr>
+  <p:timing>
+    <p:tnLst>
+      <p:par>
+        <p:cTn id="1" dur="indefinite" restart="never" nodeType="tmRoot">
+          <p:childTnLst>
+            <p:seq concurrent="1" nextAc="seek">
+              <p:cTn id="2" dur="indefinite" nodeType="mainSeq">
+                <p:childTnLst>
+                  <p:par>
+                    <p:cTn id="3" fill="hold">
+                      <p:stCondLst>
+                        <p:cond delay="indefinite"/>
+                      </p:stCondLst>
+                      <p:childTnLst>
+                        <p:par>
+                          <p:cTn id="4" fill="hold">
+                            <p:stCondLst>
+                              <p:cond delay="0"/>
+                            </p:stCondLst>
+                            <p:childTnLst>
+                              <p:par>
+                                <p:cTn id="5" presetID="1" presetClass="entr" presetSubtype="0" fill="hold" grpId="0" nodeType="clickEffect">
+                                  <p:stCondLst>
+                                    <p:cond delay="0"/>
+                                  </p:stCondLst>
+                                  <p:childTnLst>
+                                    <p:set>
+                                      <p:cBhvr>
+                                        <p:cTn id="6" dur="1" fill="hold">
+                                          <p:stCondLst>
+                                            <p:cond delay="0"/>
+                                          </p:stCondLst>
+                                        </p:cTn>
+                                        <p:tgtEl>
+                                          <p:spTgt spid="3">
+                                            <p:txEl>
+                                              <p:pRg st="0" end="0"/>
+                                            </p:txEl>
+                                          </p:spTgt>
+                                        </p:tgtEl>
+                                        <p:attrNameLst>
+                                          <p:attrName>style.visibility</p:attrName>
+                                        </p:attrNameLst>
+                                      </p:cBhvr>
+                                      <p:to>
+                                        <p:strVal val="visible"/>
+                                      </p:to>
+                                    </p:set>
+                                  </p:childTnLst>
+                                </p:cTn>
+                              </p:par>
+                            </p:childTnLst>
+                          </p:cTn>
+                        </p:par>
+                      </p:childTnLst>
+                    </p:cTn>
+                  </p:par>
+                  <p:par>
+                    <p:cTn id="7" fill="hold">
+                      <p:stCondLst>
+                        <p:cond delay="indefinite"/>
+                      </p:stCondLst>
+                      <p:childTnLst>
+                        <p:par>
+                          <p:cTn id="8" fill="hold">
+                            <p:stCondLst>
+                              <p:cond delay="0"/>
+                            </p:stCondLst>
+                            <p:childTnLst>
+                              <p:par>
+                                <p:cTn id="9" presetID="1" presetClass="entr" presetSubtype="0" fill="hold" grpId="0" nodeType="clickEffect">
+                                  <p:stCondLst>
+                                    <p:cond delay="0"/>
+                                  </p:stCondLst>
+                                  <p:childTnLst>
+                                    <p:set>
+                                      <p:cBhvr>
+                                        <p:cTn id="10" dur="1" fill="hold">
+                                          <p:stCondLst>
+                                            <p:cond delay="0"/>
+                                          </p:stCondLst>
+                                        </p:cTn>
+                                        <p:tgtEl>
+                                          <p:spTgt spid="3">
+                                            <p:txEl>
+                                              <p:pRg st="1" end="1"/>
+                                            </p:txEl>
+                                          </p:spTgt>
+                                        </p:tgtEl>
+                                        <p:attrNameLst>
+                                          <p:attrName>style.visibility</p:attrName>
+                                        </p:attrNameLst>
+                                      </p:cBhvr>
+                                      <p:to>
+                                        <p:strVal val="visible"/>
+                                      </p:to>
+                                    </p:set>
+                                  </p:childTnLst>
+                                </p:cTn>
+                              </p:par>
+                            </p:childTnLst>
+                          </p:cTn>
+                        </p:par>
+                      </p:childTnLst>
+                    </p:cTn>
+                  </p:par>
+                  <p:par>
+                    <p:cTn id="11" fill="hold">
+                      <p:stCondLst>
+                        <p:cond delay="indefinite"/>
+                      </p:stCondLst>
+                      <p:childTnLst>
+                        <p:par>
+                          <p:cTn id="12" fill="hold">
+                            <p:stCondLst>
+                              <p:cond delay="0"/>
+                            </p:stCondLst>
+                            <p:childTnLst>
+                              <p:par>
+                                <p:cTn id="13" presetID="1" presetClass="entr" presetSubtype="0" fill="hold" grpId="0" nodeType="clickEffect">
+                                  <p:stCondLst>
+                                    <p:cond delay="0"/>
+                                  </p:stCondLst>
+                                  <p:childTnLst>
+                                    <p:set>
+                                      <p:cBhvr>
+                                        <p:cTn id="14" dur="1" fill="hold">
+                                          <p:stCondLst>
+                                            <p:cond delay="0"/>
+                                          </p:stCondLst>
+                                        </p:cTn>
+                                        <p:tgtEl>
+                                          <p:spTgt spid="3">
+                                            <p:txEl>
+                                              <p:pRg st="2" end="2"/>
+                                            </p:txEl>
+                                          </p:spTgt>
+                                        </p:tgtEl>
+                                        <p:attrNameLst>
+                                          <p:attrName>style.visibility</p:attrName>
+                                        </p:attrNameLst>
+                                      </p:cBhvr>
+                                      <p:to>
+                                        <p:strVal val="visible"/>
+                                      </p:to>
+                                    </p:set>
+                                  </p:childTnLst>
+                                </p:cTn>
+                              </p:par>
+                              <p:par>
+                                <p:cTn id="15" presetID="1" presetClass="entr" presetSubtype="0" fill="hold" grpId="0" nodeType="withEffect">
+                                  <p:stCondLst>
+                                    <p:cond delay="0"/>
+                                  </p:stCondLst>
+                                  <p:childTnLst>
+                                    <p:set>
+                                      <p:cBhvr>
+                                        <p:cTn id="16" dur="1" fill="hold">
+                                          <p:stCondLst>
+                                            <p:cond delay="0"/>
+                                          </p:stCondLst>
+                                        </p:cTn>
+                                        <p:tgtEl>
+                                          <p:spTgt spid="3">
+                                            <p:txEl>
+                                              <p:pRg st="3" end="3"/>
+                                            </p:txEl>
+                                          </p:spTgt>
+                                        </p:tgtEl>
+                                        <p:attrNameLst>
+                                          <p:attrName>style.visibility</p:attrName>
+                                        </p:attrNameLst>
+                                      </p:cBhvr>
+                                      <p:to>
+                                        <p:strVal val="visible"/>
+                                      </p:to>
+                                    </p:set>
+                                  </p:childTnLst>
+                                </p:cTn>
+                              </p:par>
+                              <p:par>
+                                <p:cTn id="17" presetID="1" presetClass="entr" presetSubtype="0" fill="hold" grpId="0" nodeType="withEffect">
+                                  <p:stCondLst>
+                                    <p:cond delay="0"/>
+                                  </p:stCondLst>
+                                  <p:childTnLst>
+                                    <p:set>
+                                      <p:cBhvr>
+                                        <p:cTn id="18" dur="1" fill="hold">
+                                          <p:stCondLst>
+                                            <p:cond delay="0"/>
+                                          </p:stCondLst>
+                                        </p:cTn>
+                                        <p:tgtEl>
+                                          <p:spTgt spid="3">
+                                            <p:txEl>
+                                              <p:pRg st="4" end="4"/>
+                                            </p:txEl>
+                                          </p:spTgt>
+                                        </p:tgtEl>
+                                        <p:attrNameLst>
+                                          <p:attrName>style.visibility</p:attrName>
+                                        </p:attrNameLst>
+                                      </p:cBhvr>
+                                      <p:to>
+                                        <p:strVal val="visible"/>
+                                      </p:to>
+                                    </p:set>
+                                  </p:childTnLst>
+                                </p:cTn>
+                              </p:par>
+                              <p:par>
+                                <p:cTn id="19" presetID="1" presetClass="entr" presetSubtype="0" fill="hold" grpId="0" nodeType="withEffect">
+                                  <p:stCondLst>
+                                    <p:cond delay="0"/>
+                                  </p:stCondLst>
+                                  <p:childTnLst>
+                                    <p:set>
+                                      <p:cBhvr>
+                                        <p:cTn id="20" dur="1" fill="hold">
+                                          <p:stCondLst>
+                                            <p:cond delay="0"/>
+                                          </p:stCondLst>
+                                        </p:cTn>
+                                        <p:tgtEl>
+                                          <p:spTgt spid="3">
+                                            <p:txEl>
+                                              <p:pRg st="5" end="5"/>
+                                            </p:txEl>
+                                          </p:spTgt>
+                                        </p:tgtEl>
+                                        <p:attrNameLst>
+                                          <p:attrName>style.visibility</p:attrName>
+                                        </p:attrNameLst>
+                                      </p:cBhvr>
+                                      <p:to>
+                                        <p:strVal val="visible"/>
+                                      </p:to>
+                                    </p:set>
+                                  </p:childTnLst>
+                                </p:cTn>
+                              </p:par>
+                              <p:par>
+                                <p:cTn id="21" presetID="1" presetClass="entr" presetSubtype="0" fill="hold" grpId="0" nodeType="withEffect">
+                                  <p:stCondLst>
+                                    <p:cond delay="0"/>
+                                  </p:stCondLst>
+                                  <p:childTnLst>
+                                    <p:set>
+                                      <p:cBhvr>
+                                        <p:cTn id="22" dur="1" fill="hold">
+                                          <p:stCondLst>
+                                            <p:cond delay="0"/>
+                                          </p:stCondLst>
+                                        </p:cTn>
+                                        <p:tgtEl>
+                                          <p:spTgt spid="3">
+                                            <p:txEl>
+                                              <p:pRg st="6" end="6"/>
+                                            </p:txEl>
+                                          </p:spTgt>
+                                        </p:tgtEl>
+                                        <p:attrNameLst>
+                                          <p:attrName>style.visibility</p:attrName>
+                                        </p:attrNameLst>
+                                      </p:cBhvr>
+                                      <p:to>
+                                        <p:strVal val="visible"/>
+                                      </p:to>
+                                    </p:set>
+                                  </p:childTnLst>
+                                </p:cTn>
+                              </p:par>
+                            </p:childTnLst>
+                          </p:cTn>
+                        </p:par>
+                      </p:childTnLst>
+                    </p:cTn>
+                  </p:par>
+                  <p:par>
+                    <p:cTn id="23" fill="hold">
+                      <p:stCondLst>
+                        <p:cond delay="indefinite"/>
+                      </p:stCondLst>
+                      <p:childTnLst>
+                        <p:par>
+                          <p:cTn id="24" fill="hold">
+                            <p:stCondLst>
+                              <p:cond delay="0"/>
+                            </p:stCondLst>
+                            <p:childTnLst>
+                              <p:par>
+                                <p:cTn id="25" presetID="1" presetClass="entr" presetSubtype="0" fill="hold" grpId="0" nodeType="clickEffect">
+                                  <p:stCondLst>
+                                    <p:cond delay="0"/>
+                                  </p:stCondLst>
+                                  <p:childTnLst>
+                                    <p:set>
+                                      <p:cBhvr>
+                                        <p:cTn id="26" dur="1" fill="hold">
+                                          <p:stCondLst>
+                                            <p:cond delay="0"/>
+                                          </p:stCondLst>
+                                        </p:cTn>
+                                        <p:tgtEl>
+                                          <p:spTgt spid="3">
+                                            <p:txEl>
+                                              <p:pRg st="7" end="7"/>
+                                            </p:txEl>
+                                          </p:spTgt>
+                                        </p:tgtEl>
+                                        <p:attrNameLst>
+                                          <p:attrName>style.visibility</p:attrName>
+                                        </p:attrNameLst>
+                                      </p:cBhvr>
+                                      <p:to>
+                                        <p:strVal val="visible"/>
+                                      </p:to>
+                                    </p:set>
+                                  </p:childTnLst>
+                                </p:cTn>
+                              </p:par>
+                            </p:childTnLst>
+                          </p:cTn>
+                        </p:par>
+                      </p:childTnLst>
+                    </p:cTn>
+                  </p:par>
+                </p:childTnLst>
+              </p:cTn>
+              <p:prevCondLst>
+                <p:cond evt="onPrev" delay="0">
+                  <p:tgtEl>
+                    <p:sldTgt/>
+                  </p:tgtEl>
+                </p:cond>
+              </p:prevCondLst>
+              <p:nextCondLst>
+                <p:cond evt="onNext" delay="0">
+                  <p:tgtEl>
+                    <p:sldTgt/>
+                  </p:tgtEl>
+                </p:cond>
+              </p:nextCondLst>
+            </p:seq>
+          </p:childTnLst>
+        </p:cTn>
+      </p:par>
+    </p:tnLst>
+    <p:bldLst>
+      <p:bldP spid="3" grpId="0" uiExpand="1" build="p"/>
+    </p:bldLst>
+  </p:timing>
+</p:sld>
+</file>
+
+<file path=ppt/slides/slide14.xml><?xml version="1.0" encoding="utf-8"?>
+<p:sld xmlns:a="http://schemas.openxmlformats.org/drawingml/2006/main" xmlns:r="http://schemas.openxmlformats.org/officeDocument/2006/relationships" xmlns:p="http://schemas.openxmlformats.org/presentationml/2006/main">
+  <p:cSld>
+    <p:spTree>
+      <p:nvGrpSpPr>
+        <p:cNvPr id="1" name=""/>
+        <p:cNvGrpSpPr/>
+        <p:nvPr/>
+      </p:nvGrpSpPr>
+      <p:grpSpPr>
+        <a:xfrm>
+          <a:off x="0" y="0"/>
+          <a:ext cx="0" cy="0"/>
+          <a:chOff x="0" y="0"/>
+          <a:chExt cx="0" cy="0"/>
+        </a:xfrm>
+      </p:grpSpPr>
+      <p:sp>
+        <p:nvSpPr>
+          <p:cNvPr id="2" name="Title 1">
+            <a:extLst>
+              <a:ext uri="{FF2B5EF4-FFF2-40B4-BE49-F238E27FC236}">
+                <a16:creationId xmlns:a16="http://schemas.microsoft.com/office/drawing/2014/main" id="{0494694A-369B-2B83-68B9-A5CFFBF5E733}"/>
+              </a:ext>
+            </a:extLst>
+          </p:cNvPr>
+          <p:cNvSpPr>
+            <a:spLocks noGrp="1"/>
+          </p:cNvSpPr>
+          <p:nvPr>
+            <p:ph type="title"/>
+          </p:nvPr>
+        </p:nvSpPr>
+        <p:spPr/>
+        <p:txBody>
+          <a:bodyPr/>
+          <a:lstStyle/>
+          <a:p>
+            <a:r>
+              <a:rPr lang="en-US" dirty="0"/>
+              <a:t>Practical</a:t>
+            </a:r>
+            <a:endParaRPr lang="en-GB" dirty="0"/>
+          </a:p>
+        </p:txBody>
+      </p:sp>
+      <p:sp>
+        <p:nvSpPr>
+          <p:cNvPr id="3" name="Content Placeholder 2">
+            <a:extLst>
+              <a:ext uri="{FF2B5EF4-FFF2-40B4-BE49-F238E27FC236}">
+                <a16:creationId xmlns:a16="http://schemas.microsoft.com/office/drawing/2014/main" id="{1DE2EACC-629E-3BED-0F35-917C8154711F}"/>
+              </a:ext>
+            </a:extLst>
+          </p:cNvPr>
+          <p:cNvSpPr>
+            <a:spLocks noGrp="1"/>
+          </p:cNvSpPr>
+          <p:nvPr>
+            <p:ph idx="1"/>
+          </p:nvPr>
+        </p:nvSpPr>
+        <p:spPr/>
+        <p:txBody>
+          <a:bodyPr/>
+          <a:lstStyle/>
+          <a:p>
+            <a:pPr>
+              <a:spcBef>
+                <a:spcPts val="0"/>
+              </a:spcBef>
+              <a:spcAft>
+                <a:spcPts val="1200"/>
+              </a:spcAft>
+            </a:pPr>
+            <a:r>
+              <a:rPr lang="en-US" sz="2400" dirty="0"/>
+              <a:t>Practical</a:t>
+            </a:r>
+          </a:p>
+          <a:p>
+            <a:pPr marL="342900" indent="-342900">
+              <a:spcBef>
+                <a:spcPts val="0"/>
+              </a:spcBef>
+              <a:spcAft>
+                <a:spcPts val="1200"/>
+              </a:spcAft>
+              <a:buFont typeface="Arial" panose="020B0604020202020204" pitchFamily="34" charset="0"/>
+              <a:buChar char="•"/>
+            </a:pPr>
+            <a:r>
+              <a:rPr lang="en-US" dirty="0"/>
+              <a:t>Walks through steps to make a basic </a:t>
+            </a:r>
+            <a:r>
+              <a:rPr lang="en-US" dirty="0" err="1"/>
+              <a:t>ggplot</a:t>
+            </a:r>
+            <a:endParaRPr lang="en-US" dirty="0"/>
+          </a:p>
+          <a:p>
+            <a:pPr marL="342900" indent="-342900">
+              <a:spcBef>
+                <a:spcPts val="0"/>
+              </a:spcBef>
+              <a:spcAft>
+                <a:spcPts val="1200"/>
+              </a:spcAft>
+              <a:buFont typeface="Arial" panose="020B0604020202020204" pitchFamily="34" charset="0"/>
+              <a:buChar char="•"/>
+            </a:pPr>
+            <a:r>
+              <a:rPr lang="en-US" sz="2400" dirty="0"/>
+              <a:t>Introduces functions to change the appearance of the </a:t>
+            </a:r>
+            <a:r>
+              <a:rPr lang="en-US" sz="2400" dirty="0" err="1"/>
+              <a:t>ggplot</a:t>
+            </a:r>
+            <a:endParaRPr lang="en-US" sz="2400" dirty="0"/>
+          </a:p>
+        </p:txBody>
+      </p:sp>
+    </p:spTree>
+    <p:extLst>
+      <p:ext uri="{BB962C8B-B14F-4D97-AF65-F5344CB8AC3E}">
+        <p14:creationId xmlns:p14="http://schemas.microsoft.com/office/powerpoint/2010/main" val="2799020149"/>
+      </p:ext>
+    </p:extLst>
+  </p:cSld>
+  <p:clrMapOvr>
+    <a:masterClrMapping/>
+  </p:clrMapOvr>
+</p:sld>
+</file>
+
+<file path=ppt/slides/slide15.xml><?xml version="1.0" encoding="utf-8"?>
+<p:sld xmlns:a="http://schemas.openxmlformats.org/drawingml/2006/main" xmlns:r="http://schemas.openxmlformats.org/officeDocument/2006/relationships" xmlns:p="http://schemas.openxmlformats.org/presentationml/2006/main">
+  <p:cSld>
+    <p:spTree>
+      <p:nvGrpSpPr>
+        <p:cNvPr id="1" name=""/>
+        <p:cNvGrpSpPr/>
+        <p:nvPr/>
+      </p:nvGrpSpPr>
+      <p:grpSpPr>
+        <a:xfrm>
+          <a:off x="0" y="0"/>
+          <a:ext cx="0" cy="0"/>
+          <a:chOff x="0" y="0"/>
+          <a:chExt cx="0" cy="0"/>
+        </a:xfrm>
+      </p:grpSpPr>
+      <p:sp>
+        <p:nvSpPr>
+          <p:cNvPr id="2" name="Title 1">
+            <a:extLst>
+              <a:ext uri="{FF2B5EF4-FFF2-40B4-BE49-F238E27FC236}">
+                <a16:creationId xmlns:a16="http://schemas.microsoft.com/office/drawing/2014/main" id="{0494694A-369B-2B83-68B9-A5CFFBF5E733}"/>
+              </a:ext>
+            </a:extLst>
+          </p:cNvPr>
+          <p:cNvSpPr>
+            <a:spLocks noGrp="1"/>
+          </p:cNvSpPr>
+          <p:nvPr>
+            <p:ph type="title"/>
+          </p:nvPr>
+        </p:nvSpPr>
+        <p:spPr/>
+        <p:txBody>
+          <a:bodyPr/>
+          <a:lstStyle/>
+          <a:p>
+            <a:r>
+              <a:rPr lang="en-US" dirty="0"/>
+              <a:t>Package for data cleaning: </a:t>
+            </a:r>
+            <a:r>
+              <a:rPr lang="en-US" dirty="0" err="1"/>
+              <a:t>dplyr</a:t>
+            </a:r>
+            <a:endParaRPr lang="en-GB" dirty="0"/>
+          </a:p>
+        </p:txBody>
+      </p:sp>
+      <p:sp>
+        <p:nvSpPr>
+          <p:cNvPr id="3" name="Content Placeholder 2">
+            <a:extLst>
+              <a:ext uri="{FF2B5EF4-FFF2-40B4-BE49-F238E27FC236}">
+                <a16:creationId xmlns:a16="http://schemas.microsoft.com/office/drawing/2014/main" id="{1DE2EACC-629E-3BED-0F35-917C8154711F}"/>
+              </a:ext>
+            </a:extLst>
+          </p:cNvPr>
+          <p:cNvSpPr>
+            <a:spLocks noGrp="1"/>
+          </p:cNvSpPr>
+          <p:nvPr>
+            <p:ph idx="1"/>
+          </p:nvPr>
+        </p:nvSpPr>
+        <p:spPr/>
+        <p:txBody>
+          <a:bodyPr/>
+          <a:lstStyle/>
+          <a:p>
+            <a:pPr marL="342900" indent="-342900">
+              <a:buFont typeface="Arial" panose="020B0604020202020204" pitchFamily="34" charset="0"/>
+              <a:buChar char="•"/>
+            </a:pPr>
+            <a:r>
+              <a:rPr lang="en-GB" dirty="0" err="1"/>
+              <a:t>dplyr</a:t>
+            </a:r>
+            <a:r>
+              <a:rPr lang="en-GB" dirty="0"/>
+              <a:t> is a package developed for handling and cleaning data</a:t>
+            </a:r>
+          </a:p>
+          <a:p>
+            <a:pPr marL="342900" indent="-342900">
+              <a:buFont typeface="Arial" panose="020B0604020202020204" pitchFamily="34" charset="0"/>
+              <a:buChar char="•"/>
+            </a:pPr>
+            <a:endParaRPr lang="en-GB" dirty="0"/>
+          </a:p>
+          <a:p>
+            <a:pPr marL="342900" indent="-342900">
+              <a:buFont typeface="Arial" panose="020B0604020202020204" pitchFamily="34" charset="0"/>
+              <a:buChar char="•"/>
+            </a:pPr>
+            <a:r>
+              <a:rPr lang="en-GB" dirty="0" err="1"/>
+              <a:t>dplyr</a:t>
+            </a:r>
+            <a:r>
+              <a:rPr lang="en-GB" dirty="0"/>
+              <a:t> contains functions to manipulate data frames:</a:t>
+            </a:r>
+          </a:p>
+          <a:p>
+            <a:pPr marL="1085850" lvl="1" indent="-342900">
+              <a:buFont typeface="Arial" panose="020B0604020202020204" pitchFamily="34" charset="0"/>
+              <a:buChar char="•"/>
+            </a:pPr>
+            <a:r>
+              <a:rPr lang="en-GB" sz="2400" dirty="0">
+                <a:latin typeface="Corbel" panose="020B0503020204020204" pitchFamily="34" charset="0"/>
+              </a:rPr>
+              <a:t>filter(): filter rows (depending on their value)</a:t>
+            </a:r>
+          </a:p>
+          <a:p>
+            <a:pPr marL="1085850" lvl="1" indent="-342900">
+              <a:buFont typeface="Arial" panose="020B0604020202020204" pitchFamily="34" charset="0"/>
+              <a:buChar char="•"/>
+            </a:pPr>
+            <a:r>
+              <a:rPr lang="en-GB" sz="2400" dirty="0">
+                <a:latin typeface="Corbel" panose="020B0503020204020204" pitchFamily="34" charset="0"/>
+              </a:rPr>
+              <a:t>select(): select columns</a:t>
+            </a:r>
+          </a:p>
+          <a:p>
+            <a:pPr marL="1085850" lvl="1" indent="-342900">
+              <a:buFont typeface="Arial" panose="020B0604020202020204" pitchFamily="34" charset="0"/>
+              <a:buChar char="•"/>
+            </a:pPr>
+            <a:r>
+              <a:rPr lang="en-GB" sz="2400" dirty="0">
+                <a:latin typeface="Corbel" panose="020B0503020204020204" pitchFamily="34" charset="0"/>
+              </a:rPr>
+              <a:t>rename(): rename columns</a:t>
+            </a:r>
+          </a:p>
+          <a:p>
+            <a:pPr marL="1085850" lvl="1" indent="-342900">
+              <a:buFont typeface="Arial" panose="020B0604020202020204" pitchFamily="34" charset="0"/>
+              <a:buChar char="•"/>
+            </a:pPr>
+            <a:r>
+              <a:rPr lang="en-GB" sz="2400" dirty="0">
+                <a:latin typeface="Corbel" panose="020B0503020204020204" pitchFamily="34" charset="0"/>
+              </a:rPr>
+              <a:t>mutate(): add new columns, or change existing ones</a:t>
+            </a:r>
+          </a:p>
+          <a:p>
+            <a:pPr marL="1085850" lvl="1" indent="-342900">
+              <a:buFont typeface="Arial" panose="020B0604020202020204" pitchFamily="34" charset="0"/>
+              <a:buChar char="•"/>
+            </a:pPr>
+            <a:r>
+              <a:rPr lang="en-GB" sz="2400" dirty="0" err="1">
+                <a:latin typeface="Corbel" panose="020B0503020204020204" pitchFamily="34" charset="0"/>
+              </a:rPr>
+              <a:t>group_by</a:t>
+            </a:r>
+            <a:r>
+              <a:rPr lang="en-GB" sz="2400" dirty="0">
+                <a:latin typeface="Corbel" panose="020B0503020204020204" pitchFamily="34" charset="0"/>
+              </a:rPr>
+              <a:t>(): group rows together</a:t>
+            </a:r>
+          </a:p>
+          <a:p>
+            <a:pPr marL="1085850" lvl="1" indent="-342900">
+              <a:buFont typeface="Arial" panose="020B0604020202020204" pitchFamily="34" charset="0"/>
+              <a:buChar char="•"/>
+            </a:pPr>
+            <a:r>
+              <a:rPr lang="en-GB" sz="2400" dirty="0">
+                <a:latin typeface="Corbel" panose="020B0503020204020204" pitchFamily="34" charset="0"/>
+              </a:rPr>
+              <a:t>summarise(): compute summary statistics</a:t>
+            </a:r>
+          </a:p>
+        </p:txBody>
+      </p:sp>
+    </p:spTree>
+    <p:extLst>
+      <p:ext uri="{BB962C8B-B14F-4D97-AF65-F5344CB8AC3E}">
+        <p14:creationId xmlns:p14="http://schemas.microsoft.com/office/powerpoint/2010/main" val="3463844246"/>
+      </p:ext>
+    </p:extLst>
+  </p:cSld>
+  <p:clrMapOvr>
+    <a:masterClrMapping/>
+  </p:clrMapOvr>
+</p:sld>
+</file>
+
+<file path=ppt/slides/slide16.xml><?xml version="1.0" encoding="utf-8"?>
+<p:sld xmlns:a="http://schemas.openxmlformats.org/drawingml/2006/main" xmlns:r="http://schemas.openxmlformats.org/officeDocument/2006/relationships" xmlns:p="http://schemas.openxmlformats.org/presentationml/2006/main">
+  <p:cSld>
+    <p:spTree>
+      <p:nvGrpSpPr>
+        <p:cNvPr id="1" name=""/>
+        <p:cNvGrpSpPr/>
+        <p:nvPr/>
+      </p:nvGrpSpPr>
+      <p:grpSpPr>
+        <a:xfrm>
+          <a:off x="0" y="0"/>
+          <a:ext cx="0" cy="0"/>
+          <a:chOff x="0" y="0"/>
+          <a:chExt cx="0" cy="0"/>
+        </a:xfrm>
+      </p:grpSpPr>
+      <p:sp>
+        <p:nvSpPr>
+          <p:cNvPr id="2" name="Title 1">
+            <a:extLst>
+              <a:ext uri="{FF2B5EF4-FFF2-40B4-BE49-F238E27FC236}">
+                <a16:creationId xmlns:a16="http://schemas.microsoft.com/office/drawing/2014/main" id="{F0A45566-4617-4665-BD5E-906529FF2A03}"/>
+              </a:ext>
+            </a:extLst>
+          </p:cNvPr>
+          <p:cNvSpPr>
+            <a:spLocks noGrp="1"/>
+          </p:cNvSpPr>
+          <p:nvPr>
+            <p:ph type="title"/>
+          </p:nvPr>
+        </p:nvSpPr>
+        <p:spPr/>
+        <p:txBody>
+          <a:bodyPr/>
+          <a:lstStyle/>
+          <a:p>
+            <a:r>
+              <a:rPr lang="en-US" dirty="0"/>
+              <a:t>Trouble shooting</a:t>
+            </a:r>
+            <a:endParaRPr lang="en-GB" dirty="0"/>
+          </a:p>
+        </p:txBody>
+      </p:sp>
+      <p:sp>
+        <p:nvSpPr>
+          <p:cNvPr id="3" name="Content Placeholder 2">
+            <a:extLst>
+              <a:ext uri="{FF2B5EF4-FFF2-40B4-BE49-F238E27FC236}">
+                <a16:creationId xmlns:a16="http://schemas.microsoft.com/office/drawing/2014/main" id="{FA4BAB85-6D54-4F14-9854-9040CEF943A0}"/>
+              </a:ext>
+            </a:extLst>
+          </p:cNvPr>
+          <p:cNvSpPr>
+            <a:spLocks noGrp="1"/>
+          </p:cNvSpPr>
+          <p:nvPr>
+            <p:ph idx="1"/>
+          </p:nvPr>
+        </p:nvSpPr>
+        <p:spPr>
+          <a:xfrm>
+            <a:off x="609599" y="1477818"/>
+            <a:ext cx="10972801" cy="5380182"/>
+          </a:xfrm>
+        </p:spPr>
+        <p:txBody>
+          <a:bodyPr/>
+          <a:lstStyle/>
+          <a:p>
+            <a:pPr marL="342900" indent="-342900">
+              <a:buFont typeface="Arial" panose="020B0604020202020204" pitchFamily="34" charset="0"/>
+              <a:buChar char="•"/>
+            </a:pPr>
+            <a:r>
+              <a:rPr lang="en-US" dirty="0"/>
+              <a:t>When debugging your code, a few tips / resources can come in handy:</a:t>
+            </a:r>
+            <a:endParaRPr lang="en-GB" sz="2200" dirty="0"/>
+          </a:p>
+          <a:p>
+            <a:pPr marL="1085850" lvl="1" indent="-342900">
+              <a:buFont typeface="Arial" panose="020B0604020202020204" pitchFamily="34" charset="0"/>
+              <a:buChar char="•"/>
+            </a:pPr>
+            <a:r>
+              <a:rPr lang="en-US" sz="2200" dirty="0"/>
+              <a:t>Check every “, (, { or [ is closed, and that the letter case is correct.</a:t>
+            </a:r>
+          </a:p>
+          <a:p>
+            <a:pPr marL="342900" indent="-342900">
+              <a:buFont typeface="Arial" panose="020B0604020202020204" pitchFamily="34" charset="0"/>
+              <a:buChar char="•"/>
+            </a:pPr>
+            <a:endParaRPr lang="en-US" sz="2200" dirty="0"/>
+          </a:p>
+          <a:p>
+            <a:pPr marL="1085850" lvl="1" indent="-342900">
+              <a:buFont typeface="Arial" panose="020B0604020202020204" pitchFamily="34" charset="0"/>
+              <a:buChar char="•"/>
+            </a:pPr>
+            <a:r>
+              <a:rPr lang="en-US" sz="2200" dirty="0"/>
+              <a:t>Use ‘?’ to open the documentation of a function or dataset (e.g. ‘?mean’, ‘plot()’, ‘?iris’). The documentation usually provides information on:</a:t>
+            </a:r>
+          </a:p>
+          <a:p>
+            <a:pPr marL="1485900" lvl="2" indent="-342900">
+              <a:buFont typeface="Arial" panose="020B0604020202020204" pitchFamily="34" charset="0"/>
+              <a:buChar char="•"/>
+            </a:pPr>
+            <a:r>
+              <a:rPr lang="en-US" sz="1800" dirty="0"/>
+              <a:t>How the function is meant to be used.</a:t>
+            </a:r>
+          </a:p>
+          <a:p>
+            <a:pPr marL="1485900" lvl="2" indent="-342900">
+              <a:buFont typeface="Arial" panose="020B0604020202020204" pitchFamily="34" charset="0"/>
+              <a:buChar char="•"/>
+            </a:pPr>
+            <a:r>
+              <a:rPr lang="en-US" sz="1800" dirty="0"/>
+              <a:t>The arguments it can accept.</a:t>
+            </a:r>
+          </a:p>
+          <a:p>
+            <a:pPr marL="1485900" lvl="2" indent="-342900">
+              <a:buFont typeface="Arial" panose="020B0604020202020204" pitchFamily="34" charset="0"/>
+              <a:buChar char="•"/>
+            </a:pPr>
+            <a:r>
+              <a:rPr lang="en-US" sz="1800" dirty="0"/>
+              <a:t>The value it returns.</a:t>
+            </a:r>
+          </a:p>
+          <a:p>
+            <a:pPr marL="1085850" lvl="1" indent="-342900">
+              <a:buFont typeface="Arial" panose="020B0604020202020204" pitchFamily="34" charset="0"/>
+              <a:buChar char="•"/>
+            </a:pPr>
+            <a:endParaRPr lang="en-US" sz="2200" dirty="0"/>
+          </a:p>
+          <a:p>
+            <a:pPr marL="1085850" lvl="1" indent="-342900">
+              <a:buFont typeface="Arial" panose="020B0604020202020204" pitchFamily="34" charset="0"/>
+              <a:buChar char="•"/>
+            </a:pPr>
+            <a:r>
+              <a:rPr lang="en-US" sz="2200" dirty="0"/>
+              <a:t>Check the vignettes / examples associated with the packages you are using.</a:t>
+            </a:r>
+          </a:p>
+          <a:p>
+            <a:pPr marL="1085850" lvl="1" indent="-342900">
+              <a:buFont typeface="Arial" panose="020B0604020202020204" pitchFamily="34" charset="0"/>
+              <a:buChar char="•"/>
+            </a:pPr>
+            <a:endParaRPr lang="en-US" sz="2200" dirty="0"/>
+          </a:p>
+          <a:p>
+            <a:pPr marL="1085850" lvl="1" indent="-342900">
+              <a:buFont typeface="Arial" panose="020B0604020202020204" pitchFamily="34" charset="0"/>
+              <a:buChar char="•"/>
+            </a:pPr>
+            <a:r>
+              <a:rPr lang="en-US" sz="2200" b="1" dirty="0"/>
+              <a:t>Google the error message and the name of the function causing the bug, someone else probably ran into the same problem before !</a:t>
+            </a:r>
+          </a:p>
+          <a:p>
+            <a:pPr marL="342900" indent="-342900">
+              <a:buFont typeface="Arial" panose="020B0604020202020204" pitchFamily="34" charset="0"/>
+              <a:buChar char="•"/>
+            </a:pPr>
+            <a:endParaRPr lang="en-US" dirty="0"/>
+          </a:p>
+        </p:txBody>
+      </p:sp>
+    </p:spTree>
+    <p:extLst>
+      <p:ext uri="{BB962C8B-B14F-4D97-AF65-F5344CB8AC3E}">
+        <p14:creationId xmlns:p14="http://schemas.microsoft.com/office/powerpoint/2010/main" val="2564155248"/>
+      </p:ext>
+    </p:extLst>
+  </p:cSld>
+  <p:clrMapOvr>
+    <a:masterClrMapping/>
+  </p:clrMapOvr>
+  <p:timing>
+    <p:tnLst>
+      <p:par>
+        <p:cTn id="1" dur="indefinite" restart="never" nodeType="tmRoot">
+          <p:childTnLst>
+            <p:seq concurrent="1" nextAc="seek">
+              <p:cTn id="2" dur="indefinite" nodeType="mainSeq">
+                <p:childTnLst>
+                  <p:par>
+                    <p:cTn id="3" fill="hold">
+                      <p:stCondLst>
+                        <p:cond delay="indefinite"/>
+                      </p:stCondLst>
+                      <p:childTnLst>
+                        <p:par>
+                          <p:cTn id="4" fill="hold">
+                            <p:stCondLst>
+                              <p:cond delay="0"/>
+                            </p:stCondLst>
+                            <p:childTnLst>
+                              <p:par>
+                                <p:cTn id="5" presetID="1" presetClass="entr" presetSubtype="0" fill="hold" grpId="0" nodeType="clickEffect">
+                                  <p:stCondLst>
+                                    <p:cond delay="0"/>
+                                  </p:stCondLst>
+                                  <p:childTnLst>
+                                    <p:set>
+                                      <p:cBhvr>
+                                        <p:cTn id="6" dur="1" fill="hold">
+                                          <p:stCondLst>
+                                            <p:cond delay="0"/>
+                                          </p:stCondLst>
+                                        </p:cTn>
+                                        <p:tgtEl>
+                                          <p:spTgt spid="3">
+                                            <p:txEl>
+                                              <p:pRg st="0" end="0"/>
+                                            </p:txEl>
+                                          </p:spTgt>
+                                        </p:tgtEl>
+                                        <p:attrNameLst>
+                                          <p:attrName>style.visibility</p:attrName>
+                                        </p:attrNameLst>
+                                      </p:cBhvr>
+                                      <p:to>
+                                        <p:strVal val="visible"/>
+                                      </p:to>
+                                    </p:set>
+                                  </p:childTnLst>
+                                </p:cTn>
+                              </p:par>
+                            </p:childTnLst>
+                          </p:cTn>
+                        </p:par>
+                      </p:childTnLst>
+                    </p:cTn>
+                  </p:par>
+                  <p:par>
+                    <p:cTn id="7" fill="hold">
+                      <p:stCondLst>
+                        <p:cond delay="indefinite"/>
+                      </p:stCondLst>
+                      <p:childTnLst>
+                        <p:par>
+                          <p:cTn id="8" fill="hold">
+                            <p:stCondLst>
+                              <p:cond delay="0"/>
+                            </p:stCondLst>
+                            <p:childTnLst>
+                              <p:par>
+                                <p:cTn id="9" presetID="1" presetClass="entr" presetSubtype="0" fill="hold" grpId="0" nodeType="clickEffect">
+                                  <p:stCondLst>
+                                    <p:cond delay="0"/>
+                                  </p:stCondLst>
+                                  <p:childTnLst>
+                                    <p:set>
+                                      <p:cBhvr>
+                                        <p:cTn id="10" dur="1" fill="hold">
+                                          <p:stCondLst>
+                                            <p:cond delay="0"/>
+                                          </p:stCondLst>
+                                        </p:cTn>
+                                        <p:tgtEl>
+                                          <p:spTgt spid="3">
+                                            <p:txEl>
+                                              <p:pRg st="1" end="1"/>
+                                            </p:txEl>
+                                          </p:spTgt>
+                                        </p:tgtEl>
+                                        <p:attrNameLst>
+                                          <p:attrName>style.visibility</p:attrName>
+                                        </p:attrNameLst>
+                                      </p:cBhvr>
+                                      <p:to>
+                                        <p:strVal val="visible"/>
+                                      </p:to>
+                                    </p:set>
+                                  </p:childTnLst>
+                                </p:cTn>
+                              </p:par>
+                            </p:childTnLst>
+                          </p:cTn>
+                        </p:par>
+                      </p:childTnLst>
+                    </p:cTn>
+                  </p:par>
+                  <p:par>
+                    <p:cTn id="11" fill="hold">
+                      <p:stCondLst>
+                        <p:cond delay="indefinite"/>
+                      </p:stCondLst>
+                      <p:childTnLst>
+                        <p:par>
+                          <p:cTn id="12" fill="hold">
+                            <p:stCondLst>
+                              <p:cond delay="0"/>
+                            </p:stCondLst>
+                            <p:childTnLst>
+                              <p:par>
+                                <p:cTn id="13" presetID="1" presetClass="entr" presetSubtype="0" fill="hold" grpId="0" nodeType="clickEffect">
+                                  <p:stCondLst>
+                                    <p:cond delay="0"/>
+                                  </p:stCondLst>
+                                  <p:childTnLst>
+                                    <p:set>
+                                      <p:cBhvr>
+                                        <p:cTn id="14" dur="1" fill="hold">
+                                          <p:stCondLst>
+                                            <p:cond delay="0"/>
+                                          </p:stCondLst>
+                                        </p:cTn>
+                                        <p:tgtEl>
+                                          <p:spTgt spid="3">
+                                            <p:txEl>
+                                              <p:pRg st="3" end="3"/>
+                                            </p:txEl>
+                                          </p:spTgt>
+                                        </p:tgtEl>
+                                        <p:attrNameLst>
+                                          <p:attrName>style.visibility</p:attrName>
+                                        </p:attrNameLst>
+                                      </p:cBhvr>
+                                      <p:to>
+                                        <p:strVal val="visible"/>
+                                      </p:to>
+                                    </p:set>
+                                  </p:childTnLst>
+                                </p:cTn>
+                              </p:par>
+                              <p:par>
+                                <p:cTn id="15" presetID="1" presetClass="entr" presetSubtype="0" fill="hold" grpId="0" nodeType="withEffect">
+                                  <p:stCondLst>
+                                    <p:cond delay="0"/>
+                                  </p:stCondLst>
+                                  <p:childTnLst>
+                                    <p:set>
+                                      <p:cBhvr>
+                                        <p:cTn id="16" dur="1" fill="hold">
+                                          <p:stCondLst>
+                                            <p:cond delay="0"/>
+                                          </p:stCondLst>
+                                        </p:cTn>
+                                        <p:tgtEl>
+                                          <p:spTgt spid="3">
+                                            <p:txEl>
+                                              <p:pRg st="4" end="4"/>
+                                            </p:txEl>
+                                          </p:spTgt>
+                                        </p:tgtEl>
+                                        <p:attrNameLst>
+                                          <p:attrName>style.visibility</p:attrName>
+                                        </p:attrNameLst>
+                                      </p:cBhvr>
+                                      <p:to>
+                                        <p:strVal val="visible"/>
+                                      </p:to>
+                                    </p:set>
+                                  </p:childTnLst>
+                                </p:cTn>
+                              </p:par>
+                              <p:par>
+                                <p:cTn id="17" presetID="1" presetClass="entr" presetSubtype="0" fill="hold" grpId="0" nodeType="withEffect">
+                                  <p:stCondLst>
+                                    <p:cond delay="0"/>
+                                  </p:stCondLst>
+                                  <p:childTnLst>
+                                    <p:set>
+                                      <p:cBhvr>
+                                        <p:cTn id="18" dur="1" fill="hold">
+                                          <p:stCondLst>
+                                            <p:cond delay="0"/>
+                                          </p:stCondLst>
+                                        </p:cTn>
+                                        <p:tgtEl>
+                                          <p:spTgt spid="3">
+                                            <p:txEl>
+                                              <p:pRg st="5" end="5"/>
+                                            </p:txEl>
+                                          </p:spTgt>
+                                        </p:tgtEl>
+                                        <p:attrNameLst>
+                                          <p:attrName>style.visibility</p:attrName>
+                                        </p:attrNameLst>
+                                      </p:cBhvr>
+                                      <p:to>
+                                        <p:strVal val="visible"/>
+                                      </p:to>
+                                    </p:set>
+                                  </p:childTnLst>
+                                </p:cTn>
+                              </p:par>
+                              <p:par>
+                                <p:cTn id="19" presetID="1" presetClass="entr" presetSubtype="0" fill="hold" grpId="0" nodeType="withEffect">
+                                  <p:stCondLst>
+                                    <p:cond delay="0"/>
+                                  </p:stCondLst>
+                                  <p:childTnLst>
+                                    <p:set>
+                                      <p:cBhvr>
+                                        <p:cTn id="20" dur="1" fill="hold">
+                                          <p:stCondLst>
+                                            <p:cond delay="0"/>
+                                          </p:stCondLst>
+                                        </p:cTn>
+                                        <p:tgtEl>
+                                          <p:spTgt spid="3">
+                                            <p:txEl>
+                                              <p:pRg st="6" end="6"/>
+                                            </p:txEl>
+                                          </p:spTgt>
+                                        </p:tgtEl>
+                                        <p:attrNameLst>
+                                          <p:attrName>style.visibility</p:attrName>
+                                        </p:attrNameLst>
+                                      </p:cBhvr>
+                                      <p:to>
+                                        <p:strVal val="visible"/>
+                                      </p:to>
+                                    </p:set>
+                                  </p:childTnLst>
+                                </p:cTn>
+                              </p:par>
+                            </p:childTnLst>
+                          </p:cTn>
+                        </p:par>
+                      </p:childTnLst>
+                    </p:cTn>
+                  </p:par>
+                  <p:par>
+                    <p:cTn id="21" fill="hold">
+                      <p:stCondLst>
+                        <p:cond delay="indefinite"/>
+                      </p:stCondLst>
+                      <p:childTnLst>
+                        <p:par>
+                          <p:cTn id="22" fill="hold">
+                            <p:stCondLst>
+                              <p:cond delay="0"/>
+                            </p:stCondLst>
+                            <p:childTnLst>
+                              <p:par>
+                                <p:cTn id="23" presetID="1" presetClass="entr" presetSubtype="0" fill="hold" grpId="0" nodeType="clickEffect">
+                                  <p:stCondLst>
+                                    <p:cond delay="0"/>
+                                  </p:stCondLst>
+                                  <p:childTnLst>
+                                    <p:set>
+                                      <p:cBhvr>
+                                        <p:cTn id="24" dur="1" fill="hold">
+                                          <p:stCondLst>
+                                            <p:cond delay="0"/>
+                                          </p:stCondLst>
+                                        </p:cTn>
+                                        <p:tgtEl>
+                                          <p:spTgt spid="3">
+                                            <p:txEl>
+                                              <p:pRg st="8" end="8"/>
+                                            </p:txEl>
+                                          </p:spTgt>
+                                        </p:tgtEl>
+                                        <p:attrNameLst>
+                                          <p:attrName>style.visibility</p:attrName>
+                                        </p:attrNameLst>
+                                      </p:cBhvr>
+                                      <p:to>
+                                        <p:strVal val="visible"/>
+                                      </p:to>
+                                    </p:set>
+                                  </p:childTnLst>
+                                </p:cTn>
+                              </p:par>
+                            </p:childTnLst>
+                          </p:cTn>
+                        </p:par>
+                      </p:childTnLst>
+                    </p:cTn>
+                  </p:par>
+                  <p:par>
+                    <p:cTn id="25" fill="hold">
+                      <p:stCondLst>
+                        <p:cond delay="indefinite"/>
+                      </p:stCondLst>
+                      <p:childTnLst>
+                        <p:par>
+                          <p:cTn id="26" fill="hold">
+                            <p:stCondLst>
+                              <p:cond delay="0"/>
+                            </p:stCondLst>
+                            <p:childTnLst>
+                              <p:par>
+                                <p:cTn id="27" presetID="1" presetClass="entr" presetSubtype="0" fill="hold" grpId="0" nodeType="clickEffect">
+                                  <p:stCondLst>
+                                    <p:cond delay="0"/>
+                                  </p:stCondLst>
+                                  <p:childTnLst>
+                                    <p:set>
+                                      <p:cBhvr>
+                                        <p:cTn id="28" dur="1" fill="hold">
+                                          <p:stCondLst>
+                                            <p:cond delay="0"/>
+                                          </p:stCondLst>
+                                        </p:cTn>
+                                        <p:tgtEl>
+                                          <p:spTgt spid="3">
+                                            <p:txEl>
+                                              <p:pRg st="10" end="10"/>
+                                            </p:txEl>
+                                          </p:spTgt>
+                                        </p:tgtEl>
+                                        <p:attrNameLst>
+                                          <p:attrName>style.visibility</p:attrName>
+                                        </p:attrNameLst>
+                                      </p:cBhvr>
+                                      <p:to>
+                                        <p:strVal val="visible"/>
+                                      </p:to>
+                                    </p:set>
+                                  </p:childTnLst>
+                                </p:cTn>
+                              </p:par>
+                            </p:childTnLst>
+                          </p:cTn>
+                        </p:par>
+                      </p:childTnLst>
+                    </p:cTn>
+                  </p:par>
+                </p:childTnLst>
+              </p:cTn>
+              <p:prevCondLst>
+                <p:cond evt="onPrev" delay="0">
+                  <p:tgtEl>
+                    <p:sldTgt/>
+                  </p:tgtEl>
+                </p:cond>
+              </p:prevCondLst>
+              <p:nextCondLst>
+                <p:cond evt="onNext" delay="0">
+                  <p:tgtEl>
+                    <p:sldTgt/>
+                  </p:tgtEl>
+                </p:cond>
+              </p:nextCondLst>
+            </p:seq>
+          </p:childTnLst>
+        </p:cTn>
+      </p:par>
+    </p:tnLst>
+    <p:bldLst>
+      <p:bldP spid="3" grpId="0" uiExpand="1" build="p"/>
+    </p:bldLst>
+  </p:timing>
+</p:sld>
+</file>
+
+<file path=ppt/slides/slide17.xml><?xml version="1.0" encoding="utf-8"?>
+<p:sld xmlns:a="http://schemas.openxmlformats.org/drawingml/2006/main" xmlns:r="http://schemas.openxmlformats.org/officeDocument/2006/relationships" xmlns:p="http://schemas.openxmlformats.org/presentationml/2006/main">
+  <p:cSld>
+    <p:spTree>
+      <p:nvGrpSpPr>
+        <p:cNvPr id="1" name=""/>
+        <p:cNvGrpSpPr/>
+        <p:nvPr/>
+      </p:nvGrpSpPr>
+      <p:grpSpPr>
+        <a:xfrm>
+          <a:off x="0" y="0"/>
+          <a:ext cx="0" cy="0"/>
+          <a:chOff x="0" y="0"/>
+          <a:chExt cx="0" cy="0"/>
+        </a:xfrm>
+      </p:grpSpPr>
+      <p:sp>
+        <p:nvSpPr>
+          <p:cNvPr id="2" name="Title 1">
+            <a:extLst>
+              <a:ext uri="{FF2B5EF4-FFF2-40B4-BE49-F238E27FC236}">
                 <a16:creationId xmlns:a16="http://schemas.microsoft.com/office/drawing/2014/main" id="{A1FFF348-256A-419B-94A5-1E1296D1F338}"/>
               </a:ext>
             </a:extLst>
@@ -5682,15 +7789,7 @@
             </a:pPr>
             <a:r>
               <a:rPr lang="en-US" dirty="0"/>
-              <a:t>R has many built-in functions (you have already used a few, such as “mean()”, “print()”, “</a:t>
-            </a:r>
-            <a:r>
-              <a:rPr lang="en-US" dirty="0" err="1"/>
-              <a:t>setwd</a:t>
-            </a:r>
-            <a:r>
-              <a:rPr lang="en-US" dirty="0"/>
-              <a:t>()”, etc..)</a:t>
+              <a:t>R has many built-in functions. You have already used a few, such as “mean()”, “median()” etc.</a:t>
             </a:r>
             <a:endParaRPr lang="en-US" b="1" dirty="0"/>
           </a:p>
@@ -7633,7 +9732,7 @@
           <p:cNvPr id="2" name="Title 1">
             <a:extLst>
               <a:ext uri="{FF2B5EF4-FFF2-40B4-BE49-F238E27FC236}">
-                <a16:creationId xmlns:a16="http://schemas.microsoft.com/office/drawing/2014/main" id="{00355A65-FD6C-401C-8B74-0E20D0FB85C1}"/>
+                <a16:creationId xmlns:a16="http://schemas.microsoft.com/office/drawing/2014/main" id="{0494694A-369B-2B83-68B9-A5CFFBF5E733}"/>
               </a:ext>
             </a:extLst>
           </p:cNvPr>
@@ -7646,14 +9745,20 @@
         </p:nvSpPr>
         <p:spPr/>
         <p:txBody>
-          <a:bodyPr>
-            <a:normAutofit/>
-          </a:bodyPr>
+          <a:bodyPr/>
           <a:lstStyle/>
           <a:p>
             <a:r>
               <a:rPr lang="en-US" dirty="0"/>
-              <a:t>Example of importing and using a package: ggplot2</a:t>
+              <a:t>Package for data </a:t>
+            </a:r>
+            <a:r>
+              <a:rPr lang="en-US" dirty="0" err="1"/>
+              <a:t>visualisation</a:t>
+            </a:r>
+            <a:r>
+              <a:rPr lang="en-US" dirty="0"/>
+              <a:t>: ggplot2</a:t>
             </a:r>
             <a:endParaRPr lang="en-GB" dirty="0"/>
           </a:p>
@@ -7664,7 +9769,7 @@
           <p:cNvPr id="3" name="Content Placeholder 2">
             <a:extLst>
               <a:ext uri="{FF2B5EF4-FFF2-40B4-BE49-F238E27FC236}">
-                <a16:creationId xmlns:a16="http://schemas.microsoft.com/office/drawing/2014/main" id="{AD57517A-35EC-4F66-83D4-8D16A7DEB483}"/>
+                <a16:creationId xmlns:a16="http://schemas.microsoft.com/office/drawing/2014/main" id="{1DE2EACC-629E-3BED-0F35-917C8154711F}"/>
               </a:ext>
             </a:extLst>
           </p:cNvPr>
@@ -7681,6 +9786,12 @@
           <a:lstStyle/>
           <a:p>
             <a:pPr marL="342900" indent="-342900">
+              <a:spcBef>
+                <a:spcPts val="0"/>
+              </a:spcBef>
+              <a:spcAft>
+                <a:spcPts val="1200"/>
+              </a:spcAft>
               <a:buFont typeface="Arial" panose="020B0604020202020204" pitchFamily="34" charset="0"/>
               <a:buChar char="•"/>
             </a:pPr>
@@ -7691,769 +9802,178 @@
           </a:p>
           <a:p>
             <a:pPr marL="342900" indent="-342900">
+              <a:spcBef>
+                <a:spcPts val="0"/>
+              </a:spcBef>
+              <a:spcAft>
+                <a:spcPts val="1200"/>
+              </a:spcAft>
               <a:buFont typeface="Arial" panose="020B0604020202020204" pitchFamily="34" charset="0"/>
               <a:buChar char="•"/>
             </a:pPr>
-            <a:endParaRPr lang="en-US" dirty="0"/>
+            <a:r>
+              <a:rPr lang="en-US" dirty="0"/>
+              <a:t>There are three main steps for making a </a:t>
+            </a:r>
+            <a:r>
+              <a:rPr lang="en-US" dirty="0" err="1"/>
+              <a:t>ggplot</a:t>
+            </a:r>
+            <a:r>
+              <a:rPr lang="en-US" dirty="0"/>
+              <a:t>:</a:t>
+            </a:r>
+          </a:p>
+          <a:p>
+            <a:pPr marL="1257300" lvl="1" indent="-514350">
+              <a:spcBef>
+                <a:spcPts val="0"/>
+              </a:spcBef>
+              <a:spcAft>
+                <a:spcPts val="1200"/>
+              </a:spcAft>
+              <a:buFont typeface="+mj-lt"/>
+              <a:buAutoNum type="arabicPeriod"/>
+            </a:pPr>
+            <a:r>
+              <a:rPr lang="en-US" sz="2400" dirty="0"/>
+              <a:t>Open the canvas with the “</a:t>
+            </a:r>
+            <a:r>
+              <a:rPr lang="en-US" sz="2400" dirty="0" err="1"/>
+              <a:t>ggplot</a:t>
+            </a:r>
+            <a:r>
+              <a:rPr lang="en-US" sz="2400" dirty="0"/>
+              <a:t>()” function and define which data set to use.</a:t>
+            </a:r>
+          </a:p>
+          <a:p>
+            <a:pPr marL="1257300" lvl="1" indent="-514350">
+              <a:spcBef>
+                <a:spcPts val="0"/>
+              </a:spcBef>
+              <a:spcAft>
+                <a:spcPts val="1200"/>
+              </a:spcAft>
+              <a:buFont typeface="+mj-lt"/>
+              <a:buAutoNum type="arabicPeriod"/>
+            </a:pPr>
+            <a:r>
+              <a:rPr lang="en-US" sz="2400" dirty="0"/>
+              <a:t>Tell R which variables (columns) you want to plot.</a:t>
+            </a:r>
+          </a:p>
+          <a:p>
+            <a:pPr marL="1257300" lvl="1" indent="-514350">
+              <a:spcBef>
+                <a:spcPts val="0"/>
+              </a:spcBef>
+              <a:spcAft>
+                <a:spcPts val="1200"/>
+              </a:spcAft>
+              <a:buFont typeface="+mj-lt"/>
+              <a:buAutoNum type="arabicPeriod"/>
+            </a:pPr>
+            <a:r>
+              <a:rPr lang="en-US" sz="2400" dirty="0"/>
+              <a:t>Tell R how you want to plot these data e.g. a histogram, a scatter plot, a boxplot.</a:t>
+            </a:r>
           </a:p>
           <a:p>
             <a:pPr marL="342900" indent="-342900">
+              <a:spcBef>
+                <a:spcPts val="0"/>
+              </a:spcBef>
+              <a:spcAft>
+                <a:spcPts val="1200"/>
+              </a:spcAft>
               <a:buFont typeface="Arial" panose="020B0604020202020204" pitchFamily="34" charset="0"/>
               <a:buChar char="•"/>
             </a:pPr>
             <a:r>
               <a:rPr lang="en-US" dirty="0"/>
-              <a:t>It can be more flexible than base R plots.</a:t>
+              <a:t>Extra (optional) steps change the appearance of the plot.</a:t>
             </a:r>
           </a:p>
           <a:p>
             <a:pPr marL="342900" indent="-342900">
+              <a:spcBef>
+                <a:spcPts val="0"/>
+              </a:spcBef>
+              <a:spcAft>
+                <a:spcPts val="1200"/>
+              </a:spcAft>
               <a:buFont typeface="Arial" panose="020B0604020202020204" pitchFamily="34" charset="0"/>
               <a:buChar char="•"/>
             </a:pPr>
-            <a:endParaRPr lang="en-US" dirty="0"/>
-          </a:p>
-          <a:p>
-            <a:pPr marL="342900" indent="-342900">
+            <a:r>
+              <a:rPr lang="en-US" dirty="0"/>
+              <a:t>Resources:</a:t>
+            </a:r>
+          </a:p>
+          <a:p>
+            <a:pPr marL="1085850" lvl="1" indent="-342900">
+              <a:spcBef>
+                <a:spcPts val="0"/>
+              </a:spcBef>
+              <a:spcAft>
+                <a:spcPts val="1200"/>
+              </a:spcAft>
               <a:buFont typeface="Arial" panose="020B0604020202020204" pitchFamily="34" charset="0"/>
               <a:buChar char="•"/>
             </a:pPr>
             <a:r>
-              <a:rPr lang="en-GB" dirty="0"/>
-              <a:t>The basic function is ‘</a:t>
-            </a:r>
-            <a:r>
-              <a:rPr lang="en-GB" dirty="0" err="1"/>
-              <a:t>ggplot</a:t>
-            </a:r>
-            <a:r>
-              <a:rPr lang="en-GB" dirty="0"/>
-              <a:t>()’, which returns an empty blank plot.</a:t>
-            </a:r>
-          </a:p>
-          <a:p>
-            <a:pPr marL="342900" indent="-342900">
+              <a:rPr lang="en-GB" sz="2400" dirty="0">
+                <a:hlinkClick r:id="rId2"/>
+              </a:rPr>
+              <a:t>ggplot2 website</a:t>
+            </a:r>
+            <a:endParaRPr lang="en-US" sz="2400" dirty="0">
+              <a:hlinkClick r:id="rId3"/>
+            </a:endParaRPr>
+          </a:p>
+          <a:p>
+            <a:pPr marL="1085850" lvl="1" indent="-342900">
+              <a:spcBef>
+                <a:spcPts val="0"/>
+              </a:spcBef>
+              <a:spcAft>
+                <a:spcPts val="1200"/>
+              </a:spcAft>
               <a:buFont typeface="Arial" panose="020B0604020202020204" pitchFamily="34" charset="0"/>
               <a:buChar char="•"/>
             </a:pPr>
-            <a:endParaRPr lang="en-GB" dirty="0"/>
-          </a:p>
-          <a:p>
-            <a:pPr marL="342900" indent="-342900">
+            <a:r>
+              <a:rPr lang="en-US" sz="2400" dirty="0">
+                <a:hlinkClick r:id="rId3"/>
+              </a:rPr>
+              <a:t>Epi R Handbook</a:t>
+            </a:r>
+            <a:r>
+              <a:rPr lang="en-US" sz="2400" dirty="0"/>
+              <a:t> </a:t>
+            </a:r>
+          </a:p>
+          <a:p>
+            <a:pPr marL="1085850" lvl="1" indent="-342900">
+              <a:spcBef>
+                <a:spcPts val="0"/>
+              </a:spcBef>
+              <a:spcAft>
+                <a:spcPts val="1200"/>
+              </a:spcAft>
               <a:buFont typeface="Arial" panose="020B0604020202020204" pitchFamily="34" charset="0"/>
               <a:buChar char="•"/>
             </a:pPr>
-            <a:r>
-              <a:rPr lang="en-GB" dirty="0"/>
-              <a:t>Layers of information are then added to the plot, using various functions.</a:t>
-            </a:r>
-          </a:p>
-          <a:p>
-            <a:pPr marL="342900" indent="-342900">
-              <a:buFont typeface="Arial" panose="020B0604020202020204" pitchFamily="34" charset="0"/>
-              <a:buChar char="•"/>
-            </a:pPr>
-            <a:endParaRPr lang="en-GB" dirty="0"/>
-          </a:p>
-          <a:p>
-            <a:pPr marL="342900" indent="-342900">
-              <a:buFont typeface="Arial" panose="020B0604020202020204" pitchFamily="34" charset="0"/>
-              <a:buChar char="•"/>
-            </a:pPr>
-            <a:r>
-              <a:rPr lang="en-GB" dirty="0"/>
-              <a:t>More information on ggplot2 can be found on the </a:t>
-            </a:r>
-            <a:r>
-              <a:rPr lang="en-GB" dirty="0" err="1"/>
-              <a:t>cheatsheet</a:t>
-            </a:r>
-            <a:r>
-              <a:rPr lang="en-GB" dirty="0"/>
-              <a:t> and website (</a:t>
-            </a:r>
-            <a:r>
-              <a:rPr lang="en-GB" dirty="0">
-                <a:hlinkClick r:id="rId2"/>
-              </a:rPr>
-              <a:t>https://ggplot2.tidyverse.org/</a:t>
-            </a:r>
-            <a:r>
-              <a:rPr lang="en-GB" dirty="0"/>
-              <a:t>). </a:t>
-            </a:r>
+            <a:endParaRPr lang="en-US" sz="2400" dirty="0"/>
           </a:p>
         </p:txBody>
       </p:sp>
     </p:spTree>
     <p:extLst>
       <p:ext uri="{BB962C8B-B14F-4D97-AF65-F5344CB8AC3E}">
-        <p14:creationId xmlns:p14="http://schemas.microsoft.com/office/powerpoint/2010/main" val="1328776277"/>
-      </p:ext>
-    </p:extLst>
-  </p:cSld>
-  <p:clrMapOvr>
-    <a:masterClrMapping/>
-  </p:clrMapOvr>
-  <p:timing>
-    <p:tnLst>
-      <p:par>
-        <p:cTn id="1" dur="indefinite" restart="never" nodeType="tmRoot">
-          <p:childTnLst>
-            <p:seq concurrent="1" nextAc="seek">
-              <p:cTn id="2" dur="indefinite" nodeType="mainSeq">
-                <p:childTnLst>
-                  <p:par>
-                    <p:cTn id="3" fill="hold">
-                      <p:stCondLst>
-                        <p:cond delay="indefinite"/>
-                      </p:stCondLst>
-                      <p:childTnLst>
-                        <p:par>
-                          <p:cTn id="4" fill="hold">
-                            <p:stCondLst>
-                              <p:cond delay="0"/>
-                            </p:stCondLst>
-                            <p:childTnLst>
-                              <p:par>
-                                <p:cTn id="5" presetID="1" presetClass="entr" presetSubtype="0" fill="hold" grpId="0" nodeType="clickEffect">
-                                  <p:stCondLst>
-                                    <p:cond delay="0"/>
-                                  </p:stCondLst>
-                                  <p:childTnLst>
-                                    <p:set>
-                                      <p:cBhvr>
-                                        <p:cTn id="6" dur="1" fill="hold">
-                                          <p:stCondLst>
-                                            <p:cond delay="0"/>
-                                          </p:stCondLst>
-                                        </p:cTn>
-                                        <p:tgtEl>
-                                          <p:spTgt spid="3">
-                                            <p:txEl>
-                                              <p:pRg st="0" end="0"/>
-                                            </p:txEl>
-                                          </p:spTgt>
-                                        </p:tgtEl>
-                                        <p:attrNameLst>
-                                          <p:attrName>style.visibility</p:attrName>
-                                        </p:attrNameLst>
-                                      </p:cBhvr>
-                                      <p:to>
-                                        <p:strVal val="visible"/>
-                                      </p:to>
-                                    </p:set>
-                                  </p:childTnLst>
-                                </p:cTn>
-                              </p:par>
-                            </p:childTnLst>
-                          </p:cTn>
-                        </p:par>
-                      </p:childTnLst>
-                    </p:cTn>
-                  </p:par>
-                  <p:par>
-                    <p:cTn id="7" fill="hold">
-                      <p:stCondLst>
-                        <p:cond delay="indefinite"/>
-                      </p:stCondLst>
-                      <p:childTnLst>
-                        <p:par>
-                          <p:cTn id="8" fill="hold">
-                            <p:stCondLst>
-                              <p:cond delay="0"/>
-                            </p:stCondLst>
-                            <p:childTnLst>
-                              <p:par>
-                                <p:cTn id="9" presetID="1" presetClass="entr" presetSubtype="0" fill="hold" grpId="0" nodeType="clickEffect">
-                                  <p:stCondLst>
-                                    <p:cond delay="0"/>
-                                  </p:stCondLst>
-                                  <p:childTnLst>
-                                    <p:set>
-                                      <p:cBhvr>
-                                        <p:cTn id="10" dur="1" fill="hold">
-                                          <p:stCondLst>
-                                            <p:cond delay="0"/>
-                                          </p:stCondLst>
-                                        </p:cTn>
-                                        <p:tgtEl>
-                                          <p:spTgt spid="3">
-                                            <p:txEl>
-                                              <p:pRg st="2" end="2"/>
-                                            </p:txEl>
-                                          </p:spTgt>
-                                        </p:tgtEl>
-                                        <p:attrNameLst>
-                                          <p:attrName>style.visibility</p:attrName>
-                                        </p:attrNameLst>
-                                      </p:cBhvr>
-                                      <p:to>
-                                        <p:strVal val="visible"/>
-                                      </p:to>
-                                    </p:set>
-                                  </p:childTnLst>
-                                </p:cTn>
-                              </p:par>
-                            </p:childTnLst>
-                          </p:cTn>
-                        </p:par>
-                      </p:childTnLst>
-                    </p:cTn>
-                  </p:par>
-                  <p:par>
-                    <p:cTn id="11" fill="hold">
-                      <p:stCondLst>
-                        <p:cond delay="indefinite"/>
-                      </p:stCondLst>
-                      <p:childTnLst>
-                        <p:par>
-                          <p:cTn id="12" fill="hold">
-                            <p:stCondLst>
-                              <p:cond delay="0"/>
-                            </p:stCondLst>
-                            <p:childTnLst>
-                              <p:par>
-                                <p:cTn id="13" presetID="1" presetClass="entr" presetSubtype="0" fill="hold" grpId="0" nodeType="clickEffect">
-                                  <p:stCondLst>
-                                    <p:cond delay="0"/>
-                                  </p:stCondLst>
-                                  <p:childTnLst>
-                                    <p:set>
-                                      <p:cBhvr>
-                                        <p:cTn id="14" dur="1" fill="hold">
-                                          <p:stCondLst>
-                                            <p:cond delay="0"/>
-                                          </p:stCondLst>
-                                        </p:cTn>
-                                        <p:tgtEl>
-                                          <p:spTgt spid="3">
-                                            <p:txEl>
-                                              <p:pRg st="4" end="4"/>
-                                            </p:txEl>
-                                          </p:spTgt>
-                                        </p:tgtEl>
-                                        <p:attrNameLst>
-                                          <p:attrName>style.visibility</p:attrName>
-                                        </p:attrNameLst>
-                                      </p:cBhvr>
-                                      <p:to>
-                                        <p:strVal val="visible"/>
-                                      </p:to>
-                                    </p:set>
-                                  </p:childTnLst>
-                                </p:cTn>
-                              </p:par>
-                            </p:childTnLst>
-                          </p:cTn>
-                        </p:par>
-                      </p:childTnLst>
-                    </p:cTn>
-                  </p:par>
-                  <p:par>
-                    <p:cTn id="15" fill="hold">
-                      <p:stCondLst>
-                        <p:cond delay="indefinite"/>
-                      </p:stCondLst>
-                      <p:childTnLst>
-                        <p:par>
-                          <p:cTn id="16" fill="hold">
-                            <p:stCondLst>
-                              <p:cond delay="0"/>
-                            </p:stCondLst>
-                            <p:childTnLst>
-                              <p:par>
-                                <p:cTn id="17" presetID="1" presetClass="entr" presetSubtype="0" fill="hold" grpId="0" nodeType="clickEffect">
-                                  <p:stCondLst>
-                                    <p:cond delay="0"/>
-                                  </p:stCondLst>
-                                  <p:childTnLst>
-                                    <p:set>
-                                      <p:cBhvr>
-                                        <p:cTn id="18" dur="1" fill="hold">
-                                          <p:stCondLst>
-                                            <p:cond delay="0"/>
-                                          </p:stCondLst>
-                                        </p:cTn>
-                                        <p:tgtEl>
-                                          <p:spTgt spid="3">
-                                            <p:txEl>
-                                              <p:pRg st="6" end="6"/>
-                                            </p:txEl>
-                                          </p:spTgt>
-                                        </p:tgtEl>
-                                        <p:attrNameLst>
-                                          <p:attrName>style.visibility</p:attrName>
-                                        </p:attrNameLst>
-                                      </p:cBhvr>
-                                      <p:to>
-                                        <p:strVal val="visible"/>
-                                      </p:to>
-                                    </p:set>
-                                  </p:childTnLst>
-                                </p:cTn>
-                              </p:par>
-                            </p:childTnLst>
-                          </p:cTn>
-                        </p:par>
-                      </p:childTnLst>
-                    </p:cTn>
-                  </p:par>
-                  <p:par>
-                    <p:cTn id="19" fill="hold">
-                      <p:stCondLst>
-                        <p:cond delay="indefinite"/>
-                      </p:stCondLst>
-                      <p:childTnLst>
-                        <p:par>
-                          <p:cTn id="20" fill="hold">
-                            <p:stCondLst>
-                              <p:cond delay="0"/>
-                            </p:stCondLst>
-                            <p:childTnLst>
-                              <p:par>
-                                <p:cTn id="21" presetID="1" presetClass="entr" presetSubtype="0" fill="hold" grpId="0" nodeType="clickEffect">
-                                  <p:stCondLst>
-                                    <p:cond delay="0"/>
-                                  </p:stCondLst>
-                                  <p:childTnLst>
-                                    <p:set>
-                                      <p:cBhvr>
-                                        <p:cTn id="22" dur="1" fill="hold">
-                                          <p:stCondLst>
-                                            <p:cond delay="0"/>
-                                          </p:stCondLst>
-                                        </p:cTn>
-                                        <p:tgtEl>
-                                          <p:spTgt spid="3">
-                                            <p:txEl>
-                                              <p:pRg st="8" end="8"/>
-                                            </p:txEl>
-                                          </p:spTgt>
-                                        </p:tgtEl>
-                                        <p:attrNameLst>
-                                          <p:attrName>style.visibility</p:attrName>
-                                        </p:attrNameLst>
-                                      </p:cBhvr>
-                                      <p:to>
-                                        <p:strVal val="visible"/>
-                                      </p:to>
-                                    </p:set>
-                                  </p:childTnLst>
-                                </p:cTn>
-                              </p:par>
-                            </p:childTnLst>
-                          </p:cTn>
-                        </p:par>
-                      </p:childTnLst>
-                    </p:cTn>
-                  </p:par>
-                </p:childTnLst>
-              </p:cTn>
-              <p:prevCondLst>
-                <p:cond evt="onPrev" delay="0">
-                  <p:tgtEl>
-                    <p:sldTgt/>
-                  </p:tgtEl>
-                </p:cond>
-              </p:prevCondLst>
-              <p:nextCondLst>
-                <p:cond evt="onNext" delay="0">
-                  <p:tgtEl>
-                    <p:sldTgt/>
-                  </p:tgtEl>
-                </p:cond>
-              </p:nextCondLst>
-            </p:seq>
-          </p:childTnLst>
-        </p:cTn>
-      </p:par>
-    </p:tnLst>
-    <p:bldLst>
-      <p:bldP spid="3" grpId="0" build="p"/>
-    </p:bldLst>
-  </p:timing>
-</p:sld>
-</file>
-
-<file path=ppt/slides/slide8.xml><?xml version="1.0" encoding="utf-8"?>
-<p:sld xmlns:a="http://schemas.openxmlformats.org/drawingml/2006/main" xmlns:r="http://schemas.openxmlformats.org/officeDocument/2006/relationships" xmlns:p="http://schemas.openxmlformats.org/presentationml/2006/main">
-  <p:cSld>
-    <p:spTree>
-      <p:nvGrpSpPr>
-        <p:cNvPr id="1" name=""/>
-        <p:cNvGrpSpPr/>
-        <p:nvPr/>
-      </p:nvGrpSpPr>
-      <p:grpSpPr>
-        <a:xfrm>
-          <a:off x="0" y="0"/>
-          <a:ext cx="0" cy="0"/>
-          <a:chOff x="0" y="0"/>
-          <a:chExt cx="0" cy="0"/>
-        </a:xfrm>
-      </p:grpSpPr>
-      <p:sp>
-        <p:nvSpPr>
-          <p:cNvPr id="2" name="Title 1">
-            <a:extLst>
-              <a:ext uri="{FF2B5EF4-FFF2-40B4-BE49-F238E27FC236}">
-                <a16:creationId xmlns:a16="http://schemas.microsoft.com/office/drawing/2014/main" id="{0494694A-369B-2B83-68B9-A5CFFBF5E733}"/>
-              </a:ext>
-            </a:extLst>
-          </p:cNvPr>
-          <p:cNvSpPr>
-            <a:spLocks noGrp="1"/>
-          </p:cNvSpPr>
-          <p:nvPr>
-            <p:ph type="title"/>
-          </p:nvPr>
-        </p:nvSpPr>
-        <p:spPr/>
-        <p:txBody>
-          <a:bodyPr/>
-          <a:lstStyle/>
-          <a:p>
-            <a:r>
-              <a:rPr lang="en-US" dirty="0"/>
-              <a:t>Package for data cleaning: </a:t>
-            </a:r>
-            <a:r>
-              <a:rPr lang="en-US" dirty="0" err="1"/>
-              <a:t>dplyr</a:t>
-            </a:r>
-            <a:endParaRPr lang="en-GB" dirty="0"/>
-          </a:p>
-        </p:txBody>
-      </p:sp>
-      <p:sp>
-        <p:nvSpPr>
-          <p:cNvPr id="3" name="Content Placeholder 2">
-            <a:extLst>
-              <a:ext uri="{FF2B5EF4-FFF2-40B4-BE49-F238E27FC236}">
-                <a16:creationId xmlns:a16="http://schemas.microsoft.com/office/drawing/2014/main" id="{1DE2EACC-629E-3BED-0F35-917C8154711F}"/>
-              </a:ext>
-            </a:extLst>
-          </p:cNvPr>
-          <p:cNvSpPr>
-            <a:spLocks noGrp="1"/>
-          </p:cNvSpPr>
-          <p:nvPr>
-            <p:ph idx="1"/>
-          </p:nvPr>
-        </p:nvSpPr>
-        <p:spPr/>
-        <p:txBody>
-          <a:bodyPr/>
-          <a:lstStyle/>
-          <a:p>
-            <a:pPr marL="342900" indent="-342900">
-              <a:buFont typeface="Arial" panose="020B0604020202020204" pitchFamily="34" charset="0"/>
-              <a:buChar char="•"/>
-            </a:pPr>
-            <a:r>
-              <a:rPr lang="en-GB" dirty="0" err="1"/>
-              <a:t>dplyr</a:t>
-            </a:r>
-            <a:r>
-              <a:rPr lang="en-GB" dirty="0"/>
-              <a:t> is a package developed for handling and cleaning data</a:t>
-            </a:r>
-          </a:p>
-          <a:p>
-            <a:pPr marL="342900" indent="-342900">
-              <a:buFont typeface="Arial" panose="020B0604020202020204" pitchFamily="34" charset="0"/>
-              <a:buChar char="•"/>
-            </a:pPr>
-            <a:endParaRPr lang="en-GB" dirty="0"/>
-          </a:p>
-          <a:p>
-            <a:pPr marL="342900" indent="-342900">
-              <a:buFont typeface="Arial" panose="020B0604020202020204" pitchFamily="34" charset="0"/>
-              <a:buChar char="•"/>
-            </a:pPr>
-            <a:r>
-              <a:rPr lang="en-GB" dirty="0" err="1"/>
-              <a:t>dplyr</a:t>
-            </a:r>
-            <a:r>
-              <a:rPr lang="en-GB" dirty="0"/>
-              <a:t> contains a few commands to manipulate data:</a:t>
-            </a:r>
-          </a:p>
-          <a:p>
-            <a:pPr marL="1085850" lvl="1" indent="-342900">
-              <a:buFont typeface="Arial" panose="020B0604020202020204" pitchFamily="34" charset="0"/>
-              <a:buChar char="•"/>
-            </a:pPr>
-            <a:r>
-              <a:rPr lang="en-GB" dirty="0"/>
-              <a:t>filter(): select rows (depending on their value)</a:t>
-            </a:r>
-          </a:p>
-          <a:p>
-            <a:pPr marL="1085850" lvl="1" indent="-342900">
-              <a:buFont typeface="Arial" panose="020B0604020202020204" pitchFamily="34" charset="0"/>
-              <a:buChar char="•"/>
-            </a:pPr>
-            <a:r>
-              <a:rPr lang="en-GB" dirty="0"/>
-              <a:t>select(): select </a:t>
-            </a:r>
-            <a:r>
-              <a:rPr lang="en-GB" dirty="0" err="1"/>
-              <a:t>colums</a:t>
-            </a:r>
-            <a:r>
-              <a:rPr lang="en-GB" dirty="0"/>
-              <a:t> (depending on their value)</a:t>
-            </a:r>
-          </a:p>
-          <a:p>
-            <a:pPr marL="1085850" lvl="1" indent="-342900">
-              <a:buFont typeface="Arial" panose="020B0604020202020204" pitchFamily="34" charset="0"/>
-              <a:buChar char="•"/>
-            </a:pPr>
-            <a:r>
-              <a:rPr lang="en-GB" dirty="0"/>
-              <a:t>mutate(): add new variables</a:t>
-            </a:r>
-          </a:p>
-          <a:p>
-            <a:pPr marL="1085850" lvl="1" indent="-342900">
-              <a:buFont typeface="Arial" panose="020B0604020202020204" pitchFamily="34" charset="0"/>
-              <a:buChar char="•"/>
-            </a:pPr>
-            <a:r>
-              <a:rPr lang="en-GB" dirty="0"/>
-              <a:t>arrange(): change the order of the rows</a:t>
-            </a:r>
-          </a:p>
-          <a:p>
-            <a:pPr marL="1085850" lvl="1" indent="-342900">
-              <a:buFont typeface="Arial" panose="020B0604020202020204" pitchFamily="34" charset="0"/>
-              <a:buChar char="•"/>
-            </a:pPr>
-            <a:r>
-              <a:rPr lang="en-GB" dirty="0"/>
-              <a:t>summarise(): compute summary statistics</a:t>
-            </a:r>
-          </a:p>
-          <a:p>
-            <a:pPr marL="1085850" lvl="1" indent="-342900">
-              <a:buFont typeface="Arial" panose="020B0604020202020204" pitchFamily="34" charset="0"/>
-              <a:buChar char="•"/>
-            </a:pPr>
-            <a:r>
-              <a:rPr lang="en-GB" dirty="0" err="1"/>
-              <a:t>group_by</a:t>
-            </a:r>
-            <a:r>
-              <a:rPr lang="en-GB" dirty="0"/>
-              <a:t>(): group rows together</a:t>
-            </a:r>
-          </a:p>
-        </p:txBody>
-      </p:sp>
-    </p:spTree>
-    <p:extLst>
-      <p:ext uri="{BB962C8B-B14F-4D97-AF65-F5344CB8AC3E}">
-        <p14:creationId xmlns:p14="http://schemas.microsoft.com/office/powerpoint/2010/main" val="3463844246"/>
-      </p:ext>
-    </p:extLst>
-  </p:cSld>
-  <p:clrMapOvr>
-    <a:masterClrMapping/>
-  </p:clrMapOvr>
-</p:sld>
-</file>
-
-<file path=ppt/slides/slide9.xml><?xml version="1.0" encoding="utf-8"?>
-<p:sld xmlns:a="http://schemas.openxmlformats.org/drawingml/2006/main" xmlns:r="http://schemas.openxmlformats.org/officeDocument/2006/relationships" xmlns:p="http://schemas.openxmlformats.org/presentationml/2006/main">
-  <p:cSld>
-    <p:spTree>
-      <p:nvGrpSpPr>
-        <p:cNvPr id="1" name=""/>
-        <p:cNvGrpSpPr/>
-        <p:nvPr/>
-      </p:nvGrpSpPr>
-      <p:grpSpPr>
-        <a:xfrm>
-          <a:off x="0" y="0"/>
-          <a:ext cx="0" cy="0"/>
-          <a:chOff x="0" y="0"/>
-          <a:chExt cx="0" cy="0"/>
-        </a:xfrm>
-      </p:grpSpPr>
-      <p:sp>
-        <p:nvSpPr>
-          <p:cNvPr id="2" name="Title 1">
-            <a:extLst>
-              <a:ext uri="{FF2B5EF4-FFF2-40B4-BE49-F238E27FC236}">
-                <a16:creationId xmlns:a16="http://schemas.microsoft.com/office/drawing/2014/main" id="{F0A45566-4617-4665-BD5E-906529FF2A03}"/>
-              </a:ext>
-            </a:extLst>
-          </p:cNvPr>
-          <p:cNvSpPr>
-            <a:spLocks noGrp="1"/>
-          </p:cNvSpPr>
-          <p:nvPr>
-            <p:ph type="title"/>
-          </p:nvPr>
-        </p:nvSpPr>
-        <p:spPr/>
-        <p:txBody>
-          <a:bodyPr/>
-          <a:lstStyle/>
-          <a:p>
-            <a:r>
-              <a:rPr lang="en-US" dirty="0"/>
-              <a:t>Trouble shooting</a:t>
-            </a:r>
-            <a:endParaRPr lang="en-GB" dirty="0"/>
-          </a:p>
-        </p:txBody>
-      </p:sp>
-      <p:sp>
-        <p:nvSpPr>
-          <p:cNvPr id="3" name="Content Placeholder 2">
-            <a:extLst>
-              <a:ext uri="{FF2B5EF4-FFF2-40B4-BE49-F238E27FC236}">
-                <a16:creationId xmlns:a16="http://schemas.microsoft.com/office/drawing/2014/main" id="{FA4BAB85-6D54-4F14-9854-9040CEF943A0}"/>
-              </a:ext>
-            </a:extLst>
-          </p:cNvPr>
-          <p:cNvSpPr>
-            <a:spLocks noGrp="1"/>
-          </p:cNvSpPr>
-          <p:nvPr>
-            <p:ph idx="1"/>
-          </p:nvPr>
-        </p:nvSpPr>
-        <p:spPr>
-          <a:xfrm>
-            <a:off x="609599" y="1477818"/>
-            <a:ext cx="10972801" cy="5380182"/>
-          </a:xfrm>
-        </p:spPr>
-        <p:txBody>
-          <a:bodyPr/>
-          <a:lstStyle/>
-          <a:p>
-            <a:pPr marL="342900" indent="-342900">
-              <a:buFont typeface="Arial" panose="020B0604020202020204" pitchFamily="34" charset="0"/>
-              <a:buChar char="•"/>
-            </a:pPr>
-            <a:r>
-              <a:rPr lang="en-US" dirty="0"/>
-              <a:t>When debugging your code, a few tips / resources can come in handy:</a:t>
-            </a:r>
-            <a:endParaRPr lang="en-GB" sz="2200" dirty="0"/>
-          </a:p>
-          <a:p>
-            <a:pPr marL="1085850" lvl="1" indent="-342900">
-              <a:buFont typeface="Arial" panose="020B0604020202020204" pitchFamily="34" charset="0"/>
-              <a:buChar char="•"/>
-            </a:pPr>
-            <a:r>
-              <a:rPr lang="en-US" sz="2200" dirty="0"/>
-              <a:t>Check every “, (, { or [ is closed, and that the letter case is correct.</a:t>
-            </a:r>
-          </a:p>
-          <a:p>
-            <a:pPr marL="342900" indent="-342900">
-              <a:buFont typeface="Arial" panose="020B0604020202020204" pitchFamily="34" charset="0"/>
-              <a:buChar char="•"/>
-            </a:pPr>
-            <a:endParaRPr lang="en-US" sz="2200" dirty="0"/>
-          </a:p>
-          <a:p>
-            <a:pPr marL="1085850" lvl="1" indent="-342900">
-              <a:buFont typeface="Arial" panose="020B0604020202020204" pitchFamily="34" charset="0"/>
-              <a:buChar char="•"/>
-            </a:pPr>
-            <a:r>
-              <a:rPr lang="en-US" sz="2200" dirty="0"/>
-              <a:t>Use ‘?’ to open the documentation of a function or dataset (e.g. ‘?mean’, ‘plot()’, ‘?iris’). The documentation usually provides information on:</a:t>
-            </a:r>
-          </a:p>
-          <a:p>
-            <a:pPr marL="1485900" lvl="2" indent="-342900">
-              <a:buFont typeface="Arial" panose="020B0604020202020204" pitchFamily="34" charset="0"/>
-              <a:buChar char="•"/>
-            </a:pPr>
-            <a:r>
-              <a:rPr lang="en-US" sz="1800" dirty="0"/>
-              <a:t>How the function is meant to be used.</a:t>
-            </a:r>
-          </a:p>
-          <a:p>
-            <a:pPr marL="1485900" lvl="2" indent="-342900">
-              <a:buFont typeface="Arial" panose="020B0604020202020204" pitchFamily="34" charset="0"/>
-              <a:buChar char="•"/>
-            </a:pPr>
-            <a:r>
-              <a:rPr lang="en-US" sz="1800" dirty="0"/>
-              <a:t>The arguments it can accept.</a:t>
-            </a:r>
-          </a:p>
-          <a:p>
-            <a:pPr marL="1485900" lvl="2" indent="-342900">
-              <a:buFont typeface="Arial" panose="020B0604020202020204" pitchFamily="34" charset="0"/>
-              <a:buChar char="•"/>
-            </a:pPr>
-            <a:r>
-              <a:rPr lang="en-US" sz="1800" dirty="0"/>
-              <a:t>The value it returns.</a:t>
-            </a:r>
-          </a:p>
-          <a:p>
-            <a:pPr marL="1085850" lvl="1" indent="-342900">
-              <a:buFont typeface="Arial" panose="020B0604020202020204" pitchFamily="34" charset="0"/>
-              <a:buChar char="•"/>
-            </a:pPr>
-            <a:endParaRPr lang="en-US" sz="2200" dirty="0"/>
-          </a:p>
-          <a:p>
-            <a:pPr marL="1085850" lvl="1" indent="-342900">
-              <a:buFont typeface="Arial" panose="020B0604020202020204" pitchFamily="34" charset="0"/>
-              <a:buChar char="•"/>
-            </a:pPr>
-            <a:r>
-              <a:rPr lang="en-US" sz="2200" dirty="0"/>
-              <a:t>Check the vignettes / examples associated with the packages you are using.</a:t>
-            </a:r>
-          </a:p>
-          <a:p>
-            <a:pPr marL="1085850" lvl="1" indent="-342900">
-              <a:buFont typeface="Arial" panose="020B0604020202020204" pitchFamily="34" charset="0"/>
-              <a:buChar char="•"/>
-            </a:pPr>
-            <a:endParaRPr lang="en-US" sz="2200" dirty="0"/>
-          </a:p>
-          <a:p>
-            <a:pPr marL="1085850" lvl="1" indent="-342900">
-              <a:buFont typeface="Arial" panose="020B0604020202020204" pitchFamily="34" charset="0"/>
-              <a:buChar char="•"/>
-            </a:pPr>
-            <a:r>
-              <a:rPr lang="en-US" sz="2200" b="1" dirty="0"/>
-              <a:t>Google the error message and the name of the function causing the bug, someone else probably ran into the same problem before !</a:t>
-            </a:r>
-          </a:p>
-          <a:p>
-            <a:pPr marL="342900" indent="-342900">
-              <a:buFont typeface="Arial" panose="020B0604020202020204" pitchFamily="34" charset="0"/>
-              <a:buChar char="•"/>
-            </a:pPr>
-            <a:endParaRPr lang="en-US" dirty="0"/>
-          </a:p>
-        </p:txBody>
-      </p:sp>
-    </p:spTree>
-    <p:extLst>
-      <p:ext uri="{BB962C8B-B14F-4D97-AF65-F5344CB8AC3E}">
-        <p14:creationId xmlns:p14="http://schemas.microsoft.com/office/powerpoint/2010/main" val="2564155248"/>
+        <p14:creationId xmlns:p14="http://schemas.microsoft.com/office/powerpoint/2010/main" val="1680360471"/>
       </p:ext>
     </p:extLst>
   </p:cSld>
@@ -8560,26 +10080,39 @@
                                   </p:childTnLst>
                                 </p:cTn>
                               </p:par>
-                            </p:childTnLst>
-                          </p:cTn>
-                        </p:par>
-                      </p:childTnLst>
-                    </p:cTn>
-                  </p:par>
-                  <p:par>
-                    <p:cTn id="11" fill="hold">
-                      <p:stCondLst>
-                        <p:cond delay="indefinite"/>
-                      </p:stCondLst>
-                      <p:childTnLst>
-                        <p:par>
-                          <p:cTn id="12" fill="hold">
-                            <p:stCondLst>
-                              <p:cond delay="0"/>
-                            </p:stCondLst>
-                            <p:childTnLst>
                               <p:par>
-                                <p:cTn id="13" presetID="1" presetClass="entr" presetSubtype="0" fill="hold" grpId="0" nodeType="clickEffect">
+                                <p:cTn id="11" presetID="1" presetClass="entr" presetSubtype="0" fill="hold" grpId="0" nodeType="withEffect">
+                                  <p:stCondLst>
+                                    <p:cond delay="0"/>
+                                  </p:stCondLst>
+                                  <p:childTnLst>
+                                    <p:set>
+                                      <p:cBhvr>
+                                        <p:cTn id="12" dur="1" fill="hold">
+                                          <p:stCondLst>
+                                            <p:cond delay="0"/>
+                                          </p:stCondLst>
+                                        </p:cTn>
+                                        <p:tgtEl>
+                                          <p:spTgt spid="3">
+                                            <p:txEl>
+                                              <p:pRg st="2" end="2"/>
+                                            </p:txEl>
+                                          </p:spTgt>
+                                        </p:tgtEl>
+                                        <p:attrNameLst>
+                                          <p:attrName>style.visibility</p:attrName>
+                                        </p:attrNameLst>
+                                      </p:cBhvr>
+                                      <p:to>
+                                        <p:strVal val="visible"/>
+                                      </p:to>
+                                    </p:set>
+                                  </p:childTnLst>
+                                </p:cTn>
+                              </p:par>
+                              <p:par>
+                                <p:cTn id="13" presetID="1" presetClass="entr" presetSubtype="0" fill="hold" grpId="0" nodeType="withEffect">
                                   <p:stCondLst>
                                     <p:cond delay="0"/>
                                   </p:stCondLst>
@@ -8640,39 +10173,26 @@
                                   </p:childTnLst>
                                 </p:cTn>
                               </p:par>
+                            </p:childTnLst>
+                          </p:cTn>
+                        </p:par>
+                      </p:childTnLst>
+                    </p:cTn>
+                  </p:par>
+                  <p:par>
+                    <p:cTn id="17" fill="hold">
+                      <p:stCondLst>
+                        <p:cond delay="indefinite"/>
+                      </p:stCondLst>
+                      <p:childTnLst>
+                        <p:par>
+                          <p:cTn id="18" fill="hold">
+                            <p:stCondLst>
+                              <p:cond delay="0"/>
+                            </p:stCondLst>
+                            <p:childTnLst>
                               <p:par>
-                                <p:cTn id="17" presetID="1" presetClass="entr" presetSubtype="0" fill="hold" grpId="0" nodeType="withEffect">
-                                  <p:stCondLst>
-                                    <p:cond delay="0"/>
-                                  </p:stCondLst>
-                                  <p:childTnLst>
-                                    <p:set>
-                                      <p:cBhvr>
-                                        <p:cTn id="18" dur="1" fill="hold">
-                                          <p:stCondLst>
-                                            <p:cond delay="0"/>
-                                          </p:stCondLst>
-                                        </p:cTn>
-                                        <p:tgtEl>
-                                          <p:spTgt spid="3">
-                                            <p:txEl>
-                                              <p:pRg st="5" end="5"/>
-                                            </p:txEl>
-                                          </p:spTgt>
-                                        </p:tgtEl>
-                                        <p:attrNameLst>
-                                          <p:attrName>style.visibility</p:attrName>
-                                        </p:attrNameLst>
-                                      </p:cBhvr>
-                                      <p:to>
-                                        <p:strVal val="visible"/>
-                                      </p:to>
-                                    </p:set>
-                                  </p:childTnLst>
-                                </p:cTn>
-                              </p:par>
-                              <p:par>
-                                <p:cTn id="19" presetID="1" presetClass="entr" presetSubtype="0" fill="hold" grpId="0" nodeType="withEffect">
+                                <p:cTn id="19" presetID="1" presetClass="entr" presetSubtype="0" fill="hold" grpId="0" nodeType="clickEffect">
                                   <p:stCondLst>
                                     <p:cond delay="0"/>
                                   </p:stCondLst>
@@ -8687,7 +10207,7 @@
                                         <p:tgtEl>
                                           <p:spTgt spid="3">
                                             <p:txEl>
-                                              <p:pRg st="6" end="6"/>
+                                              <p:pRg st="5" end="5"/>
                                             </p:txEl>
                                           </p:spTgt>
                                         </p:tgtEl>
@@ -8736,7 +10256,7 @@
                                         <p:tgtEl>
                                           <p:spTgt spid="3">
                                             <p:txEl>
-                                              <p:pRg st="8" end="8"/>
+                                              <p:pRg st="6" end="6"/>
                                             </p:txEl>
                                           </p:spTgt>
                                         </p:tgtEl>
@@ -8751,26 +10271,39 @@
                                   </p:childTnLst>
                                 </p:cTn>
                               </p:par>
-                            </p:childTnLst>
-                          </p:cTn>
-                        </p:par>
-                      </p:childTnLst>
-                    </p:cTn>
-                  </p:par>
-                  <p:par>
-                    <p:cTn id="25" fill="hold">
-                      <p:stCondLst>
-                        <p:cond delay="indefinite"/>
-                      </p:stCondLst>
-                      <p:childTnLst>
-                        <p:par>
-                          <p:cTn id="26" fill="hold">
-                            <p:stCondLst>
-                              <p:cond delay="0"/>
-                            </p:stCondLst>
-                            <p:childTnLst>
                               <p:par>
-                                <p:cTn id="27" presetID="1" presetClass="entr" presetSubtype="0" fill="hold" grpId="0" nodeType="clickEffect">
+                                <p:cTn id="25" presetID="1" presetClass="entr" presetSubtype="0" fill="hold" grpId="0" nodeType="withEffect">
+                                  <p:stCondLst>
+                                    <p:cond delay="0"/>
+                                  </p:stCondLst>
+                                  <p:childTnLst>
+                                    <p:set>
+                                      <p:cBhvr>
+                                        <p:cTn id="26" dur="1" fill="hold">
+                                          <p:stCondLst>
+                                            <p:cond delay="0"/>
+                                          </p:stCondLst>
+                                        </p:cTn>
+                                        <p:tgtEl>
+                                          <p:spTgt spid="3">
+                                            <p:txEl>
+                                              <p:pRg st="7" end="7"/>
+                                            </p:txEl>
+                                          </p:spTgt>
+                                        </p:tgtEl>
+                                        <p:attrNameLst>
+                                          <p:attrName>style.visibility</p:attrName>
+                                        </p:attrNameLst>
+                                      </p:cBhvr>
+                                      <p:to>
+                                        <p:strVal val="visible"/>
+                                      </p:to>
+                                    </p:set>
+                                  </p:childTnLst>
+                                </p:cTn>
+                              </p:par>
+                              <p:par>
+                                <p:cTn id="27" presetID="1" presetClass="entr" presetSubtype="0" fill="hold" grpId="0" nodeType="withEffect">
                                   <p:stCondLst>
                                     <p:cond delay="0"/>
                                   </p:stCondLst>
@@ -8785,7 +10318,7 @@
                                         <p:tgtEl>
                                           <p:spTgt spid="3">
                                             <p:txEl>
-                                              <p:pRg st="10" end="10"/>
+                                              <p:pRg st="8" end="8"/>
                                             </p:txEl>
                                           </p:spTgt>
                                         </p:tgtEl>
@@ -8828,9 +10361,546 @@
       </p:par>
     </p:tnLst>
     <p:bldLst>
-      <p:bldP spid="3" grpId="0" uiExpand="1" build="p"/>
+      <p:bldP spid="3" grpId="0" build="p"/>
     </p:bldLst>
   </p:timing>
+</p:sld>
+</file>
+
+<file path=ppt/slides/slide8.xml><?xml version="1.0" encoding="utf-8"?>
+<p:sld xmlns:a="http://schemas.openxmlformats.org/drawingml/2006/main" xmlns:r="http://schemas.openxmlformats.org/officeDocument/2006/relationships" xmlns:p="http://schemas.openxmlformats.org/presentationml/2006/main">
+  <p:cSld>
+    <p:spTree>
+      <p:nvGrpSpPr>
+        <p:cNvPr id="1" name=""/>
+        <p:cNvGrpSpPr/>
+        <p:nvPr/>
+      </p:nvGrpSpPr>
+      <p:grpSpPr>
+        <a:xfrm>
+          <a:off x="0" y="0"/>
+          <a:ext cx="0" cy="0"/>
+          <a:chOff x="0" y="0"/>
+          <a:chExt cx="0" cy="0"/>
+        </a:xfrm>
+      </p:grpSpPr>
+      <p:sp>
+        <p:nvSpPr>
+          <p:cNvPr id="2" name="Title 1">
+            <a:extLst>
+              <a:ext uri="{FF2B5EF4-FFF2-40B4-BE49-F238E27FC236}">
+                <a16:creationId xmlns:a16="http://schemas.microsoft.com/office/drawing/2014/main" id="{0494694A-369B-2B83-68B9-A5CFFBF5E733}"/>
+              </a:ext>
+            </a:extLst>
+          </p:cNvPr>
+          <p:cNvSpPr>
+            <a:spLocks noGrp="1"/>
+          </p:cNvSpPr>
+          <p:nvPr>
+            <p:ph type="title"/>
+          </p:nvPr>
+        </p:nvSpPr>
+        <p:spPr/>
+        <p:txBody>
+          <a:bodyPr/>
+          <a:lstStyle/>
+          <a:p>
+            <a:r>
+              <a:rPr lang="en-US" dirty="0"/>
+              <a:t>ggplot2, step 1</a:t>
+            </a:r>
+            <a:endParaRPr lang="en-GB" dirty="0"/>
+          </a:p>
+        </p:txBody>
+      </p:sp>
+      <p:sp>
+        <p:nvSpPr>
+          <p:cNvPr id="3" name="Content Placeholder 2">
+            <a:extLst>
+              <a:ext uri="{FF2B5EF4-FFF2-40B4-BE49-F238E27FC236}">
+                <a16:creationId xmlns:a16="http://schemas.microsoft.com/office/drawing/2014/main" id="{1DE2EACC-629E-3BED-0F35-917C8154711F}"/>
+              </a:ext>
+            </a:extLst>
+          </p:cNvPr>
+          <p:cNvSpPr>
+            <a:spLocks noGrp="1"/>
+          </p:cNvSpPr>
+          <p:nvPr>
+            <p:ph idx="1"/>
+          </p:nvPr>
+        </p:nvSpPr>
+        <p:spPr/>
+        <p:txBody>
+          <a:bodyPr/>
+          <a:lstStyle/>
+          <a:p>
+            <a:pPr>
+              <a:spcBef>
+                <a:spcPts val="0"/>
+              </a:spcBef>
+              <a:spcAft>
+                <a:spcPts val="1200"/>
+              </a:spcAft>
+            </a:pPr>
+            <a:r>
+              <a:rPr lang="en-US" sz="2400" dirty="0"/>
+              <a:t>Step 1: Open the canvas with the “</a:t>
+            </a:r>
+            <a:r>
+              <a:rPr lang="en-US" sz="2400" dirty="0" err="1"/>
+              <a:t>ggplot</a:t>
+            </a:r>
+            <a:r>
+              <a:rPr lang="en-US" sz="2400" dirty="0"/>
+              <a:t>()” function and define which data set to use.</a:t>
+            </a:r>
+          </a:p>
+        </p:txBody>
+      </p:sp>
+      <p:pic>
+        <p:nvPicPr>
+          <p:cNvPr id="4" name="Picture 3">
+            <a:extLst>
+              <a:ext uri="{FF2B5EF4-FFF2-40B4-BE49-F238E27FC236}">
+                <a16:creationId xmlns:a16="http://schemas.microsoft.com/office/drawing/2014/main" id="{52A8BBB6-D4A2-29AC-FAF8-3EEBF19A548A}"/>
+              </a:ext>
+            </a:extLst>
+          </p:cNvPr>
+          <p:cNvPicPr>
+            <a:picLocks noChangeAspect="1"/>
+          </p:cNvPicPr>
+          <p:nvPr/>
+        </p:nvPicPr>
+        <p:blipFill>
+          <a:blip r:embed="rId2"/>
+          <a:stretch>
+            <a:fillRect/>
+          </a:stretch>
+        </p:blipFill>
+        <p:spPr>
+          <a:xfrm>
+            <a:off x="8349343" y="2840181"/>
+            <a:ext cx="3233057" cy="3233057"/>
+          </a:xfrm>
+          <a:prstGeom prst="rect">
+            <a:avLst/>
+          </a:prstGeom>
+        </p:spPr>
+      </p:pic>
+      <p:pic>
+        <p:nvPicPr>
+          <p:cNvPr id="5" name="Picture 4">
+            <a:extLst>
+              <a:ext uri="{FF2B5EF4-FFF2-40B4-BE49-F238E27FC236}">
+                <a16:creationId xmlns:a16="http://schemas.microsoft.com/office/drawing/2014/main" id="{7FF2237E-DC23-45AF-D861-53968BA59560}"/>
+              </a:ext>
+            </a:extLst>
+          </p:cNvPr>
+          <p:cNvPicPr>
+            <a:picLocks noChangeAspect="1"/>
+          </p:cNvPicPr>
+          <p:nvPr/>
+        </p:nvPicPr>
+        <p:blipFill rotWithShape="1">
+          <a:blip r:embed="rId3"/>
+          <a:srcRect l="1820" t="9253" r="54623" b="58515"/>
+          <a:stretch/>
+        </p:blipFill>
+        <p:spPr>
+          <a:xfrm>
+            <a:off x="1368383" y="3429000"/>
+            <a:ext cx="4948550" cy="2288639"/>
+          </a:xfrm>
+          <a:prstGeom prst="rect">
+            <a:avLst/>
+          </a:prstGeom>
+        </p:spPr>
+      </p:pic>
+      <p:sp>
+        <p:nvSpPr>
+          <p:cNvPr id="6" name="Rectangle 5">
+            <a:extLst>
+              <a:ext uri="{FF2B5EF4-FFF2-40B4-BE49-F238E27FC236}">
+                <a16:creationId xmlns:a16="http://schemas.microsoft.com/office/drawing/2014/main" id="{AF391E97-F268-7634-FC4B-73E136FC7199}"/>
+              </a:ext>
+            </a:extLst>
+          </p:cNvPr>
+          <p:cNvSpPr/>
+          <p:nvPr/>
+        </p:nvSpPr>
+        <p:spPr>
+          <a:xfrm>
+            <a:off x="1477241" y="4974771"/>
+            <a:ext cx="2198914" cy="598714"/>
+          </a:xfrm>
+          <a:prstGeom prst="rect">
+            <a:avLst/>
+          </a:prstGeom>
+          <a:noFill/>
+          <a:ln w="38100">
+            <a:solidFill>
+              <a:schemeClr val="accent5"/>
+            </a:solidFill>
+          </a:ln>
+          <a:effectLst/>
+        </p:spPr>
+        <p:style>
+          <a:lnRef idx="1">
+            <a:schemeClr val="accent1"/>
+          </a:lnRef>
+          <a:fillRef idx="3">
+            <a:schemeClr val="accent1"/>
+          </a:fillRef>
+          <a:effectRef idx="2">
+            <a:schemeClr val="accent1"/>
+          </a:effectRef>
+          <a:fontRef idx="minor">
+            <a:schemeClr val="lt1"/>
+          </a:fontRef>
+        </p:style>
+        <p:txBody>
+          <a:bodyPr rtlCol="0" anchor="ctr"/>
+          <a:lstStyle/>
+          <a:p>
+            <a:pPr algn="ctr"/>
+            <a:endParaRPr lang="en-US"/>
+          </a:p>
+        </p:txBody>
+      </p:sp>
+      <p:sp>
+        <p:nvSpPr>
+          <p:cNvPr id="9" name="TextBox 8">
+            <a:extLst>
+              <a:ext uri="{FF2B5EF4-FFF2-40B4-BE49-F238E27FC236}">
+                <a16:creationId xmlns:a16="http://schemas.microsoft.com/office/drawing/2014/main" id="{A22918F9-0F46-56B6-3FDE-0CBFC98923E4}"/>
+              </a:ext>
+            </a:extLst>
+          </p:cNvPr>
+          <p:cNvSpPr txBox="1"/>
+          <p:nvPr/>
+        </p:nvSpPr>
+        <p:spPr>
+          <a:xfrm>
+            <a:off x="9512060" y="2470849"/>
+            <a:ext cx="907621" cy="369332"/>
+          </a:xfrm>
+          <a:prstGeom prst="rect">
+            <a:avLst/>
+          </a:prstGeom>
+          <a:noFill/>
+        </p:spPr>
+        <p:txBody>
+          <a:bodyPr wrap="none" rtlCol="0">
+            <a:spAutoFit/>
+          </a:bodyPr>
+          <a:lstStyle/>
+          <a:p>
+            <a:r>
+              <a:rPr lang="en-US" b="1" dirty="0"/>
+              <a:t>Output</a:t>
+            </a:r>
+          </a:p>
+        </p:txBody>
+      </p:sp>
+    </p:spTree>
+    <p:extLst>
+      <p:ext uri="{BB962C8B-B14F-4D97-AF65-F5344CB8AC3E}">
+        <p14:creationId xmlns:p14="http://schemas.microsoft.com/office/powerpoint/2010/main" val="252776047"/>
+      </p:ext>
+    </p:extLst>
+  </p:cSld>
+  <p:clrMapOvr>
+    <a:masterClrMapping/>
+  </p:clrMapOvr>
+</p:sld>
+</file>
+
+<file path=ppt/slides/slide9.xml><?xml version="1.0" encoding="utf-8"?>
+<p:sld xmlns:a="http://schemas.openxmlformats.org/drawingml/2006/main" xmlns:r="http://schemas.openxmlformats.org/officeDocument/2006/relationships" xmlns:p="http://schemas.openxmlformats.org/presentationml/2006/main">
+  <p:cSld>
+    <p:spTree>
+      <p:nvGrpSpPr>
+        <p:cNvPr id="1" name=""/>
+        <p:cNvGrpSpPr/>
+        <p:nvPr/>
+      </p:nvGrpSpPr>
+      <p:grpSpPr>
+        <a:xfrm>
+          <a:off x="0" y="0"/>
+          <a:ext cx="0" cy="0"/>
+          <a:chOff x="0" y="0"/>
+          <a:chExt cx="0" cy="0"/>
+        </a:xfrm>
+      </p:grpSpPr>
+      <p:sp>
+        <p:nvSpPr>
+          <p:cNvPr id="2" name="Title 1">
+            <a:extLst>
+              <a:ext uri="{FF2B5EF4-FFF2-40B4-BE49-F238E27FC236}">
+                <a16:creationId xmlns:a16="http://schemas.microsoft.com/office/drawing/2014/main" id="{0494694A-369B-2B83-68B9-A5CFFBF5E733}"/>
+              </a:ext>
+            </a:extLst>
+          </p:cNvPr>
+          <p:cNvSpPr>
+            <a:spLocks noGrp="1"/>
+          </p:cNvSpPr>
+          <p:nvPr>
+            <p:ph type="title"/>
+          </p:nvPr>
+        </p:nvSpPr>
+        <p:spPr/>
+        <p:txBody>
+          <a:bodyPr/>
+          <a:lstStyle/>
+          <a:p>
+            <a:r>
+              <a:rPr lang="en-US" dirty="0"/>
+              <a:t>ggplot2, step 2</a:t>
+            </a:r>
+            <a:endParaRPr lang="en-GB" dirty="0"/>
+          </a:p>
+        </p:txBody>
+      </p:sp>
+      <p:sp>
+        <p:nvSpPr>
+          <p:cNvPr id="3" name="Content Placeholder 2">
+            <a:extLst>
+              <a:ext uri="{FF2B5EF4-FFF2-40B4-BE49-F238E27FC236}">
+                <a16:creationId xmlns:a16="http://schemas.microsoft.com/office/drawing/2014/main" id="{1DE2EACC-629E-3BED-0F35-917C8154711F}"/>
+              </a:ext>
+            </a:extLst>
+          </p:cNvPr>
+          <p:cNvSpPr>
+            <a:spLocks noGrp="1"/>
+          </p:cNvSpPr>
+          <p:nvPr>
+            <p:ph idx="1"/>
+          </p:nvPr>
+        </p:nvSpPr>
+        <p:spPr/>
+        <p:txBody>
+          <a:bodyPr/>
+          <a:lstStyle/>
+          <a:p>
+            <a:pPr>
+              <a:spcBef>
+                <a:spcPts val="0"/>
+              </a:spcBef>
+              <a:spcAft>
+                <a:spcPts val="1200"/>
+              </a:spcAft>
+            </a:pPr>
+            <a:r>
+              <a:rPr lang="en-US" sz="2400" b="1" dirty="0"/>
+              <a:t>Step 2: Tell R which variables (columns) you want to plot.</a:t>
+            </a:r>
+            <a:endParaRPr lang="en-US" b="1" dirty="0"/>
+          </a:p>
+          <a:p>
+            <a:pPr marL="342900" indent="-342900">
+              <a:spcBef>
+                <a:spcPts val="0"/>
+              </a:spcBef>
+              <a:spcAft>
+                <a:spcPts val="1200"/>
+              </a:spcAft>
+              <a:buFont typeface="Arial" panose="020B0604020202020204" pitchFamily="34" charset="0"/>
+              <a:buChar char="•"/>
+            </a:pPr>
+            <a:r>
+              <a:rPr lang="en-US" sz="2400" dirty="0"/>
+              <a:t>To do this, we map variable names from our data to plot “aesthetics” (features), such as the x and y axes.</a:t>
+            </a:r>
+          </a:p>
+          <a:p>
+            <a:pPr marL="342900" indent="-342900">
+              <a:spcBef>
+                <a:spcPts val="0"/>
+              </a:spcBef>
+              <a:spcAft>
+                <a:spcPts val="1200"/>
+              </a:spcAft>
+              <a:buFont typeface="Arial" panose="020B0604020202020204" pitchFamily="34" charset="0"/>
+              <a:buChar char="•"/>
+            </a:pPr>
+            <a:r>
+              <a:rPr lang="en-US" sz="2400" dirty="0"/>
+              <a:t>We map variables to aesthetics inside the `</a:t>
+            </a:r>
+            <a:r>
+              <a:rPr lang="en-US" sz="2400" dirty="0" err="1"/>
+              <a:t>aes</a:t>
+            </a:r>
+            <a:r>
+              <a:rPr lang="en-US" sz="2400" dirty="0"/>
+              <a:t>()` function, and assign this to the `mapping` argument of the `</a:t>
+            </a:r>
+            <a:r>
+              <a:rPr lang="en-US" sz="2400" dirty="0" err="1"/>
+              <a:t>ggplot</a:t>
+            </a:r>
+            <a:r>
+              <a:rPr lang="en-US" sz="2400" dirty="0"/>
+              <a:t>()` function.</a:t>
+            </a:r>
+          </a:p>
+        </p:txBody>
+      </p:sp>
+      <p:sp>
+        <p:nvSpPr>
+          <p:cNvPr id="9" name="TextBox 8">
+            <a:extLst>
+              <a:ext uri="{FF2B5EF4-FFF2-40B4-BE49-F238E27FC236}">
+                <a16:creationId xmlns:a16="http://schemas.microsoft.com/office/drawing/2014/main" id="{A22918F9-0F46-56B6-3FDE-0CBFC98923E4}"/>
+              </a:ext>
+            </a:extLst>
+          </p:cNvPr>
+          <p:cNvSpPr txBox="1"/>
+          <p:nvPr/>
+        </p:nvSpPr>
+        <p:spPr>
+          <a:xfrm>
+            <a:off x="9639116" y="2741341"/>
+            <a:ext cx="907621" cy="369332"/>
+          </a:xfrm>
+          <a:prstGeom prst="rect">
+            <a:avLst/>
+          </a:prstGeom>
+          <a:noFill/>
+        </p:spPr>
+        <p:txBody>
+          <a:bodyPr wrap="none" rtlCol="0">
+            <a:spAutoFit/>
+          </a:bodyPr>
+          <a:lstStyle/>
+          <a:p>
+            <a:r>
+              <a:rPr lang="en-US" b="1" dirty="0"/>
+              <a:t>Output</a:t>
+            </a:r>
+          </a:p>
+        </p:txBody>
+      </p:sp>
+      <p:pic>
+        <p:nvPicPr>
+          <p:cNvPr id="7" name="Picture 6">
+            <a:extLst>
+              <a:ext uri="{FF2B5EF4-FFF2-40B4-BE49-F238E27FC236}">
+                <a16:creationId xmlns:a16="http://schemas.microsoft.com/office/drawing/2014/main" id="{35A91161-F3ED-08E9-28EB-CF824E9E7E55}"/>
+              </a:ext>
+            </a:extLst>
+          </p:cNvPr>
+          <p:cNvPicPr>
+            <a:picLocks noChangeAspect="1"/>
+          </p:cNvPicPr>
+          <p:nvPr/>
+        </p:nvPicPr>
+        <p:blipFill>
+          <a:blip r:embed="rId2"/>
+          <a:stretch>
+            <a:fillRect/>
+          </a:stretch>
+        </p:blipFill>
+        <p:spPr>
+          <a:xfrm>
+            <a:off x="8360229" y="3110673"/>
+            <a:ext cx="3222171" cy="3222171"/>
+          </a:xfrm>
+          <a:prstGeom prst="rect">
+            <a:avLst/>
+          </a:prstGeom>
+        </p:spPr>
+      </p:pic>
+      <p:pic>
+        <p:nvPicPr>
+          <p:cNvPr id="8" name="Picture 7">
+            <a:extLst>
+              <a:ext uri="{FF2B5EF4-FFF2-40B4-BE49-F238E27FC236}">
+                <a16:creationId xmlns:a16="http://schemas.microsoft.com/office/drawing/2014/main" id="{B2575200-DA97-3C9C-78C2-29D15517D2D2}"/>
+              </a:ext>
+            </a:extLst>
+          </p:cNvPr>
+          <p:cNvPicPr>
+            <a:picLocks noChangeAspect="1"/>
+          </p:cNvPicPr>
+          <p:nvPr/>
+        </p:nvPicPr>
+        <p:blipFill rotWithShape="1">
+          <a:blip r:embed="rId3"/>
+          <a:srcRect l="1821" t="9834" r="55322" b="57395"/>
+          <a:stretch/>
+        </p:blipFill>
+        <p:spPr>
+          <a:xfrm>
+            <a:off x="1730828" y="3429000"/>
+            <a:ext cx="5314733" cy="2539999"/>
+          </a:xfrm>
+          <a:prstGeom prst="rect">
+            <a:avLst/>
+          </a:prstGeom>
+        </p:spPr>
+      </p:pic>
+      <p:sp>
+        <p:nvSpPr>
+          <p:cNvPr id="6" name="Rectangle 5">
+            <a:extLst>
+              <a:ext uri="{FF2B5EF4-FFF2-40B4-BE49-F238E27FC236}">
+                <a16:creationId xmlns:a16="http://schemas.microsoft.com/office/drawing/2014/main" id="{AF391E97-F268-7634-FC4B-73E136FC7199}"/>
+              </a:ext>
+            </a:extLst>
+          </p:cNvPr>
+          <p:cNvSpPr/>
+          <p:nvPr/>
+        </p:nvSpPr>
+        <p:spPr>
+          <a:xfrm>
+            <a:off x="1863941" y="5099794"/>
+            <a:ext cx="4253830" cy="781132"/>
+          </a:xfrm>
+          <a:prstGeom prst="rect">
+            <a:avLst/>
+          </a:prstGeom>
+          <a:noFill/>
+          <a:ln w="38100">
+            <a:solidFill>
+              <a:schemeClr val="accent5"/>
+            </a:solidFill>
+          </a:ln>
+          <a:effectLst/>
+        </p:spPr>
+        <p:style>
+          <a:lnRef idx="1">
+            <a:schemeClr val="accent1"/>
+          </a:lnRef>
+          <a:fillRef idx="3">
+            <a:schemeClr val="accent1"/>
+          </a:fillRef>
+          <a:effectRef idx="2">
+            <a:schemeClr val="accent1"/>
+          </a:effectRef>
+          <a:fontRef idx="minor">
+            <a:schemeClr val="lt1"/>
+          </a:fontRef>
+        </p:style>
+        <p:txBody>
+          <a:bodyPr rtlCol="0" anchor="ctr"/>
+          <a:lstStyle/>
+          <a:p>
+            <a:pPr algn="ctr"/>
+            <a:endParaRPr lang="en-US"/>
+          </a:p>
+        </p:txBody>
+      </p:sp>
+    </p:spTree>
+    <p:extLst>
+      <p:ext uri="{BB962C8B-B14F-4D97-AF65-F5344CB8AC3E}">
+        <p14:creationId xmlns:p14="http://schemas.microsoft.com/office/powerpoint/2010/main" val="39039457"/>
+      </p:ext>
+    </p:extLst>
+  </p:cSld>
+  <p:clrMapOvr>
+    <a:masterClrMapping/>
+  </p:clrMapOvr>
 </p:sld>
 </file>
 

</xml_diff>